<commit_message>
Made progress on momentum
</commit_message>
<xml_diff>
--- a/tex/figures/MomentumAndCM/Figures.pptx
+++ b/tex/figures/MomentumAndCM/Figures.pptx
@@ -6,6 +6,7 @@
   </p:sldMasterIdLst>
   <p:sldIdLst>
     <p:sldId id="271" r:id="rId2"/>
+    <p:sldId id="272" r:id="rId3"/>
   </p:sldIdLst>
   <p:sldSz cx="12192000" cy="6858000"/>
   <p:notesSz cx="6858000" cy="9144000"/>
@@ -4552,6 +4553,2149 @@
 </p:sld>
 </file>
 
+<file path=ppt/slides/slide2.xml><?xml version="1.0" encoding="utf-8"?>
+<p:sld xmlns:a="http://schemas.openxmlformats.org/drawingml/2006/main" xmlns:r="http://schemas.openxmlformats.org/officeDocument/2006/relationships" xmlns:p="http://schemas.openxmlformats.org/presentationml/2006/main">
+  <p:cSld>
+    <p:spTree>
+      <p:nvGrpSpPr>
+        <p:cNvPr id="1" name=""/>
+        <p:cNvGrpSpPr/>
+        <p:nvPr/>
+      </p:nvGrpSpPr>
+      <p:grpSpPr>
+        <a:xfrm>
+          <a:off x="0" y="0"/>
+          <a:ext cx="0" cy="0"/>
+          <a:chOff x="0" y="0"/>
+          <a:chExt cx="0" cy="0"/>
+        </a:xfrm>
+      </p:grpSpPr>
+      <p:grpSp>
+        <p:nvGrpSpPr>
+          <p:cNvPr id="23" name="Group 22"/>
+          <p:cNvGrpSpPr/>
+          <p:nvPr/>
+        </p:nvGrpSpPr>
+        <p:grpSpPr>
+          <a:xfrm>
+            <a:off x="491614" y="349046"/>
+            <a:ext cx="5909188" cy="2507090"/>
+            <a:chOff x="835743" y="712839"/>
+            <a:chExt cx="5909188" cy="2507090"/>
+          </a:xfrm>
+        </p:grpSpPr>
+        <p:grpSp>
+          <p:nvGrpSpPr>
+            <p:cNvPr id="17" name="Group 16"/>
+            <p:cNvGrpSpPr/>
+            <p:nvPr/>
+          </p:nvGrpSpPr>
+          <p:grpSpPr>
+            <a:xfrm>
+              <a:off x="835743" y="712839"/>
+              <a:ext cx="5909188" cy="1763078"/>
+              <a:chOff x="1622323" y="1174955"/>
+              <a:chExt cx="5909188" cy="1763078"/>
+            </a:xfrm>
+          </p:grpSpPr>
+          <p:sp>
+            <p:nvSpPr>
+              <p:cNvPr id="4" name="Freeform 3"/>
+              <p:cNvSpPr/>
+              <p:nvPr/>
+            </p:nvSpPr>
+            <p:spPr>
+              <a:xfrm>
+                <a:off x="3215148" y="2092459"/>
+                <a:ext cx="1583703" cy="537328"/>
+              </a:xfrm>
+              <a:custGeom>
+                <a:avLst/>
+                <a:gdLst>
+                  <a:gd name="connsiteX0" fmla="*/ 0 w 10086681"/>
+                  <a:gd name="connsiteY0" fmla="*/ 931129 h 1873809"/>
+                  <a:gd name="connsiteX1" fmla="*/ 923827 w 10086681"/>
+                  <a:gd name="connsiteY1" fmla="*/ 26156 h 1873809"/>
+                  <a:gd name="connsiteX2" fmla="*/ 1838227 w 10086681"/>
+                  <a:gd name="connsiteY2" fmla="*/ 1836102 h 1873809"/>
+                  <a:gd name="connsiteX3" fmla="*/ 2771481 w 10086681"/>
+                  <a:gd name="connsiteY3" fmla="*/ 26156 h 1873809"/>
+                  <a:gd name="connsiteX4" fmla="*/ 3667027 w 10086681"/>
+                  <a:gd name="connsiteY4" fmla="*/ 1873809 h 1873809"/>
+                  <a:gd name="connsiteX5" fmla="*/ 4600281 w 10086681"/>
+                  <a:gd name="connsiteY5" fmla="*/ 26156 h 1873809"/>
+                  <a:gd name="connsiteX6" fmla="*/ 5486400 w 10086681"/>
+                  <a:gd name="connsiteY6" fmla="*/ 1854956 h 1873809"/>
+                  <a:gd name="connsiteX7" fmla="*/ 6400800 w 10086681"/>
+                  <a:gd name="connsiteY7" fmla="*/ 26156 h 1873809"/>
+                  <a:gd name="connsiteX8" fmla="*/ 7324627 w 10086681"/>
+                  <a:gd name="connsiteY8" fmla="*/ 1854956 h 1873809"/>
+                  <a:gd name="connsiteX9" fmla="*/ 8229600 w 10086681"/>
+                  <a:gd name="connsiteY9" fmla="*/ 26156 h 1873809"/>
+                  <a:gd name="connsiteX10" fmla="*/ 9134574 w 10086681"/>
+                  <a:gd name="connsiteY10" fmla="*/ 1854956 h 1873809"/>
+                  <a:gd name="connsiteX11" fmla="*/ 10086681 w 10086681"/>
+                  <a:gd name="connsiteY11" fmla="*/ 931129 h 1873809"/>
+                  <a:gd name="connsiteX12" fmla="*/ 10086681 w 10086681"/>
+                  <a:gd name="connsiteY12" fmla="*/ 931129 h 1873809"/>
+                </a:gdLst>
+                <a:ahLst/>
+                <a:cxnLst>
+                  <a:cxn ang="0">
+                    <a:pos x="connsiteX0" y="connsiteY0"/>
+                  </a:cxn>
+                  <a:cxn ang="0">
+                    <a:pos x="connsiteX1" y="connsiteY1"/>
+                  </a:cxn>
+                  <a:cxn ang="0">
+                    <a:pos x="connsiteX2" y="connsiteY2"/>
+                  </a:cxn>
+                  <a:cxn ang="0">
+                    <a:pos x="connsiteX3" y="connsiteY3"/>
+                  </a:cxn>
+                  <a:cxn ang="0">
+                    <a:pos x="connsiteX4" y="connsiteY4"/>
+                  </a:cxn>
+                  <a:cxn ang="0">
+                    <a:pos x="connsiteX5" y="connsiteY5"/>
+                  </a:cxn>
+                  <a:cxn ang="0">
+                    <a:pos x="connsiteX6" y="connsiteY6"/>
+                  </a:cxn>
+                  <a:cxn ang="0">
+                    <a:pos x="connsiteX7" y="connsiteY7"/>
+                  </a:cxn>
+                  <a:cxn ang="0">
+                    <a:pos x="connsiteX8" y="connsiteY8"/>
+                  </a:cxn>
+                  <a:cxn ang="0">
+                    <a:pos x="connsiteX9" y="connsiteY9"/>
+                  </a:cxn>
+                  <a:cxn ang="0">
+                    <a:pos x="connsiteX10" y="connsiteY10"/>
+                  </a:cxn>
+                  <a:cxn ang="0">
+                    <a:pos x="connsiteX11" y="connsiteY11"/>
+                  </a:cxn>
+                  <a:cxn ang="0">
+                    <a:pos x="connsiteX12" y="connsiteY12"/>
+                  </a:cxn>
+                </a:cxnLst>
+                <a:rect l="l" t="t" r="r" b="b"/>
+                <a:pathLst>
+                  <a:path w="10086681" h="1873809">
+                    <a:moveTo>
+                      <a:pt x="0" y="931129"/>
+                    </a:moveTo>
+                    <a:cubicBezTo>
+                      <a:pt x="308728" y="403228"/>
+                      <a:pt x="617456" y="-124673"/>
+                      <a:pt x="923827" y="26156"/>
+                    </a:cubicBezTo>
+                    <a:cubicBezTo>
+                      <a:pt x="1230198" y="176985"/>
+                      <a:pt x="1530285" y="1836102"/>
+                      <a:pt x="1838227" y="1836102"/>
+                    </a:cubicBezTo>
+                    <a:cubicBezTo>
+                      <a:pt x="2146169" y="1836102"/>
+                      <a:pt x="2466681" y="19871"/>
+                      <a:pt x="2771481" y="26156"/>
+                    </a:cubicBezTo>
+                    <a:cubicBezTo>
+                      <a:pt x="3076281" y="32440"/>
+                      <a:pt x="3362227" y="1873809"/>
+                      <a:pt x="3667027" y="1873809"/>
+                    </a:cubicBezTo>
+                    <a:cubicBezTo>
+                      <a:pt x="3971827" y="1873809"/>
+                      <a:pt x="4297052" y="29298"/>
+                      <a:pt x="4600281" y="26156"/>
+                    </a:cubicBezTo>
+                    <a:cubicBezTo>
+                      <a:pt x="4903510" y="23014"/>
+                      <a:pt x="5186314" y="1854956"/>
+                      <a:pt x="5486400" y="1854956"/>
+                    </a:cubicBezTo>
+                    <a:cubicBezTo>
+                      <a:pt x="5786486" y="1854956"/>
+                      <a:pt x="6094429" y="26156"/>
+                      <a:pt x="6400800" y="26156"/>
+                    </a:cubicBezTo>
+                    <a:cubicBezTo>
+                      <a:pt x="6707171" y="26156"/>
+                      <a:pt x="7019827" y="1854956"/>
+                      <a:pt x="7324627" y="1854956"/>
+                    </a:cubicBezTo>
+                    <a:cubicBezTo>
+                      <a:pt x="7629427" y="1854956"/>
+                      <a:pt x="7927942" y="26156"/>
+                      <a:pt x="8229600" y="26156"/>
+                    </a:cubicBezTo>
+                    <a:cubicBezTo>
+                      <a:pt x="8531258" y="26156"/>
+                      <a:pt x="8825061" y="1704127"/>
+                      <a:pt x="9134574" y="1854956"/>
+                    </a:cubicBezTo>
+                    <a:cubicBezTo>
+                      <a:pt x="9444087" y="2005785"/>
+                      <a:pt x="10086681" y="931129"/>
+                      <a:pt x="10086681" y="931129"/>
+                    </a:cubicBezTo>
+                    <a:lnTo>
+                      <a:pt x="10086681" y="931129"/>
+                    </a:lnTo>
+                  </a:path>
+                </a:pathLst>
+              </a:custGeom>
+              <a:noFill/>
+              <a:ln w="38100">
+                <a:solidFill>
+                  <a:schemeClr val="tx1"/>
+                </a:solidFill>
+              </a:ln>
+            </p:spPr>
+            <p:style>
+              <a:lnRef idx="2">
+                <a:schemeClr val="accent1">
+                  <a:shade val="50000"/>
+                </a:schemeClr>
+              </a:lnRef>
+              <a:fillRef idx="1">
+                <a:schemeClr val="accent1"/>
+              </a:fillRef>
+              <a:effectRef idx="0">
+                <a:schemeClr val="accent1"/>
+              </a:effectRef>
+              <a:fontRef idx="minor">
+                <a:schemeClr val="lt1"/>
+              </a:fontRef>
+            </p:style>
+            <p:txBody>
+              <a:bodyPr rtlCol="0" anchor="ctr"/>
+              <a:lstStyle/>
+              <a:p>
+                <a:pPr algn="ctr"/>
+                <a:endParaRPr lang="en-US"/>
+              </a:p>
+            </p:txBody>
+          </p:sp>
+          <p:sp>
+            <p:nvSpPr>
+              <p:cNvPr id="5" name="Rectangle 4"/>
+              <p:cNvSpPr/>
+              <p:nvPr/>
+            </p:nvSpPr>
+            <p:spPr>
+              <a:xfrm>
+                <a:off x="1622323" y="2802193"/>
+                <a:ext cx="5909188" cy="135840"/>
+              </a:xfrm>
+              <a:prstGeom prst="rect">
+                <a:avLst/>
+              </a:prstGeom>
+              <a:solidFill>
+                <a:schemeClr val="bg2">
+                  <a:lumMod val="75000"/>
+                </a:schemeClr>
+              </a:solidFill>
+              <a:ln w="38100">
+                <a:solidFill>
+                  <a:schemeClr val="tx1"/>
+                </a:solidFill>
+              </a:ln>
+            </p:spPr>
+            <p:style>
+              <a:lnRef idx="2">
+                <a:schemeClr val="accent1">
+                  <a:shade val="50000"/>
+                </a:schemeClr>
+              </a:lnRef>
+              <a:fillRef idx="1">
+                <a:schemeClr val="accent1"/>
+              </a:fillRef>
+              <a:effectRef idx="0">
+                <a:schemeClr val="accent1"/>
+              </a:effectRef>
+              <a:fontRef idx="minor">
+                <a:schemeClr val="lt1"/>
+              </a:fontRef>
+            </p:style>
+            <p:txBody>
+              <a:bodyPr rtlCol="0" anchor="ctr"/>
+              <a:lstStyle/>
+              <a:p>
+                <a:pPr algn="ctr"/>
+                <a:endParaRPr lang="en-US"/>
+              </a:p>
+            </p:txBody>
+          </p:sp>
+          <p:sp>
+            <p:nvSpPr>
+              <p:cNvPr id="6" name="Rectangle 5"/>
+              <p:cNvSpPr/>
+              <p:nvPr/>
+            </p:nvSpPr>
+            <p:spPr>
+              <a:xfrm>
+                <a:off x="2507226" y="1938336"/>
+                <a:ext cx="707922" cy="845574"/>
+              </a:xfrm>
+              <a:prstGeom prst="rect">
+                <a:avLst/>
+              </a:prstGeom>
+              <a:solidFill>
+                <a:schemeClr val="tx1"/>
+              </a:solidFill>
+              <a:ln w="38100">
+                <a:solidFill>
+                  <a:schemeClr val="tx1"/>
+                </a:solidFill>
+              </a:ln>
+            </p:spPr>
+            <p:style>
+              <a:lnRef idx="2">
+                <a:schemeClr val="accent1">
+                  <a:shade val="50000"/>
+                </a:schemeClr>
+              </a:lnRef>
+              <a:fillRef idx="1">
+                <a:schemeClr val="accent1"/>
+              </a:fillRef>
+              <a:effectRef idx="0">
+                <a:schemeClr val="accent1"/>
+              </a:effectRef>
+              <a:fontRef idx="minor">
+                <a:schemeClr val="lt1"/>
+              </a:fontRef>
+            </p:style>
+            <p:txBody>
+              <a:bodyPr rtlCol="0" anchor="ctr"/>
+              <a:lstStyle/>
+              <a:p>
+                <a:pPr algn="ctr"/>
+                <a:endParaRPr lang="en-US"/>
+              </a:p>
+            </p:txBody>
+          </p:sp>
+          <p:sp>
+            <p:nvSpPr>
+              <p:cNvPr id="7" name="Rectangle 6"/>
+              <p:cNvSpPr/>
+              <p:nvPr/>
+            </p:nvSpPr>
+            <p:spPr>
+              <a:xfrm>
+                <a:off x="5317502" y="1938336"/>
+                <a:ext cx="189271" cy="845574"/>
+              </a:xfrm>
+              <a:prstGeom prst="rect">
+                <a:avLst/>
+              </a:prstGeom>
+              <a:solidFill>
+                <a:schemeClr val="tx1"/>
+              </a:solidFill>
+              <a:ln w="38100">
+                <a:solidFill>
+                  <a:schemeClr val="tx1"/>
+                </a:solidFill>
+              </a:ln>
+            </p:spPr>
+            <p:style>
+              <a:lnRef idx="2">
+                <a:schemeClr val="accent1">
+                  <a:shade val="50000"/>
+                </a:schemeClr>
+              </a:lnRef>
+              <a:fillRef idx="1">
+                <a:schemeClr val="accent1"/>
+              </a:fillRef>
+              <a:effectRef idx="0">
+                <a:schemeClr val="accent1"/>
+              </a:effectRef>
+              <a:fontRef idx="minor">
+                <a:schemeClr val="lt1"/>
+              </a:fontRef>
+            </p:style>
+            <p:txBody>
+              <a:bodyPr rtlCol="0" anchor="ctr"/>
+              <a:lstStyle/>
+              <a:p>
+                <a:pPr algn="ctr"/>
+                <a:endParaRPr lang="en-US"/>
+              </a:p>
+            </p:txBody>
+          </p:sp>
+          <mc:AlternateContent xmlns:mc="http://schemas.openxmlformats.org/markup-compatibility/2006">
+            <mc:Choice xmlns:a14="http://schemas.microsoft.com/office/drawing/2010/main" Requires="a14">
+              <p:sp>
+                <p:nvSpPr>
+                  <p:cNvPr id="8" name="TextBox 7"/>
+                  <p:cNvSpPr txBox="1"/>
+                  <p:nvPr/>
+                </p:nvSpPr>
+                <p:spPr>
+                  <a:xfrm>
+                    <a:off x="2713775" y="1174955"/>
+                    <a:ext cx="294824" cy="307777"/>
+                  </a:xfrm>
+                  <a:prstGeom prst="rect">
+                    <a:avLst/>
+                  </a:prstGeom>
+                  <a:noFill/>
+                </p:spPr>
+                <p:txBody>
+                  <a:bodyPr wrap="none" lIns="0" tIns="0" rIns="0" bIns="0" rtlCol="0">
+                    <a:spAutoFit/>
+                  </a:bodyPr>
+                  <a:lstStyle/>
+                  <a:p>
+                    <a14:m>
+                      <m:oMathPara xmlns:m="http://schemas.openxmlformats.org/officeDocument/2006/math">
+                        <m:oMathParaPr>
+                          <m:jc m:val="centerGroup"/>
+                        </m:oMathParaPr>
+                        <m:oMath xmlns:m="http://schemas.openxmlformats.org/officeDocument/2006/math">
+                          <m:r>
+                            <a:rPr lang="en-US" sz="2000" b="0" i="1" smtClean="0">
+                              <a:latin typeface="Cambria Math" panose="02040503050406030204" pitchFamily="18" charset="0"/>
+                              <a:cs typeface="Arial" panose="020B0604020202020204" pitchFamily="34" charset="0"/>
+                            </a:rPr>
+                            <m:t>𝑀</m:t>
+                          </m:r>
+                        </m:oMath>
+                      </m:oMathPara>
+                    </a14:m>
+                    <a:endParaRPr lang="en-US" sz="2000" dirty="0" smtClean="0">
+                      <a:latin typeface="Arial" panose="020B0604020202020204" pitchFamily="34" charset="0"/>
+                      <a:cs typeface="Arial" panose="020B0604020202020204" pitchFamily="34" charset="0"/>
+                    </a:endParaRPr>
+                  </a:p>
+                </p:txBody>
+              </p:sp>
+            </mc:Choice>
+            <mc:Fallback>
+              <p:sp>
+                <p:nvSpPr>
+                  <p:cNvPr id="8" name="TextBox 7"/>
+                  <p:cNvSpPr txBox="1">
+                    <a:spLocks noRot="1" noChangeAspect="1" noMove="1" noResize="1" noEditPoints="1" noAdjustHandles="1" noChangeArrowheads="1" noChangeShapeType="1" noTextEdit="1"/>
+                  </p:cNvSpPr>
+                  <p:nvPr/>
+                </p:nvSpPr>
+                <p:spPr>
+                  <a:xfrm>
+                    <a:off x="2713775" y="1174955"/>
+                    <a:ext cx="294824" cy="307777"/>
+                  </a:xfrm>
+                  <a:prstGeom prst="rect">
+                    <a:avLst/>
+                  </a:prstGeom>
+                  <a:blipFill>
+                    <a:blip r:embed="rId2"/>
+                    <a:stretch>
+                      <a:fillRect l="-18750" r="-16667" b="-9804"/>
+                    </a:stretch>
+                  </a:blipFill>
+                </p:spPr>
+                <p:txBody>
+                  <a:bodyPr/>
+                  <a:lstStyle/>
+                  <a:p>
+                    <a:r>
+                      <a:rPr lang="en-US">
+                        <a:noFill/>
+                      </a:rPr>
+                      <a:t> </a:t>
+                    </a:r>
+                  </a:p>
+                </p:txBody>
+              </p:sp>
+            </mc:Fallback>
+          </mc:AlternateContent>
+          <mc:AlternateContent xmlns:mc="http://schemas.openxmlformats.org/markup-compatibility/2006">
+            <mc:Choice xmlns:a14="http://schemas.microsoft.com/office/drawing/2010/main" Requires="a14">
+              <p:sp>
+                <p:nvSpPr>
+                  <p:cNvPr id="9" name="TextBox 8"/>
+                  <p:cNvSpPr txBox="1"/>
+                  <p:nvPr/>
+                </p:nvSpPr>
+                <p:spPr>
+                  <a:xfrm>
+                    <a:off x="5317502" y="1174955"/>
+                    <a:ext cx="269793" cy="307777"/>
+                  </a:xfrm>
+                  <a:prstGeom prst="rect">
+                    <a:avLst/>
+                  </a:prstGeom>
+                  <a:noFill/>
+                </p:spPr>
+                <p:txBody>
+                  <a:bodyPr wrap="square" lIns="0" tIns="0" rIns="0" bIns="0" rtlCol="0">
+                    <a:spAutoFit/>
+                  </a:bodyPr>
+                  <a:lstStyle/>
+                  <a:p>
+                    <a14:m>
+                      <m:oMathPara xmlns:m="http://schemas.openxmlformats.org/officeDocument/2006/math">
+                        <m:oMathParaPr>
+                          <m:jc m:val="centerGroup"/>
+                        </m:oMathParaPr>
+                        <m:oMath xmlns:m="http://schemas.openxmlformats.org/officeDocument/2006/math">
+                          <m:r>
+                            <a:rPr lang="en-US" sz="2000" b="0" i="1" smtClean="0">
+                              <a:latin typeface="Cambria Math" panose="02040503050406030204" pitchFamily="18" charset="0"/>
+                              <a:cs typeface="Arial" panose="020B0604020202020204" pitchFamily="34" charset="0"/>
+                            </a:rPr>
+                            <m:t>𝑚</m:t>
+                          </m:r>
+                        </m:oMath>
+                      </m:oMathPara>
+                    </a14:m>
+                    <a:endParaRPr lang="en-US" sz="2000" dirty="0" smtClean="0">
+                      <a:latin typeface="Arial" panose="020B0604020202020204" pitchFamily="34" charset="0"/>
+                      <a:cs typeface="Arial" panose="020B0604020202020204" pitchFamily="34" charset="0"/>
+                    </a:endParaRPr>
+                  </a:p>
+                </p:txBody>
+              </p:sp>
+            </mc:Choice>
+            <mc:Fallback>
+              <p:sp>
+                <p:nvSpPr>
+                  <p:cNvPr id="9" name="TextBox 8"/>
+                  <p:cNvSpPr txBox="1">
+                    <a:spLocks noRot="1" noChangeAspect="1" noMove="1" noResize="1" noEditPoints="1" noAdjustHandles="1" noChangeArrowheads="1" noChangeShapeType="1" noTextEdit="1"/>
+                  </p:cNvSpPr>
+                  <p:nvPr/>
+                </p:nvSpPr>
+                <p:spPr>
+                  <a:xfrm>
+                    <a:off x="5317502" y="1174955"/>
+                    <a:ext cx="269793" cy="307777"/>
+                  </a:xfrm>
+                  <a:prstGeom prst="rect">
+                    <a:avLst/>
+                  </a:prstGeom>
+                  <a:blipFill>
+                    <a:blip r:embed="rId3"/>
+                    <a:stretch>
+                      <a:fillRect l="-15909" r="-11364" b="-1961"/>
+                    </a:stretch>
+                  </a:blipFill>
+                </p:spPr>
+                <p:txBody>
+                  <a:bodyPr/>
+                  <a:lstStyle/>
+                  <a:p>
+                    <a:r>
+                      <a:rPr lang="en-US">
+                        <a:noFill/>
+                      </a:rPr>
+                      <a:t> </a:t>
+                    </a:r>
+                  </a:p>
+                </p:txBody>
+              </p:sp>
+            </mc:Fallback>
+          </mc:AlternateContent>
+          <p:cxnSp>
+            <p:nvCxnSpPr>
+              <p:cNvPr id="11" name="Straight Arrow Connector 10"/>
+              <p:cNvCxnSpPr/>
+              <p:nvPr/>
+            </p:nvCxnSpPr>
+            <p:spPr>
+              <a:xfrm>
+                <a:off x="2713775" y="1710813"/>
+                <a:ext cx="1091309" cy="9832"/>
+              </a:xfrm>
+              <a:prstGeom prst="straightConnector1">
+                <a:avLst/>
+              </a:prstGeom>
+              <a:ln w="38100">
+                <a:solidFill>
+                  <a:schemeClr val="tx1"/>
+                </a:solidFill>
+                <a:tailEnd type="triangle"/>
+              </a:ln>
+            </p:spPr>
+            <p:style>
+              <a:lnRef idx="1">
+                <a:schemeClr val="accent1"/>
+              </a:lnRef>
+              <a:fillRef idx="0">
+                <a:schemeClr val="accent1"/>
+              </a:fillRef>
+              <a:effectRef idx="0">
+                <a:schemeClr val="accent1"/>
+              </a:effectRef>
+              <a:fontRef idx="minor">
+                <a:schemeClr val="tx1"/>
+              </a:fontRef>
+            </p:style>
+          </p:cxnSp>
+          <p:cxnSp>
+            <p:nvCxnSpPr>
+              <p:cNvPr id="12" name="Straight Arrow Connector 11"/>
+              <p:cNvCxnSpPr/>
+              <p:nvPr/>
+            </p:nvCxnSpPr>
+            <p:spPr>
+              <a:xfrm flipH="1">
+                <a:off x="4604663" y="1715729"/>
+                <a:ext cx="712839" cy="4916"/>
+              </a:xfrm>
+              <a:prstGeom prst="straightConnector1">
+                <a:avLst/>
+              </a:prstGeom>
+              <a:ln w="38100">
+                <a:solidFill>
+                  <a:schemeClr val="tx1"/>
+                </a:solidFill>
+                <a:tailEnd type="triangle"/>
+              </a:ln>
+            </p:spPr>
+            <p:style>
+              <a:lnRef idx="1">
+                <a:schemeClr val="accent1"/>
+              </a:lnRef>
+              <a:fillRef idx="0">
+                <a:schemeClr val="accent1"/>
+              </a:fillRef>
+              <a:effectRef idx="0">
+                <a:schemeClr val="accent1"/>
+              </a:effectRef>
+              <a:fontRef idx="minor">
+                <a:schemeClr val="tx1"/>
+              </a:fontRef>
+            </p:style>
+          </p:cxnSp>
+          <mc:AlternateContent xmlns:mc="http://schemas.openxmlformats.org/markup-compatibility/2006">
+            <mc:Choice xmlns:a14="http://schemas.microsoft.com/office/drawing/2010/main" Requires="a14">
+              <p:sp>
+                <p:nvSpPr>
+                  <p:cNvPr id="14" name="TextBox 13"/>
+                  <p:cNvSpPr txBox="1"/>
+                  <p:nvPr/>
+                </p:nvSpPr>
+                <p:spPr>
+                  <a:xfrm>
+                    <a:off x="3259429" y="1345183"/>
+                    <a:ext cx="387798" cy="307777"/>
+                  </a:xfrm>
+                  <a:prstGeom prst="rect">
+                    <a:avLst/>
+                  </a:prstGeom>
+                  <a:noFill/>
+                </p:spPr>
+                <p:txBody>
+                  <a:bodyPr wrap="none" lIns="0" tIns="0" rIns="0" bIns="0" rtlCol="0">
+                    <a:spAutoFit/>
+                  </a:bodyPr>
+                  <a:lstStyle/>
+                  <a:p>
+                    <a14:m>
+                      <m:oMathPara xmlns:m="http://schemas.openxmlformats.org/officeDocument/2006/math">
+                        <m:oMathParaPr>
+                          <m:jc m:val="centerGroup"/>
+                        </m:oMathParaPr>
+                        <m:oMath xmlns:m="http://schemas.openxmlformats.org/officeDocument/2006/math">
+                          <m:sSub>
+                            <m:sSubPr>
+                              <m:ctrlPr>
+                                <a:rPr lang="en-US" sz="2000" b="0" i="1" smtClean="0">
+                                  <a:latin typeface="Cambria Math" panose="02040503050406030204" pitchFamily="18" charset="0"/>
+                                  <a:cs typeface="Arial" panose="020B0604020202020204" pitchFamily="34" charset="0"/>
+                                </a:rPr>
+                              </m:ctrlPr>
+                            </m:sSubPr>
+                            <m:e>
+                              <m:acc>
+                                <m:accPr>
+                                  <m:chr m:val="⃗"/>
+                                  <m:ctrlPr>
+                                    <a:rPr lang="en-US" sz="2000" b="0" i="1" smtClean="0">
+                                      <a:latin typeface="Cambria Math" panose="02040503050406030204" pitchFamily="18" charset="0"/>
+                                      <a:cs typeface="Arial" panose="020B0604020202020204" pitchFamily="34" charset="0"/>
+                                    </a:rPr>
+                                  </m:ctrlPr>
+                                </m:accPr>
+                                <m:e>
+                                  <m:r>
+                                    <a:rPr lang="en-US" sz="2000" b="0" i="1" smtClean="0">
+                                      <a:latin typeface="Cambria Math" panose="02040503050406030204" pitchFamily="18" charset="0"/>
+                                      <a:cs typeface="Arial" panose="020B0604020202020204" pitchFamily="34" charset="0"/>
+                                    </a:rPr>
+                                    <m:t>𝑣</m:t>
+                                  </m:r>
+                                </m:e>
+                              </m:acc>
+                            </m:e>
+                            <m:sub>
+                              <m:r>
+                                <a:rPr lang="en-US" sz="2000" b="0" i="1" smtClean="0">
+                                  <a:latin typeface="Cambria Math" panose="02040503050406030204" pitchFamily="18" charset="0"/>
+                                  <a:cs typeface="Arial" panose="020B0604020202020204" pitchFamily="34" charset="0"/>
+                                </a:rPr>
+                                <m:t>𝑀</m:t>
+                              </m:r>
+                            </m:sub>
+                          </m:sSub>
+                        </m:oMath>
+                      </m:oMathPara>
+                    </a14:m>
+                    <a:endParaRPr lang="en-US" sz="2000" dirty="0" smtClean="0">
+                      <a:latin typeface="Arial" panose="020B0604020202020204" pitchFamily="34" charset="0"/>
+                      <a:cs typeface="Arial" panose="020B0604020202020204" pitchFamily="34" charset="0"/>
+                    </a:endParaRPr>
+                  </a:p>
+                </p:txBody>
+              </p:sp>
+            </mc:Choice>
+            <mc:Fallback>
+              <p:sp>
+                <p:nvSpPr>
+                  <p:cNvPr id="14" name="TextBox 13"/>
+                  <p:cNvSpPr txBox="1">
+                    <a:spLocks noRot="1" noChangeAspect="1" noMove="1" noResize="1" noEditPoints="1" noAdjustHandles="1" noChangeArrowheads="1" noChangeShapeType="1" noTextEdit="1"/>
+                  </p:cNvSpPr>
+                  <p:nvPr/>
+                </p:nvSpPr>
+                <p:spPr>
+                  <a:xfrm>
+                    <a:off x="3259429" y="1345183"/>
+                    <a:ext cx="387798" cy="307777"/>
+                  </a:xfrm>
+                  <a:prstGeom prst="rect">
+                    <a:avLst/>
+                  </a:prstGeom>
+                  <a:blipFill>
+                    <a:blip r:embed="rId4"/>
+                    <a:stretch>
+                      <a:fillRect l="-10938" t="-33333" r="-53125" b="-19608"/>
+                    </a:stretch>
+                  </a:blipFill>
+                </p:spPr>
+                <p:txBody>
+                  <a:bodyPr/>
+                  <a:lstStyle/>
+                  <a:p>
+                    <a:r>
+                      <a:rPr lang="en-US">
+                        <a:noFill/>
+                      </a:rPr>
+                      <a:t> </a:t>
+                    </a:r>
+                  </a:p>
+                </p:txBody>
+              </p:sp>
+            </mc:Fallback>
+          </mc:AlternateContent>
+          <mc:AlternateContent xmlns:mc="http://schemas.openxmlformats.org/markup-compatibility/2006">
+            <mc:Choice xmlns:a14="http://schemas.microsoft.com/office/drawing/2010/main" Requires="a14">
+              <p:sp>
+                <p:nvSpPr>
+                  <p:cNvPr id="15" name="TextBox 14"/>
+                  <p:cNvSpPr txBox="1"/>
+                  <p:nvPr/>
+                </p:nvSpPr>
+                <p:spPr>
+                  <a:xfrm>
+                    <a:off x="4678874" y="1345183"/>
+                    <a:ext cx="387798" cy="307777"/>
+                  </a:xfrm>
+                  <a:prstGeom prst="rect">
+                    <a:avLst/>
+                  </a:prstGeom>
+                  <a:noFill/>
+                </p:spPr>
+                <p:txBody>
+                  <a:bodyPr wrap="none" lIns="0" tIns="0" rIns="0" bIns="0" rtlCol="0">
+                    <a:spAutoFit/>
+                  </a:bodyPr>
+                  <a:lstStyle/>
+                  <a:p>
+                    <a14:m>
+                      <m:oMathPara xmlns:m="http://schemas.openxmlformats.org/officeDocument/2006/math">
+                        <m:oMathParaPr>
+                          <m:jc m:val="centerGroup"/>
+                        </m:oMathParaPr>
+                        <m:oMath xmlns:m="http://schemas.openxmlformats.org/officeDocument/2006/math">
+                          <m:sSub>
+                            <m:sSubPr>
+                              <m:ctrlPr>
+                                <a:rPr lang="en-US" sz="2000" b="0" i="1" smtClean="0">
+                                  <a:latin typeface="Cambria Math" panose="02040503050406030204" pitchFamily="18" charset="0"/>
+                                  <a:cs typeface="Arial" panose="020B0604020202020204" pitchFamily="34" charset="0"/>
+                                </a:rPr>
+                              </m:ctrlPr>
+                            </m:sSubPr>
+                            <m:e>
+                              <m:acc>
+                                <m:accPr>
+                                  <m:chr m:val="⃗"/>
+                                  <m:ctrlPr>
+                                    <a:rPr lang="en-US" sz="2000" b="0" i="1" smtClean="0">
+                                      <a:latin typeface="Cambria Math" panose="02040503050406030204" pitchFamily="18" charset="0"/>
+                                      <a:cs typeface="Arial" panose="020B0604020202020204" pitchFamily="34" charset="0"/>
+                                    </a:rPr>
+                                  </m:ctrlPr>
+                                </m:accPr>
+                                <m:e>
+                                  <m:r>
+                                    <a:rPr lang="en-US" sz="2000" b="0" i="1" smtClean="0">
+                                      <a:latin typeface="Cambria Math" panose="02040503050406030204" pitchFamily="18" charset="0"/>
+                                      <a:cs typeface="Arial" panose="020B0604020202020204" pitchFamily="34" charset="0"/>
+                                    </a:rPr>
+                                    <m:t>𝑣</m:t>
+                                  </m:r>
+                                </m:e>
+                              </m:acc>
+                            </m:e>
+                            <m:sub>
+                              <m:r>
+                                <a:rPr lang="en-US" sz="2000" b="0" i="1" smtClean="0">
+                                  <a:latin typeface="Cambria Math" panose="02040503050406030204" pitchFamily="18" charset="0"/>
+                                  <a:cs typeface="Arial" panose="020B0604020202020204" pitchFamily="34" charset="0"/>
+                                </a:rPr>
+                                <m:t>𝑚</m:t>
+                              </m:r>
+                            </m:sub>
+                          </m:sSub>
+                        </m:oMath>
+                      </m:oMathPara>
+                    </a14:m>
+                    <a:endParaRPr lang="en-US" sz="2000" dirty="0" smtClean="0">
+                      <a:latin typeface="Arial" panose="020B0604020202020204" pitchFamily="34" charset="0"/>
+                      <a:cs typeface="Arial" panose="020B0604020202020204" pitchFamily="34" charset="0"/>
+                    </a:endParaRPr>
+                  </a:p>
+                </p:txBody>
+              </p:sp>
+            </mc:Choice>
+            <mc:Fallback>
+              <p:sp>
+                <p:nvSpPr>
+                  <p:cNvPr id="15" name="TextBox 14"/>
+                  <p:cNvSpPr txBox="1">
+                    <a:spLocks noRot="1" noChangeAspect="1" noMove="1" noResize="1" noEditPoints="1" noAdjustHandles="1" noChangeArrowheads="1" noChangeShapeType="1" noTextEdit="1"/>
+                  </p:cNvSpPr>
+                  <p:nvPr/>
+                </p:nvSpPr>
+                <p:spPr>
+                  <a:xfrm>
+                    <a:off x="4678874" y="1345183"/>
+                    <a:ext cx="387798" cy="307777"/>
+                  </a:xfrm>
+                  <a:prstGeom prst="rect">
+                    <a:avLst/>
+                  </a:prstGeom>
+                  <a:blipFill>
+                    <a:blip r:embed="rId5"/>
+                    <a:stretch>
+                      <a:fillRect l="-10938" t="-33333" r="-53125" b="-13725"/>
+                    </a:stretch>
+                  </a:blipFill>
+                </p:spPr>
+                <p:txBody>
+                  <a:bodyPr/>
+                  <a:lstStyle/>
+                  <a:p>
+                    <a:r>
+                      <a:rPr lang="en-US">
+                        <a:noFill/>
+                      </a:rPr>
+                      <a:t> </a:t>
+                    </a:r>
+                  </a:p>
+                </p:txBody>
+              </p:sp>
+            </mc:Fallback>
+          </mc:AlternateContent>
+          <mc:AlternateContent xmlns:mc="http://schemas.openxmlformats.org/markup-compatibility/2006">
+            <mc:Choice xmlns:a14="http://schemas.microsoft.com/office/drawing/2010/main" Requires="a14">
+              <p:sp>
+                <p:nvSpPr>
+                  <p:cNvPr id="16" name="TextBox 15"/>
+                  <p:cNvSpPr txBox="1"/>
+                  <p:nvPr/>
+                </p:nvSpPr>
+                <p:spPr>
+                  <a:xfrm>
+                    <a:off x="4242619" y="1775540"/>
+                    <a:ext cx="219099" cy="307777"/>
+                  </a:xfrm>
+                  <a:prstGeom prst="rect">
+                    <a:avLst/>
+                  </a:prstGeom>
+                  <a:noFill/>
+                </p:spPr>
+                <p:txBody>
+                  <a:bodyPr wrap="none" lIns="0" tIns="0" rIns="0" bIns="0" rtlCol="0">
+                    <a:spAutoFit/>
+                  </a:bodyPr>
+                  <a:lstStyle/>
+                  <a:p>
+                    <a14:m>
+                      <m:oMathPara xmlns:m="http://schemas.openxmlformats.org/officeDocument/2006/math">
+                        <m:oMathParaPr>
+                          <m:jc m:val="centerGroup"/>
+                        </m:oMathParaPr>
+                        <m:oMath xmlns:m="http://schemas.openxmlformats.org/officeDocument/2006/math">
+                          <m:r>
+                            <a:rPr lang="en-US" sz="2000" b="0" i="1" smtClean="0">
+                              <a:latin typeface="Cambria Math" panose="02040503050406030204" pitchFamily="18" charset="0"/>
+                              <a:cs typeface="Arial" panose="020B0604020202020204" pitchFamily="34" charset="0"/>
+                            </a:rPr>
+                            <m:t>𝑘</m:t>
+                          </m:r>
+                        </m:oMath>
+                      </m:oMathPara>
+                    </a14:m>
+                    <a:endParaRPr lang="en-US" sz="2000" dirty="0" smtClean="0">
+                      <a:latin typeface="Arial" panose="020B0604020202020204" pitchFamily="34" charset="0"/>
+                      <a:cs typeface="Arial" panose="020B0604020202020204" pitchFamily="34" charset="0"/>
+                    </a:endParaRPr>
+                  </a:p>
+                </p:txBody>
+              </p:sp>
+            </mc:Choice>
+            <mc:Fallback>
+              <p:sp>
+                <p:nvSpPr>
+                  <p:cNvPr id="16" name="TextBox 15"/>
+                  <p:cNvSpPr txBox="1">
+                    <a:spLocks noRot="1" noChangeAspect="1" noMove="1" noResize="1" noEditPoints="1" noAdjustHandles="1" noChangeArrowheads="1" noChangeShapeType="1" noTextEdit="1"/>
+                  </p:cNvSpPr>
+                  <p:nvPr/>
+                </p:nvSpPr>
+                <p:spPr>
+                  <a:xfrm>
+                    <a:off x="4242619" y="1775540"/>
+                    <a:ext cx="219099" cy="307777"/>
+                  </a:xfrm>
+                  <a:prstGeom prst="rect">
+                    <a:avLst/>
+                  </a:prstGeom>
+                  <a:blipFill>
+                    <a:blip r:embed="rId6"/>
+                    <a:stretch>
+                      <a:fillRect l="-25000" r="-22222" b="-12000"/>
+                    </a:stretch>
+                  </a:blipFill>
+                </p:spPr>
+                <p:txBody>
+                  <a:bodyPr/>
+                  <a:lstStyle/>
+                  <a:p>
+                    <a:r>
+                      <a:rPr lang="en-US">
+                        <a:noFill/>
+                      </a:rPr>
+                      <a:t> </a:t>
+                    </a:r>
+                  </a:p>
+                </p:txBody>
+              </p:sp>
+            </mc:Fallback>
+          </mc:AlternateContent>
+        </p:grpSp>
+        <p:grpSp>
+          <p:nvGrpSpPr>
+            <p:cNvPr id="18" name="Group 17"/>
+            <p:cNvGrpSpPr/>
+            <p:nvPr/>
+          </p:nvGrpSpPr>
+          <p:grpSpPr>
+            <a:xfrm>
+              <a:off x="844732" y="2661395"/>
+              <a:ext cx="4031829" cy="558534"/>
+              <a:chOff x="919312" y="3331012"/>
+              <a:chExt cx="4031829" cy="558534"/>
+            </a:xfrm>
+          </p:grpSpPr>
+          <p:cxnSp>
+            <p:nvCxnSpPr>
+              <p:cNvPr id="19" name="Straight Arrow Connector 18"/>
+              <p:cNvCxnSpPr/>
+              <p:nvPr/>
+            </p:nvCxnSpPr>
+            <p:spPr>
+              <a:xfrm flipV="1">
+                <a:off x="1025912" y="3438955"/>
+                <a:ext cx="3925229" cy="1"/>
+              </a:xfrm>
+              <a:prstGeom prst="straightConnector1">
+                <a:avLst/>
+              </a:prstGeom>
+              <a:ln w="38100">
+                <a:solidFill>
+                  <a:schemeClr val="tx1"/>
+                </a:solidFill>
+                <a:tailEnd type="triangle"/>
+              </a:ln>
+            </p:spPr>
+            <p:style>
+              <a:lnRef idx="1">
+                <a:schemeClr val="accent1"/>
+              </a:lnRef>
+              <a:fillRef idx="0">
+                <a:schemeClr val="accent1"/>
+              </a:fillRef>
+              <a:effectRef idx="0">
+                <a:schemeClr val="accent1"/>
+              </a:effectRef>
+              <a:fontRef idx="minor">
+                <a:schemeClr val="tx1"/>
+              </a:fontRef>
+            </p:style>
+          </p:cxnSp>
+          <mc:AlternateContent xmlns:mc="http://schemas.openxmlformats.org/markup-compatibility/2006" xmlns:a14="http://schemas.microsoft.com/office/drawing/2010/main">
+            <mc:Choice Requires="a14">
+              <p:sp>
+                <p:nvSpPr>
+                  <p:cNvPr id="20" name="Rectangle 19"/>
+                  <p:cNvSpPr/>
+                  <p:nvPr/>
+                </p:nvSpPr>
+                <p:spPr>
+                  <a:xfrm>
+                    <a:off x="4404738" y="3438955"/>
+                    <a:ext cx="367985" cy="369332"/>
+                  </a:xfrm>
+                  <a:prstGeom prst="rect">
+                    <a:avLst/>
+                  </a:prstGeom>
+                </p:spPr>
+                <p:txBody>
+                  <a:bodyPr wrap="square">
+                    <a:spAutoFit/>
+                  </a:bodyPr>
+                  <a:lstStyle/>
+                  <a:p>
+                    <a:pPr/>
+                    <a14:m>
+                      <m:oMathPara xmlns:m="http://schemas.openxmlformats.org/officeDocument/2006/math">
+                        <m:oMathParaPr>
+                          <m:jc m:val="centerGroup"/>
+                        </m:oMathParaPr>
+                        <m:oMath xmlns:m="http://schemas.openxmlformats.org/officeDocument/2006/math">
+                          <m:r>
+                            <a:rPr lang="en-US" i="1">
+                              <a:latin typeface="Cambria Math" panose="02040503050406030204" pitchFamily="18" charset="0"/>
+                              <a:cs typeface="Arial" panose="020B0604020202020204" pitchFamily="34" charset="0"/>
+                            </a:rPr>
+                            <m:t>𝑥</m:t>
+                          </m:r>
+                        </m:oMath>
+                      </m:oMathPara>
+                    </a14:m>
+                    <a:endParaRPr lang="en-CA" dirty="0"/>
+                  </a:p>
+                </p:txBody>
+              </p:sp>
+            </mc:Choice>
+            <mc:Fallback xmlns="">
+              <p:sp>
+                <p:nvSpPr>
+                  <p:cNvPr id="28" name="Rectangle 27"/>
+                  <p:cNvSpPr>
+                    <a:spLocks noRot="1" noChangeAspect="1" noMove="1" noResize="1" noEditPoints="1" noAdjustHandles="1" noChangeArrowheads="1" noChangeShapeType="1" noTextEdit="1"/>
+                  </p:cNvSpPr>
+                  <p:nvPr/>
+                </p:nvSpPr>
+                <p:spPr>
+                  <a:xfrm>
+                    <a:off x="4404738" y="3438955"/>
+                    <a:ext cx="367985" cy="369332"/>
+                  </a:xfrm>
+                  <a:prstGeom prst="rect">
+                    <a:avLst/>
+                  </a:prstGeom>
+                  <a:blipFill>
+                    <a:blip r:embed="rId30"/>
+                    <a:stretch>
+                      <a:fillRect/>
+                    </a:stretch>
+                  </a:blipFill>
+                </p:spPr>
+                <p:txBody>
+                  <a:bodyPr/>
+                  <a:lstStyle/>
+                  <a:p>
+                    <a:r>
+                      <a:rPr lang="en-US">
+                        <a:noFill/>
+                      </a:rPr>
+                      <a:t> </a:t>
+                    </a:r>
+                  </a:p>
+                </p:txBody>
+              </p:sp>
+            </mc:Fallback>
+          </mc:AlternateContent>
+          <mc:AlternateContent xmlns:mc="http://schemas.openxmlformats.org/markup-compatibility/2006" xmlns:a14="http://schemas.microsoft.com/office/drawing/2010/main">
+            <mc:Choice Requires="a14">
+              <p:sp>
+                <p:nvSpPr>
+                  <p:cNvPr id="21" name="TextBox 20"/>
+                  <p:cNvSpPr txBox="1"/>
+                  <p:nvPr/>
+                </p:nvSpPr>
+                <p:spPr>
+                  <a:xfrm>
+                    <a:off x="919312" y="3581769"/>
+                    <a:ext cx="213200" cy="307777"/>
+                  </a:xfrm>
+                  <a:prstGeom prst="rect">
+                    <a:avLst/>
+                  </a:prstGeom>
+                  <a:noFill/>
+                </p:spPr>
+                <p:txBody>
+                  <a:bodyPr wrap="none" lIns="0" tIns="0" rIns="0" bIns="0" rtlCol="0">
+                    <a:spAutoFit/>
+                  </a:bodyPr>
+                  <a:lstStyle/>
+                  <a:p>
+                    <a:pPr/>
+                    <a14:m>
+                      <m:oMathPara xmlns:m="http://schemas.openxmlformats.org/officeDocument/2006/math">
+                        <m:oMathParaPr>
+                          <m:jc m:val="centerGroup"/>
+                        </m:oMathParaPr>
+                        <m:oMath xmlns:m="http://schemas.openxmlformats.org/officeDocument/2006/math">
+                          <m:r>
+                            <a:rPr lang="en-US" sz="2000" b="0" i="1" smtClean="0">
+                              <a:latin typeface="Cambria Math" panose="02040503050406030204" pitchFamily="18" charset="0"/>
+                              <a:cs typeface="Arial" panose="020B0604020202020204" pitchFamily="34" charset="0"/>
+                            </a:rPr>
+                            <m:t>0</m:t>
+                          </m:r>
+                        </m:oMath>
+                      </m:oMathPara>
+                    </a14:m>
+                    <a:endParaRPr lang="en-US" sz="2000" dirty="0" smtClean="0">
+                      <a:latin typeface="Arial" panose="020B0604020202020204" pitchFamily="34" charset="0"/>
+                      <a:cs typeface="Arial" panose="020B0604020202020204" pitchFamily="34" charset="0"/>
+                    </a:endParaRPr>
+                  </a:p>
+                </p:txBody>
+              </p:sp>
+            </mc:Choice>
+            <mc:Fallback xmlns="">
+              <p:sp>
+                <p:nvSpPr>
+                  <p:cNvPr id="29" name="TextBox 28"/>
+                  <p:cNvSpPr txBox="1">
+                    <a:spLocks noRot="1" noChangeAspect="1" noMove="1" noResize="1" noEditPoints="1" noAdjustHandles="1" noChangeArrowheads="1" noChangeShapeType="1" noTextEdit="1"/>
+                  </p:cNvSpPr>
+                  <p:nvPr/>
+                </p:nvSpPr>
+                <p:spPr>
+                  <a:xfrm>
+                    <a:off x="919312" y="3581769"/>
+                    <a:ext cx="213200" cy="307777"/>
+                  </a:xfrm>
+                  <a:prstGeom prst="rect">
+                    <a:avLst/>
+                  </a:prstGeom>
+                  <a:blipFill>
+                    <a:blip r:embed="rId31"/>
+                    <a:stretch>
+                      <a:fillRect l="-25714" r="-22857" b="-10000"/>
+                    </a:stretch>
+                  </a:blipFill>
+                </p:spPr>
+                <p:txBody>
+                  <a:bodyPr/>
+                  <a:lstStyle/>
+                  <a:p>
+                    <a:r>
+                      <a:rPr lang="en-US">
+                        <a:noFill/>
+                      </a:rPr>
+                      <a:t> </a:t>
+                    </a:r>
+                  </a:p>
+                </p:txBody>
+              </p:sp>
+            </mc:Fallback>
+          </mc:AlternateContent>
+          <p:cxnSp>
+            <p:nvCxnSpPr>
+              <p:cNvPr id="22" name="Straight Connector 21"/>
+              <p:cNvCxnSpPr/>
+              <p:nvPr/>
+            </p:nvCxnSpPr>
+            <p:spPr>
+              <a:xfrm flipV="1">
+                <a:off x="1099058" y="3331012"/>
+                <a:ext cx="0" cy="239606"/>
+              </a:xfrm>
+              <a:prstGeom prst="line">
+                <a:avLst/>
+              </a:prstGeom>
+              <a:ln w="38100">
+                <a:solidFill>
+                  <a:schemeClr val="tx1"/>
+                </a:solidFill>
+              </a:ln>
+            </p:spPr>
+            <p:style>
+              <a:lnRef idx="1">
+                <a:schemeClr val="accent1"/>
+              </a:lnRef>
+              <a:fillRef idx="0">
+                <a:schemeClr val="accent1"/>
+              </a:fillRef>
+              <a:effectRef idx="0">
+                <a:schemeClr val="accent1"/>
+              </a:effectRef>
+              <a:fontRef idx="minor">
+                <a:schemeClr val="tx1"/>
+              </a:fontRef>
+            </p:style>
+          </p:cxnSp>
+        </p:grpSp>
+      </p:grpSp>
+      <p:grpSp>
+        <p:nvGrpSpPr>
+          <p:cNvPr id="24" name="Group 23"/>
+          <p:cNvGrpSpPr/>
+          <p:nvPr/>
+        </p:nvGrpSpPr>
+        <p:grpSpPr>
+          <a:xfrm>
+            <a:off x="593571" y="3775588"/>
+            <a:ext cx="5909188" cy="2507090"/>
+            <a:chOff x="835743" y="712839"/>
+            <a:chExt cx="5909188" cy="2507090"/>
+          </a:xfrm>
+        </p:grpSpPr>
+        <p:grpSp>
+          <p:nvGrpSpPr>
+            <p:cNvPr id="25" name="Group 24"/>
+            <p:cNvGrpSpPr/>
+            <p:nvPr/>
+          </p:nvGrpSpPr>
+          <p:grpSpPr>
+            <a:xfrm>
+              <a:off x="835743" y="712839"/>
+              <a:ext cx="5909188" cy="1763078"/>
+              <a:chOff x="1622323" y="1174955"/>
+              <a:chExt cx="5909188" cy="1763078"/>
+            </a:xfrm>
+          </p:grpSpPr>
+          <p:sp>
+            <p:nvSpPr>
+              <p:cNvPr id="32" name="Rectangle 31"/>
+              <p:cNvSpPr/>
+              <p:nvPr/>
+            </p:nvSpPr>
+            <p:spPr>
+              <a:xfrm>
+                <a:off x="1622323" y="2802193"/>
+                <a:ext cx="5909188" cy="135840"/>
+              </a:xfrm>
+              <a:prstGeom prst="rect">
+                <a:avLst/>
+              </a:prstGeom>
+              <a:solidFill>
+                <a:schemeClr val="bg2">
+                  <a:lumMod val="75000"/>
+                </a:schemeClr>
+              </a:solidFill>
+              <a:ln w="38100">
+                <a:solidFill>
+                  <a:schemeClr val="tx1"/>
+                </a:solidFill>
+              </a:ln>
+            </p:spPr>
+            <p:style>
+              <a:lnRef idx="2">
+                <a:schemeClr val="accent1">
+                  <a:shade val="50000"/>
+                </a:schemeClr>
+              </a:lnRef>
+              <a:fillRef idx="1">
+                <a:schemeClr val="accent1"/>
+              </a:fillRef>
+              <a:effectRef idx="0">
+                <a:schemeClr val="accent1"/>
+              </a:effectRef>
+              <a:fontRef idx="minor">
+                <a:schemeClr val="lt1"/>
+              </a:fontRef>
+            </p:style>
+            <p:txBody>
+              <a:bodyPr rtlCol="0" anchor="ctr"/>
+              <a:lstStyle/>
+              <a:p>
+                <a:pPr algn="ctr"/>
+                <a:endParaRPr lang="en-US"/>
+              </a:p>
+            </p:txBody>
+          </p:sp>
+          <p:sp>
+            <p:nvSpPr>
+              <p:cNvPr id="33" name="Rectangle 32"/>
+              <p:cNvSpPr/>
+              <p:nvPr/>
+            </p:nvSpPr>
+            <p:spPr>
+              <a:xfrm>
+                <a:off x="2507226" y="1938336"/>
+                <a:ext cx="707922" cy="845574"/>
+              </a:xfrm>
+              <a:prstGeom prst="rect">
+                <a:avLst/>
+              </a:prstGeom>
+              <a:solidFill>
+                <a:schemeClr val="tx1"/>
+              </a:solidFill>
+              <a:ln w="38100">
+                <a:solidFill>
+                  <a:schemeClr val="tx1"/>
+                </a:solidFill>
+              </a:ln>
+            </p:spPr>
+            <p:style>
+              <a:lnRef idx="2">
+                <a:schemeClr val="accent1">
+                  <a:shade val="50000"/>
+                </a:schemeClr>
+              </a:lnRef>
+              <a:fillRef idx="1">
+                <a:schemeClr val="accent1"/>
+              </a:fillRef>
+              <a:effectRef idx="0">
+                <a:schemeClr val="accent1"/>
+              </a:effectRef>
+              <a:fontRef idx="minor">
+                <a:schemeClr val="lt1"/>
+              </a:fontRef>
+            </p:style>
+            <p:txBody>
+              <a:bodyPr rtlCol="0" anchor="ctr"/>
+              <a:lstStyle/>
+              <a:p>
+                <a:pPr algn="ctr"/>
+                <a:endParaRPr lang="en-US"/>
+              </a:p>
+            </p:txBody>
+          </p:sp>
+          <p:sp>
+            <p:nvSpPr>
+              <p:cNvPr id="34" name="Rectangle 33"/>
+              <p:cNvSpPr/>
+              <p:nvPr/>
+            </p:nvSpPr>
+            <p:spPr>
+              <a:xfrm>
+                <a:off x="5317502" y="1938336"/>
+                <a:ext cx="189271" cy="845574"/>
+              </a:xfrm>
+              <a:prstGeom prst="rect">
+                <a:avLst/>
+              </a:prstGeom>
+              <a:solidFill>
+                <a:schemeClr val="tx1"/>
+              </a:solidFill>
+              <a:ln w="38100">
+                <a:solidFill>
+                  <a:schemeClr val="tx1"/>
+                </a:solidFill>
+              </a:ln>
+            </p:spPr>
+            <p:style>
+              <a:lnRef idx="2">
+                <a:schemeClr val="accent1">
+                  <a:shade val="50000"/>
+                </a:schemeClr>
+              </a:lnRef>
+              <a:fillRef idx="1">
+                <a:schemeClr val="accent1"/>
+              </a:fillRef>
+              <a:effectRef idx="0">
+                <a:schemeClr val="accent1"/>
+              </a:effectRef>
+              <a:fontRef idx="minor">
+                <a:schemeClr val="lt1"/>
+              </a:fontRef>
+            </p:style>
+            <p:txBody>
+              <a:bodyPr rtlCol="0" anchor="ctr"/>
+              <a:lstStyle/>
+              <a:p>
+                <a:pPr algn="ctr"/>
+                <a:endParaRPr lang="en-US"/>
+              </a:p>
+            </p:txBody>
+          </p:sp>
+          <mc:AlternateContent xmlns:mc="http://schemas.openxmlformats.org/markup-compatibility/2006">
+            <mc:Choice xmlns:a14="http://schemas.microsoft.com/office/drawing/2010/main" Requires="a14">
+              <p:sp>
+                <p:nvSpPr>
+                  <p:cNvPr id="35" name="TextBox 34"/>
+                  <p:cNvSpPr txBox="1"/>
+                  <p:nvPr/>
+                </p:nvSpPr>
+                <p:spPr>
+                  <a:xfrm>
+                    <a:off x="2713775" y="1174955"/>
+                    <a:ext cx="294824" cy="307777"/>
+                  </a:xfrm>
+                  <a:prstGeom prst="rect">
+                    <a:avLst/>
+                  </a:prstGeom>
+                  <a:noFill/>
+                </p:spPr>
+                <p:txBody>
+                  <a:bodyPr wrap="none" lIns="0" tIns="0" rIns="0" bIns="0" rtlCol="0">
+                    <a:spAutoFit/>
+                  </a:bodyPr>
+                  <a:lstStyle/>
+                  <a:p>
+                    <a14:m>
+                      <m:oMathPara xmlns:m="http://schemas.openxmlformats.org/officeDocument/2006/math">
+                        <m:oMathParaPr>
+                          <m:jc m:val="centerGroup"/>
+                        </m:oMathParaPr>
+                        <m:oMath xmlns:m="http://schemas.openxmlformats.org/officeDocument/2006/math">
+                          <m:r>
+                            <a:rPr lang="en-US" sz="2000" b="0" i="1" smtClean="0">
+                              <a:latin typeface="Cambria Math" panose="02040503050406030204" pitchFamily="18" charset="0"/>
+                              <a:cs typeface="Arial" panose="020B0604020202020204" pitchFamily="34" charset="0"/>
+                            </a:rPr>
+                            <m:t>𝑀</m:t>
+                          </m:r>
+                        </m:oMath>
+                      </m:oMathPara>
+                    </a14:m>
+                    <a:endParaRPr lang="en-US" sz="2000" dirty="0" smtClean="0">
+                      <a:latin typeface="Arial" panose="020B0604020202020204" pitchFamily="34" charset="0"/>
+                      <a:cs typeface="Arial" panose="020B0604020202020204" pitchFamily="34" charset="0"/>
+                    </a:endParaRPr>
+                  </a:p>
+                </p:txBody>
+              </p:sp>
+            </mc:Choice>
+            <mc:Fallback>
+              <p:sp>
+                <p:nvSpPr>
+                  <p:cNvPr id="35" name="TextBox 34"/>
+                  <p:cNvSpPr txBox="1">
+                    <a:spLocks noRot="1" noChangeAspect="1" noMove="1" noResize="1" noEditPoints="1" noAdjustHandles="1" noChangeArrowheads="1" noChangeShapeType="1" noTextEdit="1"/>
+                  </p:cNvSpPr>
+                  <p:nvPr/>
+                </p:nvSpPr>
+                <p:spPr>
+                  <a:xfrm>
+                    <a:off x="2713775" y="1174955"/>
+                    <a:ext cx="294824" cy="307777"/>
+                  </a:xfrm>
+                  <a:prstGeom prst="rect">
+                    <a:avLst/>
+                  </a:prstGeom>
+                  <a:blipFill>
+                    <a:blip r:embed="rId32"/>
+                    <a:stretch>
+                      <a:fillRect l="-16327" r="-16327" b="-9804"/>
+                    </a:stretch>
+                  </a:blipFill>
+                </p:spPr>
+                <p:txBody>
+                  <a:bodyPr/>
+                  <a:lstStyle/>
+                  <a:p>
+                    <a:r>
+                      <a:rPr lang="en-US">
+                        <a:noFill/>
+                      </a:rPr>
+                      <a:t> </a:t>
+                    </a:r>
+                  </a:p>
+                </p:txBody>
+              </p:sp>
+            </mc:Fallback>
+          </mc:AlternateContent>
+          <mc:AlternateContent xmlns:mc="http://schemas.openxmlformats.org/markup-compatibility/2006">
+            <mc:Choice xmlns:a14="http://schemas.microsoft.com/office/drawing/2010/main" Requires="a14">
+              <p:sp>
+                <p:nvSpPr>
+                  <p:cNvPr id="36" name="TextBox 35"/>
+                  <p:cNvSpPr txBox="1"/>
+                  <p:nvPr/>
+                </p:nvSpPr>
+                <p:spPr>
+                  <a:xfrm>
+                    <a:off x="5317502" y="1174955"/>
+                    <a:ext cx="269793" cy="307777"/>
+                  </a:xfrm>
+                  <a:prstGeom prst="rect">
+                    <a:avLst/>
+                  </a:prstGeom>
+                  <a:noFill/>
+                </p:spPr>
+                <p:txBody>
+                  <a:bodyPr wrap="square" lIns="0" tIns="0" rIns="0" bIns="0" rtlCol="0">
+                    <a:spAutoFit/>
+                  </a:bodyPr>
+                  <a:lstStyle/>
+                  <a:p>
+                    <a14:m>
+                      <m:oMathPara xmlns:m="http://schemas.openxmlformats.org/officeDocument/2006/math">
+                        <m:oMathParaPr>
+                          <m:jc m:val="centerGroup"/>
+                        </m:oMathParaPr>
+                        <m:oMath xmlns:m="http://schemas.openxmlformats.org/officeDocument/2006/math">
+                          <m:r>
+                            <a:rPr lang="en-US" sz="2000" b="0" i="1" smtClean="0">
+                              <a:latin typeface="Cambria Math" panose="02040503050406030204" pitchFamily="18" charset="0"/>
+                              <a:cs typeface="Arial" panose="020B0604020202020204" pitchFamily="34" charset="0"/>
+                            </a:rPr>
+                            <m:t>𝑚</m:t>
+                          </m:r>
+                        </m:oMath>
+                      </m:oMathPara>
+                    </a14:m>
+                    <a:endParaRPr lang="en-US" sz="2000" dirty="0" smtClean="0">
+                      <a:latin typeface="Arial" panose="020B0604020202020204" pitchFamily="34" charset="0"/>
+                      <a:cs typeface="Arial" panose="020B0604020202020204" pitchFamily="34" charset="0"/>
+                    </a:endParaRPr>
+                  </a:p>
+                </p:txBody>
+              </p:sp>
+            </mc:Choice>
+            <mc:Fallback>
+              <p:sp>
+                <p:nvSpPr>
+                  <p:cNvPr id="36" name="TextBox 35"/>
+                  <p:cNvSpPr txBox="1">
+                    <a:spLocks noRot="1" noChangeAspect="1" noMove="1" noResize="1" noEditPoints="1" noAdjustHandles="1" noChangeArrowheads="1" noChangeShapeType="1" noTextEdit="1"/>
+                  </p:cNvSpPr>
+                  <p:nvPr/>
+                </p:nvSpPr>
+                <p:spPr>
+                  <a:xfrm>
+                    <a:off x="5317502" y="1174955"/>
+                    <a:ext cx="269793" cy="307777"/>
+                  </a:xfrm>
+                  <a:prstGeom prst="rect">
+                    <a:avLst/>
+                  </a:prstGeom>
+                  <a:blipFill>
+                    <a:blip r:embed="rId33"/>
+                    <a:stretch>
+                      <a:fillRect l="-15909" r="-11364" b="-1961"/>
+                    </a:stretch>
+                  </a:blipFill>
+                </p:spPr>
+                <p:txBody>
+                  <a:bodyPr/>
+                  <a:lstStyle/>
+                  <a:p>
+                    <a:r>
+                      <a:rPr lang="en-US">
+                        <a:noFill/>
+                      </a:rPr>
+                      <a:t> </a:t>
+                    </a:r>
+                  </a:p>
+                </p:txBody>
+              </p:sp>
+            </mc:Fallback>
+          </mc:AlternateContent>
+          <p:cxnSp>
+            <p:nvCxnSpPr>
+              <p:cNvPr id="37" name="Straight Arrow Connector 36"/>
+              <p:cNvCxnSpPr/>
+              <p:nvPr/>
+            </p:nvCxnSpPr>
+            <p:spPr>
+              <a:xfrm>
+                <a:off x="2713775" y="1710813"/>
+                <a:ext cx="1091309" cy="9832"/>
+              </a:xfrm>
+              <a:prstGeom prst="straightConnector1">
+                <a:avLst/>
+              </a:prstGeom>
+              <a:ln w="38100">
+                <a:solidFill>
+                  <a:schemeClr val="tx1"/>
+                </a:solidFill>
+                <a:tailEnd type="triangle"/>
+              </a:ln>
+            </p:spPr>
+            <p:style>
+              <a:lnRef idx="1">
+                <a:schemeClr val="accent1"/>
+              </a:lnRef>
+              <a:fillRef idx="0">
+                <a:schemeClr val="accent1"/>
+              </a:fillRef>
+              <a:effectRef idx="0">
+                <a:schemeClr val="accent1"/>
+              </a:effectRef>
+              <a:fontRef idx="minor">
+                <a:schemeClr val="tx1"/>
+              </a:fontRef>
+            </p:style>
+          </p:cxnSp>
+          <p:cxnSp>
+            <p:nvCxnSpPr>
+              <p:cNvPr id="38" name="Straight Arrow Connector 37"/>
+              <p:cNvCxnSpPr/>
+              <p:nvPr/>
+            </p:nvCxnSpPr>
+            <p:spPr>
+              <a:xfrm flipV="1">
+                <a:off x="5317503" y="1714514"/>
+                <a:ext cx="499559" cy="1215"/>
+              </a:xfrm>
+              <a:prstGeom prst="straightConnector1">
+                <a:avLst/>
+              </a:prstGeom>
+              <a:ln w="38100">
+                <a:solidFill>
+                  <a:schemeClr val="tx1"/>
+                </a:solidFill>
+                <a:tailEnd type="triangle"/>
+              </a:ln>
+            </p:spPr>
+            <p:style>
+              <a:lnRef idx="1">
+                <a:schemeClr val="accent1"/>
+              </a:lnRef>
+              <a:fillRef idx="0">
+                <a:schemeClr val="accent1"/>
+              </a:fillRef>
+              <a:effectRef idx="0">
+                <a:schemeClr val="accent1"/>
+              </a:effectRef>
+              <a:fontRef idx="minor">
+                <a:schemeClr val="tx1"/>
+              </a:fontRef>
+            </p:style>
+          </p:cxnSp>
+          <mc:AlternateContent xmlns:mc="http://schemas.openxmlformats.org/markup-compatibility/2006">
+            <mc:Choice xmlns:a14="http://schemas.microsoft.com/office/drawing/2010/main" Requires="a14">
+              <p:sp>
+                <p:nvSpPr>
+                  <p:cNvPr id="39" name="TextBox 38"/>
+                  <p:cNvSpPr txBox="1"/>
+                  <p:nvPr/>
+                </p:nvSpPr>
+                <p:spPr>
+                  <a:xfrm>
+                    <a:off x="3259429" y="1345183"/>
+                    <a:ext cx="387798" cy="307777"/>
+                  </a:xfrm>
+                  <a:prstGeom prst="rect">
+                    <a:avLst/>
+                  </a:prstGeom>
+                  <a:noFill/>
+                </p:spPr>
+                <p:txBody>
+                  <a:bodyPr wrap="none" lIns="0" tIns="0" rIns="0" bIns="0" rtlCol="0">
+                    <a:spAutoFit/>
+                  </a:bodyPr>
+                  <a:lstStyle/>
+                  <a:p>
+                    <a14:m>
+                      <m:oMathPara xmlns:m="http://schemas.openxmlformats.org/officeDocument/2006/math">
+                        <m:oMathParaPr>
+                          <m:jc m:val="centerGroup"/>
+                        </m:oMathParaPr>
+                        <m:oMath xmlns:m="http://schemas.openxmlformats.org/officeDocument/2006/math">
+                          <m:sSub>
+                            <m:sSubPr>
+                              <m:ctrlPr>
+                                <a:rPr lang="en-US" sz="2000" b="0" i="1" smtClean="0">
+                                  <a:latin typeface="Cambria Math" panose="02040503050406030204" pitchFamily="18" charset="0"/>
+                                  <a:cs typeface="Arial" panose="020B0604020202020204" pitchFamily="34" charset="0"/>
+                                </a:rPr>
+                              </m:ctrlPr>
+                            </m:sSubPr>
+                            <m:e>
+                              <m:acc>
+                                <m:accPr>
+                                  <m:chr m:val="⃗"/>
+                                  <m:ctrlPr>
+                                    <a:rPr lang="en-US" sz="2000" b="0" i="1" smtClean="0">
+                                      <a:latin typeface="Cambria Math" panose="02040503050406030204" pitchFamily="18" charset="0"/>
+                                      <a:cs typeface="Arial" panose="020B0604020202020204" pitchFamily="34" charset="0"/>
+                                    </a:rPr>
+                                  </m:ctrlPr>
+                                </m:accPr>
+                                <m:e>
+                                  <m:r>
+                                    <a:rPr lang="en-US" sz="2000" b="0" i="1" smtClean="0">
+                                      <a:latin typeface="Cambria Math" panose="02040503050406030204" pitchFamily="18" charset="0"/>
+                                      <a:cs typeface="Arial" panose="020B0604020202020204" pitchFamily="34" charset="0"/>
+                                    </a:rPr>
+                                    <m:t>𝑣</m:t>
+                                  </m:r>
+                                </m:e>
+                              </m:acc>
+                            </m:e>
+                            <m:sub>
+                              <m:r>
+                                <a:rPr lang="en-US" sz="2000" b="0" i="1" smtClean="0">
+                                  <a:latin typeface="Cambria Math" panose="02040503050406030204" pitchFamily="18" charset="0"/>
+                                  <a:cs typeface="Arial" panose="020B0604020202020204" pitchFamily="34" charset="0"/>
+                                </a:rPr>
+                                <m:t>𝑀</m:t>
+                              </m:r>
+                            </m:sub>
+                          </m:sSub>
+                        </m:oMath>
+                      </m:oMathPara>
+                    </a14:m>
+                    <a:endParaRPr lang="en-US" sz="2000" dirty="0" smtClean="0">
+                      <a:latin typeface="Arial" panose="020B0604020202020204" pitchFamily="34" charset="0"/>
+                      <a:cs typeface="Arial" panose="020B0604020202020204" pitchFamily="34" charset="0"/>
+                    </a:endParaRPr>
+                  </a:p>
+                </p:txBody>
+              </p:sp>
+            </mc:Choice>
+            <mc:Fallback>
+              <p:sp>
+                <p:nvSpPr>
+                  <p:cNvPr id="39" name="TextBox 38"/>
+                  <p:cNvSpPr txBox="1">
+                    <a:spLocks noRot="1" noChangeAspect="1" noMove="1" noResize="1" noEditPoints="1" noAdjustHandles="1" noChangeArrowheads="1" noChangeShapeType="1" noTextEdit="1"/>
+                  </p:cNvSpPr>
+                  <p:nvPr/>
+                </p:nvSpPr>
+                <p:spPr>
+                  <a:xfrm>
+                    <a:off x="3259429" y="1345183"/>
+                    <a:ext cx="387798" cy="307777"/>
+                  </a:xfrm>
+                  <a:prstGeom prst="rect">
+                    <a:avLst/>
+                  </a:prstGeom>
+                  <a:blipFill>
+                    <a:blip r:embed="rId34"/>
+                    <a:stretch>
+                      <a:fillRect l="-12500" t="-33333" r="-51563" b="-19608"/>
+                    </a:stretch>
+                  </a:blipFill>
+                </p:spPr>
+                <p:txBody>
+                  <a:bodyPr/>
+                  <a:lstStyle/>
+                  <a:p>
+                    <a:r>
+                      <a:rPr lang="en-US">
+                        <a:noFill/>
+                      </a:rPr>
+                      <a:t> </a:t>
+                    </a:r>
+                  </a:p>
+                </p:txBody>
+              </p:sp>
+            </mc:Fallback>
+          </mc:AlternateContent>
+          <mc:AlternateContent xmlns:mc="http://schemas.openxmlformats.org/markup-compatibility/2006">
+            <mc:Choice xmlns:a14="http://schemas.microsoft.com/office/drawing/2010/main" Requires="a14">
+              <p:sp>
+                <p:nvSpPr>
+                  <p:cNvPr id="40" name="TextBox 39"/>
+                  <p:cNvSpPr txBox="1"/>
+                  <p:nvPr/>
+                </p:nvSpPr>
+                <p:spPr>
+                  <a:xfrm>
+                    <a:off x="4922839" y="1335248"/>
+                    <a:ext cx="387798" cy="307777"/>
+                  </a:xfrm>
+                  <a:prstGeom prst="rect">
+                    <a:avLst/>
+                  </a:prstGeom>
+                  <a:noFill/>
+                </p:spPr>
+                <p:txBody>
+                  <a:bodyPr wrap="none" lIns="0" tIns="0" rIns="0" bIns="0" rtlCol="0">
+                    <a:spAutoFit/>
+                  </a:bodyPr>
+                  <a:lstStyle/>
+                  <a:p>
+                    <a14:m>
+                      <m:oMathPara xmlns:m="http://schemas.openxmlformats.org/officeDocument/2006/math">
+                        <m:oMathParaPr>
+                          <m:jc m:val="centerGroup"/>
+                        </m:oMathParaPr>
+                        <m:oMath xmlns:m="http://schemas.openxmlformats.org/officeDocument/2006/math">
+                          <m:sSub>
+                            <m:sSubPr>
+                              <m:ctrlPr>
+                                <a:rPr lang="en-US" sz="2000" b="0" i="1" smtClean="0">
+                                  <a:latin typeface="Cambria Math" panose="02040503050406030204" pitchFamily="18" charset="0"/>
+                                  <a:cs typeface="Arial" panose="020B0604020202020204" pitchFamily="34" charset="0"/>
+                                </a:rPr>
+                              </m:ctrlPr>
+                            </m:sSubPr>
+                            <m:e>
+                              <m:acc>
+                                <m:accPr>
+                                  <m:chr m:val="⃗"/>
+                                  <m:ctrlPr>
+                                    <a:rPr lang="en-US" sz="2000" b="0" i="1" smtClean="0">
+                                      <a:latin typeface="Cambria Math" panose="02040503050406030204" pitchFamily="18" charset="0"/>
+                                      <a:cs typeface="Arial" panose="020B0604020202020204" pitchFamily="34" charset="0"/>
+                                    </a:rPr>
+                                  </m:ctrlPr>
+                                </m:accPr>
+                                <m:e>
+                                  <m:r>
+                                    <a:rPr lang="en-US" sz="2000" b="0" i="1" smtClean="0">
+                                      <a:latin typeface="Cambria Math" panose="02040503050406030204" pitchFamily="18" charset="0"/>
+                                      <a:cs typeface="Arial" panose="020B0604020202020204" pitchFamily="34" charset="0"/>
+                                    </a:rPr>
+                                    <m:t>𝑣</m:t>
+                                  </m:r>
+                                </m:e>
+                              </m:acc>
+                            </m:e>
+                            <m:sub>
+                              <m:r>
+                                <a:rPr lang="en-US" sz="2000" b="0" i="1" smtClean="0">
+                                  <a:latin typeface="Cambria Math" panose="02040503050406030204" pitchFamily="18" charset="0"/>
+                                  <a:cs typeface="Arial" panose="020B0604020202020204" pitchFamily="34" charset="0"/>
+                                </a:rPr>
+                                <m:t>𝑚</m:t>
+                              </m:r>
+                            </m:sub>
+                          </m:sSub>
+                        </m:oMath>
+                      </m:oMathPara>
+                    </a14:m>
+                    <a:endParaRPr lang="en-US" sz="2000" dirty="0" smtClean="0">
+                      <a:latin typeface="Arial" panose="020B0604020202020204" pitchFamily="34" charset="0"/>
+                      <a:cs typeface="Arial" panose="020B0604020202020204" pitchFamily="34" charset="0"/>
+                    </a:endParaRPr>
+                  </a:p>
+                </p:txBody>
+              </p:sp>
+            </mc:Choice>
+            <mc:Fallback>
+              <p:sp>
+                <p:nvSpPr>
+                  <p:cNvPr id="40" name="TextBox 39"/>
+                  <p:cNvSpPr txBox="1">
+                    <a:spLocks noRot="1" noChangeAspect="1" noMove="1" noResize="1" noEditPoints="1" noAdjustHandles="1" noChangeArrowheads="1" noChangeShapeType="1" noTextEdit="1"/>
+                  </p:cNvSpPr>
+                  <p:nvPr/>
+                </p:nvSpPr>
+                <p:spPr>
+                  <a:xfrm>
+                    <a:off x="4922839" y="1335248"/>
+                    <a:ext cx="387798" cy="307777"/>
+                  </a:xfrm>
+                  <a:prstGeom prst="rect">
+                    <a:avLst/>
+                  </a:prstGeom>
+                  <a:blipFill>
+                    <a:blip r:embed="rId35"/>
+                    <a:stretch>
+                      <a:fillRect l="-12698" t="-36000" r="-53968" b="-16000"/>
+                    </a:stretch>
+                  </a:blipFill>
+                </p:spPr>
+                <p:txBody>
+                  <a:bodyPr/>
+                  <a:lstStyle/>
+                  <a:p>
+                    <a:r>
+                      <a:rPr lang="en-US">
+                        <a:noFill/>
+                      </a:rPr>
+                      <a:t> </a:t>
+                    </a:r>
+                  </a:p>
+                </p:txBody>
+              </p:sp>
+            </mc:Fallback>
+          </mc:AlternateContent>
+        </p:grpSp>
+        <p:grpSp>
+          <p:nvGrpSpPr>
+            <p:cNvPr id="26" name="Group 25"/>
+            <p:cNvGrpSpPr/>
+            <p:nvPr/>
+          </p:nvGrpSpPr>
+          <p:grpSpPr>
+            <a:xfrm>
+              <a:off x="844732" y="2661395"/>
+              <a:ext cx="4031829" cy="558534"/>
+              <a:chOff x="919312" y="3331012"/>
+              <a:chExt cx="4031829" cy="558534"/>
+            </a:xfrm>
+          </p:grpSpPr>
+          <p:cxnSp>
+            <p:nvCxnSpPr>
+              <p:cNvPr id="27" name="Straight Arrow Connector 26"/>
+              <p:cNvCxnSpPr/>
+              <p:nvPr/>
+            </p:nvCxnSpPr>
+            <p:spPr>
+              <a:xfrm flipV="1">
+                <a:off x="1025912" y="3438955"/>
+                <a:ext cx="3925229" cy="1"/>
+              </a:xfrm>
+              <a:prstGeom prst="straightConnector1">
+                <a:avLst/>
+              </a:prstGeom>
+              <a:ln w="38100">
+                <a:solidFill>
+                  <a:schemeClr val="tx1"/>
+                </a:solidFill>
+                <a:tailEnd type="triangle"/>
+              </a:ln>
+            </p:spPr>
+            <p:style>
+              <a:lnRef idx="1">
+                <a:schemeClr val="accent1"/>
+              </a:lnRef>
+              <a:fillRef idx="0">
+                <a:schemeClr val="accent1"/>
+              </a:fillRef>
+              <a:effectRef idx="0">
+                <a:schemeClr val="accent1"/>
+              </a:effectRef>
+              <a:fontRef idx="minor">
+                <a:schemeClr val="tx1"/>
+              </a:fontRef>
+            </p:style>
+          </p:cxnSp>
+          <mc:AlternateContent xmlns:mc="http://schemas.openxmlformats.org/markup-compatibility/2006" xmlns:a14="http://schemas.microsoft.com/office/drawing/2010/main">
+            <mc:Choice Requires="a14">
+              <p:sp>
+                <p:nvSpPr>
+                  <p:cNvPr id="28" name="Rectangle 27"/>
+                  <p:cNvSpPr/>
+                  <p:nvPr/>
+                </p:nvSpPr>
+                <p:spPr>
+                  <a:xfrm>
+                    <a:off x="4404738" y="3438955"/>
+                    <a:ext cx="367985" cy="369332"/>
+                  </a:xfrm>
+                  <a:prstGeom prst="rect">
+                    <a:avLst/>
+                  </a:prstGeom>
+                </p:spPr>
+                <p:txBody>
+                  <a:bodyPr wrap="square">
+                    <a:spAutoFit/>
+                  </a:bodyPr>
+                  <a:lstStyle/>
+                  <a:p>
+                    <a:pPr/>
+                    <a14:m>
+                      <m:oMathPara xmlns:m="http://schemas.openxmlformats.org/officeDocument/2006/math">
+                        <m:oMathParaPr>
+                          <m:jc m:val="centerGroup"/>
+                        </m:oMathParaPr>
+                        <m:oMath xmlns:m="http://schemas.openxmlformats.org/officeDocument/2006/math">
+                          <m:r>
+                            <a:rPr lang="en-US" i="1">
+                              <a:latin typeface="Cambria Math" panose="02040503050406030204" pitchFamily="18" charset="0"/>
+                              <a:cs typeface="Arial" panose="020B0604020202020204" pitchFamily="34" charset="0"/>
+                            </a:rPr>
+                            <m:t>𝑥</m:t>
+                          </m:r>
+                        </m:oMath>
+                      </m:oMathPara>
+                    </a14:m>
+                    <a:endParaRPr lang="en-CA" dirty="0"/>
+                  </a:p>
+                </p:txBody>
+              </p:sp>
+            </mc:Choice>
+            <mc:Fallback xmlns="">
+              <p:sp>
+                <p:nvSpPr>
+                  <p:cNvPr id="28" name="Rectangle 27"/>
+                  <p:cNvSpPr>
+                    <a:spLocks noRot="1" noChangeAspect="1" noMove="1" noResize="1" noEditPoints="1" noAdjustHandles="1" noChangeArrowheads="1" noChangeShapeType="1" noTextEdit="1"/>
+                  </p:cNvSpPr>
+                  <p:nvPr/>
+                </p:nvSpPr>
+                <p:spPr>
+                  <a:xfrm>
+                    <a:off x="4404738" y="3438955"/>
+                    <a:ext cx="367985" cy="369332"/>
+                  </a:xfrm>
+                  <a:prstGeom prst="rect">
+                    <a:avLst/>
+                  </a:prstGeom>
+                  <a:blipFill>
+                    <a:blip r:embed="rId30"/>
+                    <a:stretch>
+                      <a:fillRect/>
+                    </a:stretch>
+                  </a:blipFill>
+                </p:spPr>
+                <p:txBody>
+                  <a:bodyPr/>
+                  <a:lstStyle/>
+                  <a:p>
+                    <a:r>
+                      <a:rPr lang="en-US">
+                        <a:noFill/>
+                      </a:rPr>
+                      <a:t> </a:t>
+                    </a:r>
+                  </a:p>
+                </p:txBody>
+              </p:sp>
+            </mc:Fallback>
+          </mc:AlternateContent>
+          <mc:AlternateContent xmlns:mc="http://schemas.openxmlformats.org/markup-compatibility/2006" xmlns:a14="http://schemas.microsoft.com/office/drawing/2010/main">
+            <mc:Choice Requires="a14">
+              <p:sp>
+                <p:nvSpPr>
+                  <p:cNvPr id="29" name="TextBox 28"/>
+                  <p:cNvSpPr txBox="1"/>
+                  <p:nvPr/>
+                </p:nvSpPr>
+                <p:spPr>
+                  <a:xfrm>
+                    <a:off x="919312" y="3581769"/>
+                    <a:ext cx="213200" cy="307777"/>
+                  </a:xfrm>
+                  <a:prstGeom prst="rect">
+                    <a:avLst/>
+                  </a:prstGeom>
+                  <a:noFill/>
+                </p:spPr>
+                <p:txBody>
+                  <a:bodyPr wrap="none" lIns="0" tIns="0" rIns="0" bIns="0" rtlCol="0">
+                    <a:spAutoFit/>
+                  </a:bodyPr>
+                  <a:lstStyle/>
+                  <a:p>
+                    <a:pPr/>
+                    <a14:m>
+                      <m:oMathPara xmlns:m="http://schemas.openxmlformats.org/officeDocument/2006/math">
+                        <m:oMathParaPr>
+                          <m:jc m:val="centerGroup"/>
+                        </m:oMathParaPr>
+                        <m:oMath xmlns:m="http://schemas.openxmlformats.org/officeDocument/2006/math">
+                          <m:r>
+                            <a:rPr lang="en-US" sz="2000" b="0" i="1" smtClean="0">
+                              <a:latin typeface="Cambria Math" panose="02040503050406030204" pitchFamily="18" charset="0"/>
+                              <a:cs typeface="Arial" panose="020B0604020202020204" pitchFamily="34" charset="0"/>
+                            </a:rPr>
+                            <m:t>0</m:t>
+                          </m:r>
+                        </m:oMath>
+                      </m:oMathPara>
+                    </a14:m>
+                    <a:endParaRPr lang="en-US" sz="2000" dirty="0" smtClean="0">
+                      <a:latin typeface="Arial" panose="020B0604020202020204" pitchFamily="34" charset="0"/>
+                      <a:cs typeface="Arial" panose="020B0604020202020204" pitchFamily="34" charset="0"/>
+                    </a:endParaRPr>
+                  </a:p>
+                </p:txBody>
+              </p:sp>
+            </mc:Choice>
+            <mc:Fallback xmlns="">
+              <p:sp>
+                <p:nvSpPr>
+                  <p:cNvPr id="29" name="TextBox 28"/>
+                  <p:cNvSpPr txBox="1">
+                    <a:spLocks noRot="1" noChangeAspect="1" noMove="1" noResize="1" noEditPoints="1" noAdjustHandles="1" noChangeArrowheads="1" noChangeShapeType="1" noTextEdit="1"/>
+                  </p:cNvSpPr>
+                  <p:nvPr/>
+                </p:nvSpPr>
+                <p:spPr>
+                  <a:xfrm>
+                    <a:off x="919312" y="3581769"/>
+                    <a:ext cx="213200" cy="307777"/>
+                  </a:xfrm>
+                  <a:prstGeom prst="rect">
+                    <a:avLst/>
+                  </a:prstGeom>
+                  <a:blipFill>
+                    <a:blip r:embed="rId31"/>
+                    <a:stretch>
+                      <a:fillRect l="-25714" r="-22857" b="-10000"/>
+                    </a:stretch>
+                  </a:blipFill>
+                </p:spPr>
+                <p:txBody>
+                  <a:bodyPr/>
+                  <a:lstStyle/>
+                  <a:p>
+                    <a:r>
+                      <a:rPr lang="en-US">
+                        <a:noFill/>
+                      </a:rPr>
+                      <a:t> </a:t>
+                    </a:r>
+                  </a:p>
+                </p:txBody>
+              </p:sp>
+            </mc:Fallback>
+          </mc:AlternateContent>
+          <p:cxnSp>
+            <p:nvCxnSpPr>
+              <p:cNvPr id="30" name="Straight Connector 29"/>
+              <p:cNvCxnSpPr/>
+              <p:nvPr/>
+            </p:nvCxnSpPr>
+            <p:spPr>
+              <a:xfrm flipV="1">
+                <a:off x="1099058" y="3331012"/>
+                <a:ext cx="0" cy="239606"/>
+              </a:xfrm>
+              <a:prstGeom prst="line">
+                <a:avLst/>
+              </a:prstGeom>
+              <a:ln w="38100">
+                <a:solidFill>
+                  <a:schemeClr val="tx1"/>
+                </a:solidFill>
+              </a:ln>
+            </p:spPr>
+            <p:style>
+              <a:lnRef idx="1">
+                <a:schemeClr val="accent1"/>
+              </a:lnRef>
+              <a:fillRef idx="0">
+                <a:schemeClr val="accent1"/>
+              </a:fillRef>
+              <a:effectRef idx="0">
+                <a:schemeClr val="accent1"/>
+              </a:effectRef>
+              <a:fontRef idx="minor">
+                <a:schemeClr val="tx1"/>
+              </a:fontRef>
+            </p:style>
+          </p:cxnSp>
+        </p:grpSp>
+      </p:grpSp>
+    </p:spTree>
+    <p:extLst>
+      <p:ext uri="{BB962C8B-B14F-4D97-AF65-F5344CB8AC3E}">
+        <p14:creationId xmlns:p14="http://schemas.microsoft.com/office/powerpoint/2010/main" val="1084934318"/>
+      </p:ext>
+    </p:extLst>
+  </p:cSld>
+  <p:clrMapOvr>
+    <a:masterClrMapping/>
+  </p:clrMapOvr>
+</p:sld>
+</file>
+
 <file path=ppt/theme/theme1.xml><?xml version="1.0" encoding="utf-8"?>
 <a:theme xmlns:a="http://schemas.openxmlformats.org/drawingml/2006/main" name="Office Theme">
   <a:themeElements>

</xml_diff>

<commit_message>
completed frame of references
</commit_message>
<xml_diff>
--- a/tex/figures/MomentumAndCM/Figures.pptx
+++ b/tex/figures/MomentumAndCM/Figures.pptx
@@ -247,7 +247,7 @@
           <a:p>
             <a:fld id="{F7249F8D-641B-4CAF-BAE5-10524742F6F1}" type="datetimeFigureOut">
               <a:rPr lang="en-CA" smtClean="0"/>
-              <a:t>2018-06-27</a:t>
+              <a:t>2018-06-28</a:t>
             </a:fld>
             <a:endParaRPr lang="en-CA"/>
           </a:p>
@@ -417,7 +417,7 @@
           <a:p>
             <a:fld id="{F7249F8D-641B-4CAF-BAE5-10524742F6F1}" type="datetimeFigureOut">
               <a:rPr lang="en-CA" smtClean="0"/>
-              <a:t>2018-06-27</a:t>
+              <a:t>2018-06-28</a:t>
             </a:fld>
             <a:endParaRPr lang="en-CA"/>
           </a:p>
@@ -597,7 +597,7 @@
           <a:p>
             <a:fld id="{F7249F8D-641B-4CAF-BAE5-10524742F6F1}" type="datetimeFigureOut">
               <a:rPr lang="en-CA" smtClean="0"/>
-              <a:t>2018-06-27</a:t>
+              <a:t>2018-06-28</a:t>
             </a:fld>
             <a:endParaRPr lang="en-CA"/>
           </a:p>
@@ -767,7 +767,7 @@
           <a:p>
             <a:fld id="{F7249F8D-641B-4CAF-BAE5-10524742F6F1}" type="datetimeFigureOut">
               <a:rPr lang="en-CA" smtClean="0"/>
-              <a:t>2018-06-27</a:t>
+              <a:t>2018-06-28</a:t>
             </a:fld>
             <a:endParaRPr lang="en-CA"/>
           </a:p>
@@ -1013,7 +1013,7 @@
           <a:p>
             <a:fld id="{F7249F8D-641B-4CAF-BAE5-10524742F6F1}" type="datetimeFigureOut">
               <a:rPr lang="en-CA" smtClean="0"/>
-              <a:t>2018-06-27</a:t>
+              <a:t>2018-06-28</a:t>
             </a:fld>
             <a:endParaRPr lang="en-CA"/>
           </a:p>
@@ -1245,7 +1245,7 @@
           <a:p>
             <a:fld id="{F7249F8D-641B-4CAF-BAE5-10524742F6F1}" type="datetimeFigureOut">
               <a:rPr lang="en-CA" smtClean="0"/>
-              <a:t>2018-06-27</a:t>
+              <a:t>2018-06-28</a:t>
             </a:fld>
             <a:endParaRPr lang="en-CA"/>
           </a:p>
@@ -1612,7 +1612,7 @@
           <a:p>
             <a:fld id="{F7249F8D-641B-4CAF-BAE5-10524742F6F1}" type="datetimeFigureOut">
               <a:rPr lang="en-CA" smtClean="0"/>
-              <a:t>2018-06-27</a:t>
+              <a:t>2018-06-28</a:t>
             </a:fld>
             <a:endParaRPr lang="en-CA"/>
           </a:p>
@@ -1730,7 +1730,7 @@
           <a:p>
             <a:fld id="{F7249F8D-641B-4CAF-BAE5-10524742F6F1}" type="datetimeFigureOut">
               <a:rPr lang="en-CA" smtClean="0"/>
-              <a:t>2018-06-27</a:t>
+              <a:t>2018-06-28</a:t>
             </a:fld>
             <a:endParaRPr lang="en-CA"/>
           </a:p>
@@ -1825,7 +1825,7 @@
           <a:p>
             <a:fld id="{F7249F8D-641B-4CAF-BAE5-10524742F6F1}" type="datetimeFigureOut">
               <a:rPr lang="en-CA" smtClean="0"/>
-              <a:t>2018-06-27</a:t>
+              <a:t>2018-06-28</a:t>
             </a:fld>
             <a:endParaRPr lang="en-CA"/>
           </a:p>
@@ -2102,7 +2102,7 @@
           <a:p>
             <a:fld id="{F7249F8D-641B-4CAF-BAE5-10524742F6F1}" type="datetimeFigureOut">
               <a:rPr lang="en-CA" smtClean="0"/>
-              <a:t>2018-06-27</a:t>
+              <a:t>2018-06-28</a:t>
             </a:fld>
             <a:endParaRPr lang="en-CA"/>
           </a:p>
@@ -2355,7 +2355,7 @@
           <a:p>
             <a:fld id="{F7249F8D-641B-4CAF-BAE5-10524742F6F1}" type="datetimeFigureOut">
               <a:rPr lang="en-CA" smtClean="0"/>
-              <a:t>2018-06-27</a:t>
+              <a:t>2018-06-28</a:t>
             </a:fld>
             <a:endParaRPr lang="en-CA"/>
           </a:p>
@@ -2568,7 +2568,7 @@
           <a:p>
             <a:fld id="{F7249F8D-641B-4CAF-BAE5-10524742F6F1}" type="datetimeFigureOut">
               <a:rPr lang="en-CA" smtClean="0"/>
-              <a:t>2018-06-27</a:t>
+              <a:t>2018-06-28</a:t>
             </a:fld>
             <a:endParaRPr lang="en-CA"/>
           </a:p>
@@ -8021,8 +8021,8 @@
               </a:fontRef>
             </p:style>
           </p:cxnSp>
-          <mc:AlternateContent xmlns:mc="http://schemas.openxmlformats.org/markup-compatibility/2006">
-            <mc:Choice xmlns:a14="http://schemas.microsoft.com/office/drawing/2010/main" Requires="a14">
+          <mc:AlternateContent xmlns:mc="http://schemas.openxmlformats.org/markup-compatibility/2006" xmlns:a14="http://schemas.microsoft.com/office/drawing/2010/main">
+            <mc:Choice Requires="a14">
               <p:sp>
                 <p:nvSpPr>
                   <p:cNvPr id="42" name="Rectangle 41"/>
@@ -8066,7 +8066,7 @@
                 </p:txBody>
               </p:sp>
             </mc:Choice>
-            <mc:Fallback>
+            <mc:Fallback xmlns="">
               <p:sp>
                 <p:nvSpPr>
                   <p:cNvPr id="42" name="Rectangle 41"/>
@@ -8265,8 +8265,8 @@
             </a:fontRef>
           </p:style>
         </p:cxnSp>
-        <mc:AlternateContent xmlns:mc="http://schemas.openxmlformats.org/markup-compatibility/2006">
-          <mc:Choice xmlns:a14="http://schemas.microsoft.com/office/drawing/2010/main" Requires="a14">
+        <mc:AlternateContent xmlns:mc="http://schemas.openxmlformats.org/markup-compatibility/2006" xmlns:a14="http://schemas.microsoft.com/office/drawing/2010/main">
+          <mc:Choice Requires="a14">
             <p:sp>
               <p:nvSpPr>
                 <p:cNvPr id="47" name="TextBox 46"/>
@@ -8289,6 +8289,7 @@
                 </a:bodyPr>
                 <a:lstStyle/>
                 <a:p>
+                  <a:pPr/>
                   <a14:m>
                     <m:oMathPara xmlns:m="http://schemas.openxmlformats.org/officeDocument/2006/math">
                       <m:oMathParaPr>
@@ -8326,7 +8327,7 @@
               </p:txBody>
             </p:sp>
           </mc:Choice>
-          <mc:Fallback>
+          <mc:Fallback xmlns="">
             <p:sp>
               <p:nvSpPr>
                 <p:cNvPr id="47" name="TextBox 46"/>
@@ -8365,8 +8366,8 @@
             </p:sp>
           </mc:Fallback>
         </mc:AlternateContent>
-        <mc:AlternateContent xmlns:mc="http://schemas.openxmlformats.org/markup-compatibility/2006">
-          <mc:Choice xmlns:a14="http://schemas.microsoft.com/office/drawing/2010/main" Requires="a14">
+        <mc:AlternateContent xmlns:mc="http://schemas.openxmlformats.org/markup-compatibility/2006" xmlns:a14="http://schemas.microsoft.com/office/drawing/2010/main">
+          <mc:Choice Requires="a14">
             <p:sp>
               <p:nvSpPr>
                 <p:cNvPr id="48" name="TextBox 47"/>
@@ -8389,6 +8390,7 @@
                 </a:bodyPr>
                 <a:lstStyle/>
                 <a:p>
+                  <a:pPr/>
                   <a14:m>
                     <m:oMathPara xmlns:m="http://schemas.openxmlformats.org/officeDocument/2006/math">
                       <m:oMathParaPr>
@@ -8413,7 +8415,7 @@
               </p:txBody>
             </p:sp>
           </mc:Choice>
-          <mc:Fallback>
+          <mc:Fallback xmlns="">
             <p:sp>
               <p:nvSpPr>
                 <p:cNvPr id="48" name="TextBox 47"/>
@@ -8452,8 +8454,8 @@
             </p:sp>
           </mc:Fallback>
         </mc:AlternateContent>
-        <mc:AlternateContent xmlns:mc="http://schemas.openxmlformats.org/markup-compatibility/2006">
-          <mc:Choice xmlns:a14="http://schemas.microsoft.com/office/drawing/2010/main" Requires="a14">
+        <mc:AlternateContent xmlns:mc="http://schemas.openxmlformats.org/markup-compatibility/2006" xmlns:a14="http://schemas.microsoft.com/office/drawing/2010/main">
+          <mc:Choice Requires="a14">
             <p:sp>
               <p:nvSpPr>
                 <p:cNvPr id="49" name="TextBox 48"/>
@@ -8476,6 +8478,7 @@
                 </a:bodyPr>
                 <a:lstStyle/>
                 <a:p>
+                  <a:pPr/>
                   <a14:m>
                     <m:oMathPara xmlns:m="http://schemas.openxmlformats.org/officeDocument/2006/math">
                       <m:oMathParaPr>
@@ -8500,7 +8503,7 @@
               </p:txBody>
             </p:sp>
           </mc:Choice>
-          <mc:Fallback>
+          <mc:Fallback xmlns="">
             <p:sp>
               <p:nvSpPr>
                 <p:cNvPr id="49" name="TextBox 48"/>
@@ -8539,8 +8542,8 @@
             </p:sp>
           </mc:Fallback>
         </mc:AlternateContent>
-        <mc:AlternateContent xmlns:mc="http://schemas.openxmlformats.org/markup-compatibility/2006">
-          <mc:Choice xmlns:a14="http://schemas.microsoft.com/office/drawing/2010/main" Requires="a14">
+        <mc:AlternateContent xmlns:mc="http://schemas.openxmlformats.org/markup-compatibility/2006" xmlns:a14="http://schemas.microsoft.com/office/drawing/2010/main">
+          <mc:Choice Requires="a14">
             <p:sp>
               <p:nvSpPr>
                 <p:cNvPr id="50" name="TextBox 49"/>
@@ -8563,6 +8566,7 @@
                 </a:bodyPr>
                 <a:lstStyle/>
                 <a:p>
+                  <a:pPr/>
                   <a14:m>
                     <m:oMathPara xmlns:m="http://schemas.openxmlformats.org/officeDocument/2006/math">
                       <m:oMathParaPr>
@@ -8587,7 +8591,7 @@
               </p:txBody>
             </p:sp>
           </mc:Choice>
-          <mc:Fallback>
+          <mc:Fallback xmlns="">
             <p:sp>
               <p:nvSpPr>
                 <p:cNvPr id="50" name="TextBox 49"/>
@@ -8626,8 +8630,8 @@
             </p:sp>
           </mc:Fallback>
         </mc:AlternateContent>
-        <mc:AlternateContent xmlns:mc="http://schemas.openxmlformats.org/markup-compatibility/2006">
-          <mc:Choice xmlns:a14="http://schemas.microsoft.com/office/drawing/2010/main" Requires="a14">
+        <mc:AlternateContent xmlns:mc="http://schemas.openxmlformats.org/markup-compatibility/2006" xmlns:a14="http://schemas.microsoft.com/office/drawing/2010/main">
+          <mc:Choice Requires="a14">
             <p:sp>
               <p:nvSpPr>
                 <p:cNvPr id="51" name="TextBox 50"/>
@@ -8650,6 +8654,7 @@
                 </a:bodyPr>
                 <a:lstStyle/>
                 <a:p>
+                  <a:pPr/>
                   <a14:m>
                     <m:oMathPara xmlns:m="http://schemas.openxmlformats.org/officeDocument/2006/math">
                       <m:oMathParaPr>
@@ -8674,7 +8679,7 @@
               </p:txBody>
             </p:sp>
           </mc:Choice>
-          <mc:Fallback>
+          <mc:Fallback xmlns="">
             <p:sp>
               <p:nvSpPr>
                 <p:cNvPr id="51" name="TextBox 50"/>
@@ -8713,8 +8718,8 @@
             </p:sp>
           </mc:Fallback>
         </mc:AlternateContent>
-        <mc:AlternateContent xmlns:mc="http://schemas.openxmlformats.org/markup-compatibility/2006">
-          <mc:Choice xmlns:a14="http://schemas.microsoft.com/office/drawing/2010/main" Requires="a14">
+        <mc:AlternateContent xmlns:mc="http://schemas.openxmlformats.org/markup-compatibility/2006" xmlns:a14="http://schemas.microsoft.com/office/drawing/2010/main">
+          <mc:Choice Requires="a14">
             <p:sp>
               <p:nvSpPr>
                 <p:cNvPr id="52" name="TextBox 51"/>
@@ -8737,6 +8742,7 @@
                 </a:bodyPr>
                 <a:lstStyle/>
                 <a:p>
+                  <a:pPr/>
                   <a14:m>
                     <m:oMathPara xmlns:m="http://schemas.openxmlformats.org/officeDocument/2006/math">
                       <m:oMathParaPr>
@@ -8761,7 +8767,7 @@
               </p:txBody>
             </p:sp>
           </mc:Choice>
-          <mc:Fallback>
+          <mc:Fallback xmlns="">
             <p:sp>
               <p:nvSpPr>
                 <p:cNvPr id="52" name="TextBox 51"/>
@@ -8800,8 +8806,8 @@
             </p:sp>
           </mc:Fallback>
         </mc:AlternateContent>
-        <mc:AlternateContent xmlns:mc="http://schemas.openxmlformats.org/markup-compatibility/2006">
-          <mc:Choice xmlns:a14="http://schemas.microsoft.com/office/drawing/2010/main" Requires="a14">
+        <mc:AlternateContent xmlns:mc="http://schemas.openxmlformats.org/markup-compatibility/2006" xmlns:a14="http://schemas.microsoft.com/office/drawing/2010/main">
+          <mc:Choice Requires="a14">
             <p:sp>
               <p:nvSpPr>
                 <p:cNvPr id="53" name="TextBox 52"/>
@@ -8824,6 +8830,7 @@
                 </a:bodyPr>
                 <a:lstStyle/>
                 <a:p>
+                  <a:pPr/>
                   <a14:m>
                     <m:oMathPara xmlns:m="http://schemas.openxmlformats.org/officeDocument/2006/math">
                       <m:oMathParaPr>
@@ -8848,7 +8855,7 @@
               </p:txBody>
             </p:sp>
           </mc:Choice>
-          <mc:Fallback>
+          <mc:Fallback xmlns="">
             <p:sp>
               <p:nvSpPr>
                 <p:cNvPr id="53" name="TextBox 52"/>
@@ -8887,8 +8894,8 @@
             </p:sp>
           </mc:Fallback>
         </mc:AlternateContent>
-        <mc:AlternateContent xmlns:mc="http://schemas.openxmlformats.org/markup-compatibility/2006">
-          <mc:Choice xmlns:a14="http://schemas.microsoft.com/office/drawing/2010/main" Requires="a14">
+        <mc:AlternateContent xmlns:mc="http://schemas.openxmlformats.org/markup-compatibility/2006" xmlns:a14="http://schemas.microsoft.com/office/drawing/2010/main">
+          <mc:Choice Requires="a14">
             <p:sp>
               <p:nvSpPr>
                 <p:cNvPr id="54" name="TextBox 53"/>
@@ -8911,6 +8918,7 @@
                 </a:bodyPr>
                 <a:lstStyle/>
                 <a:p>
+                  <a:pPr/>
                   <a14:m>
                     <m:oMathPara xmlns:m="http://schemas.openxmlformats.org/officeDocument/2006/math">
                       <m:oMathParaPr>
@@ -8935,7 +8943,7 @@
               </p:txBody>
             </p:sp>
           </mc:Choice>
-          <mc:Fallback>
+          <mc:Fallback xmlns="">
             <p:sp>
               <p:nvSpPr>
                 <p:cNvPr id="54" name="TextBox 53"/>
@@ -9715,8 +9723,8 @@
             </p:sp>
           </p:grpSp>
         </p:grpSp>
-        <mc:AlternateContent xmlns:mc="http://schemas.openxmlformats.org/markup-compatibility/2006">
-          <mc:Choice xmlns:a14="http://schemas.microsoft.com/office/drawing/2010/main" Requires="a14">
+        <mc:AlternateContent xmlns:mc="http://schemas.openxmlformats.org/markup-compatibility/2006" xmlns:a14="http://schemas.microsoft.com/office/drawing/2010/main">
+          <mc:Choice Requires="a14">
             <p:sp>
               <p:nvSpPr>
                 <p:cNvPr id="75" name="TextBox 74"/>
@@ -9739,6 +9747,7 @@
                 </a:bodyPr>
                 <a:lstStyle/>
                 <a:p>
+                  <a:pPr/>
                   <a14:m>
                     <m:oMathPara xmlns:m="http://schemas.openxmlformats.org/officeDocument/2006/math">
                       <m:oMathParaPr>
@@ -9784,7 +9793,7 @@
               </p:txBody>
             </p:sp>
           </mc:Choice>
-          <mc:Fallback>
+          <mc:Fallback xmlns="">
             <p:sp>
               <p:nvSpPr>
                 <p:cNvPr id="75" name="TextBox 74"/>
@@ -9823,8 +9832,8 @@
             </p:sp>
           </mc:Fallback>
         </mc:AlternateContent>
-        <mc:AlternateContent xmlns:mc="http://schemas.openxmlformats.org/markup-compatibility/2006">
-          <mc:Choice xmlns:a14="http://schemas.microsoft.com/office/drawing/2010/main" Requires="a14">
+        <mc:AlternateContent xmlns:mc="http://schemas.openxmlformats.org/markup-compatibility/2006" xmlns:a14="http://schemas.microsoft.com/office/drawing/2010/main">
+          <mc:Choice Requires="a14">
             <p:sp>
               <p:nvSpPr>
                 <p:cNvPr id="76" name="TextBox 75"/>
@@ -9847,6 +9856,7 @@
                 </a:bodyPr>
                 <a:lstStyle/>
                 <a:p>
+                  <a:pPr/>
                   <a14:m>
                     <m:oMathPara xmlns:m="http://schemas.openxmlformats.org/officeDocument/2006/math">
                       <m:oMathParaPr>
@@ -9892,7 +9902,7 @@
               </p:txBody>
             </p:sp>
           </mc:Choice>
-          <mc:Fallback>
+          <mc:Fallback xmlns="">
             <p:sp>
               <p:nvSpPr>
                 <p:cNvPr id="76" name="TextBox 75"/>
@@ -10188,8 +10198,8 @@
               </a:fontRef>
             </p:style>
           </p:cxnSp>
-          <mc:AlternateContent xmlns:mc="http://schemas.openxmlformats.org/markup-compatibility/2006">
-            <mc:Choice xmlns:a14="http://schemas.microsoft.com/office/drawing/2010/main" Requires="a14">
+          <mc:AlternateContent xmlns:mc="http://schemas.openxmlformats.org/markup-compatibility/2006" xmlns:a14="http://schemas.microsoft.com/office/drawing/2010/main">
+            <mc:Choice Requires="a14">
               <p:sp>
                 <p:nvSpPr>
                   <p:cNvPr id="86" name="TextBox 85"/>
@@ -10212,6 +10222,7 @@
                   </a:bodyPr>
                   <a:lstStyle/>
                   <a:p>
+                    <a:pPr/>
                     <a14:m>
                       <m:oMathPara xmlns:m="http://schemas.openxmlformats.org/officeDocument/2006/math">
                         <m:oMathParaPr>
@@ -10236,7 +10247,7 @@
                 </p:txBody>
               </p:sp>
             </mc:Choice>
-            <mc:Fallback>
+            <mc:Fallback xmlns="">
               <p:sp>
                 <p:nvSpPr>
                   <p:cNvPr id="86" name="TextBox 85"/>
@@ -10275,8 +10286,8 @@
               </p:sp>
             </mc:Fallback>
           </mc:AlternateContent>
-          <mc:AlternateContent xmlns:mc="http://schemas.openxmlformats.org/markup-compatibility/2006">
-            <mc:Choice xmlns:a14="http://schemas.microsoft.com/office/drawing/2010/main" Requires="a14">
+          <mc:AlternateContent xmlns:mc="http://schemas.openxmlformats.org/markup-compatibility/2006" xmlns:a14="http://schemas.microsoft.com/office/drawing/2010/main">
+            <mc:Choice Requires="a14">
               <p:sp>
                 <p:nvSpPr>
                   <p:cNvPr id="87" name="TextBox 86"/>
@@ -10299,6 +10310,7 @@
                   </a:bodyPr>
                   <a:lstStyle/>
                   <a:p>
+                    <a:pPr/>
                     <a14:m>
                       <m:oMathPara xmlns:m="http://schemas.openxmlformats.org/officeDocument/2006/math">
                         <m:oMathParaPr>
@@ -10323,7 +10335,7 @@
                 </p:txBody>
               </p:sp>
             </mc:Choice>
-            <mc:Fallback>
+            <mc:Fallback xmlns="">
               <p:sp>
                 <p:nvSpPr>
                   <p:cNvPr id="87" name="TextBox 86"/>
@@ -10544,8 +10556,8 @@
               </a:fontRef>
             </p:style>
           </p:cxnSp>
-          <mc:AlternateContent xmlns:mc="http://schemas.openxmlformats.org/markup-compatibility/2006">
-            <mc:Choice xmlns:a14="http://schemas.microsoft.com/office/drawing/2010/main" Requires="a14">
+          <mc:AlternateContent xmlns:mc="http://schemas.openxmlformats.org/markup-compatibility/2006" xmlns:a14="http://schemas.microsoft.com/office/drawing/2010/main">
+            <mc:Choice Requires="a14">
               <p:sp>
                 <p:nvSpPr>
                   <p:cNvPr id="98" name="TextBox 97"/>
@@ -10568,6 +10580,7 @@
                   </a:bodyPr>
                   <a:lstStyle/>
                   <a:p>
+                    <a:pPr/>
                     <a14:m>
                       <m:oMathPara xmlns:m="http://schemas.openxmlformats.org/officeDocument/2006/math">
                         <m:oMathParaPr>
@@ -10592,7 +10605,7 @@
                 </p:txBody>
               </p:sp>
             </mc:Choice>
-            <mc:Fallback>
+            <mc:Fallback xmlns="">
               <p:sp>
                 <p:nvSpPr>
                   <p:cNvPr id="98" name="TextBox 97"/>
@@ -10631,8 +10644,8 @@
               </p:sp>
             </mc:Fallback>
           </mc:AlternateContent>
-          <mc:AlternateContent xmlns:mc="http://schemas.openxmlformats.org/markup-compatibility/2006">
-            <mc:Choice xmlns:a14="http://schemas.microsoft.com/office/drawing/2010/main" Requires="a14">
+          <mc:AlternateContent xmlns:mc="http://schemas.openxmlformats.org/markup-compatibility/2006" xmlns:a14="http://schemas.microsoft.com/office/drawing/2010/main">
+            <mc:Choice Requires="a14">
               <p:sp>
                 <p:nvSpPr>
                   <p:cNvPr id="99" name="TextBox 98"/>
@@ -10655,6 +10668,7 @@
                   </a:bodyPr>
                   <a:lstStyle/>
                   <a:p>
+                    <a:pPr/>
                     <a14:m>
                       <m:oMathPara xmlns:m="http://schemas.openxmlformats.org/officeDocument/2006/math">
                         <m:oMathParaPr>
@@ -10679,7 +10693,7 @@
                 </p:txBody>
               </p:sp>
             </mc:Choice>
-            <mc:Fallback>
+            <mc:Fallback xmlns="">
               <p:sp>
                 <p:nvSpPr>
                   <p:cNvPr id="99" name="TextBox 98"/>
@@ -10718,8 +10732,8 @@
               </p:sp>
             </mc:Fallback>
           </mc:AlternateContent>
-          <mc:AlternateContent xmlns:mc="http://schemas.openxmlformats.org/markup-compatibility/2006">
-            <mc:Choice xmlns:a14="http://schemas.microsoft.com/office/drawing/2010/main" Requires="a14">
+          <mc:AlternateContent xmlns:mc="http://schemas.openxmlformats.org/markup-compatibility/2006" xmlns:a14="http://schemas.microsoft.com/office/drawing/2010/main">
+            <mc:Choice Requires="a14">
               <p:sp>
                 <p:nvSpPr>
                   <p:cNvPr id="100" name="TextBox 99"/>
@@ -10742,6 +10756,7 @@
                   </a:bodyPr>
                   <a:lstStyle/>
                   <a:p>
+                    <a:pPr/>
                     <a14:m>
                       <m:oMathPara xmlns:m="http://schemas.openxmlformats.org/officeDocument/2006/math">
                         <m:oMathParaPr>
@@ -10800,7 +10815,7 @@
                 </p:txBody>
               </p:sp>
             </mc:Choice>
-            <mc:Fallback>
+            <mc:Fallback xmlns="">
               <p:sp>
                 <p:nvSpPr>
                   <p:cNvPr id="100" name="TextBox 99"/>
@@ -10839,8 +10854,8 @@
               </p:sp>
             </mc:Fallback>
           </mc:AlternateContent>
-          <mc:AlternateContent xmlns:mc="http://schemas.openxmlformats.org/markup-compatibility/2006">
-            <mc:Choice xmlns:a14="http://schemas.microsoft.com/office/drawing/2010/main" Requires="a14">
+          <mc:AlternateContent xmlns:mc="http://schemas.openxmlformats.org/markup-compatibility/2006" xmlns:a14="http://schemas.microsoft.com/office/drawing/2010/main">
+            <mc:Choice Requires="a14">
               <p:sp>
                 <p:nvSpPr>
                   <p:cNvPr id="101" name="TextBox 100"/>
@@ -10863,6 +10878,7 @@
                   </a:bodyPr>
                   <a:lstStyle/>
                   <a:p>
+                    <a:pPr/>
                     <a14:m>
                       <m:oMathPara xmlns:m="http://schemas.openxmlformats.org/officeDocument/2006/math">
                         <m:oMathParaPr>
@@ -10928,7 +10944,7 @@
                 </p:txBody>
               </p:sp>
             </mc:Choice>
-            <mc:Fallback>
+            <mc:Fallback xmlns="">
               <p:sp>
                 <p:nvSpPr>
                   <p:cNvPr id="101" name="TextBox 100"/>
@@ -10967,8 +10983,8 @@
               </p:sp>
             </mc:Fallback>
           </mc:AlternateContent>
-          <mc:AlternateContent xmlns:mc="http://schemas.openxmlformats.org/markup-compatibility/2006">
-            <mc:Choice xmlns:a14="http://schemas.microsoft.com/office/drawing/2010/main" Requires="a14">
+          <mc:AlternateContent xmlns:mc="http://schemas.openxmlformats.org/markup-compatibility/2006" xmlns:a14="http://schemas.microsoft.com/office/drawing/2010/main">
+            <mc:Choice Requires="a14">
               <p:sp>
                 <p:nvSpPr>
                   <p:cNvPr id="102" name="TextBox 101"/>
@@ -10991,6 +11007,7 @@
                   </a:bodyPr>
                   <a:lstStyle/>
                   <a:p>
+                    <a:pPr/>
                     <a14:m>
                       <m:oMathPara xmlns:m="http://schemas.openxmlformats.org/officeDocument/2006/math">
                         <m:oMathParaPr>
@@ -11056,7 +11073,7 @@
                 </p:txBody>
               </p:sp>
             </mc:Choice>
-            <mc:Fallback>
+            <mc:Fallback xmlns="">
               <p:sp>
                 <p:nvSpPr>
                   <p:cNvPr id="102" name="TextBox 101"/>
@@ -11095,8 +11112,8 @@
               </p:sp>
             </mc:Fallback>
           </mc:AlternateContent>
-          <mc:AlternateContent xmlns:mc="http://schemas.openxmlformats.org/markup-compatibility/2006">
-            <mc:Choice xmlns:a14="http://schemas.microsoft.com/office/drawing/2010/main" Requires="a14">
+          <mc:AlternateContent xmlns:mc="http://schemas.openxmlformats.org/markup-compatibility/2006" xmlns:a14="http://schemas.microsoft.com/office/drawing/2010/main">
+            <mc:Choice Requires="a14">
               <p:sp>
                 <p:nvSpPr>
                   <p:cNvPr id="103" name="TextBox 102"/>
@@ -11119,6 +11136,7 @@
                   </a:bodyPr>
                   <a:lstStyle/>
                   <a:p>
+                    <a:pPr/>
                     <a14:m>
                       <m:oMathPara xmlns:m="http://schemas.openxmlformats.org/officeDocument/2006/math">
                         <m:oMathParaPr>
@@ -11164,7 +11182,7 @@
                 </p:txBody>
               </p:sp>
             </mc:Choice>
-            <mc:Fallback>
+            <mc:Fallback xmlns="">
               <p:sp>
                 <p:nvSpPr>
                   <p:cNvPr id="103" name="TextBox 102"/>
@@ -11203,8 +11221,8 @@
               </p:sp>
             </mc:Fallback>
           </mc:AlternateContent>
-          <mc:AlternateContent xmlns:mc="http://schemas.openxmlformats.org/markup-compatibility/2006">
-            <mc:Choice xmlns:a14="http://schemas.microsoft.com/office/drawing/2010/main" Requires="a14">
+          <mc:AlternateContent xmlns:mc="http://schemas.openxmlformats.org/markup-compatibility/2006" xmlns:a14="http://schemas.microsoft.com/office/drawing/2010/main">
+            <mc:Choice Requires="a14">
               <p:sp>
                 <p:nvSpPr>
                   <p:cNvPr id="104" name="TextBox 103"/>
@@ -11227,6 +11245,7 @@
                   </a:bodyPr>
                   <a:lstStyle/>
                   <a:p>
+                    <a:pPr/>
                     <a14:m>
                       <m:oMathPara xmlns:m="http://schemas.openxmlformats.org/officeDocument/2006/math">
                         <m:oMathParaPr>
@@ -11272,7 +11291,7 @@
                 </p:txBody>
               </p:sp>
             </mc:Choice>
-            <mc:Fallback>
+            <mc:Fallback xmlns="">
               <p:sp>
                 <p:nvSpPr>
                   <p:cNvPr id="104" name="TextBox 103"/>
@@ -12003,8 +12022,8 @@
               </a:fontRef>
             </p:style>
           </p:cxnSp>
-          <mc:AlternateContent xmlns:mc="http://schemas.openxmlformats.org/markup-compatibility/2006">
-            <mc:Choice xmlns:a14="http://schemas.microsoft.com/office/drawing/2010/main" Requires="a14">
+          <mc:AlternateContent xmlns:mc="http://schemas.openxmlformats.org/markup-compatibility/2006" xmlns:a14="http://schemas.microsoft.com/office/drawing/2010/main">
+            <mc:Choice Requires="a14">
               <p:sp>
                 <p:nvSpPr>
                   <p:cNvPr id="12" name="TextBox 11"/>
@@ -12027,6 +12046,7 @@
                   </a:bodyPr>
                   <a:lstStyle/>
                   <a:p>
+                    <a:pPr/>
                     <a14:m>
                       <m:oMathPara xmlns:m="http://schemas.openxmlformats.org/officeDocument/2006/math">
                         <m:oMathParaPr>
@@ -12064,7 +12084,7 @@
                 </p:txBody>
               </p:sp>
             </mc:Choice>
-            <mc:Fallback>
+            <mc:Fallback xmlns="">
               <p:sp>
                 <p:nvSpPr>
                   <p:cNvPr id="12" name="TextBox 11"/>
@@ -12103,8 +12123,8 @@
               </p:sp>
             </mc:Fallback>
           </mc:AlternateContent>
-          <mc:AlternateContent xmlns:mc="http://schemas.openxmlformats.org/markup-compatibility/2006">
-            <mc:Choice xmlns:a14="http://schemas.microsoft.com/office/drawing/2010/main" Requires="a14">
+          <mc:AlternateContent xmlns:mc="http://schemas.openxmlformats.org/markup-compatibility/2006" xmlns:a14="http://schemas.microsoft.com/office/drawing/2010/main">
+            <mc:Choice Requires="a14">
               <p:sp>
                 <p:nvSpPr>
                   <p:cNvPr id="13" name="TextBox 12"/>
@@ -12127,6 +12147,7 @@
                   </a:bodyPr>
                   <a:lstStyle/>
                   <a:p>
+                    <a:pPr/>
                     <a14:m>
                       <m:oMathPara xmlns:m="http://schemas.openxmlformats.org/officeDocument/2006/math">
                         <m:oMathParaPr>
@@ -12151,7 +12172,7 @@
                 </p:txBody>
               </p:sp>
             </mc:Choice>
-            <mc:Fallback>
+            <mc:Fallback xmlns="">
               <p:sp>
                 <p:nvSpPr>
                   <p:cNvPr id="13" name="TextBox 12"/>
@@ -12556,8 +12577,8 @@
               </a:fontRef>
             </p:style>
           </p:cxnSp>
-          <mc:AlternateContent xmlns:mc="http://schemas.openxmlformats.org/markup-compatibility/2006">
-            <mc:Choice xmlns:a14="http://schemas.microsoft.com/office/drawing/2010/main" Requires="a14">
+          <mc:AlternateContent xmlns:mc="http://schemas.openxmlformats.org/markup-compatibility/2006" xmlns:a14="http://schemas.microsoft.com/office/drawing/2010/main">
+            <mc:Choice Requires="a14">
               <p:sp>
                 <p:nvSpPr>
                   <p:cNvPr id="34" name="TextBox 33"/>
@@ -12580,6 +12601,7 @@
                   </a:bodyPr>
                   <a:lstStyle/>
                   <a:p>
+                    <a:pPr/>
                     <a14:m>
                       <m:oMathPara xmlns:m="http://schemas.openxmlformats.org/officeDocument/2006/math">
                         <m:oMathParaPr>
@@ -12604,7 +12626,7 @@
                 </p:txBody>
               </p:sp>
             </mc:Choice>
-            <mc:Fallback>
+            <mc:Fallback xmlns="">
               <p:sp>
                 <p:nvSpPr>
                   <p:cNvPr id="34" name="TextBox 33"/>
@@ -12643,8 +12665,8 @@
               </p:sp>
             </mc:Fallback>
           </mc:AlternateContent>
-          <mc:AlternateContent xmlns:mc="http://schemas.openxmlformats.org/markup-compatibility/2006">
-            <mc:Choice xmlns:a14="http://schemas.microsoft.com/office/drawing/2010/main" Requires="a14">
+          <mc:AlternateContent xmlns:mc="http://schemas.openxmlformats.org/markup-compatibility/2006" xmlns:a14="http://schemas.microsoft.com/office/drawing/2010/main">
+            <mc:Choice Requires="a14">
               <p:sp>
                 <p:nvSpPr>
                   <p:cNvPr id="39" name="TextBox 38"/>
@@ -12667,6 +12689,7 @@
                   </a:bodyPr>
                   <a:lstStyle/>
                   <a:p>
+                    <a:pPr/>
                     <a14:m>
                       <m:oMathPara xmlns:m="http://schemas.openxmlformats.org/officeDocument/2006/math">
                         <m:oMathParaPr>
@@ -12705,7 +12728,7 @@
                 </p:txBody>
               </p:sp>
             </mc:Choice>
-            <mc:Fallback>
+            <mc:Fallback xmlns="">
               <p:sp>
                 <p:nvSpPr>
                   <p:cNvPr id="39" name="TextBox 38"/>
@@ -12744,8 +12767,8 @@
               </p:sp>
             </mc:Fallback>
           </mc:AlternateContent>
-          <mc:AlternateContent xmlns:mc="http://schemas.openxmlformats.org/markup-compatibility/2006">
-            <mc:Choice xmlns:a14="http://schemas.microsoft.com/office/drawing/2010/main" Requires="a14">
+          <mc:AlternateContent xmlns:mc="http://schemas.openxmlformats.org/markup-compatibility/2006" xmlns:a14="http://schemas.microsoft.com/office/drawing/2010/main">
+            <mc:Choice Requires="a14">
               <p:sp>
                 <p:nvSpPr>
                   <p:cNvPr id="40" name="TextBox 39"/>
@@ -12768,6 +12791,7 @@
                   </a:bodyPr>
                   <a:lstStyle/>
                   <a:p>
+                    <a:pPr/>
                     <a14:m>
                       <m:oMathPara xmlns:m="http://schemas.openxmlformats.org/officeDocument/2006/math">
                         <m:oMathParaPr>
@@ -12792,7 +12816,7 @@
                 </p:txBody>
               </p:sp>
             </mc:Choice>
-            <mc:Fallback>
+            <mc:Fallback xmlns="">
               <p:sp>
                 <p:nvSpPr>
                   <p:cNvPr id="40" name="TextBox 39"/>
@@ -12831,8 +12855,8 @@
               </p:sp>
             </mc:Fallback>
           </mc:AlternateContent>
-          <mc:AlternateContent xmlns:mc="http://schemas.openxmlformats.org/markup-compatibility/2006">
-            <mc:Choice xmlns:a14="http://schemas.microsoft.com/office/drawing/2010/main" Requires="a14">
+          <mc:AlternateContent xmlns:mc="http://schemas.openxmlformats.org/markup-compatibility/2006" xmlns:a14="http://schemas.microsoft.com/office/drawing/2010/main">
+            <mc:Choice Requires="a14">
               <p:sp>
                 <p:nvSpPr>
                   <p:cNvPr id="41" name="TextBox 40"/>
@@ -12855,6 +12879,7 @@
                   </a:bodyPr>
                   <a:lstStyle/>
                   <a:p>
+                    <a:pPr/>
                     <a14:m>
                       <m:oMathPara xmlns:m="http://schemas.openxmlformats.org/officeDocument/2006/math">
                         <m:oMathParaPr>
@@ -12879,7 +12904,7 @@
                 </p:txBody>
               </p:sp>
             </mc:Choice>
-            <mc:Fallback>
+            <mc:Fallback xmlns="">
               <p:sp>
                 <p:nvSpPr>
                   <p:cNvPr id="41" name="TextBox 40"/>
@@ -12918,8 +12943,8 @@
               </p:sp>
             </mc:Fallback>
           </mc:AlternateContent>
-          <mc:AlternateContent xmlns:mc="http://schemas.openxmlformats.org/markup-compatibility/2006">
-            <mc:Choice xmlns:a14="http://schemas.microsoft.com/office/drawing/2010/main" Requires="a14">
+          <mc:AlternateContent xmlns:mc="http://schemas.openxmlformats.org/markup-compatibility/2006" xmlns:a14="http://schemas.microsoft.com/office/drawing/2010/main">
+            <mc:Choice Requires="a14">
               <p:sp>
                 <p:nvSpPr>
                   <p:cNvPr id="42" name="TextBox 41"/>
@@ -12942,6 +12967,7 @@
                   </a:bodyPr>
                   <a:lstStyle/>
                   <a:p>
+                    <a:pPr/>
                     <a14:m>
                       <m:oMathPara xmlns:m="http://schemas.openxmlformats.org/officeDocument/2006/math">
                         <m:oMathParaPr>
@@ -12966,7 +12992,7 @@
                 </p:txBody>
               </p:sp>
             </mc:Choice>
-            <mc:Fallback>
+            <mc:Fallback xmlns="">
               <p:sp>
                 <p:nvSpPr>
                   <p:cNvPr id="42" name="TextBox 41"/>
@@ -13005,8 +13031,8 @@
               </p:sp>
             </mc:Fallback>
           </mc:AlternateContent>
-          <mc:AlternateContent xmlns:mc="http://schemas.openxmlformats.org/markup-compatibility/2006">
-            <mc:Choice xmlns:a14="http://schemas.microsoft.com/office/drawing/2010/main" Requires="a14">
+          <mc:AlternateContent xmlns:mc="http://schemas.openxmlformats.org/markup-compatibility/2006" xmlns:a14="http://schemas.microsoft.com/office/drawing/2010/main">
+            <mc:Choice Requires="a14">
               <p:sp>
                 <p:nvSpPr>
                   <p:cNvPr id="43" name="TextBox 42"/>
@@ -13029,6 +13055,7 @@
                   </a:bodyPr>
                   <a:lstStyle/>
                   <a:p>
+                    <a:pPr/>
                     <a14:m>
                       <m:oMathPara xmlns:m="http://schemas.openxmlformats.org/officeDocument/2006/math">
                         <m:oMathParaPr>
@@ -13053,7 +13080,7 @@
                 </p:txBody>
               </p:sp>
             </mc:Choice>
-            <mc:Fallback>
+            <mc:Fallback xmlns="">
               <p:sp>
                 <p:nvSpPr>
                   <p:cNvPr id="43" name="TextBox 42"/>
@@ -13660,8 +13687,8 @@
                   </a:fontRef>
                 </p:style>
               </p:cxnSp>
-              <mc:AlternateContent xmlns:mc="http://schemas.openxmlformats.org/markup-compatibility/2006">
-                <mc:Choice xmlns:a14="http://schemas.microsoft.com/office/drawing/2010/main" Requires="a14">
+              <mc:AlternateContent xmlns:mc="http://schemas.openxmlformats.org/markup-compatibility/2006" xmlns:a14="http://schemas.microsoft.com/office/drawing/2010/main">
+                <mc:Choice Requires="a14">
                   <p:sp>
                     <p:nvSpPr>
                       <p:cNvPr id="69" name="TextBox 68"/>
@@ -13684,6 +13711,7 @@
                       </a:bodyPr>
                       <a:lstStyle/>
                       <a:p>
+                        <a:pPr/>
                         <a14:m>
                           <m:oMathPara xmlns:m="http://schemas.openxmlformats.org/officeDocument/2006/math">
                             <m:oMathParaPr>
@@ -13708,7 +13736,7 @@
                     </p:txBody>
                   </p:sp>
                 </mc:Choice>
-                <mc:Fallback>
+                <mc:Fallback xmlns="">
                   <p:sp>
                     <p:nvSpPr>
                       <p:cNvPr id="69" name="TextBox 68"/>
@@ -13747,8 +13775,8 @@
                   </p:sp>
                 </mc:Fallback>
               </mc:AlternateContent>
-              <mc:AlternateContent xmlns:mc="http://schemas.openxmlformats.org/markup-compatibility/2006">
-                <mc:Choice xmlns:a14="http://schemas.microsoft.com/office/drawing/2010/main" Requires="a14">
+              <mc:AlternateContent xmlns:mc="http://schemas.openxmlformats.org/markup-compatibility/2006" xmlns:a14="http://schemas.microsoft.com/office/drawing/2010/main">
+                <mc:Choice Requires="a14">
                   <p:sp>
                     <p:nvSpPr>
                       <p:cNvPr id="70" name="TextBox 69"/>
@@ -13771,6 +13799,7 @@
                       </a:bodyPr>
                       <a:lstStyle/>
                       <a:p>
+                        <a:pPr/>
                         <a14:m>
                           <m:oMathPara xmlns:m="http://schemas.openxmlformats.org/officeDocument/2006/math">
                             <m:oMathParaPr>
@@ -13795,7 +13824,7 @@
                     </p:txBody>
                   </p:sp>
                 </mc:Choice>
-                <mc:Fallback>
+                <mc:Fallback xmlns="">
                   <p:sp>
                     <p:nvSpPr>
                       <p:cNvPr id="70" name="TextBox 69"/>
@@ -13870,8 +13899,8 @@
                   </a:fontRef>
                 </p:style>
               </p:cxnSp>
-              <mc:AlternateContent xmlns:mc="http://schemas.openxmlformats.org/markup-compatibility/2006">
-                <mc:Choice xmlns:a14="http://schemas.microsoft.com/office/drawing/2010/main" Requires="a14">
+              <mc:AlternateContent xmlns:mc="http://schemas.openxmlformats.org/markup-compatibility/2006" xmlns:a14="http://schemas.microsoft.com/office/drawing/2010/main">
+                <mc:Choice Requires="a14">
                   <p:sp>
                     <p:nvSpPr>
                       <p:cNvPr id="78" name="TextBox 77"/>
@@ -13894,6 +13923,7 @@
                       </a:bodyPr>
                       <a:lstStyle/>
                       <a:p>
+                        <a:pPr/>
                         <a14:m>
                           <m:oMathPara xmlns:m="http://schemas.openxmlformats.org/officeDocument/2006/math">
                             <m:oMathParaPr>
@@ -13952,7 +13982,7 @@
                     </p:txBody>
                   </p:sp>
                 </mc:Choice>
-                <mc:Fallback>
+                <mc:Fallback xmlns="">
                   <p:sp>
                     <p:nvSpPr>
                       <p:cNvPr id="78" name="TextBox 77"/>
@@ -13991,8 +14021,8 @@
                   </p:sp>
                 </mc:Fallback>
               </mc:AlternateContent>
-              <mc:AlternateContent xmlns:mc="http://schemas.openxmlformats.org/markup-compatibility/2006">
-                <mc:Choice xmlns:a14="http://schemas.microsoft.com/office/drawing/2010/main" Requires="a14">
+              <mc:AlternateContent xmlns:mc="http://schemas.openxmlformats.org/markup-compatibility/2006" xmlns:a14="http://schemas.microsoft.com/office/drawing/2010/main">
+                <mc:Choice Requires="a14">
                   <p:sp>
                     <p:nvSpPr>
                       <p:cNvPr id="79" name="TextBox 78"/>
@@ -14015,6 +14045,7 @@
                       </a:bodyPr>
                       <a:lstStyle/>
                       <a:p>
+                        <a:pPr/>
                         <a14:m>
                           <m:oMathPara xmlns:m="http://schemas.openxmlformats.org/officeDocument/2006/math">
                             <m:oMathParaPr>
@@ -14080,7 +14111,7 @@
                     </p:txBody>
                   </p:sp>
                 </mc:Choice>
-                <mc:Fallback>
+                <mc:Fallback xmlns="">
                   <p:sp>
                     <p:nvSpPr>
                       <p:cNvPr id="79" name="TextBox 78"/>
@@ -14119,8 +14150,8 @@
                   </p:sp>
                 </mc:Fallback>
               </mc:AlternateContent>
-              <mc:AlternateContent xmlns:mc="http://schemas.openxmlformats.org/markup-compatibility/2006">
-                <mc:Choice xmlns:a14="http://schemas.microsoft.com/office/drawing/2010/main" Requires="a14">
+              <mc:AlternateContent xmlns:mc="http://schemas.openxmlformats.org/markup-compatibility/2006" xmlns:a14="http://schemas.microsoft.com/office/drawing/2010/main">
+                <mc:Choice Requires="a14">
                   <p:sp>
                     <p:nvSpPr>
                       <p:cNvPr id="80" name="TextBox 79"/>
@@ -14143,6 +14174,7 @@
                       </a:bodyPr>
                       <a:lstStyle/>
                       <a:p>
+                        <a:pPr/>
                         <a14:m>
                           <m:oMathPara xmlns:m="http://schemas.openxmlformats.org/officeDocument/2006/math">
                             <m:oMathParaPr>
@@ -14208,7 +14240,7 @@
                     </p:txBody>
                   </p:sp>
                 </mc:Choice>
-                <mc:Fallback>
+                <mc:Fallback xmlns="">
                   <p:sp>
                     <p:nvSpPr>
                       <p:cNvPr id="80" name="TextBox 79"/>
@@ -14247,8 +14279,8 @@
                   </p:sp>
                 </mc:Fallback>
               </mc:AlternateContent>
-              <mc:AlternateContent xmlns:mc="http://schemas.openxmlformats.org/markup-compatibility/2006">
-                <mc:Choice xmlns:a14="http://schemas.microsoft.com/office/drawing/2010/main" Requires="a14">
+              <mc:AlternateContent xmlns:mc="http://schemas.openxmlformats.org/markup-compatibility/2006" xmlns:a14="http://schemas.microsoft.com/office/drawing/2010/main">
+                <mc:Choice Requires="a14">
                   <p:sp>
                     <p:nvSpPr>
                       <p:cNvPr id="81" name="TextBox 80"/>
@@ -14271,6 +14303,7 @@
                       </a:bodyPr>
                       <a:lstStyle/>
                       <a:p>
+                        <a:pPr/>
                         <a14:m>
                           <m:oMathPara xmlns:m="http://schemas.openxmlformats.org/officeDocument/2006/math">
                             <m:oMathParaPr>
@@ -14316,7 +14349,7 @@
                     </p:txBody>
                   </p:sp>
                 </mc:Choice>
-                <mc:Fallback>
+                <mc:Fallback xmlns="">
                   <p:sp>
                     <p:nvSpPr>
                       <p:cNvPr id="81" name="TextBox 80"/>
@@ -14355,8 +14388,8 @@
                   </p:sp>
                 </mc:Fallback>
               </mc:AlternateContent>
-              <mc:AlternateContent xmlns:mc="http://schemas.openxmlformats.org/markup-compatibility/2006">
-                <mc:Choice xmlns:a14="http://schemas.microsoft.com/office/drawing/2010/main" Requires="a14">
+              <mc:AlternateContent xmlns:mc="http://schemas.openxmlformats.org/markup-compatibility/2006" xmlns:a14="http://schemas.microsoft.com/office/drawing/2010/main">
+                <mc:Choice Requires="a14">
                   <p:sp>
                     <p:nvSpPr>
                       <p:cNvPr id="82" name="TextBox 81"/>
@@ -14379,6 +14412,7 @@
                       </a:bodyPr>
                       <a:lstStyle/>
                       <a:p>
+                        <a:pPr/>
                         <a14:m>
                           <m:oMathPara xmlns:m="http://schemas.openxmlformats.org/officeDocument/2006/math">
                             <m:oMathParaPr>
@@ -14424,7 +14458,7 @@
                     </p:txBody>
                   </p:sp>
                 </mc:Choice>
-                <mc:Fallback>
+                <mc:Fallback xmlns="">
                   <p:sp>
                     <p:nvSpPr>
                       <p:cNvPr id="82" name="TextBox 81"/>
@@ -15027,8 +15061,8 @@
             <a:chExt cx="1513490" cy="969246"/>
           </a:xfrm>
         </p:grpSpPr>
-        <mc:AlternateContent xmlns:mc="http://schemas.openxmlformats.org/markup-compatibility/2006">
-          <mc:Choice xmlns:a14="http://schemas.microsoft.com/office/drawing/2010/main" Requires="a14">
+        <mc:AlternateContent xmlns:mc="http://schemas.openxmlformats.org/markup-compatibility/2006" xmlns:a14="http://schemas.microsoft.com/office/drawing/2010/main">
+          <mc:Choice Requires="a14">
             <p:sp>
               <p:nvSpPr>
                 <p:cNvPr id="90" name="TextBox 89"/>
@@ -15051,6 +15085,7 @@
                 </a:bodyPr>
                 <a:lstStyle/>
                 <a:p>
+                  <a:pPr/>
                   <a14:m>
                     <m:oMathPara xmlns:m="http://schemas.openxmlformats.org/officeDocument/2006/math">
                       <m:oMathParaPr>
@@ -15116,7 +15151,7 @@
               </p:txBody>
             </p:sp>
           </mc:Choice>
-          <mc:Fallback>
+          <mc:Fallback xmlns="">
             <p:sp>
               <p:nvSpPr>
                 <p:cNvPr id="90" name="TextBox 89"/>
@@ -15155,8 +15190,8 @@
             </p:sp>
           </mc:Fallback>
         </mc:AlternateContent>
-        <mc:AlternateContent xmlns:mc="http://schemas.openxmlformats.org/markup-compatibility/2006">
-          <mc:Choice xmlns:a14="http://schemas.microsoft.com/office/drawing/2010/main" Requires="a14">
+        <mc:AlternateContent xmlns:mc="http://schemas.openxmlformats.org/markup-compatibility/2006" xmlns:a14="http://schemas.microsoft.com/office/drawing/2010/main">
+          <mc:Choice Requires="a14">
             <p:sp>
               <p:nvSpPr>
                 <p:cNvPr id="91" name="TextBox 90"/>
@@ -15179,6 +15214,7 @@
                 </a:bodyPr>
                 <a:lstStyle/>
                 <a:p>
+                  <a:pPr/>
                   <a14:m>
                     <m:oMathPara xmlns:m="http://schemas.openxmlformats.org/officeDocument/2006/math">
                       <m:oMathParaPr>
@@ -15244,7 +15280,7 @@
               </p:txBody>
             </p:sp>
           </mc:Choice>
-          <mc:Fallback>
+          <mc:Fallback xmlns="">
             <p:sp>
               <p:nvSpPr>
                 <p:cNvPr id="91" name="TextBox 90"/>
@@ -15391,8 +15427,8 @@
             </a:fontRef>
           </p:style>
         </p:cxnSp>
-        <mc:AlternateContent xmlns:mc="http://schemas.openxmlformats.org/markup-compatibility/2006">
-          <mc:Choice xmlns:a14="http://schemas.microsoft.com/office/drawing/2010/main" Requires="a14">
+        <mc:AlternateContent xmlns:mc="http://schemas.openxmlformats.org/markup-compatibility/2006" xmlns:a14="http://schemas.microsoft.com/office/drawing/2010/main">
+          <mc:Choice Requires="a14">
             <p:sp>
               <p:nvSpPr>
                 <p:cNvPr id="109" name="TextBox 108"/>
@@ -15415,6 +15451,7 @@
                 </a:bodyPr>
                 <a:lstStyle/>
                 <a:p>
+                  <a:pPr/>
                   <a14:m>
                     <m:oMathPara xmlns:m="http://schemas.openxmlformats.org/officeDocument/2006/math">
                       <m:oMathParaPr>
@@ -15473,7 +15510,7 @@
               </p:txBody>
             </p:sp>
           </mc:Choice>
-          <mc:Fallback>
+          <mc:Fallback xmlns="">
             <p:sp>
               <p:nvSpPr>
                 <p:cNvPr id="109" name="TextBox 108"/>
@@ -15727,8 +15764,8 @@
             </a:fontRef>
           </p:style>
         </p:cxnSp>
-        <mc:AlternateContent xmlns:mc="http://schemas.openxmlformats.org/markup-compatibility/2006">
-          <mc:Choice xmlns:a14="http://schemas.microsoft.com/office/drawing/2010/main" Requires="a14">
+        <mc:AlternateContent xmlns:mc="http://schemas.openxmlformats.org/markup-compatibility/2006" xmlns:a14="http://schemas.microsoft.com/office/drawing/2010/main">
+          <mc:Choice Requires="a14">
             <p:sp>
               <p:nvSpPr>
                 <p:cNvPr id="11" name="TextBox 10"/>
@@ -15751,6 +15788,7 @@
                 </a:bodyPr>
                 <a:lstStyle/>
                 <a:p>
+                  <a:pPr/>
                   <a14:m>
                     <m:oMathPara xmlns:m="http://schemas.openxmlformats.org/officeDocument/2006/math">
                       <m:oMathParaPr>
@@ -15809,7 +15847,7 @@
               </p:txBody>
             </p:sp>
           </mc:Choice>
-          <mc:Fallback>
+          <mc:Fallback xmlns="">
             <p:sp>
               <p:nvSpPr>
                 <p:cNvPr id="11" name="TextBox 10"/>
@@ -15848,8 +15886,8 @@
             </p:sp>
           </mc:Fallback>
         </mc:AlternateContent>
-        <mc:AlternateContent xmlns:mc="http://schemas.openxmlformats.org/markup-compatibility/2006">
-          <mc:Choice xmlns:a14="http://schemas.microsoft.com/office/drawing/2010/main" Requires="a14">
+        <mc:AlternateContent xmlns:mc="http://schemas.openxmlformats.org/markup-compatibility/2006" xmlns:a14="http://schemas.microsoft.com/office/drawing/2010/main">
+          <mc:Choice Requires="a14">
             <p:sp>
               <p:nvSpPr>
                 <p:cNvPr id="12" name="TextBox 11"/>
@@ -15872,6 +15910,7 @@
                 </a:bodyPr>
                 <a:lstStyle/>
                 <a:p>
+                  <a:pPr/>
                   <a14:m>
                     <m:oMathPara xmlns:m="http://schemas.openxmlformats.org/officeDocument/2006/math">
                       <m:oMathParaPr>
@@ -15917,7 +15956,7 @@
               </p:txBody>
             </p:sp>
           </mc:Choice>
-          <mc:Fallback>
+          <mc:Fallback xmlns="">
             <p:sp>
               <p:nvSpPr>
                 <p:cNvPr id="12" name="TextBox 11"/>
@@ -15956,8 +15995,8 @@
             </p:sp>
           </mc:Fallback>
         </mc:AlternateContent>
-        <mc:AlternateContent xmlns:mc="http://schemas.openxmlformats.org/markup-compatibility/2006">
-          <mc:Choice xmlns:a14="http://schemas.microsoft.com/office/drawing/2010/main" Requires="a14">
+        <mc:AlternateContent xmlns:mc="http://schemas.openxmlformats.org/markup-compatibility/2006" xmlns:a14="http://schemas.microsoft.com/office/drawing/2010/main">
+          <mc:Choice Requires="a14">
             <p:sp>
               <p:nvSpPr>
                 <p:cNvPr id="13" name="TextBox 12"/>
@@ -15980,6 +16019,7 @@
                 </a:bodyPr>
                 <a:lstStyle/>
                 <a:p>
+                  <a:pPr/>
                   <a14:m>
                     <m:oMathPara xmlns:m="http://schemas.openxmlformats.org/officeDocument/2006/math">
                       <m:oMathParaPr>
@@ -16025,7 +16065,7 @@
               </p:txBody>
             </p:sp>
           </mc:Choice>
-          <mc:Fallback>
+          <mc:Fallback xmlns="">
             <p:sp>
               <p:nvSpPr>
                 <p:cNvPr id="13" name="TextBox 12"/>
@@ -16064,8 +16104,8 @@
             </p:sp>
           </mc:Fallback>
         </mc:AlternateContent>
-        <mc:AlternateContent xmlns:mc="http://schemas.openxmlformats.org/markup-compatibility/2006">
-          <mc:Choice xmlns:a14="http://schemas.microsoft.com/office/drawing/2010/main" Requires="a14">
+        <mc:AlternateContent xmlns:mc="http://schemas.openxmlformats.org/markup-compatibility/2006" xmlns:a14="http://schemas.microsoft.com/office/drawing/2010/main">
+          <mc:Choice Requires="a14">
             <p:sp>
               <p:nvSpPr>
                 <p:cNvPr id="14" name="TextBox 13"/>
@@ -16088,6 +16128,7 @@
                 </a:bodyPr>
                 <a:lstStyle/>
                 <a:p>
+                  <a:pPr/>
                   <a14:m>
                     <m:oMathPara xmlns:m="http://schemas.openxmlformats.org/officeDocument/2006/math">
                       <m:oMathParaPr>
@@ -16146,7 +16187,7 @@
               </p:txBody>
             </p:sp>
           </mc:Choice>
-          <mc:Fallback>
+          <mc:Fallback xmlns="">
             <p:sp>
               <p:nvSpPr>
                 <p:cNvPr id="14" name="TextBox 13"/>
@@ -16167,6 +16208,2096 @@
                   <a:blip r:embed="rId5"/>
                   <a:stretch>
                     <a:fillRect l="-15094" t="-33333" r="-64151" b="-19608"/>
+                  </a:stretch>
+                </a:blipFill>
+              </p:spPr>
+              <p:txBody>
+                <a:bodyPr/>
+                <a:lstStyle/>
+                <a:p>
+                  <a:r>
+                    <a:rPr lang="en-US">
+                      <a:noFill/>
+                    </a:rPr>
+                    <a:t> </a:t>
+                  </a:r>
+                </a:p>
+              </p:txBody>
+            </p:sp>
+          </mc:Fallback>
+        </mc:AlternateContent>
+      </p:grpSp>
+      <p:grpSp>
+        <p:nvGrpSpPr>
+          <p:cNvPr id="6" name="Group 5"/>
+          <p:cNvGrpSpPr/>
+          <p:nvPr/>
+        </p:nvGrpSpPr>
+        <p:grpSpPr>
+          <a:xfrm>
+            <a:off x="524745" y="3620229"/>
+            <a:ext cx="4040818" cy="1950264"/>
+            <a:chOff x="524745" y="3620229"/>
+            <a:chExt cx="4040818" cy="1950264"/>
+          </a:xfrm>
+        </p:grpSpPr>
+        <p:grpSp>
+          <p:nvGrpSpPr>
+            <p:cNvPr id="2" name="Group 1"/>
+            <p:cNvGrpSpPr/>
+            <p:nvPr/>
+          </p:nvGrpSpPr>
+          <p:grpSpPr>
+            <a:xfrm>
+              <a:off x="524745" y="3620229"/>
+              <a:ext cx="4040818" cy="1807043"/>
+              <a:chOff x="524745" y="3620229"/>
+              <a:chExt cx="4040818" cy="1807043"/>
+            </a:xfrm>
+          </p:grpSpPr>
+          <p:grpSp>
+            <p:nvGrpSpPr>
+              <p:cNvPr id="16" name="Group 15"/>
+              <p:cNvGrpSpPr/>
+              <p:nvPr/>
+            </p:nvGrpSpPr>
+            <p:grpSpPr>
+              <a:xfrm>
+                <a:off x="524745" y="3620964"/>
+                <a:ext cx="4040818" cy="1806308"/>
+                <a:chOff x="835743" y="1413621"/>
+                <a:chExt cx="4040818" cy="1806308"/>
+              </a:xfrm>
+            </p:grpSpPr>
+            <p:grpSp>
+              <p:nvGrpSpPr>
+                <p:cNvPr id="17" name="Group 16"/>
+                <p:cNvGrpSpPr/>
+                <p:nvPr/>
+              </p:nvGrpSpPr>
+              <p:grpSpPr>
+                <a:xfrm>
+                  <a:off x="835743" y="1413621"/>
+                  <a:ext cx="4040818" cy="1148198"/>
+                  <a:chOff x="1622323" y="1875737"/>
+                  <a:chExt cx="4040818" cy="1148198"/>
+                </a:xfrm>
+              </p:grpSpPr>
+              <p:sp>
+                <p:nvSpPr>
+                  <p:cNvPr id="23" name="Rectangle 22"/>
+                  <p:cNvSpPr/>
+                  <p:nvPr/>
+                </p:nvSpPr>
+                <p:spPr>
+                  <a:xfrm>
+                    <a:off x="1622323" y="2802193"/>
+                    <a:ext cx="4040818" cy="221742"/>
+                  </a:xfrm>
+                  <a:prstGeom prst="rect">
+                    <a:avLst/>
+                  </a:prstGeom>
+                  <a:solidFill>
+                    <a:schemeClr val="bg2">
+                      <a:lumMod val="75000"/>
+                    </a:schemeClr>
+                  </a:solidFill>
+                  <a:ln w="38100">
+                    <a:solidFill>
+                      <a:schemeClr val="tx1"/>
+                    </a:solidFill>
+                  </a:ln>
+                </p:spPr>
+                <p:style>
+                  <a:lnRef idx="2">
+                    <a:schemeClr val="accent1">
+                      <a:shade val="50000"/>
+                    </a:schemeClr>
+                  </a:lnRef>
+                  <a:fillRef idx="1">
+                    <a:schemeClr val="accent1"/>
+                  </a:fillRef>
+                  <a:effectRef idx="0">
+                    <a:schemeClr val="accent1"/>
+                  </a:effectRef>
+                  <a:fontRef idx="minor">
+                    <a:schemeClr val="lt1"/>
+                  </a:fontRef>
+                </p:style>
+                <p:txBody>
+                  <a:bodyPr rtlCol="0" anchor="ctr"/>
+                  <a:lstStyle/>
+                  <a:p>
+                    <a:pPr algn="ctr"/>
+                    <a:endParaRPr lang="en-US"/>
+                  </a:p>
+                </p:txBody>
+              </p:sp>
+              <p:sp>
+                <p:nvSpPr>
+                  <p:cNvPr id="24" name="Rectangle 23"/>
+                  <p:cNvSpPr/>
+                  <p:nvPr/>
+                </p:nvSpPr>
+                <p:spPr>
+                  <a:xfrm>
+                    <a:off x="2153265" y="2245068"/>
+                    <a:ext cx="310997" cy="527408"/>
+                  </a:xfrm>
+                  <a:prstGeom prst="rect">
+                    <a:avLst/>
+                  </a:prstGeom>
+                  <a:solidFill>
+                    <a:schemeClr val="tx1"/>
+                  </a:solidFill>
+                  <a:ln w="38100">
+                    <a:solidFill>
+                      <a:schemeClr val="tx1"/>
+                    </a:solidFill>
+                  </a:ln>
+                </p:spPr>
+                <p:style>
+                  <a:lnRef idx="2">
+                    <a:schemeClr val="accent1">
+                      <a:shade val="50000"/>
+                    </a:schemeClr>
+                  </a:lnRef>
+                  <a:fillRef idx="1">
+                    <a:schemeClr val="accent1"/>
+                  </a:fillRef>
+                  <a:effectRef idx="0">
+                    <a:schemeClr val="accent1"/>
+                  </a:effectRef>
+                  <a:fontRef idx="minor">
+                    <a:schemeClr val="lt1"/>
+                  </a:fontRef>
+                </p:style>
+                <p:txBody>
+                  <a:bodyPr rtlCol="0" anchor="ctr"/>
+                  <a:lstStyle/>
+                  <a:p>
+                    <a:pPr algn="ctr"/>
+                    <a:endParaRPr lang="en-US"/>
+                  </a:p>
+                </p:txBody>
+              </p:sp>
+              <mc:AlternateContent xmlns:mc="http://schemas.openxmlformats.org/markup-compatibility/2006">
+                <mc:Choice xmlns:a14="http://schemas.microsoft.com/office/drawing/2010/main" Requires="a14">
+                  <p:sp>
+                    <p:nvSpPr>
+                      <p:cNvPr id="27" name="TextBox 26"/>
+                      <p:cNvSpPr txBox="1"/>
+                      <p:nvPr/>
+                    </p:nvSpPr>
+                    <p:spPr>
+                      <a:xfrm>
+                        <a:off x="2125644" y="1875737"/>
+                        <a:ext cx="340504" cy="307777"/>
+                      </a:xfrm>
+                      <a:prstGeom prst="rect">
+                        <a:avLst/>
+                      </a:prstGeom>
+                      <a:noFill/>
+                    </p:spPr>
+                    <p:txBody>
+                      <a:bodyPr wrap="square" lIns="0" tIns="0" rIns="0" bIns="0" rtlCol="0">
+                        <a:spAutoFit/>
+                      </a:bodyPr>
+                      <a:lstStyle/>
+                      <a:p>
+                        <a:pPr/>
+                        <a14:m>
+                          <m:oMathPara xmlns:m="http://schemas.openxmlformats.org/officeDocument/2006/math">
+                            <m:oMathParaPr>
+                              <m:jc m:val="centerGroup"/>
+                            </m:oMathParaPr>
+                            <m:oMath xmlns:m="http://schemas.openxmlformats.org/officeDocument/2006/math">
+                              <m:r>
+                                <a:rPr lang="en-US" sz="2000" b="0" i="1" smtClean="0">
+                                  <a:latin typeface="Cambria Math" panose="02040503050406030204" pitchFamily="18" charset="0"/>
+                                  <a:cs typeface="Arial" panose="020B0604020202020204" pitchFamily="34" charset="0"/>
+                                </a:rPr>
+                                <m:t>𝑚</m:t>
+                              </m:r>
+                            </m:oMath>
+                          </m:oMathPara>
+                        </a14:m>
+                        <a:endParaRPr lang="en-US" sz="2000" dirty="0" smtClean="0">
+                          <a:latin typeface="Arial" panose="020B0604020202020204" pitchFamily="34" charset="0"/>
+                          <a:cs typeface="Arial" panose="020B0604020202020204" pitchFamily="34" charset="0"/>
+                        </a:endParaRPr>
+                      </a:p>
+                    </p:txBody>
+                  </p:sp>
+                </mc:Choice>
+                <mc:Fallback>
+                  <p:sp>
+                    <p:nvSpPr>
+                      <p:cNvPr id="27" name="TextBox 26"/>
+                      <p:cNvSpPr txBox="1">
+                        <a:spLocks noRot="1" noChangeAspect="1" noMove="1" noResize="1" noEditPoints="1" noAdjustHandles="1" noChangeArrowheads="1" noChangeShapeType="1" noTextEdit="1"/>
+                      </p:cNvSpPr>
+                      <p:nvPr/>
+                    </p:nvSpPr>
+                    <p:spPr>
+                      <a:xfrm>
+                        <a:off x="2125644" y="1875737"/>
+                        <a:ext cx="340504" cy="307777"/>
+                      </a:xfrm>
+                      <a:prstGeom prst="rect">
+                        <a:avLst/>
+                      </a:prstGeom>
+                      <a:blipFill>
+                        <a:blip r:embed="rId6"/>
+                        <a:stretch>
+                          <a:fillRect l="-1786" b="-2000"/>
+                        </a:stretch>
+                      </a:blipFill>
+                    </p:spPr>
+                    <p:txBody>
+                      <a:bodyPr/>
+                      <a:lstStyle/>
+                      <a:p>
+                        <a:r>
+                          <a:rPr lang="en-US">
+                            <a:noFill/>
+                          </a:rPr>
+                          <a:t> </a:t>
+                        </a:r>
+                      </a:p>
+                    </p:txBody>
+                  </p:sp>
+                </mc:Fallback>
+              </mc:AlternateContent>
+              <p:cxnSp>
+                <p:nvCxnSpPr>
+                  <p:cNvPr id="29" name="Straight Arrow Connector 28"/>
+                  <p:cNvCxnSpPr/>
+                  <p:nvPr/>
+                </p:nvCxnSpPr>
+                <p:spPr>
+                  <a:xfrm flipV="1">
+                    <a:off x="2464262" y="2491031"/>
+                    <a:ext cx="973030" cy="1216"/>
+                  </a:xfrm>
+                  <a:prstGeom prst="straightConnector1">
+                    <a:avLst/>
+                  </a:prstGeom>
+                  <a:ln w="38100">
+                    <a:solidFill>
+                      <a:schemeClr val="tx1"/>
+                    </a:solidFill>
+                    <a:tailEnd type="triangle"/>
+                  </a:ln>
+                </p:spPr>
+                <p:style>
+                  <a:lnRef idx="1">
+                    <a:schemeClr val="accent1"/>
+                  </a:lnRef>
+                  <a:fillRef idx="0">
+                    <a:schemeClr val="accent1"/>
+                  </a:fillRef>
+                  <a:effectRef idx="0">
+                    <a:schemeClr val="accent1"/>
+                  </a:effectRef>
+                  <a:fontRef idx="minor">
+                    <a:schemeClr val="tx1"/>
+                  </a:fontRef>
+                </p:style>
+              </p:cxnSp>
+              <mc:AlternateContent xmlns:mc="http://schemas.openxmlformats.org/markup-compatibility/2006">
+                <mc:Choice xmlns:a14="http://schemas.microsoft.com/office/drawing/2010/main" Requires="a14">
+                  <p:sp>
+                    <p:nvSpPr>
+                      <p:cNvPr id="31" name="TextBox 30"/>
+                      <p:cNvSpPr txBox="1"/>
+                      <p:nvPr/>
+                    </p:nvSpPr>
+                    <p:spPr>
+                      <a:xfrm>
+                        <a:off x="2604997" y="2121700"/>
+                        <a:ext cx="321178" cy="307777"/>
+                      </a:xfrm>
+                      <a:prstGeom prst="rect">
+                        <a:avLst/>
+                      </a:prstGeom>
+                      <a:noFill/>
+                    </p:spPr>
+                    <p:txBody>
+                      <a:bodyPr wrap="none" lIns="0" tIns="0" rIns="0" bIns="0" rtlCol="0">
+                        <a:spAutoFit/>
+                      </a:bodyPr>
+                      <a:lstStyle/>
+                      <a:p>
+                        <a:pPr/>
+                        <a14:m>
+                          <m:oMathPara xmlns:m="http://schemas.openxmlformats.org/officeDocument/2006/math">
+                            <m:oMathParaPr>
+                              <m:jc m:val="centerGroup"/>
+                            </m:oMathParaPr>
+                            <m:oMath xmlns:m="http://schemas.openxmlformats.org/officeDocument/2006/math">
+                              <m:sSub>
+                                <m:sSubPr>
+                                  <m:ctrlPr>
+                                    <a:rPr lang="en-US" sz="2000" b="0" i="0" smtClean="0">
+                                      <a:latin typeface="Cambria Math" panose="02040503050406030204" pitchFamily="18" charset="0"/>
+                                      <a:cs typeface="Arial" panose="020B0604020202020204" pitchFamily="34" charset="0"/>
+                                    </a:rPr>
+                                  </m:ctrlPr>
+                                </m:sSubPr>
+                                <m:e>
+                                  <m:acc>
+                                    <m:accPr>
+                                      <m:chr m:val="⃗"/>
+                                      <m:ctrlPr>
+                                        <a:rPr lang="en-US" sz="2000" b="0" i="1" smtClean="0">
+                                          <a:latin typeface="Cambria Math" panose="02040503050406030204" pitchFamily="18" charset="0"/>
+                                          <a:cs typeface="Arial" panose="020B0604020202020204" pitchFamily="34" charset="0"/>
+                                        </a:rPr>
+                                      </m:ctrlPr>
+                                    </m:accPr>
+                                    <m:e>
+                                      <m:r>
+                                        <a:rPr lang="en-US" sz="2000" b="0" i="1" smtClean="0">
+                                          <a:latin typeface="Cambria Math" panose="02040503050406030204" pitchFamily="18" charset="0"/>
+                                          <a:cs typeface="Arial" panose="020B0604020202020204" pitchFamily="34" charset="0"/>
+                                        </a:rPr>
+                                        <m:t>𝑣</m:t>
+                                      </m:r>
+                                    </m:e>
+                                  </m:acc>
+                                </m:e>
+                                <m:sub>
+                                  <m:r>
+                                    <a:rPr lang="en-US" sz="2000" b="0" i="0" smtClean="0">
+                                      <a:latin typeface="Cambria Math" panose="02040503050406030204" pitchFamily="18" charset="0"/>
+                                      <a:cs typeface="Arial" panose="020B0604020202020204" pitchFamily="34" charset="0"/>
+                                    </a:rPr>
+                                    <m:t>1</m:t>
+                                  </m:r>
+                                </m:sub>
+                              </m:sSub>
+                            </m:oMath>
+                          </m:oMathPara>
+                        </a14:m>
+                        <a:endParaRPr lang="en-US" sz="2000" dirty="0" smtClean="0">
+                          <a:latin typeface="Arial" panose="020B0604020202020204" pitchFamily="34" charset="0"/>
+                          <a:cs typeface="Arial" panose="020B0604020202020204" pitchFamily="34" charset="0"/>
+                        </a:endParaRPr>
+                      </a:p>
+                    </p:txBody>
+                  </p:sp>
+                </mc:Choice>
+                <mc:Fallback>
+                  <p:sp>
+                    <p:nvSpPr>
+                      <p:cNvPr id="31" name="TextBox 30"/>
+                      <p:cNvSpPr txBox="1">
+                        <a:spLocks noRot="1" noChangeAspect="1" noMove="1" noResize="1" noEditPoints="1" noAdjustHandles="1" noChangeArrowheads="1" noChangeShapeType="1" noTextEdit="1"/>
+                      </p:cNvSpPr>
+                      <p:nvPr/>
+                    </p:nvSpPr>
+                    <p:spPr>
+                      <a:xfrm>
+                        <a:off x="2604997" y="2121700"/>
+                        <a:ext cx="321178" cy="307777"/>
+                      </a:xfrm>
+                      <a:prstGeom prst="rect">
+                        <a:avLst/>
+                      </a:prstGeom>
+                      <a:blipFill>
+                        <a:blip r:embed="rId7"/>
+                        <a:stretch>
+                          <a:fillRect l="-13208" t="-33333" r="-64151" b="-17647"/>
+                        </a:stretch>
+                      </a:blipFill>
+                    </p:spPr>
+                    <p:txBody>
+                      <a:bodyPr/>
+                      <a:lstStyle/>
+                      <a:p>
+                        <a:r>
+                          <a:rPr lang="en-US">
+                            <a:noFill/>
+                          </a:rPr>
+                          <a:t> </a:t>
+                        </a:r>
+                      </a:p>
+                    </p:txBody>
+                  </p:sp>
+                </mc:Fallback>
+              </mc:AlternateContent>
+            </p:grpSp>
+            <p:grpSp>
+              <p:nvGrpSpPr>
+                <p:cNvPr id="18" name="Group 17"/>
+                <p:cNvGrpSpPr/>
+                <p:nvPr/>
+              </p:nvGrpSpPr>
+              <p:grpSpPr>
+                <a:xfrm>
+                  <a:off x="844732" y="2661395"/>
+                  <a:ext cx="4031829" cy="558534"/>
+                  <a:chOff x="919312" y="3331012"/>
+                  <a:chExt cx="4031829" cy="558534"/>
+                </a:xfrm>
+              </p:grpSpPr>
+              <p:cxnSp>
+                <p:nvCxnSpPr>
+                  <p:cNvPr id="19" name="Straight Arrow Connector 18"/>
+                  <p:cNvCxnSpPr/>
+                  <p:nvPr/>
+                </p:nvCxnSpPr>
+                <p:spPr>
+                  <a:xfrm flipV="1">
+                    <a:off x="1025912" y="3438955"/>
+                    <a:ext cx="3925229" cy="1"/>
+                  </a:xfrm>
+                  <a:prstGeom prst="straightConnector1">
+                    <a:avLst/>
+                  </a:prstGeom>
+                  <a:ln w="38100">
+                    <a:solidFill>
+                      <a:schemeClr val="tx1"/>
+                    </a:solidFill>
+                    <a:tailEnd type="triangle"/>
+                  </a:ln>
+                </p:spPr>
+                <p:style>
+                  <a:lnRef idx="1">
+                    <a:schemeClr val="accent1"/>
+                  </a:lnRef>
+                  <a:fillRef idx="0">
+                    <a:schemeClr val="accent1"/>
+                  </a:fillRef>
+                  <a:effectRef idx="0">
+                    <a:schemeClr val="accent1"/>
+                  </a:effectRef>
+                  <a:fontRef idx="minor">
+                    <a:schemeClr val="tx1"/>
+                  </a:fontRef>
+                </p:style>
+              </p:cxnSp>
+              <mc:AlternateContent xmlns:mc="http://schemas.openxmlformats.org/markup-compatibility/2006" xmlns:a14="http://schemas.microsoft.com/office/drawing/2010/main">
+                <mc:Choice Requires="a14">
+                  <p:sp>
+                    <p:nvSpPr>
+                      <p:cNvPr id="20" name="Rectangle 19"/>
+                      <p:cNvSpPr/>
+                      <p:nvPr/>
+                    </p:nvSpPr>
+                    <p:spPr>
+                      <a:xfrm>
+                        <a:off x="4404738" y="3438955"/>
+                        <a:ext cx="367985" cy="369332"/>
+                      </a:xfrm>
+                      <a:prstGeom prst="rect">
+                        <a:avLst/>
+                      </a:prstGeom>
+                    </p:spPr>
+                    <p:txBody>
+                      <a:bodyPr wrap="square">
+                        <a:spAutoFit/>
+                      </a:bodyPr>
+                      <a:lstStyle/>
+                      <a:p>
+                        <a:pPr/>
+                        <a14:m>
+                          <m:oMathPara xmlns:m="http://schemas.openxmlformats.org/officeDocument/2006/math">
+                            <m:oMathParaPr>
+                              <m:jc m:val="centerGroup"/>
+                            </m:oMathParaPr>
+                            <m:oMath xmlns:m="http://schemas.openxmlformats.org/officeDocument/2006/math">
+                              <m:r>
+                                <a:rPr lang="en-US" i="1">
+                                  <a:latin typeface="Cambria Math" panose="02040503050406030204" pitchFamily="18" charset="0"/>
+                                  <a:cs typeface="Arial" panose="020B0604020202020204" pitchFamily="34" charset="0"/>
+                                </a:rPr>
+                                <m:t>𝑥</m:t>
+                              </m:r>
+                            </m:oMath>
+                          </m:oMathPara>
+                        </a14:m>
+                        <a:endParaRPr lang="en-CA" dirty="0"/>
+                      </a:p>
+                    </p:txBody>
+                  </p:sp>
+                </mc:Choice>
+                <mc:Fallback xmlns="">
+                  <p:sp>
+                    <p:nvSpPr>
+                      <p:cNvPr id="28" name="Rectangle 27"/>
+                      <p:cNvSpPr>
+                        <a:spLocks noRot="1" noChangeAspect="1" noMove="1" noResize="1" noEditPoints="1" noAdjustHandles="1" noChangeArrowheads="1" noChangeShapeType="1" noTextEdit="1"/>
+                      </p:cNvSpPr>
+                      <p:nvPr/>
+                    </p:nvSpPr>
+                    <p:spPr>
+                      <a:xfrm>
+                        <a:off x="4404738" y="3438955"/>
+                        <a:ext cx="367985" cy="369332"/>
+                      </a:xfrm>
+                      <a:prstGeom prst="rect">
+                        <a:avLst/>
+                      </a:prstGeom>
+                      <a:blipFill>
+                        <a:blip r:embed="rId30"/>
+                        <a:stretch>
+                          <a:fillRect/>
+                        </a:stretch>
+                      </a:blipFill>
+                    </p:spPr>
+                    <p:txBody>
+                      <a:bodyPr/>
+                      <a:lstStyle/>
+                      <a:p>
+                        <a:r>
+                          <a:rPr lang="en-US">
+                            <a:noFill/>
+                          </a:rPr>
+                          <a:t> </a:t>
+                        </a:r>
+                      </a:p>
+                    </p:txBody>
+                  </p:sp>
+                </mc:Fallback>
+              </mc:AlternateContent>
+              <mc:AlternateContent xmlns:mc="http://schemas.openxmlformats.org/markup-compatibility/2006" xmlns:a14="http://schemas.microsoft.com/office/drawing/2010/main">
+                <mc:Choice Requires="a14">
+                  <p:sp>
+                    <p:nvSpPr>
+                      <p:cNvPr id="21" name="TextBox 20"/>
+                      <p:cNvSpPr txBox="1"/>
+                      <p:nvPr/>
+                    </p:nvSpPr>
+                    <p:spPr>
+                      <a:xfrm>
+                        <a:off x="919312" y="3581769"/>
+                        <a:ext cx="213200" cy="307777"/>
+                      </a:xfrm>
+                      <a:prstGeom prst="rect">
+                        <a:avLst/>
+                      </a:prstGeom>
+                      <a:noFill/>
+                    </p:spPr>
+                    <p:txBody>
+                      <a:bodyPr wrap="none" lIns="0" tIns="0" rIns="0" bIns="0" rtlCol="0">
+                        <a:spAutoFit/>
+                      </a:bodyPr>
+                      <a:lstStyle/>
+                      <a:p>
+                        <a:pPr/>
+                        <a14:m>
+                          <m:oMathPara xmlns:m="http://schemas.openxmlformats.org/officeDocument/2006/math">
+                            <m:oMathParaPr>
+                              <m:jc m:val="centerGroup"/>
+                            </m:oMathParaPr>
+                            <m:oMath xmlns:m="http://schemas.openxmlformats.org/officeDocument/2006/math">
+                              <m:r>
+                                <a:rPr lang="en-US" sz="2000" b="0" i="1" smtClean="0">
+                                  <a:latin typeface="Cambria Math" panose="02040503050406030204" pitchFamily="18" charset="0"/>
+                                  <a:cs typeface="Arial" panose="020B0604020202020204" pitchFamily="34" charset="0"/>
+                                </a:rPr>
+                                <m:t>0</m:t>
+                              </m:r>
+                            </m:oMath>
+                          </m:oMathPara>
+                        </a14:m>
+                        <a:endParaRPr lang="en-US" sz="2000" dirty="0" smtClean="0">
+                          <a:latin typeface="Arial" panose="020B0604020202020204" pitchFamily="34" charset="0"/>
+                          <a:cs typeface="Arial" panose="020B0604020202020204" pitchFamily="34" charset="0"/>
+                        </a:endParaRPr>
+                      </a:p>
+                    </p:txBody>
+                  </p:sp>
+                </mc:Choice>
+                <mc:Fallback xmlns="">
+                  <p:sp>
+                    <p:nvSpPr>
+                      <p:cNvPr id="29" name="TextBox 28"/>
+                      <p:cNvSpPr txBox="1">
+                        <a:spLocks noRot="1" noChangeAspect="1" noMove="1" noResize="1" noEditPoints="1" noAdjustHandles="1" noChangeArrowheads="1" noChangeShapeType="1" noTextEdit="1"/>
+                      </p:cNvSpPr>
+                      <p:nvPr/>
+                    </p:nvSpPr>
+                    <p:spPr>
+                      <a:xfrm>
+                        <a:off x="919312" y="3581769"/>
+                        <a:ext cx="213200" cy="307777"/>
+                      </a:xfrm>
+                      <a:prstGeom prst="rect">
+                        <a:avLst/>
+                      </a:prstGeom>
+                      <a:blipFill>
+                        <a:blip r:embed="rId31"/>
+                        <a:stretch>
+                          <a:fillRect l="-25714" r="-22857" b="-10000"/>
+                        </a:stretch>
+                      </a:blipFill>
+                    </p:spPr>
+                    <p:txBody>
+                      <a:bodyPr/>
+                      <a:lstStyle/>
+                      <a:p>
+                        <a:r>
+                          <a:rPr lang="en-US">
+                            <a:noFill/>
+                          </a:rPr>
+                          <a:t> </a:t>
+                        </a:r>
+                      </a:p>
+                    </p:txBody>
+                  </p:sp>
+                </mc:Fallback>
+              </mc:AlternateContent>
+              <p:cxnSp>
+                <p:nvCxnSpPr>
+                  <p:cNvPr id="22" name="Straight Connector 21"/>
+                  <p:cNvCxnSpPr/>
+                  <p:nvPr/>
+                </p:nvCxnSpPr>
+                <p:spPr>
+                  <a:xfrm flipV="1">
+                    <a:off x="1099058" y="3331012"/>
+                    <a:ext cx="0" cy="239606"/>
+                  </a:xfrm>
+                  <a:prstGeom prst="line">
+                    <a:avLst/>
+                  </a:prstGeom>
+                  <a:ln w="38100">
+                    <a:solidFill>
+                      <a:schemeClr val="tx1"/>
+                    </a:solidFill>
+                  </a:ln>
+                </p:spPr>
+                <p:style>
+                  <a:lnRef idx="1">
+                    <a:schemeClr val="accent1"/>
+                  </a:lnRef>
+                  <a:fillRef idx="0">
+                    <a:schemeClr val="accent1"/>
+                  </a:fillRef>
+                  <a:effectRef idx="0">
+                    <a:schemeClr val="accent1"/>
+                  </a:effectRef>
+                  <a:fontRef idx="minor">
+                    <a:schemeClr val="tx1"/>
+                  </a:fontRef>
+                </p:style>
+              </p:cxnSp>
+            </p:grpSp>
+          </p:grpSp>
+          <p:sp>
+            <p:nvSpPr>
+              <p:cNvPr id="47" name="Rectangle 46"/>
+              <p:cNvSpPr/>
+              <p:nvPr/>
+            </p:nvSpPr>
+            <p:spPr>
+              <a:xfrm>
+                <a:off x="3400680" y="3990295"/>
+                <a:ext cx="310997" cy="527408"/>
+              </a:xfrm>
+              <a:prstGeom prst="rect">
+                <a:avLst/>
+              </a:prstGeom>
+              <a:solidFill>
+                <a:schemeClr val="tx1"/>
+              </a:solidFill>
+              <a:ln w="38100">
+                <a:solidFill>
+                  <a:schemeClr val="tx1"/>
+                </a:solidFill>
+              </a:ln>
+            </p:spPr>
+            <p:style>
+              <a:lnRef idx="2">
+                <a:schemeClr val="accent1">
+                  <a:shade val="50000"/>
+                </a:schemeClr>
+              </a:lnRef>
+              <a:fillRef idx="1">
+                <a:schemeClr val="accent1"/>
+              </a:fillRef>
+              <a:effectRef idx="0">
+                <a:schemeClr val="accent1"/>
+              </a:effectRef>
+              <a:fontRef idx="minor">
+                <a:schemeClr val="lt1"/>
+              </a:fontRef>
+            </p:style>
+            <p:txBody>
+              <a:bodyPr rtlCol="0" anchor="ctr"/>
+              <a:lstStyle/>
+              <a:p>
+                <a:pPr algn="ctr"/>
+                <a:endParaRPr lang="en-US"/>
+              </a:p>
+            </p:txBody>
+          </p:sp>
+          <mc:AlternateContent xmlns:mc="http://schemas.openxmlformats.org/markup-compatibility/2006">
+            <mc:Choice xmlns:a14="http://schemas.microsoft.com/office/drawing/2010/main" Requires="a14">
+              <p:sp>
+                <p:nvSpPr>
+                  <p:cNvPr id="48" name="TextBox 47"/>
+                  <p:cNvSpPr txBox="1"/>
+                  <p:nvPr/>
+                </p:nvSpPr>
+                <p:spPr>
+                  <a:xfrm>
+                    <a:off x="3372053" y="3620229"/>
+                    <a:ext cx="340504" cy="307777"/>
+                  </a:xfrm>
+                  <a:prstGeom prst="rect">
+                    <a:avLst/>
+                  </a:prstGeom>
+                  <a:noFill/>
+                </p:spPr>
+                <p:txBody>
+                  <a:bodyPr wrap="square" lIns="0" tIns="0" rIns="0" bIns="0" rtlCol="0">
+                    <a:spAutoFit/>
+                  </a:bodyPr>
+                  <a:lstStyle/>
+                  <a:p>
+                    <a:pPr/>
+                    <a14:m>
+                      <m:oMathPara xmlns:m="http://schemas.openxmlformats.org/officeDocument/2006/math">
+                        <m:oMathParaPr>
+                          <m:jc m:val="centerGroup"/>
+                        </m:oMathParaPr>
+                        <m:oMath xmlns:m="http://schemas.openxmlformats.org/officeDocument/2006/math">
+                          <m:r>
+                            <a:rPr lang="en-US" sz="2000" b="0" i="1" smtClean="0">
+                              <a:latin typeface="Cambria Math" panose="02040503050406030204" pitchFamily="18" charset="0"/>
+                              <a:cs typeface="Arial" panose="020B0604020202020204" pitchFamily="34" charset="0"/>
+                            </a:rPr>
+                            <m:t>𝑚</m:t>
+                          </m:r>
+                        </m:oMath>
+                      </m:oMathPara>
+                    </a14:m>
+                    <a:endParaRPr lang="en-US" sz="2000" dirty="0" smtClean="0">
+                      <a:latin typeface="Arial" panose="020B0604020202020204" pitchFamily="34" charset="0"/>
+                      <a:cs typeface="Arial" panose="020B0604020202020204" pitchFamily="34" charset="0"/>
+                    </a:endParaRPr>
+                  </a:p>
+                </p:txBody>
+              </p:sp>
+            </mc:Choice>
+            <mc:Fallback>
+              <p:sp>
+                <p:nvSpPr>
+                  <p:cNvPr id="48" name="TextBox 47"/>
+                  <p:cNvSpPr txBox="1">
+                    <a:spLocks noRot="1" noChangeAspect="1" noMove="1" noResize="1" noEditPoints="1" noAdjustHandles="1" noChangeArrowheads="1" noChangeShapeType="1" noTextEdit="1"/>
+                  </p:cNvSpPr>
+                  <p:nvPr/>
+                </p:nvSpPr>
+                <p:spPr>
+                  <a:xfrm>
+                    <a:off x="3372053" y="3620229"/>
+                    <a:ext cx="340504" cy="307777"/>
+                  </a:xfrm>
+                  <a:prstGeom prst="rect">
+                    <a:avLst/>
+                  </a:prstGeom>
+                  <a:blipFill>
+                    <a:blip r:embed="rId32"/>
+                    <a:stretch>
+                      <a:fillRect b="-2000"/>
+                    </a:stretch>
+                  </a:blipFill>
+                </p:spPr>
+                <p:txBody>
+                  <a:bodyPr/>
+                  <a:lstStyle/>
+                  <a:p>
+                    <a:r>
+                      <a:rPr lang="en-US">
+                        <a:noFill/>
+                      </a:rPr>
+                      <a:t> </a:t>
+                    </a:r>
+                  </a:p>
+                </p:txBody>
+              </p:sp>
+            </mc:Fallback>
+          </mc:AlternateContent>
+        </p:grpSp>
+        <mc:AlternateContent xmlns:mc="http://schemas.openxmlformats.org/markup-compatibility/2006">
+          <mc:Choice xmlns:a14="http://schemas.microsoft.com/office/drawing/2010/main" Requires="a14">
+            <p:sp>
+              <p:nvSpPr>
+                <p:cNvPr id="3" name="TextBox 2"/>
+                <p:cNvSpPr txBox="1"/>
+                <p:nvPr/>
+              </p:nvSpPr>
+              <p:spPr>
+                <a:xfrm>
+                  <a:off x="1055687" y="5262716"/>
+                  <a:ext cx="2861745" cy="307777"/>
+                </a:xfrm>
+                <a:prstGeom prst="rect">
+                  <a:avLst/>
+                </a:prstGeom>
+                <a:noFill/>
+              </p:spPr>
+              <p:txBody>
+                <a:bodyPr wrap="none" lIns="0" tIns="0" rIns="0" bIns="0" rtlCol="0">
+                  <a:spAutoFit/>
+                </a:bodyPr>
+                <a:lstStyle/>
+                <a:p>
+                  <a14:m>
+                    <m:oMathPara xmlns:m="http://schemas.openxmlformats.org/officeDocument/2006/math">
+                      <m:oMathParaPr>
+                        <m:jc m:val="centerGroup"/>
+                      </m:oMathParaPr>
+                      <m:oMath xmlns:m="http://schemas.openxmlformats.org/officeDocument/2006/math">
+                        <m:r>
+                          <a:rPr lang="en-US" sz="2000" b="0" i="1" smtClean="0">
+                            <a:latin typeface="Cambria Math" panose="02040503050406030204" pitchFamily="18" charset="0"/>
+                            <a:cs typeface="Arial" panose="020B0604020202020204" pitchFamily="34" charset="0"/>
+                          </a:rPr>
+                          <m:t>𝐿𝑎𝑏</m:t>
+                        </m:r>
+                        <m:r>
+                          <a:rPr lang="en-US" sz="2000" b="0" i="1" smtClean="0">
+                            <a:latin typeface="Cambria Math" panose="02040503050406030204" pitchFamily="18" charset="0"/>
+                            <a:cs typeface="Arial" panose="020B0604020202020204" pitchFamily="34" charset="0"/>
+                          </a:rPr>
+                          <m:t> </m:t>
+                        </m:r>
+                        <m:r>
+                          <a:rPr lang="en-US" sz="2000" b="0" i="1" smtClean="0">
+                            <a:latin typeface="Cambria Math" panose="02040503050406030204" pitchFamily="18" charset="0"/>
+                            <a:cs typeface="Arial" panose="020B0604020202020204" pitchFamily="34" charset="0"/>
+                          </a:rPr>
+                          <m:t>𝑓𝑟𝑎𝑚𝑒</m:t>
+                        </m:r>
+                        <m:r>
+                          <a:rPr lang="en-US" sz="2000" b="0" i="1" smtClean="0">
+                            <a:latin typeface="Cambria Math" panose="02040503050406030204" pitchFamily="18" charset="0"/>
+                            <a:cs typeface="Arial" panose="020B0604020202020204" pitchFamily="34" charset="0"/>
+                          </a:rPr>
+                          <m:t> </m:t>
+                        </m:r>
+                        <m:r>
+                          <a:rPr lang="en-US" sz="2000" b="0" i="1" smtClean="0">
+                            <a:latin typeface="Cambria Math" panose="02040503050406030204" pitchFamily="18" charset="0"/>
+                            <a:cs typeface="Arial" panose="020B0604020202020204" pitchFamily="34" charset="0"/>
+                          </a:rPr>
+                          <m:t>𝑜𝑓</m:t>
+                        </m:r>
+                        <m:r>
+                          <a:rPr lang="en-US" sz="2000" b="0" i="1" smtClean="0">
+                            <a:latin typeface="Cambria Math" panose="02040503050406030204" pitchFamily="18" charset="0"/>
+                            <a:cs typeface="Arial" panose="020B0604020202020204" pitchFamily="34" charset="0"/>
+                          </a:rPr>
+                          <m:t> </m:t>
+                        </m:r>
+                        <m:r>
+                          <a:rPr lang="en-US" sz="2000" b="0" i="1" smtClean="0">
+                            <a:latin typeface="Cambria Math" panose="02040503050406030204" pitchFamily="18" charset="0"/>
+                            <a:cs typeface="Arial" panose="020B0604020202020204" pitchFamily="34" charset="0"/>
+                          </a:rPr>
+                          <m:t>𝑟𝑒𝑓𝑒𝑟𝑒𝑛𝑐𝑒</m:t>
+                        </m:r>
+                      </m:oMath>
+                    </m:oMathPara>
+                  </a14:m>
+                  <a:endParaRPr lang="en-US" sz="2000" dirty="0" smtClean="0">
+                    <a:latin typeface="Arial" panose="020B0604020202020204" pitchFamily="34" charset="0"/>
+                    <a:cs typeface="Arial" panose="020B0604020202020204" pitchFamily="34" charset="0"/>
+                  </a:endParaRPr>
+                </a:p>
+              </p:txBody>
+            </p:sp>
+          </mc:Choice>
+          <mc:Fallback>
+            <p:sp>
+              <p:nvSpPr>
+                <p:cNvPr id="3" name="TextBox 2"/>
+                <p:cNvSpPr txBox="1">
+                  <a:spLocks noRot="1" noChangeAspect="1" noMove="1" noResize="1" noEditPoints="1" noAdjustHandles="1" noChangeArrowheads="1" noChangeShapeType="1" noTextEdit="1"/>
+                </p:cNvSpPr>
+                <p:nvPr/>
+              </p:nvSpPr>
+              <p:spPr>
+                <a:xfrm>
+                  <a:off x="1055687" y="5262716"/>
+                  <a:ext cx="2861745" cy="307777"/>
+                </a:xfrm>
+                <a:prstGeom prst="rect">
+                  <a:avLst/>
+                </a:prstGeom>
+                <a:blipFill>
+                  <a:blip r:embed="rId33"/>
+                  <a:stretch>
+                    <a:fillRect l="-1489" r="-2340" b="-37255"/>
+                  </a:stretch>
+                </a:blipFill>
+              </p:spPr>
+              <p:txBody>
+                <a:bodyPr/>
+                <a:lstStyle/>
+                <a:p>
+                  <a:r>
+                    <a:rPr lang="en-US">
+                      <a:noFill/>
+                    </a:rPr>
+                    <a:t> </a:t>
+                  </a:r>
+                </a:p>
+              </p:txBody>
+            </p:sp>
+          </mc:Fallback>
+        </mc:AlternateContent>
+      </p:grpSp>
+      <p:grpSp>
+        <p:nvGrpSpPr>
+          <p:cNvPr id="69" name="Group 68"/>
+          <p:cNvGrpSpPr/>
+          <p:nvPr/>
+        </p:nvGrpSpPr>
+        <p:grpSpPr>
+          <a:xfrm>
+            <a:off x="5850833" y="3506371"/>
+            <a:ext cx="4040818" cy="2016181"/>
+            <a:chOff x="5850833" y="3506371"/>
+            <a:chExt cx="4040818" cy="2016181"/>
+          </a:xfrm>
+        </p:grpSpPr>
+        <p:grpSp>
+          <p:nvGrpSpPr>
+            <p:cNvPr id="49" name="Group 48"/>
+            <p:cNvGrpSpPr/>
+            <p:nvPr/>
+          </p:nvGrpSpPr>
+          <p:grpSpPr>
+            <a:xfrm>
+              <a:off x="5850833" y="3549892"/>
+              <a:ext cx="4040818" cy="1972660"/>
+              <a:chOff x="524745" y="3597833"/>
+              <a:chExt cx="4040818" cy="1972660"/>
+            </a:xfrm>
+          </p:grpSpPr>
+          <p:grpSp>
+            <p:nvGrpSpPr>
+              <p:cNvPr id="50" name="Group 49"/>
+              <p:cNvGrpSpPr/>
+              <p:nvPr/>
+            </p:nvGrpSpPr>
+            <p:grpSpPr>
+              <a:xfrm>
+                <a:off x="524745" y="3597833"/>
+                <a:ext cx="4040818" cy="1829439"/>
+                <a:chOff x="524745" y="3597833"/>
+                <a:chExt cx="4040818" cy="1829439"/>
+              </a:xfrm>
+            </p:grpSpPr>
+            <p:grpSp>
+              <p:nvGrpSpPr>
+                <p:cNvPr id="52" name="Group 51"/>
+                <p:cNvGrpSpPr/>
+                <p:nvPr/>
+              </p:nvGrpSpPr>
+              <p:grpSpPr>
+                <a:xfrm>
+                  <a:off x="524745" y="3597833"/>
+                  <a:ext cx="4040818" cy="1829439"/>
+                  <a:chOff x="835743" y="1390490"/>
+                  <a:chExt cx="4040818" cy="1829439"/>
+                </a:xfrm>
+              </p:grpSpPr>
+              <p:grpSp>
+                <p:nvGrpSpPr>
+                  <p:cNvPr id="55" name="Group 54"/>
+                  <p:cNvGrpSpPr/>
+                  <p:nvPr/>
+                </p:nvGrpSpPr>
+                <p:grpSpPr>
+                  <a:xfrm>
+                    <a:off x="835743" y="1390490"/>
+                    <a:ext cx="4040818" cy="1171329"/>
+                    <a:chOff x="1622323" y="1852606"/>
+                    <a:chExt cx="4040818" cy="1171329"/>
+                  </a:xfrm>
+                </p:grpSpPr>
+                <p:sp>
+                  <p:nvSpPr>
+                    <p:cNvPr id="61" name="Rectangle 60"/>
+                    <p:cNvSpPr/>
+                    <p:nvPr/>
+                  </p:nvSpPr>
+                  <p:spPr>
+                    <a:xfrm>
+                      <a:off x="1622323" y="2802193"/>
+                      <a:ext cx="4040818" cy="221742"/>
+                    </a:xfrm>
+                    <a:prstGeom prst="rect">
+                      <a:avLst/>
+                    </a:prstGeom>
+                    <a:solidFill>
+                      <a:schemeClr val="bg2">
+                        <a:lumMod val="75000"/>
+                      </a:schemeClr>
+                    </a:solidFill>
+                    <a:ln w="38100">
+                      <a:solidFill>
+                        <a:schemeClr val="tx1"/>
+                      </a:solidFill>
+                    </a:ln>
+                  </p:spPr>
+                  <p:style>
+                    <a:lnRef idx="2">
+                      <a:schemeClr val="accent1">
+                        <a:shade val="50000"/>
+                      </a:schemeClr>
+                    </a:lnRef>
+                    <a:fillRef idx="1">
+                      <a:schemeClr val="accent1"/>
+                    </a:fillRef>
+                    <a:effectRef idx="0">
+                      <a:schemeClr val="accent1"/>
+                    </a:effectRef>
+                    <a:fontRef idx="minor">
+                      <a:schemeClr val="lt1"/>
+                    </a:fontRef>
+                  </p:style>
+                  <p:txBody>
+                    <a:bodyPr rtlCol="0" anchor="ctr"/>
+                    <a:lstStyle/>
+                    <a:p>
+                      <a:pPr algn="ctr"/>
+                      <a:endParaRPr lang="en-US"/>
+                    </a:p>
+                  </p:txBody>
+                </p:sp>
+                <p:sp>
+                  <p:nvSpPr>
+                    <p:cNvPr id="62" name="Rectangle 61"/>
+                    <p:cNvSpPr/>
+                    <p:nvPr/>
+                  </p:nvSpPr>
+                  <p:spPr>
+                    <a:xfrm>
+                      <a:off x="2153265" y="2245068"/>
+                      <a:ext cx="310997" cy="527408"/>
+                    </a:xfrm>
+                    <a:prstGeom prst="rect">
+                      <a:avLst/>
+                    </a:prstGeom>
+                    <a:solidFill>
+                      <a:schemeClr val="tx1"/>
+                    </a:solidFill>
+                    <a:ln w="38100">
+                      <a:solidFill>
+                        <a:schemeClr val="tx1"/>
+                      </a:solidFill>
+                    </a:ln>
+                  </p:spPr>
+                  <p:style>
+                    <a:lnRef idx="2">
+                      <a:schemeClr val="accent1">
+                        <a:shade val="50000"/>
+                      </a:schemeClr>
+                    </a:lnRef>
+                    <a:fillRef idx="1">
+                      <a:schemeClr val="accent1"/>
+                    </a:fillRef>
+                    <a:effectRef idx="0">
+                      <a:schemeClr val="accent1"/>
+                    </a:effectRef>
+                    <a:fontRef idx="minor">
+                      <a:schemeClr val="lt1"/>
+                    </a:fontRef>
+                  </p:style>
+                  <p:txBody>
+                    <a:bodyPr rtlCol="0" anchor="ctr"/>
+                    <a:lstStyle/>
+                    <a:p>
+                      <a:pPr algn="ctr"/>
+                      <a:endParaRPr lang="en-US"/>
+                    </a:p>
+                  </p:txBody>
+                </p:sp>
+                <mc:AlternateContent xmlns:mc="http://schemas.openxmlformats.org/markup-compatibility/2006">
+                  <mc:Choice xmlns:a14="http://schemas.microsoft.com/office/drawing/2010/main" Requires="a14">
+                    <p:sp>
+                      <p:nvSpPr>
+                        <p:cNvPr id="63" name="TextBox 62"/>
+                        <p:cNvSpPr txBox="1"/>
+                        <p:nvPr/>
+                      </p:nvSpPr>
+                      <p:spPr>
+                        <a:xfrm>
+                          <a:off x="2125644" y="1875737"/>
+                          <a:ext cx="340504" cy="307777"/>
+                        </a:xfrm>
+                        <a:prstGeom prst="rect">
+                          <a:avLst/>
+                        </a:prstGeom>
+                        <a:noFill/>
+                      </p:spPr>
+                      <p:txBody>
+                        <a:bodyPr wrap="square" lIns="0" tIns="0" rIns="0" bIns="0" rtlCol="0">
+                          <a:spAutoFit/>
+                        </a:bodyPr>
+                        <a:lstStyle/>
+                        <a:p>
+                          <a:pPr/>
+                          <a14:m>
+                            <m:oMathPara xmlns:m="http://schemas.openxmlformats.org/officeDocument/2006/math">
+                              <m:oMathParaPr>
+                                <m:jc m:val="centerGroup"/>
+                              </m:oMathParaPr>
+                              <m:oMath xmlns:m="http://schemas.openxmlformats.org/officeDocument/2006/math">
+                                <m:r>
+                                  <a:rPr lang="en-US" sz="2000" b="0" i="1" smtClean="0">
+                                    <a:latin typeface="Cambria Math" panose="02040503050406030204" pitchFamily="18" charset="0"/>
+                                    <a:cs typeface="Arial" panose="020B0604020202020204" pitchFamily="34" charset="0"/>
+                                  </a:rPr>
+                                  <m:t>𝑚</m:t>
+                                </m:r>
+                              </m:oMath>
+                            </m:oMathPara>
+                          </a14:m>
+                          <a:endParaRPr lang="en-US" sz="2000" dirty="0" smtClean="0">
+                            <a:latin typeface="Arial" panose="020B0604020202020204" pitchFamily="34" charset="0"/>
+                            <a:cs typeface="Arial" panose="020B0604020202020204" pitchFamily="34" charset="0"/>
+                          </a:endParaRPr>
+                        </a:p>
+                      </p:txBody>
+                    </p:sp>
+                  </mc:Choice>
+                  <mc:Fallback>
+                    <p:sp>
+                      <p:nvSpPr>
+                        <p:cNvPr id="63" name="TextBox 62"/>
+                        <p:cNvSpPr txBox="1">
+                          <a:spLocks noRot="1" noChangeAspect="1" noMove="1" noResize="1" noEditPoints="1" noAdjustHandles="1" noChangeArrowheads="1" noChangeShapeType="1" noTextEdit="1"/>
+                        </p:cNvSpPr>
+                        <p:nvPr/>
+                      </p:nvSpPr>
+                      <p:spPr>
+                        <a:xfrm>
+                          <a:off x="2125644" y="1875737"/>
+                          <a:ext cx="340504" cy="307777"/>
+                        </a:xfrm>
+                        <a:prstGeom prst="rect">
+                          <a:avLst/>
+                        </a:prstGeom>
+                        <a:blipFill>
+                          <a:blip r:embed="rId34"/>
+                          <a:stretch>
+                            <a:fillRect b="-1961"/>
+                          </a:stretch>
+                        </a:blipFill>
+                      </p:spPr>
+                      <p:txBody>
+                        <a:bodyPr/>
+                        <a:lstStyle/>
+                        <a:p>
+                          <a:r>
+                            <a:rPr lang="en-US">
+                              <a:noFill/>
+                            </a:rPr>
+                            <a:t> </a:t>
+                          </a:r>
+                        </a:p>
+                      </p:txBody>
+                    </p:sp>
+                  </mc:Fallback>
+                </mc:AlternateContent>
+                <p:cxnSp>
+                  <p:nvCxnSpPr>
+                    <p:cNvPr id="64" name="Straight Arrow Connector 63"/>
+                    <p:cNvCxnSpPr/>
+                    <p:nvPr/>
+                  </p:nvCxnSpPr>
+                  <p:spPr>
+                    <a:xfrm flipV="1">
+                      <a:off x="2464262" y="2491031"/>
+                      <a:ext cx="499559" cy="1215"/>
+                    </a:xfrm>
+                    <a:prstGeom prst="straightConnector1">
+                      <a:avLst/>
+                    </a:prstGeom>
+                    <a:ln w="38100">
+                      <a:solidFill>
+                        <a:schemeClr val="tx1"/>
+                      </a:solidFill>
+                      <a:tailEnd type="triangle"/>
+                    </a:ln>
+                  </p:spPr>
+                  <p:style>
+                    <a:lnRef idx="1">
+                      <a:schemeClr val="accent1"/>
+                    </a:lnRef>
+                    <a:fillRef idx="0">
+                      <a:schemeClr val="accent1"/>
+                    </a:fillRef>
+                    <a:effectRef idx="0">
+                      <a:schemeClr val="accent1"/>
+                    </a:effectRef>
+                    <a:fontRef idx="minor">
+                      <a:schemeClr val="tx1"/>
+                    </a:fontRef>
+                  </p:style>
+                </p:cxnSp>
+                <mc:AlternateContent xmlns:mc="http://schemas.openxmlformats.org/markup-compatibility/2006">
+                  <mc:Choice xmlns:a14="http://schemas.microsoft.com/office/drawing/2010/main" Requires="a14">
+                    <p:sp>
+                      <p:nvSpPr>
+                        <p:cNvPr id="65" name="TextBox 64"/>
+                        <p:cNvSpPr txBox="1"/>
+                        <p:nvPr/>
+                      </p:nvSpPr>
+                      <p:spPr>
+                        <a:xfrm>
+                          <a:off x="2682462" y="1852606"/>
+                          <a:ext cx="506614" cy="576183"/>
+                        </a:xfrm>
+                        <a:prstGeom prst="rect">
+                          <a:avLst/>
+                        </a:prstGeom>
+                        <a:noFill/>
+                      </p:spPr>
+                      <p:txBody>
+                        <a:bodyPr wrap="none" lIns="0" tIns="0" rIns="0" bIns="0" rtlCol="0">
+                          <a:spAutoFit/>
+                        </a:bodyPr>
+                        <a:lstStyle/>
+                        <a:p>
+                          <a:pPr/>
+                          <a14:m>
+                            <m:oMathPara xmlns:m="http://schemas.openxmlformats.org/officeDocument/2006/math">
+                              <m:oMathParaPr>
+                                <m:jc m:val="centerGroup"/>
+                              </m:oMathParaPr>
+                              <m:oMath xmlns:m="http://schemas.openxmlformats.org/officeDocument/2006/math">
+                                <m:sSub>
+                                  <m:sSubPr>
+                                    <m:ctrlPr>
+                                      <a:rPr lang="en-US" sz="2000" b="0" i="0" smtClean="0">
+                                        <a:latin typeface="Cambria Math" panose="02040503050406030204" pitchFamily="18" charset="0"/>
+                                        <a:cs typeface="Arial" panose="020B0604020202020204" pitchFamily="34" charset="0"/>
+                                      </a:rPr>
+                                    </m:ctrlPr>
+                                  </m:sSubPr>
+                                  <m:e>
+                                    <m:f>
+                                      <m:fPr>
+                                        <m:ctrlPr>
+                                          <a:rPr lang="en-US" sz="2000" b="0" i="1" smtClean="0">
+                                            <a:latin typeface="Cambria Math" panose="02040503050406030204" pitchFamily="18" charset="0"/>
+                                            <a:cs typeface="Arial" panose="020B0604020202020204" pitchFamily="34" charset="0"/>
+                                          </a:rPr>
+                                        </m:ctrlPr>
+                                      </m:fPr>
+                                      <m:num>
+                                        <m:r>
+                                          <a:rPr lang="en-US" sz="2000" b="0" i="1" smtClean="0">
+                                            <a:latin typeface="Cambria Math" panose="02040503050406030204" pitchFamily="18" charset="0"/>
+                                            <a:cs typeface="Arial" panose="020B0604020202020204" pitchFamily="34" charset="0"/>
+                                          </a:rPr>
+                                          <m:t>1</m:t>
+                                        </m:r>
+                                      </m:num>
+                                      <m:den>
+                                        <m:r>
+                                          <a:rPr lang="en-US" sz="2000" b="0" i="1" smtClean="0">
+                                            <a:latin typeface="Cambria Math" panose="02040503050406030204" pitchFamily="18" charset="0"/>
+                                            <a:cs typeface="Arial" panose="020B0604020202020204" pitchFamily="34" charset="0"/>
+                                          </a:rPr>
+                                          <m:t>2</m:t>
+                                        </m:r>
+                                      </m:den>
+                                    </m:f>
+                                    <m:acc>
+                                      <m:accPr>
+                                        <m:chr m:val="⃗"/>
+                                        <m:ctrlPr>
+                                          <a:rPr lang="en-US" sz="2000" b="0" i="1" smtClean="0">
+                                            <a:latin typeface="Cambria Math" panose="02040503050406030204" pitchFamily="18" charset="0"/>
+                                            <a:cs typeface="Arial" panose="020B0604020202020204" pitchFamily="34" charset="0"/>
+                                          </a:rPr>
+                                        </m:ctrlPr>
+                                      </m:accPr>
+                                      <m:e>
+                                        <m:r>
+                                          <a:rPr lang="en-US" sz="2000" b="0" i="1" smtClean="0">
+                                            <a:latin typeface="Cambria Math" panose="02040503050406030204" pitchFamily="18" charset="0"/>
+                                            <a:cs typeface="Arial" panose="020B0604020202020204" pitchFamily="34" charset="0"/>
+                                          </a:rPr>
+                                          <m:t>𝑣</m:t>
+                                        </m:r>
+                                      </m:e>
+                                    </m:acc>
+                                  </m:e>
+                                  <m:sub>
+                                    <m:r>
+                                      <a:rPr lang="en-US" sz="2000" b="0" i="0" smtClean="0">
+                                        <a:latin typeface="Cambria Math" panose="02040503050406030204" pitchFamily="18" charset="0"/>
+                                        <a:cs typeface="Arial" panose="020B0604020202020204" pitchFamily="34" charset="0"/>
+                                      </a:rPr>
+                                      <m:t>1</m:t>
+                                    </m:r>
+                                  </m:sub>
+                                </m:sSub>
+                              </m:oMath>
+                            </m:oMathPara>
+                          </a14:m>
+                          <a:endParaRPr lang="en-US" sz="2000" dirty="0" smtClean="0">
+                            <a:latin typeface="Arial" panose="020B0604020202020204" pitchFamily="34" charset="0"/>
+                            <a:cs typeface="Arial" panose="020B0604020202020204" pitchFamily="34" charset="0"/>
+                          </a:endParaRPr>
+                        </a:p>
+                      </p:txBody>
+                    </p:sp>
+                  </mc:Choice>
+                  <mc:Fallback>
+                    <p:sp>
+                      <p:nvSpPr>
+                        <p:cNvPr id="65" name="TextBox 64"/>
+                        <p:cNvSpPr txBox="1">
+                          <a:spLocks noRot="1" noChangeAspect="1" noMove="1" noResize="1" noEditPoints="1" noAdjustHandles="1" noChangeArrowheads="1" noChangeShapeType="1" noTextEdit="1"/>
+                        </p:cNvSpPr>
+                        <p:nvPr/>
+                      </p:nvSpPr>
+                      <p:spPr>
+                        <a:xfrm>
+                          <a:off x="2682462" y="1852606"/>
+                          <a:ext cx="506614" cy="576183"/>
+                        </a:xfrm>
+                        <a:prstGeom prst="rect">
+                          <a:avLst/>
+                        </a:prstGeom>
+                        <a:blipFill>
+                          <a:blip r:embed="rId35"/>
+                          <a:stretch>
+                            <a:fillRect/>
+                          </a:stretch>
+                        </a:blipFill>
+                      </p:spPr>
+                      <p:txBody>
+                        <a:bodyPr/>
+                        <a:lstStyle/>
+                        <a:p>
+                          <a:r>
+                            <a:rPr lang="en-US">
+                              <a:noFill/>
+                            </a:rPr>
+                            <a:t> </a:t>
+                          </a:r>
+                        </a:p>
+                      </p:txBody>
+                    </p:sp>
+                  </mc:Fallback>
+                </mc:AlternateContent>
+              </p:grpSp>
+              <p:grpSp>
+                <p:nvGrpSpPr>
+                  <p:cNvPr id="56" name="Group 55"/>
+                  <p:cNvGrpSpPr/>
+                  <p:nvPr/>
+                </p:nvGrpSpPr>
+                <p:grpSpPr>
+                  <a:xfrm>
+                    <a:off x="844732" y="2661395"/>
+                    <a:ext cx="4031829" cy="558534"/>
+                    <a:chOff x="919312" y="3331012"/>
+                    <a:chExt cx="4031829" cy="558534"/>
+                  </a:xfrm>
+                </p:grpSpPr>
+                <p:cxnSp>
+                  <p:nvCxnSpPr>
+                    <p:cNvPr id="57" name="Straight Arrow Connector 56"/>
+                    <p:cNvCxnSpPr/>
+                    <p:nvPr/>
+                  </p:nvCxnSpPr>
+                  <p:spPr>
+                    <a:xfrm flipV="1">
+                      <a:off x="1025912" y="3438955"/>
+                      <a:ext cx="3925229" cy="1"/>
+                    </a:xfrm>
+                    <a:prstGeom prst="straightConnector1">
+                      <a:avLst/>
+                    </a:prstGeom>
+                    <a:ln w="38100">
+                      <a:solidFill>
+                        <a:schemeClr val="tx1"/>
+                      </a:solidFill>
+                      <a:tailEnd type="triangle"/>
+                    </a:ln>
+                  </p:spPr>
+                  <p:style>
+                    <a:lnRef idx="1">
+                      <a:schemeClr val="accent1"/>
+                    </a:lnRef>
+                    <a:fillRef idx="0">
+                      <a:schemeClr val="accent1"/>
+                    </a:fillRef>
+                    <a:effectRef idx="0">
+                      <a:schemeClr val="accent1"/>
+                    </a:effectRef>
+                    <a:fontRef idx="minor">
+                      <a:schemeClr val="tx1"/>
+                    </a:fontRef>
+                  </p:style>
+                </p:cxnSp>
+                <mc:AlternateContent xmlns:mc="http://schemas.openxmlformats.org/markup-compatibility/2006" xmlns:a14="http://schemas.microsoft.com/office/drawing/2010/main">
+                  <mc:Choice Requires="a14">
+                    <p:sp>
+                      <p:nvSpPr>
+                        <p:cNvPr id="58" name="Rectangle 57"/>
+                        <p:cNvSpPr/>
+                        <p:nvPr/>
+                      </p:nvSpPr>
+                      <p:spPr>
+                        <a:xfrm>
+                          <a:off x="4404738" y="3438955"/>
+                          <a:ext cx="367985" cy="369332"/>
+                        </a:xfrm>
+                        <a:prstGeom prst="rect">
+                          <a:avLst/>
+                        </a:prstGeom>
+                      </p:spPr>
+                      <p:txBody>
+                        <a:bodyPr wrap="square">
+                          <a:spAutoFit/>
+                        </a:bodyPr>
+                        <a:lstStyle/>
+                        <a:p>
+                          <a:pPr/>
+                          <a14:m>
+                            <m:oMathPara xmlns:m="http://schemas.openxmlformats.org/officeDocument/2006/math">
+                              <m:oMathParaPr>
+                                <m:jc m:val="centerGroup"/>
+                              </m:oMathParaPr>
+                              <m:oMath xmlns:m="http://schemas.openxmlformats.org/officeDocument/2006/math">
+                                <m:r>
+                                  <a:rPr lang="en-US" i="1">
+                                    <a:latin typeface="Cambria Math" panose="02040503050406030204" pitchFamily="18" charset="0"/>
+                                    <a:cs typeface="Arial" panose="020B0604020202020204" pitchFamily="34" charset="0"/>
+                                  </a:rPr>
+                                  <m:t>𝑥</m:t>
+                                </m:r>
+                              </m:oMath>
+                            </m:oMathPara>
+                          </a14:m>
+                          <a:endParaRPr lang="en-CA" dirty="0"/>
+                        </a:p>
+                      </p:txBody>
+                    </p:sp>
+                  </mc:Choice>
+                  <mc:Fallback xmlns="">
+                    <p:sp>
+                      <p:nvSpPr>
+                        <p:cNvPr id="28" name="Rectangle 27"/>
+                        <p:cNvSpPr>
+                          <a:spLocks noRot="1" noChangeAspect="1" noMove="1" noResize="1" noEditPoints="1" noAdjustHandles="1" noChangeArrowheads="1" noChangeShapeType="1" noTextEdit="1"/>
+                        </p:cNvSpPr>
+                        <p:nvPr/>
+                      </p:nvSpPr>
+                      <p:spPr>
+                        <a:xfrm>
+                          <a:off x="4404738" y="3438955"/>
+                          <a:ext cx="367985" cy="369332"/>
+                        </a:xfrm>
+                        <a:prstGeom prst="rect">
+                          <a:avLst/>
+                        </a:prstGeom>
+                        <a:blipFill>
+                          <a:blip r:embed="rId30"/>
+                          <a:stretch>
+                            <a:fillRect/>
+                          </a:stretch>
+                        </a:blipFill>
+                      </p:spPr>
+                      <p:txBody>
+                        <a:bodyPr/>
+                        <a:lstStyle/>
+                        <a:p>
+                          <a:r>
+                            <a:rPr lang="en-US">
+                              <a:noFill/>
+                            </a:rPr>
+                            <a:t> </a:t>
+                          </a:r>
+                        </a:p>
+                      </p:txBody>
+                    </p:sp>
+                  </mc:Fallback>
+                </mc:AlternateContent>
+                <mc:AlternateContent xmlns:mc="http://schemas.openxmlformats.org/markup-compatibility/2006" xmlns:a14="http://schemas.microsoft.com/office/drawing/2010/main">
+                  <mc:Choice Requires="a14">
+                    <p:sp>
+                      <p:nvSpPr>
+                        <p:cNvPr id="59" name="TextBox 58"/>
+                        <p:cNvSpPr txBox="1"/>
+                        <p:nvPr/>
+                      </p:nvSpPr>
+                      <p:spPr>
+                        <a:xfrm>
+                          <a:off x="919312" y="3581769"/>
+                          <a:ext cx="213200" cy="307777"/>
+                        </a:xfrm>
+                        <a:prstGeom prst="rect">
+                          <a:avLst/>
+                        </a:prstGeom>
+                        <a:noFill/>
+                      </p:spPr>
+                      <p:txBody>
+                        <a:bodyPr wrap="none" lIns="0" tIns="0" rIns="0" bIns="0" rtlCol="0">
+                          <a:spAutoFit/>
+                        </a:bodyPr>
+                        <a:lstStyle/>
+                        <a:p>
+                          <a:pPr/>
+                          <a14:m>
+                            <m:oMathPara xmlns:m="http://schemas.openxmlformats.org/officeDocument/2006/math">
+                              <m:oMathParaPr>
+                                <m:jc m:val="centerGroup"/>
+                              </m:oMathParaPr>
+                              <m:oMath xmlns:m="http://schemas.openxmlformats.org/officeDocument/2006/math">
+                                <m:r>
+                                  <a:rPr lang="en-US" sz="2000" b="0" i="1" smtClean="0">
+                                    <a:latin typeface="Cambria Math" panose="02040503050406030204" pitchFamily="18" charset="0"/>
+                                    <a:cs typeface="Arial" panose="020B0604020202020204" pitchFamily="34" charset="0"/>
+                                  </a:rPr>
+                                  <m:t>0</m:t>
+                                </m:r>
+                              </m:oMath>
+                            </m:oMathPara>
+                          </a14:m>
+                          <a:endParaRPr lang="en-US" sz="2000" dirty="0" smtClean="0">
+                            <a:latin typeface="Arial" panose="020B0604020202020204" pitchFamily="34" charset="0"/>
+                            <a:cs typeface="Arial" panose="020B0604020202020204" pitchFamily="34" charset="0"/>
+                          </a:endParaRPr>
+                        </a:p>
+                      </p:txBody>
+                    </p:sp>
+                  </mc:Choice>
+                  <mc:Fallback xmlns="">
+                    <p:sp>
+                      <p:nvSpPr>
+                        <p:cNvPr id="29" name="TextBox 28"/>
+                        <p:cNvSpPr txBox="1">
+                          <a:spLocks noRot="1" noChangeAspect="1" noMove="1" noResize="1" noEditPoints="1" noAdjustHandles="1" noChangeArrowheads="1" noChangeShapeType="1" noTextEdit="1"/>
+                        </p:cNvSpPr>
+                        <p:nvPr/>
+                      </p:nvSpPr>
+                      <p:spPr>
+                        <a:xfrm>
+                          <a:off x="919312" y="3581769"/>
+                          <a:ext cx="213200" cy="307777"/>
+                        </a:xfrm>
+                        <a:prstGeom prst="rect">
+                          <a:avLst/>
+                        </a:prstGeom>
+                        <a:blipFill>
+                          <a:blip r:embed="rId31"/>
+                          <a:stretch>
+                            <a:fillRect l="-25714" r="-22857" b="-10000"/>
+                          </a:stretch>
+                        </a:blipFill>
+                      </p:spPr>
+                      <p:txBody>
+                        <a:bodyPr/>
+                        <a:lstStyle/>
+                        <a:p>
+                          <a:r>
+                            <a:rPr lang="en-US">
+                              <a:noFill/>
+                            </a:rPr>
+                            <a:t> </a:t>
+                          </a:r>
+                        </a:p>
+                      </p:txBody>
+                    </p:sp>
+                  </mc:Fallback>
+                </mc:AlternateContent>
+                <p:cxnSp>
+                  <p:nvCxnSpPr>
+                    <p:cNvPr id="60" name="Straight Connector 59"/>
+                    <p:cNvCxnSpPr/>
+                    <p:nvPr/>
+                  </p:nvCxnSpPr>
+                  <p:spPr>
+                    <a:xfrm flipV="1">
+                      <a:off x="1099058" y="3331012"/>
+                      <a:ext cx="0" cy="239606"/>
+                    </a:xfrm>
+                    <a:prstGeom prst="line">
+                      <a:avLst/>
+                    </a:prstGeom>
+                    <a:ln w="38100">
+                      <a:solidFill>
+                        <a:schemeClr val="tx1"/>
+                      </a:solidFill>
+                    </a:ln>
+                  </p:spPr>
+                  <p:style>
+                    <a:lnRef idx="1">
+                      <a:schemeClr val="accent1"/>
+                    </a:lnRef>
+                    <a:fillRef idx="0">
+                      <a:schemeClr val="accent1"/>
+                    </a:fillRef>
+                    <a:effectRef idx="0">
+                      <a:schemeClr val="accent1"/>
+                    </a:effectRef>
+                    <a:fontRef idx="minor">
+                      <a:schemeClr val="tx1"/>
+                    </a:fontRef>
+                  </p:style>
+                </p:cxnSp>
+              </p:grpSp>
+            </p:grpSp>
+            <p:sp>
+              <p:nvSpPr>
+                <p:cNvPr id="53" name="Rectangle 52"/>
+                <p:cNvSpPr/>
+                <p:nvPr/>
+              </p:nvSpPr>
+              <p:spPr>
+                <a:xfrm>
+                  <a:off x="3400680" y="3990295"/>
+                  <a:ext cx="310997" cy="527408"/>
+                </a:xfrm>
+                <a:prstGeom prst="rect">
+                  <a:avLst/>
+                </a:prstGeom>
+                <a:solidFill>
+                  <a:schemeClr val="tx1"/>
+                </a:solidFill>
+                <a:ln w="38100">
+                  <a:solidFill>
+                    <a:schemeClr val="tx1"/>
+                  </a:solidFill>
+                </a:ln>
+              </p:spPr>
+              <p:style>
+                <a:lnRef idx="2">
+                  <a:schemeClr val="accent1">
+                    <a:shade val="50000"/>
+                  </a:schemeClr>
+                </a:lnRef>
+                <a:fillRef idx="1">
+                  <a:schemeClr val="accent1"/>
+                </a:fillRef>
+                <a:effectRef idx="0">
+                  <a:schemeClr val="accent1"/>
+                </a:effectRef>
+                <a:fontRef idx="minor">
+                  <a:schemeClr val="lt1"/>
+                </a:fontRef>
+              </p:style>
+              <p:txBody>
+                <a:bodyPr rtlCol="0" anchor="ctr"/>
+                <a:lstStyle/>
+                <a:p>
+                  <a:pPr algn="ctr"/>
+                  <a:endParaRPr lang="en-US"/>
+                </a:p>
+              </p:txBody>
+            </p:sp>
+            <mc:AlternateContent xmlns:mc="http://schemas.openxmlformats.org/markup-compatibility/2006">
+              <mc:Choice xmlns:a14="http://schemas.microsoft.com/office/drawing/2010/main" Requires="a14">
+                <p:sp>
+                  <p:nvSpPr>
+                    <p:cNvPr id="54" name="TextBox 53"/>
+                    <p:cNvSpPr txBox="1"/>
+                    <p:nvPr/>
+                  </p:nvSpPr>
+                  <p:spPr>
+                    <a:xfrm>
+                      <a:off x="3372053" y="3620229"/>
+                      <a:ext cx="340504" cy="307777"/>
+                    </a:xfrm>
+                    <a:prstGeom prst="rect">
+                      <a:avLst/>
+                    </a:prstGeom>
+                    <a:noFill/>
+                  </p:spPr>
+                  <p:txBody>
+                    <a:bodyPr wrap="square" lIns="0" tIns="0" rIns="0" bIns="0" rtlCol="0">
+                      <a:spAutoFit/>
+                    </a:bodyPr>
+                    <a:lstStyle/>
+                    <a:p>
+                      <a:pPr/>
+                      <a14:m>
+                        <m:oMathPara xmlns:m="http://schemas.openxmlformats.org/officeDocument/2006/math">
+                          <m:oMathParaPr>
+                            <m:jc m:val="centerGroup"/>
+                          </m:oMathParaPr>
+                          <m:oMath xmlns:m="http://schemas.openxmlformats.org/officeDocument/2006/math">
+                            <m:r>
+                              <a:rPr lang="en-US" sz="2000" b="0" i="1" smtClean="0">
+                                <a:latin typeface="Cambria Math" panose="02040503050406030204" pitchFamily="18" charset="0"/>
+                                <a:cs typeface="Arial" panose="020B0604020202020204" pitchFamily="34" charset="0"/>
+                              </a:rPr>
+                              <m:t>𝑚</m:t>
+                            </m:r>
+                          </m:oMath>
+                        </m:oMathPara>
+                      </a14:m>
+                      <a:endParaRPr lang="en-US" sz="2000" dirty="0" smtClean="0">
+                        <a:latin typeface="Arial" panose="020B0604020202020204" pitchFamily="34" charset="0"/>
+                        <a:cs typeface="Arial" panose="020B0604020202020204" pitchFamily="34" charset="0"/>
+                      </a:endParaRPr>
+                    </a:p>
+                  </p:txBody>
+                </p:sp>
+              </mc:Choice>
+              <mc:Fallback>
+                <p:sp>
+                  <p:nvSpPr>
+                    <p:cNvPr id="54" name="TextBox 53"/>
+                    <p:cNvSpPr txBox="1">
+                      <a:spLocks noRot="1" noChangeAspect="1" noMove="1" noResize="1" noEditPoints="1" noAdjustHandles="1" noChangeArrowheads="1" noChangeShapeType="1" noTextEdit="1"/>
+                    </p:cNvSpPr>
+                    <p:nvPr/>
+                  </p:nvSpPr>
+                  <p:spPr>
+                    <a:xfrm>
+                      <a:off x="3372053" y="3620229"/>
+                      <a:ext cx="340504" cy="307777"/>
+                    </a:xfrm>
+                    <a:prstGeom prst="rect">
+                      <a:avLst/>
+                    </a:prstGeom>
+                    <a:blipFill>
+                      <a:blip r:embed="rId36"/>
+                      <a:stretch>
+                        <a:fillRect l="-1786" b="-4000"/>
+                      </a:stretch>
+                    </a:blipFill>
+                  </p:spPr>
+                  <p:txBody>
+                    <a:bodyPr/>
+                    <a:lstStyle/>
+                    <a:p>
+                      <a:r>
+                        <a:rPr lang="en-US">
+                          <a:noFill/>
+                        </a:rPr>
+                        <a:t> </a:t>
+                      </a:r>
+                    </a:p>
+                  </p:txBody>
+                </p:sp>
+              </mc:Fallback>
+            </mc:AlternateContent>
+          </p:grpSp>
+          <mc:AlternateContent xmlns:mc="http://schemas.openxmlformats.org/markup-compatibility/2006">
+            <mc:Choice xmlns:a14="http://schemas.microsoft.com/office/drawing/2010/main" Requires="a14">
+              <p:sp>
+                <p:nvSpPr>
+                  <p:cNvPr id="51" name="TextBox 50"/>
+                  <p:cNvSpPr txBox="1"/>
+                  <p:nvPr/>
+                </p:nvSpPr>
+                <p:spPr>
+                  <a:xfrm>
+                    <a:off x="1055687" y="5262716"/>
+                    <a:ext cx="2815899" cy="307777"/>
+                  </a:xfrm>
+                  <a:prstGeom prst="rect">
+                    <a:avLst/>
+                  </a:prstGeom>
+                  <a:noFill/>
+                </p:spPr>
+                <p:txBody>
+                  <a:bodyPr wrap="none" lIns="0" tIns="0" rIns="0" bIns="0" rtlCol="0">
+                    <a:spAutoFit/>
+                  </a:bodyPr>
+                  <a:lstStyle/>
+                  <a:p>
+                    <a14:m>
+                      <m:oMathPara xmlns:m="http://schemas.openxmlformats.org/officeDocument/2006/math">
+                        <m:oMathParaPr>
+                          <m:jc m:val="centerGroup"/>
+                        </m:oMathParaPr>
+                        <m:oMath xmlns:m="http://schemas.openxmlformats.org/officeDocument/2006/math">
+                          <m:r>
+                            <a:rPr lang="en-US" sz="2000" b="0" i="1" smtClean="0">
+                              <a:latin typeface="Cambria Math" panose="02040503050406030204" pitchFamily="18" charset="0"/>
+                              <a:cs typeface="Arial" panose="020B0604020202020204" pitchFamily="34" charset="0"/>
+                            </a:rPr>
+                            <m:t>𝐶𝑀</m:t>
+                          </m:r>
+                          <m:r>
+                            <a:rPr lang="en-US" sz="2000" b="0" i="1" smtClean="0">
+                              <a:latin typeface="Cambria Math" panose="02040503050406030204" pitchFamily="18" charset="0"/>
+                              <a:cs typeface="Arial" panose="020B0604020202020204" pitchFamily="34" charset="0"/>
+                            </a:rPr>
+                            <m:t> </m:t>
+                          </m:r>
+                          <m:r>
+                            <a:rPr lang="en-US" sz="2000" b="0" i="1" smtClean="0">
+                              <a:latin typeface="Cambria Math" panose="02040503050406030204" pitchFamily="18" charset="0"/>
+                              <a:cs typeface="Arial" panose="020B0604020202020204" pitchFamily="34" charset="0"/>
+                            </a:rPr>
+                            <m:t>𝑓𝑟𝑎𝑚𝑒</m:t>
+                          </m:r>
+                          <m:r>
+                            <a:rPr lang="en-US" sz="2000" b="0" i="1" smtClean="0">
+                              <a:latin typeface="Cambria Math" panose="02040503050406030204" pitchFamily="18" charset="0"/>
+                              <a:cs typeface="Arial" panose="020B0604020202020204" pitchFamily="34" charset="0"/>
+                            </a:rPr>
+                            <m:t> </m:t>
+                          </m:r>
+                          <m:r>
+                            <a:rPr lang="en-US" sz="2000" b="0" i="1" smtClean="0">
+                              <a:latin typeface="Cambria Math" panose="02040503050406030204" pitchFamily="18" charset="0"/>
+                              <a:cs typeface="Arial" panose="020B0604020202020204" pitchFamily="34" charset="0"/>
+                            </a:rPr>
+                            <m:t>𝑜𝑓</m:t>
+                          </m:r>
+                          <m:r>
+                            <a:rPr lang="en-US" sz="2000" b="0" i="1" smtClean="0">
+                              <a:latin typeface="Cambria Math" panose="02040503050406030204" pitchFamily="18" charset="0"/>
+                              <a:cs typeface="Arial" panose="020B0604020202020204" pitchFamily="34" charset="0"/>
+                            </a:rPr>
+                            <m:t> </m:t>
+                          </m:r>
+                          <m:r>
+                            <a:rPr lang="en-US" sz="2000" b="0" i="1" smtClean="0">
+                              <a:latin typeface="Cambria Math" panose="02040503050406030204" pitchFamily="18" charset="0"/>
+                              <a:cs typeface="Arial" panose="020B0604020202020204" pitchFamily="34" charset="0"/>
+                            </a:rPr>
+                            <m:t>𝑟𝑒𝑓𝑒𝑟𝑒𝑛𝑐𝑒</m:t>
+                          </m:r>
+                        </m:oMath>
+                      </m:oMathPara>
+                    </a14:m>
+                    <a:endParaRPr lang="en-US" sz="2000" dirty="0" smtClean="0">
+                      <a:latin typeface="Arial" panose="020B0604020202020204" pitchFamily="34" charset="0"/>
+                      <a:cs typeface="Arial" panose="020B0604020202020204" pitchFamily="34" charset="0"/>
+                    </a:endParaRPr>
+                  </a:p>
+                </p:txBody>
+              </p:sp>
+            </mc:Choice>
+            <mc:Fallback>
+              <p:sp>
+                <p:nvSpPr>
+                  <p:cNvPr id="51" name="TextBox 50"/>
+                  <p:cNvSpPr txBox="1">
+                    <a:spLocks noRot="1" noChangeAspect="1" noMove="1" noResize="1" noEditPoints="1" noAdjustHandles="1" noChangeArrowheads="1" noChangeShapeType="1" noTextEdit="1"/>
+                  </p:cNvSpPr>
+                  <p:nvPr/>
+                </p:nvSpPr>
+                <p:spPr>
+                  <a:xfrm>
+                    <a:off x="1055687" y="5262716"/>
+                    <a:ext cx="2815899" cy="307777"/>
+                  </a:xfrm>
+                  <a:prstGeom prst="rect">
+                    <a:avLst/>
+                  </a:prstGeom>
+                  <a:blipFill>
+                    <a:blip r:embed="rId37"/>
+                    <a:stretch>
+                      <a:fillRect l="-1515" r="-2381" b="-37255"/>
+                    </a:stretch>
+                  </a:blipFill>
+                </p:spPr>
+                <p:txBody>
+                  <a:bodyPr/>
+                  <a:lstStyle/>
+                  <a:p>
+                    <a:r>
+                      <a:rPr lang="en-US">
+                        <a:noFill/>
+                      </a:rPr>
+                      <a:t> </a:t>
+                    </a:r>
+                  </a:p>
+                </p:txBody>
+              </p:sp>
+            </mc:Fallback>
+          </mc:AlternateContent>
+        </p:grpSp>
+        <p:cxnSp>
+          <p:nvCxnSpPr>
+            <p:cNvPr id="66" name="Straight Arrow Connector 65"/>
+            <p:cNvCxnSpPr/>
+            <p:nvPr/>
+          </p:nvCxnSpPr>
+          <p:spPr>
+            <a:xfrm flipH="1">
+              <a:off x="8227209" y="4189991"/>
+              <a:ext cx="499558" cy="5488"/>
+            </a:xfrm>
+            <a:prstGeom prst="straightConnector1">
+              <a:avLst/>
+            </a:prstGeom>
+            <a:ln w="38100">
+              <a:solidFill>
+                <a:schemeClr val="tx1"/>
+              </a:solidFill>
+              <a:tailEnd type="triangle"/>
+            </a:ln>
+          </p:spPr>
+          <p:style>
+            <a:lnRef idx="1">
+              <a:schemeClr val="accent1"/>
+            </a:lnRef>
+            <a:fillRef idx="0">
+              <a:schemeClr val="accent1"/>
+            </a:fillRef>
+            <a:effectRef idx="0">
+              <a:schemeClr val="accent1"/>
+            </a:effectRef>
+            <a:fontRef idx="minor">
+              <a:schemeClr val="tx1"/>
+            </a:fontRef>
+          </p:style>
+        </p:cxnSp>
+        <mc:AlternateContent xmlns:mc="http://schemas.openxmlformats.org/markup-compatibility/2006">
+          <mc:Choice xmlns:a14="http://schemas.microsoft.com/office/drawing/2010/main" Requires="a14">
+            <p:sp>
+              <p:nvSpPr>
+                <p:cNvPr id="68" name="TextBox 67"/>
+                <p:cNvSpPr txBox="1"/>
+                <p:nvPr/>
+              </p:nvSpPr>
+              <p:spPr>
+                <a:xfrm>
+                  <a:off x="7871242" y="3506371"/>
+                  <a:ext cx="741742" cy="576183"/>
+                </a:xfrm>
+                <a:prstGeom prst="rect">
+                  <a:avLst/>
+                </a:prstGeom>
+                <a:noFill/>
+              </p:spPr>
+              <p:txBody>
+                <a:bodyPr wrap="none" lIns="0" tIns="0" rIns="0" bIns="0" rtlCol="0">
+                  <a:spAutoFit/>
+                </a:bodyPr>
+                <a:lstStyle/>
+                <a:p>
+                  <a:pPr/>
+                  <a14:m>
+                    <m:oMathPara xmlns:m="http://schemas.openxmlformats.org/officeDocument/2006/math">
+                      <m:oMathParaPr>
+                        <m:jc m:val="centerGroup"/>
+                      </m:oMathParaPr>
+                      <m:oMath xmlns:m="http://schemas.openxmlformats.org/officeDocument/2006/math">
+                        <m:sSub>
+                          <m:sSubPr>
+                            <m:ctrlPr>
+                              <a:rPr lang="en-US" sz="2000" b="0" i="0" smtClean="0">
+                                <a:latin typeface="Cambria Math" panose="02040503050406030204" pitchFamily="18" charset="0"/>
+                                <a:cs typeface="Arial" panose="020B0604020202020204" pitchFamily="34" charset="0"/>
+                              </a:rPr>
+                            </m:ctrlPr>
+                          </m:sSubPr>
+                          <m:e>
+                            <m:r>
+                              <a:rPr lang="en-US" sz="2000" b="0" i="1" smtClean="0">
+                                <a:latin typeface="Cambria Math" panose="02040503050406030204" pitchFamily="18" charset="0"/>
+                                <a:cs typeface="Arial" panose="020B0604020202020204" pitchFamily="34" charset="0"/>
+                              </a:rPr>
+                              <m:t>−</m:t>
+                            </m:r>
+                            <m:f>
+                              <m:fPr>
+                                <m:ctrlPr>
+                                  <a:rPr lang="en-US" sz="2000" b="0" i="1" smtClean="0">
+                                    <a:latin typeface="Cambria Math" panose="02040503050406030204" pitchFamily="18" charset="0"/>
+                                    <a:cs typeface="Arial" panose="020B0604020202020204" pitchFamily="34" charset="0"/>
+                                  </a:rPr>
+                                </m:ctrlPr>
+                              </m:fPr>
+                              <m:num>
+                                <m:r>
+                                  <a:rPr lang="en-US" sz="2000" b="0" i="1" smtClean="0">
+                                    <a:latin typeface="Cambria Math" panose="02040503050406030204" pitchFamily="18" charset="0"/>
+                                    <a:cs typeface="Arial" panose="020B0604020202020204" pitchFamily="34" charset="0"/>
+                                  </a:rPr>
+                                  <m:t>1</m:t>
+                                </m:r>
+                              </m:num>
+                              <m:den>
+                                <m:r>
+                                  <a:rPr lang="en-US" sz="2000" b="0" i="1" smtClean="0">
+                                    <a:latin typeface="Cambria Math" panose="02040503050406030204" pitchFamily="18" charset="0"/>
+                                    <a:cs typeface="Arial" panose="020B0604020202020204" pitchFamily="34" charset="0"/>
+                                  </a:rPr>
+                                  <m:t>2</m:t>
+                                </m:r>
+                              </m:den>
+                            </m:f>
+                            <m:acc>
+                              <m:accPr>
+                                <m:chr m:val="⃗"/>
+                                <m:ctrlPr>
+                                  <a:rPr lang="en-US" sz="2000" b="0" i="1" smtClean="0">
+                                    <a:latin typeface="Cambria Math" panose="02040503050406030204" pitchFamily="18" charset="0"/>
+                                    <a:cs typeface="Arial" panose="020B0604020202020204" pitchFamily="34" charset="0"/>
+                                  </a:rPr>
+                                </m:ctrlPr>
+                              </m:accPr>
+                              <m:e>
+                                <m:r>
+                                  <a:rPr lang="en-US" sz="2000" b="0" i="1" smtClean="0">
+                                    <a:latin typeface="Cambria Math" panose="02040503050406030204" pitchFamily="18" charset="0"/>
+                                    <a:cs typeface="Arial" panose="020B0604020202020204" pitchFamily="34" charset="0"/>
+                                  </a:rPr>
+                                  <m:t>𝑣</m:t>
+                                </m:r>
+                              </m:e>
+                            </m:acc>
+                          </m:e>
+                          <m:sub>
+                            <m:r>
+                              <a:rPr lang="en-US" sz="2000" b="0" i="0" smtClean="0">
+                                <a:latin typeface="Cambria Math" panose="02040503050406030204" pitchFamily="18" charset="0"/>
+                                <a:cs typeface="Arial" panose="020B0604020202020204" pitchFamily="34" charset="0"/>
+                              </a:rPr>
+                              <m:t>1</m:t>
+                            </m:r>
+                          </m:sub>
+                        </m:sSub>
+                      </m:oMath>
+                    </m:oMathPara>
+                  </a14:m>
+                  <a:endParaRPr lang="en-US" sz="2000" dirty="0" smtClean="0">
+                    <a:latin typeface="Arial" panose="020B0604020202020204" pitchFamily="34" charset="0"/>
+                    <a:cs typeface="Arial" panose="020B0604020202020204" pitchFamily="34" charset="0"/>
+                  </a:endParaRPr>
+                </a:p>
+              </p:txBody>
+            </p:sp>
+          </mc:Choice>
+          <mc:Fallback>
+            <p:sp>
+              <p:nvSpPr>
+                <p:cNvPr id="68" name="TextBox 67"/>
+                <p:cNvSpPr txBox="1">
+                  <a:spLocks noRot="1" noChangeAspect="1" noMove="1" noResize="1" noEditPoints="1" noAdjustHandles="1" noChangeArrowheads="1" noChangeShapeType="1" noTextEdit="1"/>
+                </p:cNvSpPr>
+                <p:nvPr/>
+              </p:nvSpPr>
+              <p:spPr>
+                <a:xfrm>
+                  <a:off x="7871242" y="3506371"/>
+                  <a:ext cx="741742" cy="576183"/>
+                </a:xfrm>
+                <a:prstGeom prst="rect">
+                  <a:avLst/>
+                </a:prstGeom>
+                <a:blipFill>
+                  <a:blip r:embed="rId38"/>
+                  <a:stretch>
+                    <a:fillRect/>
                   </a:stretch>
                 </a:blipFill>
               </p:spPr>

</xml_diff>

<commit_message>
Intro to CM done
</commit_message>
<xml_diff>
--- a/tex/figures/MomentumAndCM/Figures.pptx
+++ b/tex/figures/MomentumAndCM/Figures.pptx
@@ -10,6 +10,8 @@
     <p:sldId id="273" r:id="rId4"/>
     <p:sldId id="274" r:id="rId5"/>
     <p:sldId id="275" r:id="rId6"/>
+    <p:sldId id="276" r:id="rId7"/>
+    <p:sldId id="277" r:id="rId8"/>
   </p:sldIdLst>
   <p:sldSz cx="12192000" cy="6858000"/>
   <p:notesSz cx="6858000" cy="9144000"/>
@@ -247,7 +249,7 @@
           <a:p>
             <a:fld id="{F7249F8D-641B-4CAF-BAE5-10524742F6F1}" type="datetimeFigureOut">
               <a:rPr lang="en-CA" smtClean="0"/>
-              <a:t>2018-06-28</a:t>
+              <a:t>2018-06-29</a:t>
             </a:fld>
             <a:endParaRPr lang="en-CA"/>
           </a:p>
@@ -417,7 +419,7 @@
           <a:p>
             <a:fld id="{F7249F8D-641B-4CAF-BAE5-10524742F6F1}" type="datetimeFigureOut">
               <a:rPr lang="en-CA" smtClean="0"/>
-              <a:t>2018-06-28</a:t>
+              <a:t>2018-06-29</a:t>
             </a:fld>
             <a:endParaRPr lang="en-CA"/>
           </a:p>
@@ -597,7 +599,7 @@
           <a:p>
             <a:fld id="{F7249F8D-641B-4CAF-BAE5-10524742F6F1}" type="datetimeFigureOut">
               <a:rPr lang="en-CA" smtClean="0"/>
-              <a:t>2018-06-28</a:t>
+              <a:t>2018-06-29</a:t>
             </a:fld>
             <a:endParaRPr lang="en-CA"/>
           </a:p>
@@ -767,7 +769,7 @@
           <a:p>
             <a:fld id="{F7249F8D-641B-4CAF-BAE5-10524742F6F1}" type="datetimeFigureOut">
               <a:rPr lang="en-CA" smtClean="0"/>
-              <a:t>2018-06-28</a:t>
+              <a:t>2018-06-29</a:t>
             </a:fld>
             <a:endParaRPr lang="en-CA"/>
           </a:p>
@@ -1013,7 +1015,7 @@
           <a:p>
             <a:fld id="{F7249F8D-641B-4CAF-BAE5-10524742F6F1}" type="datetimeFigureOut">
               <a:rPr lang="en-CA" smtClean="0"/>
-              <a:t>2018-06-28</a:t>
+              <a:t>2018-06-29</a:t>
             </a:fld>
             <a:endParaRPr lang="en-CA"/>
           </a:p>
@@ -1245,7 +1247,7 @@
           <a:p>
             <a:fld id="{F7249F8D-641B-4CAF-BAE5-10524742F6F1}" type="datetimeFigureOut">
               <a:rPr lang="en-CA" smtClean="0"/>
-              <a:t>2018-06-28</a:t>
+              <a:t>2018-06-29</a:t>
             </a:fld>
             <a:endParaRPr lang="en-CA"/>
           </a:p>
@@ -1612,7 +1614,7 @@
           <a:p>
             <a:fld id="{F7249F8D-641B-4CAF-BAE5-10524742F6F1}" type="datetimeFigureOut">
               <a:rPr lang="en-CA" smtClean="0"/>
-              <a:t>2018-06-28</a:t>
+              <a:t>2018-06-29</a:t>
             </a:fld>
             <a:endParaRPr lang="en-CA"/>
           </a:p>
@@ -1730,7 +1732,7 @@
           <a:p>
             <a:fld id="{F7249F8D-641B-4CAF-BAE5-10524742F6F1}" type="datetimeFigureOut">
               <a:rPr lang="en-CA" smtClean="0"/>
-              <a:t>2018-06-28</a:t>
+              <a:t>2018-06-29</a:t>
             </a:fld>
             <a:endParaRPr lang="en-CA"/>
           </a:p>
@@ -1825,7 +1827,7 @@
           <a:p>
             <a:fld id="{F7249F8D-641B-4CAF-BAE5-10524742F6F1}" type="datetimeFigureOut">
               <a:rPr lang="en-CA" smtClean="0"/>
-              <a:t>2018-06-28</a:t>
+              <a:t>2018-06-29</a:t>
             </a:fld>
             <a:endParaRPr lang="en-CA"/>
           </a:p>
@@ -2102,7 +2104,7 @@
           <a:p>
             <a:fld id="{F7249F8D-641B-4CAF-BAE5-10524742F6F1}" type="datetimeFigureOut">
               <a:rPr lang="en-CA" smtClean="0"/>
-              <a:t>2018-06-28</a:t>
+              <a:t>2018-06-29</a:t>
             </a:fld>
             <a:endParaRPr lang="en-CA"/>
           </a:p>
@@ -2355,7 +2357,7 @@
           <a:p>
             <a:fld id="{F7249F8D-641B-4CAF-BAE5-10524742F6F1}" type="datetimeFigureOut">
               <a:rPr lang="en-CA" smtClean="0"/>
-              <a:t>2018-06-28</a:t>
+              <a:t>2018-06-29</a:t>
             </a:fld>
             <a:endParaRPr lang="en-CA"/>
           </a:p>
@@ -2568,7 +2570,7 @@
           <a:p>
             <a:fld id="{F7249F8D-641B-4CAF-BAE5-10524742F6F1}" type="datetimeFigureOut">
               <a:rPr lang="en-CA" smtClean="0"/>
-              <a:t>2018-06-28</a:t>
+              <a:t>2018-06-29</a:t>
             </a:fld>
             <a:endParaRPr lang="en-CA"/>
           </a:p>
@@ -16381,8 +16383,8 @@
                   </a:p>
                 </p:txBody>
               </p:sp>
-              <mc:AlternateContent xmlns:mc="http://schemas.openxmlformats.org/markup-compatibility/2006">
-                <mc:Choice xmlns:a14="http://schemas.microsoft.com/office/drawing/2010/main" Requires="a14">
+              <mc:AlternateContent xmlns:mc="http://schemas.openxmlformats.org/markup-compatibility/2006" xmlns:a14="http://schemas.microsoft.com/office/drawing/2010/main">
+                <mc:Choice Requires="a14">
                   <p:sp>
                     <p:nvSpPr>
                       <p:cNvPr id="27" name="TextBox 26"/>
@@ -16430,7 +16432,7 @@
                     </p:txBody>
                   </p:sp>
                 </mc:Choice>
-                <mc:Fallback>
+                <mc:Fallback xmlns="">
                   <p:sp>
                     <p:nvSpPr>
                       <p:cNvPr id="27" name="TextBox 26"/>
@@ -16505,8 +16507,8 @@
                   </a:fontRef>
                 </p:style>
               </p:cxnSp>
-              <mc:AlternateContent xmlns:mc="http://schemas.openxmlformats.org/markup-compatibility/2006">
-                <mc:Choice xmlns:a14="http://schemas.microsoft.com/office/drawing/2010/main" Requires="a14">
+              <mc:AlternateContent xmlns:mc="http://schemas.openxmlformats.org/markup-compatibility/2006" xmlns:a14="http://schemas.microsoft.com/office/drawing/2010/main">
+                <mc:Choice Requires="a14">
                   <p:sp>
                     <p:nvSpPr>
                       <p:cNvPr id="31" name="TextBox 30"/>
@@ -16539,7 +16541,7 @@
                               <m:sSub>
                                 <m:sSubPr>
                                   <m:ctrlPr>
-                                    <a:rPr lang="en-US" sz="2000" b="0" i="0" smtClean="0">
+                                    <a:rPr lang="en-US" sz="2000" b="0" i="1" smtClean="0">
                                       <a:latin typeface="Cambria Math" panose="02040503050406030204" pitchFamily="18" charset="0"/>
                                       <a:cs typeface="Arial" panose="020B0604020202020204" pitchFamily="34" charset="0"/>
                                     </a:rPr>
@@ -16588,7 +16590,7 @@
                     </p:txBody>
                   </p:sp>
                 </mc:Choice>
-                <mc:Fallback>
+                <mc:Fallback xmlns="">
                   <p:sp>
                     <p:nvSpPr>
                       <p:cNvPr id="31" name="TextBox 30"/>
@@ -16935,8 +16937,8 @@
               </a:p>
             </p:txBody>
           </p:sp>
-          <mc:AlternateContent xmlns:mc="http://schemas.openxmlformats.org/markup-compatibility/2006">
-            <mc:Choice xmlns:a14="http://schemas.microsoft.com/office/drawing/2010/main" Requires="a14">
+          <mc:AlternateContent xmlns:mc="http://schemas.openxmlformats.org/markup-compatibility/2006" xmlns:a14="http://schemas.microsoft.com/office/drawing/2010/main">
+            <mc:Choice Requires="a14">
               <p:sp>
                 <p:nvSpPr>
                   <p:cNvPr id="48" name="TextBox 47"/>
@@ -16984,7 +16986,7 @@
                 </p:txBody>
               </p:sp>
             </mc:Choice>
-            <mc:Fallback>
+            <mc:Fallback xmlns="">
               <p:sp>
                 <p:nvSpPr>
                   <p:cNvPr id="48" name="TextBox 47"/>
@@ -17024,8 +17026,8 @@
             </mc:Fallback>
           </mc:AlternateContent>
         </p:grpSp>
-        <mc:AlternateContent xmlns:mc="http://schemas.openxmlformats.org/markup-compatibility/2006">
-          <mc:Choice xmlns:a14="http://schemas.microsoft.com/office/drawing/2010/main" Requires="a14">
+        <mc:AlternateContent xmlns:mc="http://schemas.openxmlformats.org/markup-compatibility/2006" xmlns:a14="http://schemas.microsoft.com/office/drawing/2010/main">
+          <mc:Choice Requires="a14">
             <p:sp>
               <p:nvSpPr>
                 <p:cNvPr id="3" name="TextBox 2"/>
@@ -17048,6 +17050,7 @@
                 </a:bodyPr>
                 <a:lstStyle/>
                 <a:p>
+                  <a:pPr/>
                   <a14:m>
                     <m:oMathPara xmlns:m="http://schemas.openxmlformats.org/officeDocument/2006/math">
                       <m:oMathParaPr>
@@ -17114,7 +17117,7 @@
               </p:txBody>
             </p:sp>
           </mc:Choice>
-          <mc:Fallback>
+          <mc:Fallback xmlns="">
             <p:sp>
               <p:nvSpPr>
                 <p:cNvPr id="3" name="TextBox 2"/>
@@ -17322,8 +17325,8 @@
                     </a:p>
                   </p:txBody>
                 </p:sp>
-                <mc:AlternateContent xmlns:mc="http://schemas.openxmlformats.org/markup-compatibility/2006">
-                  <mc:Choice xmlns:a14="http://schemas.microsoft.com/office/drawing/2010/main" Requires="a14">
+                <mc:AlternateContent xmlns:mc="http://schemas.openxmlformats.org/markup-compatibility/2006" xmlns:a14="http://schemas.microsoft.com/office/drawing/2010/main">
+                  <mc:Choice Requires="a14">
                     <p:sp>
                       <p:nvSpPr>
                         <p:cNvPr id="63" name="TextBox 62"/>
@@ -17371,7 +17374,7 @@
                       </p:txBody>
                     </p:sp>
                   </mc:Choice>
-                  <mc:Fallback>
+                  <mc:Fallback xmlns="">
                     <p:sp>
                       <p:nvSpPr>
                         <p:cNvPr id="63" name="TextBox 62"/>
@@ -17446,8 +17449,8 @@
                     </a:fontRef>
                   </p:style>
                 </p:cxnSp>
-                <mc:AlternateContent xmlns:mc="http://schemas.openxmlformats.org/markup-compatibility/2006">
-                  <mc:Choice xmlns:a14="http://schemas.microsoft.com/office/drawing/2010/main" Requires="a14">
+                <mc:AlternateContent xmlns:mc="http://schemas.openxmlformats.org/markup-compatibility/2006" xmlns:a14="http://schemas.microsoft.com/office/drawing/2010/main">
+                  <mc:Choice Requires="a14">
                     <p:sp>
                       <p:nvSpPr>
                         <p:cNvPr id="65" name="TextBox 64"/>
@@ -17480,7 +17483,7 @@
                                 <m:sSub>
                                   <m:sSubPr>
                                     <m:ctrlPr>
-                                      <a:rPr lang="en-US" sz="2000" b="0" i="0" smtClean="0">
+                                      <a:rPr lang="en-US" sz="2000" b="0" i="1" smtClean="0">
                                         <a:latin typeface="Cambria Math" panose="02040503050406030204" pitchFamily="18" charset="0"/>
                                         <a:cs typeface="Arial" panose="020B0604020202020204" pitchFamily="34" charset="0"/>
                                       </a:rPr>
@@ -17557,7 +17560,7 @@
                       </p:txBody>
                     </p:sp>
                   </mc:Choice>
-                  <mc:Fallback>
+                  <mc:Fallback xmlns="">
                     <p:sp>
                       <p:nvSpPr>
                         <p:cNvPr id="65" name="TextBox 64"/>
@@ -17904,8 +17907,8 @@
                 </a:p>
               </p:txBody>
             </p:sp>
-            <mc:AlternateContent xmlns:mc="http://schemas.openxmlformats.org/markup-compatibility/2006">
-              <mc:Choice xmlns:a14="http://schemas.microsoft.com/office/drawing/2010/main" Requires="a14">
+            <mc:AlternateContent xmlns:mc="http://schemas.openxmlformats.org/markup-compatibility/2006" xmlns:a14="http://schemas.microsoft.com/office/drawing/2010/main">
+              <mc:Choice Requires="a14">
                 <p:sp>
                   <p:nvSpPr>
                     <p:cNvPr id="54" name="TextBox 53"/>
@@ -17953,7 +17956,7 @@
                   </p:txBody>
                 </p:sp>
               </mc:Choice>
-              <mc:Fallback>
+              <mc:Fallback xmlns="">
                 <p:sp>
                   <p:nvSpPr>
                     <p:cNvPr id="54" name="TextBox 53"/>
@@ -17993,8 +17996,8 @@
               </mc:Fallback>
             </mc:AlternateContent>
           </p:grpSp>
-          <mc:AlternateContent xmlns:mc="http://schemas.openxmlformats.org/markup-compatibility/2006">
-            <mc:Choice xmlns:a14="http://schemas.microsoft.com/office/drawing/2010/main" Requires="a14">
+          <mc:AlternateContent xmlns:mc="http://schemas.openxmlformats.org/markup-compatibility/2006" xmlns:a14="http://schemas.microsoft.com/office/drawing/2010/main">
+            <mc:Choice Requires="a14">
               <p:sp>
                 <p:nvSpPr>
                   <p:cNvPr id="51" name="TextBox 50"/>
@@ -18017,6 +18020,7 @@
                   </a:bodyPr>
                   <a:lstStyle/>
                   <a:p>
+                    <a:pPr/>
                     <a14:m>
                       <m:oMathPara xmlns:m="http://schemas.openxmlformats.org/officeDocument/2006/math">
                         <m:oMathParaPr>
@@ -18083,7 +18087,7 @@
                 </p:txBody>
               </p:sp>
             </mc:Choice>
-            <mc:Fallback>
+            <mc:Fallback xmlns="">
               <p:sp>
                 <p:nvSpPr>
                   <p:cNvPr id="51" name="TextBox 50"/>
@@ -18159,8 +18163,8 @@
             </a:fontRef>
           </p:style>
         </p:cxnSp>
-        <mc:AlternateContent xmlns:mc="http://schemas.openxmlformats.org/markup-compatibility/2006">
-          <mc:Choice xmlns:a14="http://schemas.microsoft.com/office/drawing/2010/main" Requires="a14">
+        <mc:AlternateContent xmlns:mc="http://schemas.openxmlformats.org/markup-compatibility/2006" xmlns:a14="http://schemas.microsoft.com/office/drawing/2010/main">
+          <mc:Choice Requires="a14">
             <p:sp>
               <p:nvSpPr>
                 <p:cNvPr id="68" name="TextBox 67"/>
@@ -18193,7 +18197,7 @@
                         <m:sSub>
                           <m:sSubPr>
                             <m:ctrlPr>
-                              <a:rPr lang="en-US" sz="2000" b="0" i="0" smtClean="0">
+                              <a:rPr lang="en-US" sz="2000" b="0" i="1" smtClean="0">
                                 <a:latin typeface="Cambria Math" panose="02040503050406030204" pitchFamily="18" charset="0"/>
                                 <a:cs typeface="Arial" panose="020B0604020202020204" pitchFamily="34" charset="0"/>
                               </a:rPr>
@@ -18277,7 +18281,7 @@
               </p:txBody>
             </p:sp>
           </mc:Choice>
-          <mc:Fallback>
+          <mc:Fallback xmlns="">
             <p:sp>
               <p:nvSpPr>
                 <p:cNvPr id="68" name="TextBox 67"/>
@@ -18321,6 +18325,3635 @@
     <p:extLst>
       <p:ext uri="{BB962C8B-B14F-4D97-AF65-F5344CB8AC3E}">
         <p14:creationId xmlns:p14="http://schemas.microsoft.com/office/powerpoint/2010/main" val="4291168302"/>
+      </p:ext>
+    </p:extLst>
+  </p:cSld>
+  <p:clrMapOvr>
+    <a:masterClrMapping/>
+  </p:clrMapOvr>
+</p:sld>
+</file>
+
+<file path=ppt/slides/slide6.xml><?xml version="1.0" encoding="utf-8"?>
+<p:sld xmlns:a="http://schemas.openxmlformats.org/drawingml/2006/main" xmlns:r="http://schemas.openxmlformats.org/officeDocument/2006/relationships" xmlns:p="http://schemas.openxmlformats.org/presentationml/2006/main">
+  <p:cSld>
+    <p:spTree>
+      <p:nvGrpSpPr>
+        <p:cNvPr id="1" name=""/>
+        <p:cNvGrpSpPr/>
+        <p:nvPr/>
+      </p:nvGrpSpPr>
+      <p:grpSpPr>
+        <a:xfrm>
+          <a:off x="0" y="0"/>
+          <a:ext cx="0" cy="0"/>
+          <a:chOff x="0" y="0"/>
+          <a:chExt cx="0" cy="0"/>
+        </a:xfrm>
+      </p:grpSpPr>
+      <p:grpSp>
+        <p:nvGrpSpPr>
+          <p:cNvPr id="58" name="Group 57"/>
+          <p:cNvGrpSpPr/>
+          <p:nvPr/>
+        </p:nvGrpSpPr>
+        <p:grpSpPr>
+          <a:xfrm>
+            <a:off x="1180403" y="1404032"/>
+            <a:ext cx="6118851" cy="4111126"/>
+            <a:chOff x="1180403" y="1404032"/>
+            <a:chExt cx="6118851" cy="4111126"/>
+          </a:xfrm>
+        </p:grpSpPr>
+        <p:grpSp>
+          <p:nvGrpSpPr>
+            <p:cNvPr id="16" name="Group 15"/>
+            <p:cNvGrpSpPr/>
+            <p:nvPr/>
+          </p:nvGrpSpPr>
+          <p:grpSpPr>
+            <a:xfrm flipH="1">
+              <a:off x="6572229" y="2643334"/>
+              <a:ext cx="727025" cy="2871824"/>
+              <a:chOff x="3116187" y="3288287"/>
+              <a:chExt cx="746128" cy="2871824"/>
+            </a:xfrm>
+          </p:grpSpPr>
+          <p:sp>
+            <p:nvSpPr>
+              <p:cNvPr id="17" name="Rounded Rectangle 16"/>
+              <p:cNvSpPr/>
+              <p:nvPr/>
+            </p:nvSpPr>
+            <p:spPr>
+              <a:xfrm>
+                <a:off x="3254965" y="4877002"/>
+                <a:ext cx="164361" cy="1179871"/>
+              </a:xfrm>
+              <a:prstGeom prst="roundRect">
+                <a:avLst/>
+              </a:prstGeom>
+              <a:noFill/>
+              <a:ln w="38100">
+                <a:solidFill>
+                  <a:schemeClr val="tx1"/>
+                </a:solidFill>
+              </a:ln>
+            </p:spPr>
+            <p:style>
+              <a:lnRef idx="2">
+                <a:schemeClr val="accent1">
+                  <a:shade val="50000"/>
+                </a:schemeClr>
+              </a:lnRef>
+              <a:fillRef idx="1">
+                <a:schemeClr val="accent1"/>
+              </a:fillRef>
+              <a:effectRef idx="0">
+                <a:schemeClr val="accent1"/>
+              </a:effectRef>
+              <a:fontRef idx="minor">
+                <a:schemeClr val="lt1"/>
+              </a:fontRef>
+            </p:style>
+            <p:txBody>
+              <a:bodyPr rtlCol="0" anchor="ctr"/>
+              <a:lstStyle/>
+              <a:p>
+                <a:pPr algn="ctr"/>
+                <a:endParaRPr lang="en-US"/>
+              </a:p>
+            </p:txBody>
+          </p:sp>
+          <p:sp>
+            <p:nvSpPr>
+              <p:cNvPr id="18" name="Rounded Rectangle 17"/>
+              <p:cNvSpPr/>
+              <p:nvPr/>
+            </p:nvSpPr>
+            <p:spPr>
+              <a:xfrm>
+                <a:off x="3159702" y="3731544"/>
+                <a:ext cx="357945" cy="1145458"/>
+              </a:xfrm>
+              <a:prstGeom prst="roundRect">
+                <a:avLst/>
+              </a:prstGeom>
+              <a:solidFill>
+                <a:schemeClr val="accent1">
+                  <a:lumMod val="75000"/>
+                </a:schemeClr>
+              </a:solidFill>
+              <a:ln w="38100">
+                <a:solidFill>
+                  <a:schemeClr val="accent1">
+                    <a:lumMod val="75000"/>
+                  </a:schemeClr>
+                </a:solidFill>
+              </a:ln>
+            </p:spPr>
+            <p:style>
+              <a:lnRef idx="2">
+                <a:schemeClr val="accent1">
+                  <a:shade val="50000"/>
+                </a:schemeClr>
+              </a:lnRef>
+              <a:fillRef idx="1">
+                <a:schemeClr val="accent1"/>
+              </a:fillRef>
+              <a:effectRef idx="0">
+                <a:schemeClr val="accent1"/>
+              </a:effectRef>
+              <a:fontRef idx="minor">
+                <a:schemeClr val="lt1"/>
+              </a:fontRef>
+            </p:style>
+            <p:txBody>
+              <a:bodyPr rtlCol="0" anchor="ctr"/>
+              <a:lstStyle/>
+              <a:p>
+                <a:pPr algn="ctr"/>
+                <a:endParaRPr lang="en-US"/>
+              </a:p>
+            </p:txBody>
+          </p:sp>
+          <p:sp>
+            <p:nvSpPr>
+              <p:cNvPr id="19" name="Rounded Rectangle 18"/>
+              <p:cNvSpPr/>
+              <p:nvPr/>
+            </p:nvSpPr>
+            <p:spPr>
+              <a:xfrm>
+                <a:off x="3247260" y="6051956"/>
+                <a:ext cx="361601" cy="108155"/>
+              </a:xfrm>
+              <a:prstGeom prst="roundRect">
+                <a:avLst/>
+              </a:prstGeom>
+              <a:solidFill>
+                <a:schemeClr val="tx1"/>
+              </a:solidFill>
+              <a:ln w="38100">
+                <a:solidFill>
+                  <a:schemeClr val="tx1"/>
+                </a:solidFill>
+              </a:ln>
+            </p:spPr>
+            <p:style>
+              <a:lnRef idx="2">
+                <a:schemeClr val="accent1">
+                  <a:shade val="50000"/>
+                </a:schemeClr>
+              </a:lnRef>
+              <a:fillRef idx="1">
+                <a:schemeClr val="accent1"/>
+              </a:fillRef>
+              <a:effectRef idx="0">
+                <a:schemeClr val="accent1"/>
+              </a:effectRef>
+              <a:fontRef idx="minor">
+                <a:schemeClr val="lt1"/>
+              </a:fontRef>
+            </p:style>
+            <p:txBody>
+              <a:bodyPr rtlCol="0" anchor="ctr"/>
+              <a:lstStyle/>
+              <a:p>
+                <a:pPr algn="ctr"/>
+                <a:endParaRPr lang="en-US"/>
+              </a:p>
+            </p:txBody>
+          </p:sp>
+          <p:sp>
+            <p:nvSpPr>
+              <p:cNvPr id="21" name="Oval 20"/>
+              <p:cNvSpPr/>
+              <p:nvPr/>
+            </p:nvSpPr>
+            <p:spPr>
+              <a:xfrm>
+                <a:off x="3116187" y="3288287"/>
+                <a:ext cx="424039" cy="424039"/>
+              </a:xfrm>
+              <a:prstGeom prst="ellipse">
+                <a:avLst/>
+              </a:prstGeom>
+              <a:noFill/>
+              <a:ln w="38100">
+                <a:solidFill>
+                  <a:schemeClr val="tx1"/>
+                </a:solidFill>
+              </a:ln>
+            </p:spPr>
+            <p:style>
+              <a:lnRef idx="2">
+                <a:schemeClr val="accent1">
+                  <a:shade val="50000"/>
+                </a:schemeClr>
+              </a:lnRef>
+              <a:fillRef idx="1">
+                <a:schemeClr val="accent1"/>
+              </a:fillRef>
+              <a:effectRef idx="0">
+                <a:schemeClr val="accent1"/>
+              </a:effectRef>
+              <a:fontRef idx="minor">
+                <a:schemeClr val="lt1"/>
+              </a:fontRef>
+            </p:style>
+            <p:txBody>
+              <a:bodyPr rtlCol="0" anchor="ctr"/>
+              <a:lstStyle/>
+              <a:p>
+                <a:pPr algn="ctr"/>
+                <a:endParaRPr lang="en-US"/>
+              </a:p>
+            </p:txBody>
+          </p:sp>
+          <p:sp>
+            <p:nvSpPr>
+              <p:cNvPr id="22" name="Rounded Rectangle 21"/>
+              <p:cNvSpPr/>
+              <p:nvPr/>
+            </p:nvSpPr>
+            <p:spPr>
+              <a:xfrm rot="15129452">
+                <a:off x="3561081" y="3565992"/>
+                <a:ext cx="78584" cy="523885"/>
+              </a:xfrm>
+              <a:prstGeom prst="roundRect">
+                <a:avLst/>
+              </a:prstGeom>
+              <a:solidFill>
+                <a:schemeClr val="accent1">
+                  <a:lumMod val="40000"/>
+                  <a:lumOff val="60000"/>
+                </a:schemeClr>
+              </a:solidFill>
+              <a:ln w="38100">
+                <a:solidFill>
+                  <a:schemeClr val="accent1">
+                    <a:lumMod val="40000"/>
+                    <a:lumOff val="60000"/>
+                  </a:schemeClr>
+                </a:solidFill>
+              </a:ln>
+            </p:spPr>
+            <p:style>
+              <a:lnRef idx="2">
+                <a:schemeClr val="accent1">
+                  <a:shade val="50000"/>
+                </a:schemeClr>
+              </a:lnRef>
+              <a:fillRef idx="1">
+                <a:schemeClr val="accent1"/>
+              </a:fillRef>
+              <a:effectRef idx="0">
+                <a:schemeClr val="accent1"/>
+              </a:effectRef>
+              <a:fontRef idx="minor">
+                <a:schemeClr val="lt1"/>
+              </a:fontRef>
+            </p:style>
+            <p:txBody>
+              <a:bodyPr rtlCol="0" anchor="ctr"/>
+              <a:lstStyle/>
+              <a:p>
+                <a:pPr algn="ctr"/>
+                <a:endParaRPr lang="en-US"/>
+              </a:p>
+            </p:txBody>
+          </p:sp>
+        </p:grpSp>
+        <p:sp>
+          <p:nvSpPr>
+            <p:cNvPr id="23" name="Rounded Rectangle 22"/>
+            <p:cNvSpPr/>
+            <p:nvPr/>
+          </p:nvSpPr>
+          <p:spPr>
+            <a:xfrm rot="1382496" flipH="1">
+              <a:off x="6659486" y="2670438"/>
+              <a:ext cx="87772" cy="500432"/>
+            </a:xfrm>
+            <a:prstGeom prst="roundRect">
+              <a:avLst/>
+            </a:prstGeom>
+            <a:solidFill>
+              <a:schemeClr val="accent1">
+                <a:lumMod val="40000"/>
+                <a:lumOff val="60000"/>
+              </a:schemeClr>
+            </a:solidFill>
+            <a:ln w="38100">
+              <a:solidFill>
+                <a:schemeClr val="accent1">
+                  <a:lumMod val="40000"/>
+                  <a:lumOff val="60000"/>
+                </a:schemeClr>
+              </a:solidFill>
+            </a:ln>
+          </p:spPr>
+          <p:style>
+            <a:lnRef idx="2">
+              <a:schemeClr val="accent1">
+                <a:shade val="50000"/>
+              </a:schemeClr>
+            </a:lnRef>
+            <a:fillRef idx="1">
+              <a:schemeClr val="accent1"/>
+            </a:fillRef>
+            <a:effectRef idx="0">
+              <a:schemeClr val="accent1"/>
+            </a:effectRef>
+            <a:fontRef idx="minor">
+              <a:schemeClr val="lt1"/>
+            </a:fontRef>
+          </p:style>
+          <p:txBody>
+            <a:bodyPr rtlCol="0" anchor="ctr"/>
+            <a:lstStyle/>
+            <a:p>
+              <a:pPr algn="ctr"/>
+              <a:endParaRPr lang="en-US"/>
+            </a:p>
+          </p:txBody>
+        </p:sp>
+        <p:grpSp>
+          <p:nvGrpSpPr>
+            <p:cNvPr id="28" name="Group 27"/>
+            <p:cNvGrpSpPr/>
+            <p:nvPr/>
+          </p:nvGrpSpPr>
+          <p:grpSpPr>
+            <a:xfrm rot="2585420">
+              <a:off x="6505952" y="2411541"/>
+              <a:ext cx="402859" cy="599008"/>
+              <a:chOff x="5970571" y="2157789"/>
+              <a:chExt cx="402859" cy="599008"/>
+            </a:xfrm>
+          </p:grpSpPr>
+          <p:cxnSp>
+            <p:nvCxnSpPr>
+              <p:cNvPr id="25" name="Straight Connector 24"/>
+              <p:cNvCxnSpPr/>
+              <p:nvPr/>
+            </p:nvCxnSpPr>
+            <p:spPr>
+              <a:xfrm flipH="1">
+                <a:off x="6076335" y="2271252"/>
+                <a:ext cx="191331" cy="372082"/>
+              </a:xfrm>
+              <a:prstGeom prst="line">
+                <a:avLst/>
+              </a:prstGeom>
+              <a:ln w="38100">
+                <a:solidFill>
+                  <a:schemeClr val="tx1"/>
+                </a:solidFill>
+              </a:ln>
+            </p:spPr>
+            <p:style>
+              <a:lnRef idx="1">
+                <a:schemeClr val="accent1"/>
+              </a:lnRef>
+              <a:fillRef idx="0">
+                <a:schemeClr val="accent1"/>
+              </a:fillRef>
+              <a:effectRef idx="0">
+                <a:schemeClr val="accent1"/>
+              </a:effectRef>
+              <a:fontRef idx="minor">
+                <a:schemeClr val="tx1"/>
+              </a:fontRef>
+            </p:style>
+          </p:cxnSp>
+          <p:sp>
+            <p:nvSpPr>
+              <p:cNvPr id="26" name="Oval 25"/>
+              <p:cNvSpPr/>
+              <p:nvPr/>
+            </p:nvSpPr>
+            <p:spPr>
+              <a:xfrm>
+                <a:off x="5970571" y="2589649"/>
+                <a:ext cx="167148" cy="167148"/>
+              </a:xfrm>
+              <a:prstGeom prst="ellipse">
+                <a:avLst/>
+              </a:prstGeom>
+              <a:solidFill>
+                <a:schemeClr val="tx1"/>
+              </a:solidFill>
+              <a:ln w="38100">
+                <a:solidFill>
+                  <a:schemeClr val="tx1"/>
+                </a:solidFill>
+              </a:ln>
+            </p:spPr>
+            <p:style>
+              <a:lnRef idx="2">
+                <a:schemeClr val="accent1">
+                  <a:shade val="50000"/>
+                </a:schemeClr>
+              </a:lnRef>
+              <a:fillRef idx="1">
+                <a:schemeClr val="accent1"/>
+              </a:fillRef>
+              <a:effectRef idx="0">
+                <a:schemeClr val="accent1"/>
+              </a:effectRef>
+              <a:fontRef idx="minor">
+                <a:schemeClr val="lt1"/>
+              </a:fontRef>
+            </p:style>
+            <p:txBody>
+              <a:bodyPr rtlCol="0" anchor="ctr"/>
+              <a:lstStyle/>
+              <a:p>
+                <a:pPr algn="ctr"/>
+                <a:endParaRPr lang="en-US"/>
+              </a:p>
+            </p:txBody>
+          </p:sp>
+          <p:sp>
+            <p:nvSpPr>
+              <p:cNvPr id="27" name="Oval 26"/>
+              <p:cNvSpPr/>
+              <p:nvPr/>
+            </p:nvSpPr>
+            <p:spPr>
+              <a:xfrm>
+                <a:off x="6206282" y="2157789"/>
+                <a:ext cx="167148" cy="167148"/>
+              </a:xfrm>
+              <a:prstGeom prst="ellipse">
+                <a:avLst/>
+              </a:prstGeom>
+              <a:solidFill>
+                <a:schemeClr val="tx1"/>
+              </a:solidFill>
+              <a:ln w="38100">
+                <a:solidFill>
+                  <a:schemeClr val="tx1"/>
+                </a:solidFill>
+              </a:ln>
+            </p:spPr>
+            <p:style>
+              <a:lnRef idx="2">
+                <a:schemeClr val="accent1">
+                  <a:shade val="50000"/>
+                </a:schemeClr>
+              </a:lnRef>
+              <a:fillRef idx="1">
+                <a:schemeClr val="accent1"/>
+              </a:fillRef>
+              <a:effectRef idx="0">
+                <a:schemeClr val="accent1"/>
+              </a:effectRef>
+              <a:fontRef idx="minor">
+                <a:schemeClr val="lt1"/>
+              </a:fontRef>
+            </p:style>
+            <p:txBody>
+              <a:bodyPr rtlCol="0" anchor="ctr"/>
+              <a:lstStyle/>
+              <a:p>
+                <a:pPr algn="ctr"/>
+                <a:endParaRPr lang="en-US"/>
+              </a:p>
+            </p:txBody>
+          </p:sp>
+        </p:grpSp>
+        <p:grpSp>
+          <p:nvGrpSpPr>
+            <p:cNvPr id="29" name="Group 28"/>
+            <p:cNvGrpSpPr/>
+            <p:nvPr/>
+          </p:nvGrpSpPr>
+          <p:grpSpPr>
+            <a:xfrm rot="805999">
+              <a:off x="6089804" y="2059985"/>
+              <a:ext cx="402859" cy="599008"/>
+              <a:chOff x="5970571" y="2157789"/>
+              <a:chExt cx="402859" cy="599008"/>
+            </a:xfrm>
+            <a:solidFill>
+              <a:schemeClr val="bg2">
+                <a:lumMod val="75000"/>
+              </a:schemeClr>
+            </a:solidFill>
+          </p:grpSpPr>
+          <p:cxnSp>
+            <p:nvCxnSpPr>
+              <p:cNvPr id="30" name="Straight Connector 29"/>
+              <p:cNvCxnSpPr/>
+              <p:nvPr/>
+            </p:nvCxnSpPr>
+            <p:spPr>
+              <a:xfrm flipH="1">
+                <a:off x="6076335" y="2271252"/>
+                <a:ext cx="191331" cy="372082"/>
+              </a:xfrm>
+              <a:prstGeom prst="line">
+                <a:avLst/>
+              </a:prstGeom>
+              <a:grpFill/>
+              <a:ln w="38100">
+                <a:solidFill>
+                  <a:schemeClr val="bg2">
+                    <a:lumMod val="75000"/>
+                  </a:schemeClr>
+                </a:solidFill>
+              </a:ln>
+            </p:spPr>
+            <p:style>
+              <a:lnRef idx="1">
+                <a:schemeClr val="accent1"/>
+              </a:lnRef>
+              <a:fillRef idx="0">
+                <a:schemeClr val="accent1"/>
+              </a:fillRef>
+              <a:effectRef idx="0">
+                <a:schemeClr val="accent1"/>
+              </a:effectRef>
+              <a:fontRef idx="minor">
+                <a:schemeClr val="tx1"/>
+              </a:fontRef>
+            </p:style>
+          </p:cxnSp>
+          <p:sp>
+            <p:nvSpPr>
+              <p:cNvPr id="31" name="Oval 30"/>
+              <p:cNvSpPr/>
+              <p:nvPr/>
+            </p:nvSpPr>
+            <p:spPr>
+              <a:xfrm>
+                <a:off x="5970571" y="2589649"/>
+                <a:ext cx="167148" cy="167148"/>
+              </a:xfrm>
+              <a:prstGeom prst="ellipse">
+                <a:avLst/>
+              </a:prstGeom>
+              <a:grpFill/>
+              <a:ln w="38100">
+                <a:solidFill>
+                  <a:schemeClr val="bg2">
+                    <a:lumMod val="75000"/>
+                  </a:schemeClr>
+                </a:solidFill>
+              </a:ln>
+            </p:spPr>
+            <p:style>
+              <a:lnRef idx="2">
+                <a:schemeClr val="accent1">
+                  <a:shade val="50000"/>
+                </a:schemeClr>
+              </a:lnRef>
+              <a:fillRef idx="1">
+                <a:schemeClr val="accent1"/>
+              </a:fillRef>
+              <a:effectRef idx="0">
+                <a:schemeClr val="accent1"/>
+              </a:effectRef>
+              <a:fontRef idx="minor">
+                <a:schemeClr val="lt1"/>
+              </a:fontRef>
+            </p:style>
+            <p:txBody>
+              <a:bodyPr rtlCol="0" anchor="ctr"/>
+              <a:lstStyle/>
+              <a:p>
+                <a:pPr algn="ctr"/>
+                <a:endParaRPr lang="en-US"/>
+              </a:p>
+            </p:txBody>
+          </p:sp>
+          <p:sp>
+            <p:nvSpPr>
+              <p:cNvPr id="32" name="Oval 31"/>
+              <p:cNvSpPr/>
+              <p:nvPr/>
+            </p:nvSpPr>
+            <p:spPr>
+              <a:xfrm>
+                <a:off x="6206282" y="2157789"/>
+                <a:ext cx="167148" cy="167148"/>
+              </a:xfrm>
+              <a:prstGeom prst="ellipse">
+                <a:avLst/>
+              </a:prstGeom>
+              <a:grpFill/>
+              <a:ln w="38100">
+                <a:solidFill>
+                  <a:schemeClr val="bg2">
+                    <a:lumMod val="75000"/>
+                  </a:schemeClr>
+                </a:solidFill>
+              </a:ln>
+            </p:spPr>
+            <p:style>
+              <a:lnRef idx="2">
+                <a:schemeClr val="accent1">
+                  <a:shade val="50000"/>
+                </a:schemeClr>
+              </a:lnRef>
+              <a:fillRef idx="1">
+                <a:schemeClr val="accent1"/>
+              </a:fillRef>
+              <a:effectRef idx="0">
+                <a:schemeClr val="accent1"/>
+              </a:effectRef>
+              <a:fontRef idx="minor">
+                <a:schemeClr val="lt1"/>
+              </a:fontRef>
+            </p:style>
+            <p:txBody>
+              <a:bodyPr rtlCol="0" anchor="ctr"/>
+              <a:lstStyle/>
+              <a:p>
+                <a:pPr algn="ctr"/>
+                <a:endParaRPr lang="en-US"/>
+              </a:p>
+            </p:txBody>
+          </p:sp>
+        </p:grpSp>
+        <p:grpSp>
+          <p:nvGrpSpPr>
+            <p:cNvPr id="33" name="Group 32"/>
+            <p:cNvGrpSpPr/>
+            <p:nvPr/>
+          </p:nvGrpSpPr>
+          <p:grpSpPr>
+            <a:xfrm rot="19604158">
+              <a:off x="5386275" y="1636188"/>
+              <a:ext cx="402859" cy="599008"/>
+              <a:chOff x="5970571" y="2157789"/>
+              <a:chExt cx="402859" cy="599008"/>
+            </a:xfrm>
+            <a:solidFill>
+              <a:schemeClr val="bg2">
+                <a:lumMod val="75000"/>
+              </a:schemeClr>
+            </a:solidFill>
+          </p:grpSpPr>
+          <p:cxnSp>
+            <p:nvCxnSpPr>
+              <p:cNvPr id="34" name="Straight Connector 33"/>
+              <p:cNvCxnSpPr/>
+              <p:nvPr/>
+            </p:nvCxnSpPr>
+            <p:spPr>
+              <a:xfrm flipH="1">
+                <a:off x="6076335" y="2271252"/>
+                <a:ext cx="191331" cy="372082"/>
+              </a:xfrm>
+              <a:prstGeom prst="line">
+                <a:avLst/>
+              </a:prstGeom>
+              <a:grpFill/>
+              <a:ln w="38100">
+                <a:solidFill>
+                  <a:schemeClr val="bg2">
+                    <a:lumMod val="75000"/>
+                  </a:schemeClr>
+                </a:solidFill>
+              </a:ln>
+            </p:spPr>
+            <p:style>
+              <a:lnRef idx="1">
+                <a:schemeClr val="accent1"/>
+              </a:lnRef>
+              <a:fillRef idx="0">
+                <a:schemeClr val="accent1"/>
+              </a:fillRef>
+              <a:effectRef idx="0">
+                <a:schemeClr val="accent1"/>
+              </a:effectRef>
+              <a:fontRef idx="minor">
+                <a:schemeClr val="tx1"/>
+              </a:fontRef>
+            </p:style>
+          </p:cxnSp>
+          <p:sp>
+            <p:nvSpPr>
+              <p:cNvPr id="35" name="Oval 34"/>
+              <p:cNvSpPr/>
+              <p:nvPr/>
+            </p:nvSpPr>
+            <p:spPr>
+              <a:xfrm>
+                <a:off x="5970571" y="2589649"/>
+                <a:ext cx="167148" cy="167148"/>
+              </a:xfrm>
+              <a:prstGeom prst="ellipse">
+                <a:avLst/>
+              </a:prstGeom>
+              <a:grpFill/>
+              <a:ln w="38100">
+                <a:solidFill>
+                  <a:schemeClr val="bg2">
+                    <a:lumMod val="75000"/>
+                  </a:schemeClr>
+                </a:solidFill>
+              </a:ln>
+            </p:spPr>
+            <p:style>
+              <a:lnRef idx="2">
+                <a:schemeClr val="accent1">
+                  <a:shade val="50000"/>
+                </a:schemeClr>
+              </a:lnRef>
+              <a:fillRef idx="1">
+                <a:schemeClr val="accent1"/>
+              </a:fillRef>
+              <a:effectRef idx="0">
+                <a:schemeClr val="accent1"/>
+              </a:effectRef>
+              <a:fontRef idx="minor">
+                <a:schemeClr val="lt1"/>
+              </a:fontRef>
+            </p:style>
+            <p:txBody>
+              <a:bodyPr rtlCol="0" anchor="ctr"/>
+              <a:lstStyle/>
+              <a:p>
+                <a:pPr algn="ctr"/>
+                <a:endParaRPr lang="en-US"/>
+              </a:p>
+            </p:txBody>
+          </p:sp>
+          <p:sp>
+            <p:nvSpPr>
+              <p:cNvPr id="36" name="Oval 35"/>
+              <p:cNvSpPr/>
+              <p:nvPr/>
+            </p:nvSpPr>
+            <p:spPr>
+              <a:xfrm>
+                <a:off x="6206282" y="2157789"/>
+                <a:ext cx="167148" cy="167148"/>
+              </a:xfrm>
+              <a:prstGeom prst="ellipse">
+                <a:avLst/>
+              </a:prstGeom>
+              <a:grpFill/>
+              <a:ln w="38100">
+                <a:solidFill>
+                  <a:schemeClr val="bg2">
+                    <a:lumMod val="75000"/>
+                  </a:schemeClr>
+                </a:solidFill>
+              </a:ln>
+            </p:spPr>
+            <p:style>
+              <a:lnRef idx="2">
+                <a:schemeClr val="accent1">
+                  <a:shade val="50000"/>
+                </a:schemeClr>
+              </a:lnRef>
+              <a:fillRef idx="1">
+                <a:schemeClr val="accent1"/>
+              </a:fillRef>
+              <a:effectRef idx="0">
+                <a:schemeClr val="accent1"/>
+              </a:effectRef>
+              <a:fontRef idx="minor">
+                <a:schemeClr val="lt1"/>
+              </a:fontRef>
+            </p:style>
+            <p:txBody>
+              <a:bodyPr rtlCol="0" anchor="ctr"/>
+              <a:lstStyle/>
+              <a:p>
+                <a:pPr algn="ctr"/>
+                <a:endParaRPr lang="en-US"/>
+              </a:p>
+            </p:txBody>
+          </p:sp>
+        </p:grpSp>
+        <p:sp>
+          <p:nvSpPr>
+            <p:cNvPr id="37" name="Freeform 36"/>
+            <p:cNvSpPr/>
+            <p:nvPr/>
+          </p:nvSpPr>
+          <p:spPr>
+            <a:xfrm>
+              <a:off x="1180403" y="1576368"/>
+              <a:ext cx="5565058" cy="1130947"/>
+            </a:xfrm>
+            <a:custGeom>
+              <a:avLst/>
+              <a:gdLst>
+                <a:gd name="connsiteX0" fmla="*/ 5565058 w 5565058"/>
+                <a:gd name="connsiteY0" fmla="*/ 1130947 h 1130947"/>
+                <a:gd name="connsiteX1" fmla="*/ 3136490 w 5565058"/>
+                <a:gd name="connsiteY1" fmla="*/ 237 h 1130947"/>
+                <a:gd name="connsiteX2" fmla="*/ 0 w 5565058"/>
+                <a:gd name="connsiteY2" fmla="*/ 1052289 h 1130947"/>
+              </a:gdLst>
+              <a:ahLst/>
+              <a:cxnLst>
+                <a:cxn ang="0">
+                  <a:pos x="connsiteX0" y="connsiteY0"/>
+                </a:cxn>
+                <a:cxn ang="0">
+                  <a:pos x="connsiteX1" y="connsiteY1"/>
+                </a:cxn>
+                <a:cxn ang="0">
+                  <a:pos x="connsiteX2" y="connsiteY2"/>
+                </a:cxn>
+              </a:cxnLst>
+              <a:rect l="l" t="t" r="r" b="b"/>
+              <a:pathLst>
+                <a:path w="5565058" h="1130947">
+                  <a:moveTo>
+                    <a:pt x="5565058" y="1130947"/>
+                  </a:moveTo>
+                  <a:cubicBezTo>
+                    <a:pt x="4814529" y="572147"/>
+                    <a:pt x="4064000" y="13347"/>
+                    <a:pt x="3136490" y="237"/>
+                  </a:cubicBezTo>
+                  <a:cubicBezTo>
+                    <a:pt x="2208980" y="-12873"/>
+                    <a:pt x="1104490" y="519708"/>
+                    <a:pt x="0" y="1052289"/>
+                  </a:cubicBezTo>
+                </a:path>
+              </a:pathLst>
+            </a:custGeom>
+            <a:noFill/>
+            <a:ln w="38100">
+              <a:solidFill>
+                <a:schemeClr val="bg2">
+                  <a:lumMod val="75000"/>
+                </a:schemeClr>
+              </a:solidFill>
+              <a:prstDash val="dash"/>
+            </a:ln>
+          </p:spPr>
+          <p:style>
+            <a:lnRef idx="2">
+              <a:schemeClr val="accent1">
+                <a:shade val="50000"/>
+              </a:schemeClr>
+            </a:lnRef>
+            <a:fillRef idx="1">
+              <a:schemeClr val="accent1"/>
+            </a:fillRef>
+            <a:effectRef idx="0">
+              <a:schemeClr val="accent1"/>
+            </a:effectRef>
+            <a:fontRef idx="minor">
+              <a:schemeClr val="lt1"/>
+            </a:fontRef>
+          </p:style>
+          <p:txBody>
+            <a:bodyPr rtlCol="0" anchor="ctr"/>
+            <a:lstStyle/>
+            <a:p>
+              <a:pPr algn="ctr"/>
+              <a:endParaRPr lang="en-US"/>
+            </a:p>
+          </p:txBody>
+        </p:sp>
+        <p:grpSp>
+          <p:nvGrpSpPr>
+            <p:cNvPr id="38" name="Group 37"/>
+            <p:cNvGrpSpPr/>
+            <p:nvPr/>
+          </p:nvGrpSpPr>
+          <p:grpSpPr>
+            <a:xfrm rot="17921181">
+              <a:off x="4521438" y="1305958"/>
+              <a:ext cx="402859" cy="599008"/>
+              <a:chOff x="5970571" y="2157789"/>
+              <a:chExt cx="402859" cy="599008"/>
+            </a:xfrm>
+            <a:solidFill>
+              <a:schemeClr val="bg2">
+                <a:lumMod val="75000"/>
+              </a:schemeClr>
+            </a:solidFill>
+          </p:grpSpPr>
+          <p:cxnSp>
+            <p:nvCxnSpPr>
+              <p:cNvPr id="39" name="Straight Connector 38"/>
+              <p:cNvCxnSpPr/>
+              <p:nvPr/>
+            </p:nvCxnSpPr>
+            <p:spPr>
+              <a:xfrm flipH="1">
+                <a:off x="6076335" y="2271252"/>
+                <a:ext cx="191331" cy="372082"/>
+              </a:xfrm>
+              <a:prstGeom prst="line">
+                <a:avLst/>
+              </a:prstGeom>
+              <a:grpFill/>
+              <a:ln w="38100">
+                <a:solidFill>
+                  <a:schemeClr val="bg2">
+                    <a:lumMod val="75000"/>
+                  </a:schemeClr>
+                </a:solidFill>
+              </a:ln>
+            </p:spPr>
+            <p:style>
+              <a:lnRef idx="1">
+                <a:schemeClr val="accent1"/>
+              </a:lnRef>
+              <a:fillRef idx="0">
+                <a:schemeClr val="accent1"/>
+              </a:fillRef>
+              <a:effectRef idx="0">
+                <a:schemeClr val="accent1"/>
+              </a:effectRef>
+              <a:fontRef idx="minor">
+                <a:schemeClr val="tx1"/>
+              </a:fontRef>
+            </p:style>
+          </p:cxnSp>
+          <p:sp>
+            <p:nvSpPr>
+              <p:cNvPr id="40" name="Oval 39"/>
+              <p:cNvSpPr/>
+              <p:nvPr/>
+            </p:nvSpPr>
+            <p:spPr>
+              <a:xfrm>
+                <a:off x="5970571" y="2589649"/>
+                <a:ext cx="167148" cy="167148"/>
+              </a:xfrm>
+              <a:prstGeom prst="ellipse">
+                <a:avLst/>
+              </a:prstGeom>
+              <a:grpFill/>
+              <a:ln w="38100">
+                <a:solidFill>
+                  <a:schemeClr val="bg2">
+                    <a:lumMod val="75000"/>
+                  </a:schemeClr>
+                </a:solidFill>
+              </a:ln>
+            </p:spPr>
+            <p:style>
+              <a:lnRef idx="2">
+                <a:schemeClr val="accent1">
+                  <a:shade val="50000"/>
+                </a:schemeClr>
+              </a:lnRef>
+              <a:fillRef idx="1">
+                <a:schemeClr val="accent1"/>
+              </a:fillRef>
+              <a:effectRef idx="0">
+                <a:schemeClr val="accent1"/>
+              </a:effectRef>
+              <a:fontRef idx="minor">
+                <a:schemeClr val="lt1"/>
+              </a:fontRef>
+            </p:style>
+            <p:txBody>
+              <a:bodyPr rtlCol="0" anchor="ctr"/>
+              <a:lstStyle/>
+              <a:p>
+                <a:pPr algn="ctr"/>
+                <a:endParaRPr lang="en-US"/>
+              </a:p>
+            </p:txBody>
+          </p:sp>
+          <p:sp>
+            <p:nvSpPr>
+              <p:cNvPr id="41" name="Oval 40"/>
+              <p:cNvSpPr/>
+              <p:nvPr/>
+            </p:nvSpPr>
+            <p:spPr>
+              <a:xfrm>
+                <a:off x="6206282" y="2157789"/>
+                <a:ext cx="167148" cy="167148"/>
+              </a:xfrm>
+              <a:prstGeom prst="ellipse">
+                <a:avLst/>
+              </a:prstGeom>
+              <a:grpFill/>
+              <a:ln w="38100">
+                <a:solidFill>
+                  <a:schemeClr val="bg2">
+                    <a:lumMod val="75000"/>
+                  </a:schemeClr>
+                </a:solidFill>
+              </a:ln>
+            </p:spPr>
+            <p:style>
+              <a:lnRef idx="2">
+                <a:schemeClr val="accent1">
+                  <a:shade val="50000"/>
+                </a:schemeClr>
+              </a:lnRef>
+              <a:fillRef idx="1">
+                <a:schemeClr val="accent1"/>
+              </a:fillRef>
+              <a:effectRef idx="0">
+                <a:schemeClr val="accent1"/>
+              </a:effectRef>
+              <a:fontRef idx="minor">
+                <a:schemeClr val="lt1"/>
+              </a:fontRef>
+            </p:style>
+            <p:txBody>
+              <a:bodyPr rtlCol="0" anchor="ctr"/>
+              <a:lstStyle/>
+              <a:p>
+                <a:pPr algn="ctr"/>
+                <a:endParaRPr lang="en-US"/>
+              </a:p>
+            </p:txBody>
+          </p:sp>
+        </p:grpSp>
+        <p:grpSp>
+          <p:nvGrpSpPr>
+            <p:cNvPr id="42" name="Group 41"/>
+            <p:cNvGrpSpPr/>
+            <p:nvPr/>
+          </p:nvGrpSpPr>
+          <p:grpSpPr>
+            <a:xfrm rot="16200000">
+              <a:off x="3611615" y="1315716"/>
+              <a:ext cx="402859" cy="599008"/>
+              <a:chOff x="5970571" y="2157789"/>
+              <a:chExt cx="402859" cy="599008"/>
+            </a:xfrm>
+            <a:solidFill>
+              <a:schemeClr val="bg2">
+                <a:lumMod val="75000"/>
+              </a:schemeClr>
+            </a:solidFill>
+          </p:grpSpPr>
+          <p:cxnSp>
+            <p:nvCxnSpPr>
+              <p:cNvPr id="43" name="Straight Connector 42"/>
+              <p:cNvCxnSpPr/>
+              <p:nvPr/>
+            </p:nvCxnSpPr>
+            <p:spPr>
+              <a:xfrm flipH="1">
+                <a:off x="6076335" y="2271252"/>
+                <a:ext cx="191331" cy="372082"/>
+              </a:xfrm>
+              <a:prstGeom prst="line">
+                <a:avLst/>
+              </a:prstGeom>
+              <a:grpFill/>
+              <a:ln w="38100">
+                <a:solidFill>
+                  <a:schemeClr val="bg2">
+                    <a:lumMod val="75000"/>
+                  </a:schemeClr>
+                </a:solidFill>
+              </a:ln>
+            </p:spPr>
+            <p:style>
+              <a:lnRef idx="1">
+                <a:schemeClr val="accent1"/>
+              </a:lnRef>
+              <a:fillRef idx="0">
+                <a:schemeClr val="accent1"/>
+              </a:fillRef>
+              <a:effectRef idx="0">
+                <a:schemeClr val="accent1"/>
+              </a:effectRef>
+              <a:fontRef idx="minor">
+                <a:schemeClr val="tx1"/>
+              </a:fontRef>
+            </p:style>
+          </p:cxnSp>
+          <p:sp>
+            <p:nvSpPr>
+              <p:cNvPr id="44" name="Oval 43"/>
+              <p:cNvSpPr/>
+              <p:nvPr/>
+            </p:nvSpPr>
+            <p:spPr>
+              <a:xfrm>
+                <a:off x="5970571" y="2589649"/>
+                <a:ext cx="167148" cy="167148"/>
+              </a:xfrm>
+              <a:prstGeom prst="ellipse">
+                <a:avLst/>
+              </a:prstGeom>
+              <a:grpFill/>
+              <a:ln w="38100">
+                <a:solidFill>
+                  <a:schemeClr val="bg2">
+                    <a:lumMod val="75000"/>
+                  </a:schemeClr>
+                </a:solidFill>
+              </a:ln>
+            </p:spPr>
+            <p:style>
+              <a:lnRef idx="2">
+                <a:schemeClr val="accent1">
+                  <a:shade val="50000"/>
+                </a:schemeClr>
+              </a:lnRef>
+              <a:fillRef idx="1">
+                <a:schemeClr val="accent1"/>
+              </a:fillRef>
+              <a:effectRef idx="0">
+                <a:schemeClr val="accent1"/>
+              </a:effectRef>
+              <a:fontRef idx="minor">
+                <a:schemeClr val="lt1"/>
+              </a:fontRef>
+            </p:style>
+            <p:txBody>
+              <a:bodyPr rtlCol="0" anchor="ctr"/>
+              <a:lstStyle/>
+              <a:p>
+                <a:pPr algn="ctr"/>
+                <a:endParaRPr lang="en-US"/>
+              </a:p>
+            </p:txBody>
+          </p:sp>
+          <p:sp>
+            <p:nvSpPr>
+              <p:cNvPr id="45" name="Oval 44"/>
+              <p:cNvSpPr/>
+              <p:nvPr/>
+            </p:nvSpPr>
+            <p:spPr>
+              <a:xfrm>
+                <a:off x="6206282" y="2157789"/>
+                <a:ext cx="167148" cy="167148"/>
+              </a:xfrm>
+              <a:prstGeom prst="ellipse">
+                <a:avLst/>
+              </a:prstGeom>
+              <a:grpFill/>
+              <a:ln w="38100">
+                <a:solidFill>
+                  <a:schemeClr val="bg2">
+                    <a:lumMod val="75000"/>
+                  </a:schemeClr>
+                </a:solidFill>
+              </a:ln>
+            </p:spPr>
+            <p:style>
+              <a:lnRef idx="2">
+                <a:schemeClr val="accent1">
+                  <a:shade val="50000"/>
+                </a:schemeClr>
+              </a:lnRef>
+              <a:fillRef idx="1">
+                <a:schemeClr val="accent1"/>
+              </a:fillRef>
+              <a:effectRef idx="0">
+                <a:schemeClr val="accent1"/>
+              </a:effectRef>
+              <a:fontRef idx="minor">
+                <a:schemeClr val="lt1"/>
+              </a:fontRef>
+            </p:style>
+            <p:txBody>
+              <a:bodyPr rtlCol="0" anchor="ctr"/>
+              <a:lstStyle/>
+              <a:p>
+                <a:pPr algn="ctr"/>
+                <a:endParaRPr lang="en-US"/>
+              </a:p>
+            </p:txBody>
+          </p:sp>
+        </p:grpSp>
+        <p:grpSp>
+          <p:nvGrpSpPr>
+            <p:cNvPr id="46" name="Group 45"/>
+            <p:cNvGrpSpPr/>
+            <p:nvPr/>
+          </p:nvGrpSpPr>
+          <p:grpSpPr>
+            <a:xfrm rot="11855403">
+              <a:off x="2792015" y="1544233"/>
+              <a:ext cx="402859" cy="599008"/>
+              <a:chOff x="5970571" y="2157789"/>
+              <a:chExt cx="402859" cy="599008"/>
+            </a:xfrm>
+            <a:solidFill>
+              <a:schemeClr val="bg2">
+                <a:lumMod val="75000"/>
+              </a:schemeClr>
+            </a:solidFill>
+          </p:grpSpPr>
+          <p:cxnSp>
+            <p:nvCxnSpPr>
+              <p:cNvPr id="47" name="Straight Connector 46"/>
+              <p:cNvCxnSpPr/>
+              <p:nvPr/>
+            </p:nvCxnSpPr>
+            <p:spPr>
+              <a:xfrm flipH="1">
+                <a:off x="6076335" y="2271252"/>
+                <a:ext cx="191331" cy="372082"/>
+              </a:xfrm>
+              <a:prstGeom prst="line">
+                <a:avLst/>
+              </a:prstGeom>
+              <a:grpFill/>
+              <a:ln w="38100">
+                <a:solidFill>
+                  <a:schemeClr val="bg2">
+                    <a:lumMod val="75000"/>
+                  </a:schemeClr>
+                </a:solidFill>
+              </a:ln>
+            </p:spPr>
+            <p:style>
+              <a:lnRef idx="1">
+                <a:schemeClr val="accent1"/>
+              </a:lnRef>
+              <a:fillRef idx="0">
+                <a:schemeClr val="accent1"/>
+              </a:fillRef>
+              <a:effectRef idx="0">
+                <a:schemeClr val="accent1"/>
+              </a:effectRef>
+              <a:fontRef idx="minor">
+                <a:schemeClr val="tx1"/>
+              </a:fontRef>
+            </p:style>
+          </p:cxnSp>
+          <p:sp>
+            <p:nvSpPr>
+              <p:cNvPr id="48" name="Oval 47"/>
+              <p:cNvSpPr/>
+              <p:nvPr/>
+            </p:nvSpPr>
+            <p:spPr>
+              <a:xfrm>
+                <a:off x="5970571" y="2589649"/>
+                <a:ext cx="167148" cy="167148"/>
+              </a:xfrm>
+              <a:prstGeom prst="ellipse">
+                <a:avLst/>
+              </a:prstGeom>
+              <a:grpFill/>
+              <a:ln w="38100">
+                <a:solidFill>
+                  <a:schemeClr val="bg2">
+                    <a:lumMod val="75000"/>
+                  </a:schemeClr>
+                </a:solidFill>
+              </a:ln>
+            </p:spPr>
+            <p:style>
+              <a:lnRef idx="2">
+                <a:schemeClr val="accent1">
+                  <a:shade val="50000"/>
+                </a:schemeClr>
+              </a:lnRef>
+              <a:fillRef idx="1">
+                <a:schemeClr val="accent1"/>
+              </a:fillRef>
+              <a:effectRef idx="0">
+                <a:schemeClr val="accent1"/>
+              </a:effectRef>
+              <a:fontRef idx="minor">
+                <a:schemeClr val="lt1"/>
+              </a:fontRef>
+            </p:style>
+            <p:txBody>
+              <a:bodyPr rtlCol="0" anchor="ctr"/>
+              <a:lstStyle/>
+              <a:p>
+                <a:pPr algn="ctr"/>
+                <a:endParaRPr lang="en-US"/>
+              </a:p>
+            </p:txBody>
+          </p:sp>
+          <p:sp>
+            <p:nvSpPr>
+              <p:cNvPr id="49" name="Oval 48"/>
+              <p:cNvSpPr/>
+              <p:nvPr/>
+            </p:nvSpPr>
+            <p:spPr>
+              <a:xfrm>
+                <a:off x="6206282" y="2157789"/>
+                <a:ext cx="167148" cy="167148"/>
+              </a:xfrm>
+              <a:prstGeom prst="ellipse">
+                <a:avLst/>
+              </a:prstGeom>
+              <a:grpFill/>
+              <a:ln w="38100">
+                <a:solidFill>
+                  <a:schemeClr val="bg2">
+                    <a:lumMod val="75000"/>
+                  </a:schemeClr>
+                </a:solidFill>
+              </a:ln>
+            </p:spPr>
+            <p:style>
+              <a:lnRef idx="2">
+                <a:schemeClr val="accent1">
+                  <a:shade val="50000"/>
+                </a:schemeClr>
+              </a:lnRef>
+              <a:fillRef idx="1">
+                <a:schemeClr val="accent1"/>
+              </a:fillRef>
+              <a:effectRef idx="0">
+                <a:schemeClr val="accent1"/>
+              </a:effectRef>
+              <a:fontRef idx="minor">
+                <a:schemeClr val="lt1"/>
+              </a:fontRef>
+            </p:style>
+            <p:txBody>
+              <a:bodyPr rtlCol="0" anchor="ctr"/>
+              <a:lstStyle/>
+              <a:p>
+                <a:pPr algn="ctr"/>
+                <a:endParaRPr lang="en-US"/>
+              </a:p>
+            </p:txBody>
+          </p:sp>
+        </p:grpSp>
+        <p:grpSp>
+          <p:nvGrpSpPr>
+            <p:cNvPr id="50" name="Group 49"/>
+            <p:cNvGrpSpPr/>
+            <p:nvPr/>
+          </p:nvGrpSpPr>
+          <p:grpSpPr>
+            <a:xfrm rot="10454676">
+              <a:off x="2077767" y="1831192"/>
+              <a:ext cx="402859" cy="599008"/>
+              <a:chOff x="5970571" y="2157789"/>
+              <a:chExt cx="402859" cy="599008"/>
+            </a:xfrm>
+            <a:solidFill>
+              <a:schemeClr val="bg2">
+                <a:lumMod val="75000"/>
+              </a:schemeClr>
+            </a:solidFill>
+          </p:grpSpPr>
+          <p:cxnSp>
+            <p:nvCxnSpPr>
+              <p:cNvPr id="51" name="Straight Connector 50"/>
+              <p:cNvCxnSpPr/>
+              <p:nvPr/>
+            </p:nvCxnSpPr>
+            <p:spPr>
+              <a:xfrm flipH="1">
+                <a:off x="6076335" y="2271252"/>
+                <a:ext cx="191331" cy="372082"/>
+              </a:xfrm>
+              <a:prstGeom prst="line">
+                <a:avLst/>
+              </a:prstGeom>
+              <a:grpFill/>
+              <a:ln w="38100">
+                <a:solidFill>
+                  <a:schemeClr val="bg2">
+                    <a:lumMod val="75000"/>
+                  </a:schemeClr>
+                </a:solidFill>
+              </a:ln>
+            </p:spPr>
+            <p:style>
+              <a:lnRef idx="1">
+                <a:schemeClr val="accent1"/>
+              </a:lnRef>
+              <a:fillRef idx="0">
+                <a:schemeClr val="accent1"/>
+              </a:fillRef>
+              <a:effectRef idx="0">
+                <a:schemeClr val="accent1"/>
+              </a:effectRef>
+              <a:fontRef idx="minor">
+                <a:schemeClr val="tx1"/>
+              </a:fontRef>
+            </p:style>
+          </p:cxnSp>
+          <p:sp>
+            <p:nvSpPr>
+              <p:cNvPr id="52" name="Oval 51"/>
+              <p:cNvSpPr/>
+              <p:nvPr/>
+            </p:nvSpPr>
+            <p:spPr>
+              <a:xfrm>
+                <a:off x="5970571" y="2589649"/>
+                <a:ext cx="167148" cy="167148"/>
+              </a:xfrm>
+              <a:prstGeom prst="ellipse">
+                <a:avLst/>
+              </a:prstGeom>
+              <a:grpFill/>
+              <a:ln w="38100">
+                <a:solidFill>
+                  <a:schemeClr val="bg2">
+                    <a:lumMod val="75000"/>
+                  </a:schemeClr>
+                </a:solidFill>
+              </a:ln>
+            </p:spPr>
+            <p:style>
+              <a:lnRef idx="2">
+                <a:schemeClr val="accent1">
+                  <a:shade val="50000"/>
+                </a:schemeClr>
+              </a:lnRef>
+              <a:fillRef idx="1">
+                <a:schemeClr val="accent1"/>
+              </a:fillRef>
+              <a:effectRef idx="0">
+                <a:schemeClr val="accent1"/>
+              </a:effectRef>
+              <a:fontRef idx="minor">
+                <a:schemeClr val="lt1"/>
+              </a:fontRef>
+            </p:style>
+            <p:txBody>
+              <a:bodyPr rtlCol="0" anchor="ctr"/>
+              <a:lstStyle/>
+              <a:p>
+                <a:pPr algn="ctr"/>
+                <a:endParaRPr lang="en-US"/>
+              </a:p>
+            </p:txBody>
+          </p:sp>
+          <p:sp>
+            <p:nvSpPr>
+              <p:cNvPr id="53" name="Oval 52"/>
+              <p:cNvSpPr/>
+              <p:nvPr/>
+            </p:nvSpPr>
+            <p:spPr>
+              <a:xfrm>
+                <a:off x="6206282" y="2157789"/>
+                <a:ext cx="167148" cy="167148"/>
+              </a:xfrm>
+              <a:prstGeom prst="ellipse">
+                <a:avLst/>
+              </a:prstGeom>
+              <a:grpFill/>
+              <a:ln w="38100">
+                <a:solidFill>
+                  <a:schemeClr val="bg2">
+                    <a:lumMod val="75000"/>
+                  </a:schemeClr>
+                </a:solidFill>
+              </a:ln>
+            </p:spPr>
+            <p:style>
+              <a:lnRef idx="2">
+                <a:schemeClr val="accent1">
+                  <a:shade val="50000"/>
+                </a:schemeClr>
+              </a:lnRef>
+              <a:fillRef idx="1">
+                <a:schemeClr val="accent1"/>
+              </a:fillRef>
+              <a:effectRef idx="0">
+                <a:schemeClr val="accent1"/>
+              </a:effectRef>
+              <a:fontRef idx="minor">
+                <a:schemeClr val="lt1"/>
+              </a:fontRef>
+            </p:style>
+            <p:txBody>
+              <a:bodyPr rtlCol="0" anchor="ctr"/>
+              <a:lstStyle/>
+              <a:p>
+                <a:pPr algn="ctr"/>
+                <a:endParaRPr lang="en-US"/>
+              </a:p>
+            </p:txBody>
+          </p:sp>
+        </p:grpSp>
+        <p:grpSp>
+          <p:nvGrpSpPr>
+            <p:cNvPr id="54" name="Group 53"/>
+            <p:cNvGrpSpPr/>
+            <p:nvPr/>
+          </p:nvGrpSpPr>
+          <p:grpSpPr>
+            <a:xfrm rot="6833273">
+              <a:off x="1471451" y="2082097"/>
+              <a:ext cx="402859" cy="599008"/>
+              <a:chOff x="5970571" y="2157789"/>
+              <a:chExt cx="402859" cy="599008"/>
+            </a:xfrm>
+            <a:solidFill>
+              <a:schemeClr val="bg2">
+                <a:lumMod val="75000"/>
+              </a:schemeClr>
+            </a:solidFill>
+          </p:grpSpPr>
+          <p:cxnSp>
+            <p:nvCxnSpPr>
+              <p:cNvPr id="55" name="Straight Connector 54"/>
+              <p:cNvCxnSpPr/>
+              <p:nvPr/>
+            </p:nvCxnSpPr>
+            <p:spPr>
+              <a:xfrm flipH="1">
+                <a:off x="6076335" y="2271252"/>
+                <a:ext cx="191331" cy="372082"/>
+              </a:xfrm>
+              <a:prstGeom prst="line">
+                <a:avLst/>
+              </a:prstGeom>
+              <a:grpFill/>
+              <a:ln w="38100">
+                <a:solidFill>
+                  <a:schemeClr val="bg2">
+                    <a:lumMod val="75000"/>
+                  </a:schemeClr>
+                </a:solidFill>
+              </a:ln>
+            </p:spPr>
+            <p:style>
+              <a:lnRef idx="1">
+                <a:schemeClr val="accent1"/>
+              </a:lnRef>
+              <a:fillRef idx="0">
+                <a:schemeClr val="accent1"/>
+              </a:fillRef>
+              <a:effectRef idx="0">
+                <a:schemeClr val="accent1"/>
+              </a:effectRef>
+              <a:fontRef idx="minor">
+                <a:schemeClr val="tx1"/>
+              </a:fontRef>
+            </p:style>
+          </p:cxnSp>
+          <p:sp>
+            <p:nvSpPr>
+              <p:cNvPr id="56" name="Oval 55"/>
+              <p:cNvSpPr/>
+              <p:nvPr/>
+            </p:nvSpPr>
+            <p:spPr>
+              <a:xfrm>
+                <a:off x="5970571" y="2589649"/>
+                <a:ext cx="167148" cy="167148"/>
+              </a:xfrm>
+              <a:prstGeom prst="ellipse">
+                <a:avLst/>
+              </a:prstGeom>
+              <a:grpFill/>
+              <a:ln w="38100">
+                <a:solidFill>
+                  <a:schemeClr val="bg2">
+                    <a:lumMod val="75000"/>
+                  </a:schemeClr>
+                </a:solidFill>
+              </a:ln>
+            </p:spPr>
+            <p:style>
+              <a:lnRef idx="2">
+                <a:schemeClr val="accent1">
+                  <a:shade val="50000"/>
+                </a:schemeClr>
+              </a:lnRef>
+              <a:fillRef idx="1">
+                <a:schemeClr val="accent1"/>
+              </a:fillRef>
+              <a:effectRef idx="0">
+                <a:schemeClr val="accent1"/>
+              </a:effectRef>
+              <a:fontRef idx="minor">
+                <a:schemeClr val="lt1"/>
+              </a:fontRef>
+            </p:style>
+            <p:txBody>
+              <a:bodyPr rtlCol="0" anchor="ctr"/>
+              <a:lstStyle/>
+              <a:p>
+                <a:pPr algn="ctr"/>
+                <a:endParaRPr lang="en-US"/>
+              </a:p>
+            </p:txBody>
+          </p:sp>
+          <p:sp>
+            <p:nvSpPr>
+              <p:cNvPr id="57" name="Oval 56"/>
+              <p:cNvSpPr/>
+              <p:nvPr/>
+            </p:nvSpPr>
+            <p:spPr>
+              <a:xfrm>
+                <a:off x="6206282" y="2157789"/>
+                <a:ext cx="167148" cy="167148"/>
+              </a:xfrm>
+              <a:prstGeom prst="ellipse">
+                <a:avLst/>
+              </a:prstGeom>
+              <a:grpFill/>
+              <a:ln w="38100">
+                <a:solidFill>
+                  <a:schemeClr val="bg2">
+                    <a:lumMod val="75000"/>
+                  </a:schemeClr>
+                </a:solidFill>
+              </a:ln>
+            </p:spPr>
+            <p:style>
+              <a:lnRef idx="2">
+                <a:schemeClr val="accent1">
+                  <a:shade val="50000"/>
+                </a:schemeClr>
+              </a:lnRef>
+              <a:fillRef idx="1">
+                <a:schemeClr val="accent1"/>
+              </a:fillRef>
+              <a:effectRef idx="0">
+                <a:schemeClr val="accent1"/>
+              </a:effectRef>
+              <a:fontRef idx="minor">
+                <a:schemeClr val="lt1"/>
+              </a:fontRef>
+            </p:style>
+            <p:txBody>
+              <a:bodyPr rtlCol="0" anchor="ctr"/>
+              <a:lstStyle/>
+              <a:p>
+                <a:pPr algn="ctr"/>
+                <a:endParaRPr lang="en-US"/>
+              </a:p>
+            </p:txBody>
+          </p:sp>
+        </p:grpSp>
+      </p:grpSp>
+    </p:spTree>
+    <p:extLst>
+      <p:ext uri="{BB962C8B-B14F-4D97-AF65-F5344CB8AC3E}">
+        <p14:creationId xmlns:p14="http://schemas.microsoft.com/office/powerpoint/2010/main" val="3817752253"/>
+      </p:ext>
+    </p:extLst>
+  </p:cSld>
+  <p:clrMapOvr>
+    <a:masterClrMapping/>
+  </p:clrMapOvr>
+</p:sld>
+</file>
+
+<file path=ppt/slides/slide7.xml><?xml version="1.0" encoding="utf-8"?>
+<p:sld xmlns:a="http://schemas.openxmlformats.org/drawingml/2006/main" xmlns:r="http://schemas.openxmlformats.org/officeDocument/2006/relationships" xmlns:p="http://schemas.openxmlformats.org/presentationml/2006/main">
+  <p:cSld>
+    <p:spTree>
+      <p:nvGrpSpPr>
+        <p:cNvPr id="1" name=""/>
+        <p:cNvGrpSpPr/>
+        <p:nvPr/>
+      </p:nvGrpSpPr>
+      <p:grpSpPr>
+        <a:xfrm>
+          <a:off x="0" y="0"/>
+          <a:ext cx="0" cy="0"/>
+          <a:chOff x="0" y="0"/>
+          <a:chExt cx="0" cy="0"/>
+        </a:xfrm>
+      </p:grpSpPr>
+      <p:grpSp>
+        <p:nvGrpSpPr>
+          <p:cNvPr id="25" name="Group 24"/>
+          <p:cNvGrpSpPr/>
+          <p:nvPr/>
+        </p:nvGrpSpPr>
+        <p:grpSpPr>
+          <a:xfrm>
+            <a:off x="274618" y="280220"/>
+            <a:ext cx="5821382" cy="2454937"/>
+            <a:chOff x="1149689" y="496530"/>
+            <a:chExt cx="5821382" cy="2454937"/>
+          </a:xfrm>
+        </p:grpSpPr>
+        <p:sp>
+          <p:nvSpPr>
+            <p:cNvPr id="6" name="Oval 5"/>
+            <p:cNvSpPr/>
+            <p:nvPr/>
+          </p:nvSpPr>
+          <p:spPr>
+            <a:xfrm>
+              <a:off x="1149689" y="1015791"/>
+              <a:ext cx="1081549" cy="1081549"/>
+            </a:xfrm>
+            <a:prstGeom prst="ellipse">
+              <a:avLst/>
+            </a:prstGeom>
+            <a:solidFill>
+              <a:srgbClr val="FFFF00"/>
+            </a:solidFill>
+            <a:ln w="38100">
+              <a:solidFill>
+                <a:schemeClr val="tx1"/>
+              </a:solidFill>
+            </a:ln>
+          </p:spPr>
+          <p:style>
+            <a:lnRef idx="2">
+              <a:schemeClr val="accent1">
+                <a:shade val="50000"/>
+              </a:schemeClr>
+            </a:lnRef>
+            <a:fillRef idx="1">
+              <a:schemeClr val="accent1"/>
+            </a:fillRef>
+            <a:effectRef idx="0">
+              <a:schemeClr val="accent1"/>
+            </a:effectRef>
+            <a:fontRef idx="minor">
+              <a:schemeClr val="lt1"/>
+            </a:fontRef>
+          </p:style>
+          <p:txBody>
+            <a:bodyPr rtlCol="0" anchor="ctr"/>
+            <a:lstStyle/>
+            <a:p>
+              <a:pPr algn="ctr"/>
+              <a:endParaRPr lang="en-US"/>
+            </a:p>
+          </p:txBody>
+        </p:sp>
+        <p:sp>
+          <p:nvSpPr>
+            <p:cNvPr id="7" name="Oval 6"/>
+            <p:cNvSpPr/>
+            <p:nvPr/>
+          </p:nvSpPr>
+          <p:spPr>
+            <a:xfrm>
+              <a:off x="4567085" y="1332271"/>
+              <a:ext cx="442452" cy="442452"/>
+            </a:xfrm>
+            <a:prstGeom prst="ellipse">
+              <a:avLst/>
+            </a:prstGeom>
+            <a:solidFill>
+              <a:srgbClr val="0070C0"/>
+            </a:solidFill>
+            <a:ln w="38100">
+              <a:solidFill>
+                <a:schemeClr val="tx1"/>
+              </a:solidFill>
+            </a:ln>
+          </p:spPr>
+          <p:style>
+            <a:lnRef idx="2">
+              <a:schemeClr val="accent1">
+                <a:shade val="50000"/>
+              </a:schemeClr>
+            </a:lnRef>
+            <a:fillRef idx="1">
+              <a:schemeClr val="accent1"/>
+            </a:fillRef>
+            <a:effectRef idx="0">
+              <a:schemeClr val="accent1"/>
+            </a:effectRef>
+            <a:fontRef idx="minor">
+              <a:schemeClr val="lt1"/>
+            </a:fontRef>
+          </p:style>
+          <p:txBody>
+            <a:bodyPr rtlCol="0" anchor="ctr"/>
+            <a:lstStyle/>
+            <a:p>
+              <a:pPr algn="ctr"/>
+              <a:endParaRPr lang="en-US"/>
+            </a:p>
+          </p:txBody>
+        </p:sp>
+        <p:sp>
+          <p:nvSpPr>
+            <p:cNvPr id="8" name="Oval 7"/>
+            <p:cNvSpPr/>
+            <p:nvPr/>
+          </p:nvSpPr>
+          <p:spPr>
+            <a:xfrm>
+              <a:off x="6164827" y="1425678"/>
+              <a:ext cx="255638" cy="255638"/>
+            </a:xfrm>
+            <a:prstGeom prst="ellipse">
+              <a:avLst/>
+            </a:prstGeom>
+            <a:solidFill>
+              <a:srgbClr val="FF0000"/>
+            </a:solidFill>
+            <a:ln w="38100">
+              <a:solidFill>
+                <a:schemeClr val="tx1"/>
+              </a:solidFill>
+            </a:ln>
+          </p:spPr>
+          <p:style>
+            <a:lnRef idx="2">
+              <a:schemeClr val="accent1">
+                <a:shade val="50000"/>
+              </a:schemeClr>
+            </a:lnRef>
+            <a:fillRef idx="1">
+              <a:schemeClr val="accent1"/>
+            </a:fillRef>
+            <a:effectRef idx="0">
+              <a:schemeClr val="accent1"/>
+            </a:effectRef>
+            <a:fontRef idx="minor">
+              <a:schemeClr val="lt1"/>
+            </a:fontRef>
+          </p:style>
+          <p:txBody>
+            <a:bodyPr rtlCol="0" anchor="ctr"/>
+            <a:lstStyle/>
+            <a:p>
+              <a:pPr algn="ctr"/>
+              <a:endParaRPr lang="en-US"/>
+            </a:p>
+          </p:txBody>
+        </p:sp>
+        <p:grpSp>
+          <p:nvGrpSpPr>
+            <p:cNvPr id="9" name="Group 8"/>
+            <p:cNvGrpSpPr/>
+            <p:nvPr/>
+          </p:nvGrpSpPr>
+          <p:grpSpPr>
+            <a:xfrm>
+              <a:off x="1444060" y="2392933"/>
+              <a:ext cx="5527011" cy="558534"/>
+              <a:chOff x="919312" y="3331012"/>
+              <a:chExt cx="4031829" cy="558534"/>
+            </a:xfrm>
+          </p:grpSpPr>
+          <p:cxnSp>
+            <p:nvCxnSpPr>
+              <p:cNvPr id="10" name="Straight Arrow Connector 9"/>
+              <p:cNvCxnSpPr/>
+              <p:nvPr/>
+            </p:nvCxnSpPr>
+            <p:spPr>
+              <a:xfrm flipV="1">
+                <a:off x="1025912" y="3438955"/>
+                <a:ext cx="3925229" cy="1"/>
+              </a:xfrm>
+              <a:prstGeom prst="straightConnector1">
+                <a:avLst/>
+              </a:prstGeom>
+              <a:ln w="38100">
+                <a:solidFill>
+                  <a:schemeClr val="tx1"/>
+                </a:solidFill>
+                <a:tailEnd type="triangle"/>
+              </a:ln>
+            </p:spPr>
+            <p:style>
+              <a:lnRef idx="1">
+                <a:schemeClr val="accent1"/>
+              </a:lnRef>
+              <a:fillRef idx="0">
+                <a:schemeClr val="accent1"/>
+              </a:fillRef>
+              <a:effectRef idx="0">
+                <a:schemeClr val="accent1"/>
+              </a:effectRef>
+              <a:fontRef idx="minor">
+                <a:schemeClr val="tx1"/>
+              </a:fontRef>
+            </p:style>
+          </p:cxnSp>
+          <mc:AlternateContent xmlns:mc="http://schemas.openxmlformats.org/markup-compatibility/2006" xmlns:a14="http://schemas.microsoft.com/office/drawing/2010/main">
+            <mc:Choice Requires="a14">
+              <p:sp>
+                <p:nvSpPr>
+                  <p:cNvPr id="11" name="Rectangle 10"/>
+                  <p:cNvSpPr/>
+                  <p:nvPr/>
+                </p:nvSpPr>
+                <p:spPr>
+                  <a:xfrm>
+                    <a:off x="4404738" y="3438955"/>
+                    <a:ext cx="367985" cy="369332"/>
+                  </a:xfrm>
+                  <a:prstGeom prst="rect">
+                    <a:avLst/>
+                  </a:prstGeom>
+                </p:spPr>
+                <p:txBody>
+                  <a:bodyPr wrap="square">
+                    <a:spAutoFit/>
+                  </a:bodyPr>
+                  <a:lstStyle/>
+                  <a:p>
+                    <a:pPr/>
+                    <a14:m>
+                      <m:oMathPara xmlns:m="http://schemas.openxmlformats.org/officeDocument/2006/math">
+                        <m:oMathParaPr>
+                          <m:jc m:val="centerGroup"/>
+                        </m:oMathParaPr>
+                        <m:oMath xmlns:m="http://schemas.openxmlformats.org/officeDocument/2006/math">
+                          <m:r>
+                            <a:rPr lang="en-US" i="1">
+                              <a:latin typeface="Cambria Math" panose="02040503050406030204" pitchFamily="18" charset="0"/>
+                              <a:cs typeface="Arial" panose="020B0604020202020204" pitchFamily="34" charset="0"/>
+                            </a:rPr>
+                            <m:t>𝑥</m:t>
+                          </m:r>
+                        </m:oMath>
+                      </m:oMathPara>
+                    </a14:m>
+                    <a:endParaRPr lang="en-CA" dirty="0"/>
+                  </a:p>
+                </p:txBody>
+              </p:sp>
+            </mc:Choice>
+            <mc:Fallback xmlns="">
+              <p:sp>
+                <p:nvSpPr>
+                  <p:cNvPr id="28" name="Rectangle 27"/>
+                  <p:cNvSpPr>
+                    <a:spLocks noRot="1" noChangeAspect="1" noMove="1" noResize="1" noEditPoints="1" noAdjustHandles="1" noChangeArrowheads="1" noChangeShapeType="1" noTextEdit="1"/>
+                  </p:cNvSpPr>
+                  <p:nvPr/>
+                </p:nvSpPr>
+                <p:spPr>
+                  <a:xfrm>
+                    <a:off x="4404738" y="3438955"/>
+                    <a:ext cx="367985" cy="369332"/>
+                  </a:xfrm>
+                  <a:prstGeom prst="rect">
+                    <a:avLst/>
+                  </a:prstGeom>
+                  <a:blipFill>
+                    <a:blip r:embed="rId30"/>
+                    <a:stretch>
+                      <a:fillRect/>
+                    </a:stretch>
+                  </a:blipFill>
+                </p:spPr>
+                <p:txBody>
+                  <a:bodyPr/>
+                  <a:lstStyle/>
+                  <a:p>
+                    <a:r>
+                      <a:rPr lang="en-US">
+                        <a:noFill/>
+                      </a:rPr>
+                      <a:t> </a:t>
+                    </a:r>
+                  </a:p>
+                </p:txBody>
+              </p:sp>
+            </mc:Fallback>
+          </mc:AlternateContent>
+          <mc:AlternateContent xmlns:mc="http://schemas.openxmlformats.org/markup-compatibility/2006" xmlns:a14="http://schemas.microsoft.com/office/drawing/2010/main">
+            <mc:Choice Requires="a14">
+              <p:sp>
+                <p:nvSpPr>
+                  <p:cNvPr id="12" name="TextBox 11"/>
+                  <p:cNvSpPr txBox="1"/>
+                  <p:nvPr/>
+                </p:nvSpPr>
+                <p:spPr>
+                  <a:xfrm>
+                    <a:off x="919312" y="3581769"/>
+                    <a:ext cx="213200" cy="307777"/>
+                  </a:xfrm>
+                  <a:prstGeom prst="rect">
+                    <a:avLst/>
+                  </a:prstGeom>
+                  <a:noFill/>
+                </p:spPr>
+                <p:txBody>
+                  <a:bodyPr wrap="none" lIns="0" tIns="0" rIns="0" bIns="0" rtlCol="0">
+                    <a:spAutoFit/>
+                  </a:bodyPr>
+                  <a:lstStyle/>
+                  <a:p>
+                    <a:pPr/>
+                    <a14:m>
+                      <m:oMathPara xmlns:m="http://schemas.openxmlformats.org/officeDocument/2006/math">
+                        <m:oMathParaPr>
+                          <m:jc m:val="centerGroup"/>
+                        </m:oMathParaPr>
+                        <m:oMath xmlns:m="http://schemas.openxmlformats.org/officeDocument/2006/math">
+                          <m:r>
+                            <a:rPr lang="en-US" sz="2000" b="0" i="1" smtClean="0">
+                              <a:latin typeface="Cambria Math" panose="02040503050406030204" pitchFamily="18" charset="0"/>
+                              <a:cs typeface="Arial" panose="020B0604020202020204" pitchFamily="34" charset="0"/>
+                            </a:rPr>
+                            <m:t>0</m:t>
+                          </m:r>
+                        </m:oMath>
+                      </m:oMathPara>
+                    </a14:m>
+                    <a:endParaRPr lang="en-US" sz="2000" dirty="0" smtClean="0">
+                      <a:latin typeface="Arial" panose="020B0604020202020204" pitchFamily="34" charset="0"/>
+                      <a:cs typeface="Arial" panose="020B0604020202020204" pitchFamily="34" charset="0"/>
+                    </a:endParaRPr>
+                  </a:p>
+                </p:txBody>
+              </p:sp>
+            </mc:Choice>
+            <mc:Fallback xmlns="">
+              <p:sp>
+                <p:nvSpPr>
+                  <p:cNvPr id="29" name="TextBox 28"/>
+                  <p:cNvSpPr txBox="1">
+                    <a:spLocks noRot="1" noChangeAspect="1" noMove="1" noResize="1" noEditPoints="1" noAdjustHandles="1" noChangeArrowheads="1" noChangeShapeType="1" noTextEdit="1"/>
+                  </p:cNvSpPr>
+                  <p:nvPr/>
+                </p:nvSpPr>
+                <p:spPr>
+                  <a:xfrm>
+                    <a:off x="919312" y="3581769"/>
+                    <a:ext cx="213200" cy="307777"/>
+                  </a:xfrm>
+                  <a:prstGeom prst="rect">
+                    <a:avLst/>
+                  </a:prstGeom>
+                  <a:blipFill>
+                    <a:blip r:embed="rId31"/>
+                    <a:stretch>
+                      <a:fillRect l="-25714" r="-22857" b="-10000"/>
+                    </a:stretch>
+                  </a:blipFill>
+                </p:spPr>
+                <p:txBody>
+                  <a:bodyPr/>
+                  <a:lstStyle/>
+                  <a:p>
+                    <a:r>
+                      <a:rPr lang="en-US">
+                        <a:noFill/>
+                      </a:rPr>
+                      <a:t> </a:t>
+                    </a:r>
+                  </a:p>
+                </p:txBody>
+              </p:sp>
+            </mc:Fallback>
+          </mc:AlternateContent>
+          <p:cxnSp>
+            <p:nvCxnSpPr>
+              <p:cNvPr id="13" name="Straight Connector 12"/>
+              <p:cNvCxnSpPr/>
+              <p:nvPr/>
+            </p:nvCxnSpPr>
+            <p:spPr>
+              <a:xfrm flipV="1">
+                <a:off x="1099058" y="3331012"/>
+                <a:ext cx="0" cy="239606"/>
+              </a:xfrm>
+              <a:prstGeom prst="line">
+                <a:avLst/>
+              </a:prstGeom>
+              <a:ln w="38100">
+                <a:solidFill>
+                  <a:schemeClr val="tx1"/>
+                </a:solidFill>
+              </a:ln>
+            </p:spPr>
+            <p:style>
+              <a:lnRef idx="1">
+                <a:schemeClr val="accent1"/>
+              </a:lnRef>
+              <a:fillRef idx="0">
+                <a:schemeClr val="accent1"/>
+              </a:fillRef>
+              <a:effectRef idx="0">
+                <a:schemeClr val="accent1"/>
+              </a:effectRef>
+              <a:fontRef idx="minor">
+                <a:schemeClr val="tx1"/>
+              </a:fontRef>
+            </p:style>
+          </p:cxnSp>
+        </p:grpSp>
+        <p:cxnSp>
+          <p:nvCxnSpPr>
+            <p:cNvPr id="15" name="Straight Arrow Connector 14"/>
+            <p:cNvCxnSpPr/>
+            <p:nvPr/>
+          </p:nvCxnSpPr>
+          <p:spPr>
+            <a:xfrm>
+              <a:off x="1690463" y="914400"/>
+              <a:ext cx="3186337" cy="0"/>
+            </a:xfrm>
+            <a:prstGeom prst="straightConnector1">
+              <a:avLst/>
+            </a:prstGeom>
+            <a:ln w="38100">
+              <a:solidFill>
+                <a:schemeClr val="tx1"/>
+              </a:solidFill>
+              <a:headEnd type="triangle" w="med" len="med"/>
+              <a:tailEnd type="triangle" w="med" len="med"/>
+            </a:ln>
+          </p:spPr>
+          <p:style>
+            <a:lnRef idx="1">
+              <a:schemeClr val="accent1"/>
+            </a:lnRef>
+            <a:fillRef idx="0">
+              <a:schemeClr val="accent1"/>
+            </a:fillRef>
+            <a:effectRef idx="0">
+              <a:schemeClr val="accent1"/>
+            </a:effectRef>
+            <a:fontRef idx="minor">
+              <a:schemeClr val="tx1"/>
+            </a:fontRef>
+          </p:style>
+        </p:cxnSp>
+        <p:cxnSp>
+          <p:nvCxnSpPr>
+            <p:cNvPr id="16" name="Straight Arrow Connector 15"/>
+            <p:cNvCxnSpPr/>
+            <p:nvPr/>
+          </p:nvCxnSpPr>
+          <p:spPr>
+            <a:xfrm flipV="1">
+              <a:off x="1690463" y="2171686"/>
+              <a:ext cx="4602183" cy="12986"/>
+            </a:xfrm>
+            <a:prstGeom prst="straightConnector1">
+              <a:avLst/>
+            </a:prstGeom>
+            <a:ln w="38100">
+              <a:solidFill>
+                <a:schemeClr val="tx1"/>
+              </a:solidFill>
+              <a:headEnd type="triangle" w="med" len="med"/>
+              <a:tailEnd type="triangle" w="med" len="med"/>
+            </a:ln>
+          </p:spPr>
+          <p:style>
+            <a:lnRef idx="1">
+              <a:schemeClr val="accent1"/>
+            </a:lnRef>
+            <a:fillRef idx="0">
+              <a:schemeClr val="accent1"/>
+            </a:fillRef>
+            <a:effectRef idx="0">
+              <a:schemeClr val="accent1"/>
+            </a:effectRef>
+            <a:fontRef idx="minor">
+              <a:schemeClr val="tx1"/>
+            </a:fontRef>
+          </p:style>
+        </p:cxnSp>
+        <mc:AlternateContent xmlns:mc="http://schemas.openxmlformats.org/markup-compatibility/2006">
+          <mc:Choice xmlns:a14="http://schemas.microsoft.com/office/drawing/2010/main" Requires="a14">
+            <p:sp>
+              <p:nvSpPr>
+                <p:cNvPr id="20" name="TextBox 19"/>
+                <p:cNvSpPr txBox="1"/>
+                <p:nvPr/>
+              </p:nvSpPr>
+              <p:spPr>
+                <a:xfrm>
+                  <a:off x="3132436" y="496530"/>
+                  <a:ext cx="302390" cy="307777"/>
+                </a:xfrm>
+                <a:prstGeom prst="rect">
+                  <a:avLst/>
+                </a:prstGeom>
+                <a:noFill/>
+              </p:spPr>
+              <p:txBody>
+                <a:bodyPr wrap="none" lIns="0" tIns="0" rIns="0" bIns="0" rtlCol="0">
+                  <a:spAutoFit/>
+                </a:bodyPr>
+                <a:lstStyle/>
+                <a:p>
+                  <a14:m>
+                    <m:oMathPara xmlns:m="http://schemas.openxmlformats.org/officeDocument/2006/math">
+                      <m:oMathParaPr>
+                        <m:jc m:val="centerGroup"/>
+                      </m:oMathParaPr>
+                      <m:oMath xmlns:m="http://schemas.openxmlformats.org/officeDocument/2006/math">
+                        <m:sSub>
+                          <m:sSubPr>
+                            <m:ctrlPr>
+                              <a:rPr lang="en-US" sz="2000" b="0" i="1" smtClean="0">
+                                <a:latin typeface="Cambria Math" panose="02040503050406030204" pitchFamily="18" charset="0"/>
+                                <a:cs typeface="Arial" panose="020B0604020202020204" pitchFamily="34" charset="0"/>
+                              </a:rPr>
+                            </m:ctrlPr>
+                          </m:sSubPr>
+                          <m:e>
+                            <m:acc>
+                              <m:accPr>
+                                <m:chr m:val="⃗"/>
+                                <m:ctrlPr>
+                                  <a:rPr lang="en-US" sz="2000" b="0" i="1" smtClean="0">
+                                    <a:latin typeface="Cambria Math" panose="02040503050406030204" pitchFamily="18" charset="0"/>
+                                    <a:cs typeface="Arial" panose="020B0604020202020204" pitchFamily="34" charset="0"/>
+                                  </a:rPr>
+                                </m:ctrlPr>
+                              </m:accPr>
+                              <m:e>
+                                <m:r>
+                                  <a:rPr lang="en-US" sz="2000" b="0" i="1" smtClean="0">
+                                    <a:latin typeface="Cambria Math" panose="02040503050406030204" pitchFamily="18" charset="0"/>
+                                    <a:cs typeface="Arial" panose="020B0604020202020204" pitchFamily="34" charset="0"/>
+                                  </a:rPr>
+                                  <m:t>𝑟</m:t>
+                                </m:r>
+                              </m:e>
+                            </m:acc>
+                          </m:e>
+                          <m:sub>
+                            <m:r>
+                              <a:rPr lang="en-US" sz="2000" b="0" i="1" smtClean="0">
+                                <a:latin typeface="Cambria Math" panose="02040503050406030204" pitchFamily="18" charset="0"/>
+                                <a:cs typeface="Arial" panose="020B0604020202020204" pitchFamily="34" charset="0"/>
+                              </a:rPr>
+                              <m:t>𝐸</m:t>
+                            </m:r>
+                          </m:sub>
+                        </m:sSub>
+                      </m:oMath>
+                    </m:oMathPara>
+                  </a14:m>
+                  <a:endParaRPr lang="en-US" sz="2000" dirty="0" smtClean="0">
+                    <a:latin typeface="Arial" panose="020B0604020202020204" pitchFamily="34" charset="0"/>
+                    <a:cs typeface="Arial" panose="020B0604020202020204" pitchFamily="34" charset="0"/>
+                  </a:endParaRPr>
+                </a:p>
+              </p:txBody>
+            </p:sp>
+          </mc:Choice>
+          <mc:Fallback>
+            <p:sp>
+              <p:nvSpPr>
+                <p:cNvPr id="20" name="TextBox 19"/>
+                <p:cNvSpPr txBox="1">
+                  <a:spLocks noRot="1" noChangeAspect="1" noMove="1" noResize="1" noEditPoints="1" noAdjustHandles="1" noChangeArrowheads="1" noChangeShapeType="1" noTextEdit="1"/>
+                </p:cNvSpPr>
+                <p:nvPr/>
+              </p:nvSpPr>
+              <p:spPr>
+                <a:xfrm>
+                  <a:off x="3132436" y="496530"/>
+                  <a:ext cx="302390" cy="307777"/>
+                </a:xfrm>
+                <a:prstGeom prst="rect">
+                  <a:avLst/>
+                </a:prstGeom>
+                <a:blipFill>
+                  <a:blip r:embed="rId32"/>
+                  <a:stretch>
+                    <a:fillRect l="-18000" t="-36000" r="-62000" b="-20000"/>
+                  </a:stretch>
+                </a:blipFill>
+              </p:spPr>
+              <p:txBody>
+                <a:bodyPr/>
+                <a:lstStyle/>
+                <a:p>
+                  <a:r>
+                    <a:rPr lang="en-US">
+                      <a:noFill/>
+                    </a:rPr>
+                    <a:t> </a:t>
+                  </a:r>
+                </a:p>
+              </p:txBody>
+            </p:sp>
+          </mc:Fallback>
+        </mc:AlternateContent>
+        <mc:AlternateContent xmlns:mc="http://schemas.openxmlformats.org/markup-compatibility/2006">
+          <mc:Choice xmlns:a14="http://schemas.microsoft.com/office/drawing/2010/main" Requires="a14">
+            <p:sp>
+              <p:nvSpPr>
+                <p:cNvPr id="21" name="TextBox 20"/>
+                <p:cNvSpPr txBox="1"/>
+                <p:nvPr/>
+              </p:nvSpPr>
+              <p:spPr>
+                <a:xfrm>
+                  <a:off x="3991554" y="1802355"/>
+                  <a:ext cx="344518" cy="307777"/>
+                </a:xfrm>
+                <a:prstGeom prst="rect">
+                  <a:avLst/>
+                </a:prstGeom>
+                <a:noFill/>
+              </p:spPr>
+              <p:txBody>
+                <a:bodyPr wrap="none" lIns="0" tIns="0" rIns="0" bIns="0" rtlCol="0">
+                  <a:spAutoFit/>
+                </a:bodyPr>
+                <a:lstStyle/>
+                <a:p>
+                  <a14:m>
+                    <m:oMathPara xmlns:m="http://schemas.openxmlformats.org/officeDocument/2006/math">
+                      <m:oMathParaPr>
+                        <m:jc m:val="centerGroup"/>
+                      </m:oMathParaPr>
+                      <m:oMath xmlns:m="http://schemas.openxmlformats.org/officeDocument/2006/math">
+                        <m:sSub>
+                          <m:sSubPr>
+                            <m:ctrlPr>
+                              <a:rPr lang="en-US" sz="2000" b="0" i="1" smtClean="0">
+                                <a:latin typeface="Cambria Math" panose="02040503050406030204" pitchFamily="18" charset="0"/>
+                                <a:cs typeface="Arial" panose="020B0604020202020204" pitchFamily="34" charset="0"/>
+                              </a:rPr>
+                            </m:ctrlPr>
+                          </m:sSubPr>
+                          <m:e>
+                            <m:acc>
+                              <m:accPr>
+                                <m:chr m:val="⃗"/>
+                                <m:ctrlPr>
+                                  <a:rPr lang="en-US" sz="2000" b="0" i="1" smtClean="0">
+                                    <a:latin typeface="Cambria Math" panose="02040503050406030204" pitchFamily="18" charset="0"/>
+                                    <a:cs typeface="Arial" panose="020B0604020202020204" pitchFamily="34" charset="0"/>
+                                  </a:rPr>
+                                </m:ctrlPr>
+                              </m:accPr>
+                              <m:e>
+                                <m:r>
+                                  <a:rPr lang="en-US" sz="2000" b="0" i="1" smtClean="0">
+                                    <a:latin typeface="Cambria Math" panose="02040503050406030204" pitchFamily="18" charset="0"/>
+                                    <a:cs typeface="Arial" panose="020B0604020202020204" pitchFamily="34" charset="0"/>
+                                  </a:rPr>
+                                  <m:t>𝑟</m:t>
+                                </m:r>
+                              </m:e>
+                            </m:acc>
+                          </m:e>
+                          <m:sub>
+                            <m:r>
+                              <a:rPr lang="en-US" sz="2000" b="0" i="1" smtClean="0">
+                                <a:latin typeface="Cambria Math" panose="02040503050406030204" pitchFamily="18" charset="0"/>
+                                <a:cs typeface="Arial" panose="020B0604020202020204" pitchFamily="34" charset="0"/>
+                              </a:rPr>
+                              <m:t>𝑀</m:t>
+                            </m:r>
+                          </m:sub>
+                        </m:sSub>
+                      </m:oMath>
+                    </m:oMathPara>
+                  </a14:m>
+                  <a:endParaRPr lang="en-US" sz="2000" dirty="0" smtClean="0">
+                    <a:latin typeface="Arial" panose="020B0604020202020204" pitchFamily="34" charset="0"/>
+                    <a:cs typeface="Arial" panose="020B0604020202020204" pitchFamily="34" charset="0"/>
+                  </a:endParaRPr>
+                </a:p>
+              </p:txBody>
+            </p:sp>
+          </mc:Choice>
+          <mc:Fallback>
+            <p:sp>
+              <p:nvSpPr>
+                <p:cNvPr id="21" name="TextBox 20"/>
+                <p:cNvSpPr txBox="1">
+                  <a:spLocks noRot="1" noChangeAspect="1" noMove="1" noResize="1" noEditPoints="1" noAdjustHandles="1" noChangeArrowheads="1" noChangeShapeType="1" noTextEdit="1"/>
+                </p:cNvSpPr>
+                <p:nvPr/>
+              </p:nvSpPr>
+              <p:spPr>
+                <a:xfrm>
+                  <a:off x="3991554" y="1802355"/>
+                  <a:ext cx="344518" cy="307777"/>
+                </a:xfrm>
+                <a:prstGeom prst="rect">
+                  <a:avLst/>
+                </a:prstGeom>
+                <a:blipFill>
+                  <a:blip r:embed="rId33"/>
+                  <a:stretch>
+                    <a:fillRect l="-15789" t="-33333" r="-56140" b="-19608"/>
+                  </a:stretch>
+                </a:blipFill>
+              </p:spPr>
+              <p:txBody>
+                <a:bodyPr/>
+                <a:lstStyle/>
+                <a:p>
+                  <a:r>
+                    <a:rPr lang="en-US">
+                      <a:noFill/>
+                    </a:rPr>
+                    <a:t> </a:t>
+                  </a:r>
+                </a:p>
+              </p:txBody>
+            </p:sp>
+          </mc:Fallback>
+        </mc:AlternateContent>
+        <mc:AlternateContent xmlns:mc="http://schemas.openxmlformats.org/markup-compatibility/2006">
+          <mc:Choice xmlns:a14="http://schemas.microsoft.com/office/drawing/2010/main" Requires="a14">
+            <p:sp>
+              <p:nvSpPr>
+                <p:cNvPr id="22" name="TextBox 21"/>
+                <p:cNvSpPr txBox="1"/>
+                <p:nvPr/>
+              </p:nvSpPr>
+              <p:spPr>
+                <a:xfrm>
+                  <a:off x="5009537" y="1073335"/>
+                  <a:ext cx="411716" cy="307777"/>
+                </a:xfrm>
+                <a:prstGeom prst="rect">
+                  <a:avLst/>
+                </a:prstGeom>
+                <a:noFill/>
+              </p:spPr>
+              <p:txBody>
+                <a:bodyPr wrap="none" lIns="0" tIns="0" rIns="0" bIns="0" rtlCol="0">
+                  <a:spAutoFit/>
+                </a:bodyPr>
+                <a:lstStyle/>
+                <a:p>
+                  <a14:m>
+                    <m:oMathPara xmlns:m="http://schemas.openxmlformats.org/officeDocument/2006/math">
+                      <m:oMathParaPr>
+                        <m:jc m:val="centerGroup"/>
+                      </m:oMathParaPr>
+                      <m:oMath xmlns:m="http://schemas.openxmlformats.org/officeDocument/2006/math">
+                        <m:sSub>
+                          <m:sSubPr>
+                            <m:ctrlPr>
+                              <a:rPr lang="en-US" sz="2000" b="0" i="1" smtClean="0">
+                                <a:latin typeface="Cambria Math" panose="02040503050406030204" pitchFamily="18" charset="0"/>
+                                <a:cs typeface="Arial" panose="020B0604020202020204" pitchFamily="34" charset="0"/>
+                              </a:rPr>
+                            </m:ctrlPr>
+                          </m:sSubPr>
+                          <m:e>
+                            <m:r>
+                              <a:rPr lang="en-US" sz="2000" b="0" i="1" smtClean="0">
+                                <a:latin typeface="Cambria Math" panose="02040503050406030204" pitchFamily="18" charset="0"/>
+                                <a:cs typeface="Arial" panose="020B0604020202020204" pitchFamily="34" charset="0"/>
+                              </a:rPr>
+                              <m:t>𝑀</m:t>
+                            </m:r>
+                          </m:e>
+                          <m:sub>
+                            <m:r>
+                              <a:rPr lang="en-US" sz="2000" b="0" i="1" smtClean="0">
+                                <a:latin typeface="Cambria Math" panose="02040503050406030204" pitchFamily="18" charset="0"/>
+                                <a:cs typeface="Arial" panose="020B0604020202020204" pitchFamily="34" charset="0"/>
+                              </a:rPr>
+                              <m:t>𝐸</m:t>
+                            </m:r>
+                          </m:sub>
+                        </m:sSub>
+                      </m:oMath>
+                    </m:oMathPara>
+                  </a14:m>
+                  <a:endParaRPr lang="en-US" sz="2000" b="0" dirty="0" smtClean="0">
+                    <a:latin typeface="Arial" panose="020B0604020202020204" pitchFamily="34" charset="0"/>
+                    <a:cs typeface="Arial" panose="020B0604020202020204" pitchFamily="34" charset="0"/>
+                  </a:endParaRPr>
+                </a:p>
+              </p:txBody>
+            </p:sp>
+          </mc:Choice>
+          <mc:Fallback>
+            <p:sp>
+              <p:nvSpPr>
+                <p:cNvPr id="22" name="TextBox 21"/>
+                <p:cNvSpPr txBox="1">
+                  <a:spLocks noRot="1" noChangeAspect="1" noMove="1" noResize="1" noEditPoints="1" noAdjustHandles="1" noChangeArrowheads="1" noChangeShapeType="1" noTextEdit="1"/>
+                </p:cNvSpPr>
+                <p:nvPr/>
+              </p:nvSpPr>
+              <p:spPr>
+                <a:xfrm>
+                  <a:off x="5009537" y="1073335"/>
+                  <a:ext cx="411716" cy="307777"/>
+                </a:xfrm>
+                <a:prstGeom prst="rect">
+                  <a:avLst/>
+                </a:prstGeom>
+                <a:blipFill>
+                  <a:blip r:embed="rId34"/>
+                  <a:stretch>
+                    <a:fillRect l="-11765" r="-4412" b="-20000"/>
+                  </a:stretch>
+                </a:blipFill>
+              </p:spPr>
+              <p:txBody>
+                <a:bodyPr/>
+                <a:lstStyle/>
+                <a:p>
+                  <a:r>
+                    <a:rPr lang="en-US">
+                      <a:noFill/>
+                    </a:rPr>
+                    <a:t> </a:t>
+                  </a:r>
+                </a:p>
+              </p:txBody>
+            </p:sp>
+          </mc:Fallback>
+        </mc:AlternateContent>
+        <mc:AlternateContent xmlns:mc="http://schemas.openxmlformats.org/markup-compatibility/2006">
+          <mc:Choice xmlns:a14="http://schemas.microsoft.com/office/drawing/2010/main" Requires="a14">
+            <p:sp>
+              <p:nvSpPr>
+                <p:cNvPr id="23" name="TextBox 22"/>
+                <p:cNvSpPr txBox="1"/>
+                <p:nvPr/>
+              </p:nvSpPr>
+              <p:spPr>
+                <a:xfrm>
+                  <a:off x="6439851" y="1091190"/>
+                  <a:ext cx="453842" cy="307777"/>
+                </a:xfrm>
+                <a:prstGeom prst="rect">
+                  <a:avLst/>
+                </a:prstGeom>
+                <a:noFill/>
+              </p:spPr>
+              <p:txBody>
+                <a:bodyPr wrap="none" lIns="0" tIns="0" rIns="0" bIns="0" rtlCol="0">
+                  <a:spAutoFit/>
+                </a:bodyPr>
+                <a:lstStyle/>
+                <a:p>
+                  <a14:m>
+                    <m:oMathPara xmlns:m="http://schemas.openxmlformats.org/officeDocument/2006/math">
+                      <m:oMathParaPr>
+                        <m:jc m:val="centerGroup"/>
+                      </m:oMathParaPr>
+                      <m:oMath xmlns:m="http://schemas.openxmlformats.org/officeDocument/2006/math">
+                        <m:sSub>
+                          <m:sSubPr>
+                            <m:ctrlPr>
+                              <a:rPr lang="en-US" sz="2000" b="0" i="1" smtClean="0">
+                                <a:latin typeface="Cambria Math" panose="02040503050406030204" pitchFamily="18" charset="0"/>
+                                <a:cs typeface="Arial" panose="020B0604020202020204" pitchFamily="34" charset="0"/>
+                              </a:rPr>
+                            </m:ctrlPr>
+                          </m:sSubPr>
+                          <m:e>
+                            <m:r>
+                              <a:rPr lang="en-US" sz="2000" b="0" i="1" smtClean="0">
+                                <a:latin typeface="Cambria Math" panose="02040503050406030204" pitchFamily="18" charset="0"/>
+                                <a:cs typeface="Arial" panose="020B0604020202020204" pitchFamily="34" charset="0"/>
+                              </a:rPr>
+                              <m:t>𝑀</m:t>
+                            </m:r>
+                          </m:e>
+                          <m:sub>
+                            <m:r>
+                              <a:rPr lang="en-US" sz="2000" b="0" i="1" smtClean="0">
+                                <a:latin typeface="Cambria Math" panose="02040503050406030204" pitchFamily="18" charset="0"/>
+                                <a:cs typeface="Arial" panose="020B0604020202020204" pitchFamily="34" charset="0"/>
+                              </a:rPr>
+                              <m:t>𝑀</m:t>
+                            </m:r>
+                          </m:sub>
+                        </m:sSub>
+                      </m:oMath>
+                    </m:oMathPara>
+                  </a14:m>
+                  <a:endParaRPr lang="en-US" sz="2000" b="0" dirty="0" smtClean="0">
+                    <a:latin typeface="Arial" panose="020B0604020202020204" pitchFamily="34" charset="0"/>
+                    <a:cs typeface="Arial" panose="020B0604020202020204" pitchFamily="34" charset="0"/>
+                  </a:endParaRPr>
+                </a:p>
+              </p:txBody>
+            </p:sp>
+          </mc:Choice>
+          <mc:Fallback>
+            <p:sp>
+              <p:nvSpPr>
+                <p:cNvPr id="23" name="TextBox 22"/>
+                <p:cNvSpPr txBox="1">
+                  <a:spLocks noRot="1" noChangeAspect="1" noMove="1" noResize="1" noEditPoints="1" noAdjustHandles="1" noChangeArrowheads="1" noChangeShapeType="1" noTextEdit="1"/>
+                </p:cNvSpPr>
+                <p:nvPr/>
+              </p:nvSpPr>
+              <p:spPr>
+                <a:xfrm>
+                  <a:off x="6439851" y="1091190"/>
+                  <a:ext cx="453842" cy="307777"/>
+                </a:xfrm>
+                <a:prstGeom prst="rect">
+                  <a:avLst/>
+                </a:prstGeom>
+                <a:blipFill>
+                  <a:blip r:embed="rId35"/>
+                  <a:stretch>
+                    <a:fillRect l="-12162" r="-4054" b="-20000"/>
+                  </a:stretch>
+                </a:blipFill>
+              </p:spPr>
+              <p:txBody>
+                <a:bodyPr/>
+                <a:lstStyle/>
+                <a:p>
+                  <a:r>
+                    <a:rPr lang="en-US">
+                      <a:noFill/>
+                    </a:rPr>
+                    <a:t> </a:t>
+                  </a:r>
+                </a:p>
+              </p:txBody>
+            </p:sp>
+          </mc:Fallback>
+        </mc:AlternateContent>
+        <mc:AlternateContent xmlns:mc="http://schemas.openxmlformats.org/markup-compatibility/2006">
+          <mc:Choice xmlns:a14="http://schemas.microsoft.com/office/drawing/2010/main" Requires="a14">
+            <p:sp>
+              <p:nvSpPr>
+                <p:cNvPr id="24" name="TextBox 23"/>
+                <p:cNvSpPr txBox="1"/>
+                <p:nvPr/>
+              </p:nvSpPr>
+              <p:spPr>
+                <a:xfrm>
+                  <a:off x="2265632" y="1157475"/>
+                  <a:ext cx="384721" cy="307777"/>
+                </a:xfrm>
+                <a:prstGeom prst="rect">
+                  <a:avLst/>
+                </a:prstGeom>
+                <a:noFill/>
+              </p:spPr>
+              <p:txBody>
+                <a:bodyPr wrap="none" lIns="0" tIns="0" rIns="0" bIns="0" rtlCol="0">
+                  <a:spAutoFit/>
+                </a:bodyPr>
+                <a:lstStyle/>
+                <a:p>
+                  <a14:m>
+                    <m:oMathPara xmlns:m="http://schemas.openxmlformats.org/officeDocument/2006/math">
+                      <m:oMathParaPr>
+                        <m:jc m:val="centerGroup"/>
+                      </m:oMathParaPr>
+                      <m:oMath xmlns:m="http://schemas.openxmlformats.org/officeDocument/2006/math">
+                        <m:sSub>
+                          <m:sSubPr>
+                            <m:ctrlPr>
+                              <a:rPr lang="en-US" sz="2000" b="0" i="1" smtClean="0">
+                                <a:latin typeface="Cambria Math" panose="02040503050406030204" pitchFamily="18" charset="0"/>
+                                <a:cs typeface="Arial" panose="020B0604020202020204" pitchFamily="34" charset="0"/>
+                              </a:rPr>
+                            </m:ctrlPr>
+                          </m:sSubPr>
+                          <m:e>
+                            <m:r>
+                              <a:rPr lang="en-US" sz="2000" b="0" i="1" smtClean="0">
+                                <a:latin typeface="Cambria Math" panose="02040503050406030204" pitchFamily="18" charset="0"/>
+                                <a:cs typeface="Arial" panose="020B0604020202020204" pitchFamily="34" charset="0"/>
+                              </a:rPr>
+                              <m:t>𝑀</m:t>
+                            </m:r>
+                          </m:e>
+                          <m:sub>
+                            <m:r>
+                              <a:rPr lang="en-US" sz="2000" b="0" i="1" smtClean="0">
+                                <a:latin typeface="Cambria Math" panose="02040503050406030204" pitchFamily="18" charset="0"/>
+                                <a:cs typeface="Arial" panose="020B0604020202020204" pitchFamily="34" charset="0"/>
+                              </a:rPr>
+                              <m:t>𝑆</m:t>
+                            </m:r>
+                          </m:sub>
+                        </m:sSub>
+                      </m:oMath>
+                    </m:oMathPara>
+                  </a14:m>
+                  <a:endParaRPr lang="en-US" sz="2000" b="0" dirty="0" smtClean="0">
+                    <a:latin typeface="Arial" panose="020B0604020202020204" pitchFamily="34" charset="0"/>
+                    <a:cs typeface="Arial" panose="020B0604020202020204" pitchFamily="34" charset="0"/>
+                  </a:endParaRPr>
+                </a:p>
+              </p:txBody>
+            </p:sp>
+          </mc:Choice>
+          <mc:Fallback>
+            <p:sp>
+              <p:nvSpPr>
+                <p:cNvPr id="24" name="TextBox 23"/>
+                <p:cNvSpPr txBox="1">
+                  <a:spLocks noRot="1" noChangeAspect="1" noMove="1" noResize="1" noEditPoints="1" noAdjustHandles="1" noChangeArrowheads="1" noChangeShapeType="1" noTextEdit="1"/>
+                </p:cNvSpPr>
+                <p:nvPr/>
+              </p:nvSpPr>
+              <p:spPr>
+                <a:xfrm>
+                  <a:off x="2265632" y="1157475"/>
+                  <a:ext cx="384721" cy="307777"/>
+                </a:xfrm>
+                <a:prstGeom prst="rect">
+                  <a:avLst/>
+                </a:prstGeom>
+                <a:blipFill>
+                  <a:blip r:embed="rId36"/>
+                  <a:stretch>
+                    <a:fillRect l="-12698" r="-6349" b="-19608"/>
+                  </a:stretch>
+                </a:blipFill>
+              </p:spPr>
+              <p:txBody>
+                <a:bodyPr/>
+                <a:lstStyle/>
+                <a:p>
+                  <a:r>
+                    <a:rPr lang="en-US">
+                      <a:noFill/>
+                    </a:rPr>
+                    <a:t> </a:t>
+                  </a:r>
+                </a:p>
+              </p:txBody>
+            </p:sp>
+          </mc:Fallback>
+        </mc:AlternateContent>
+      </p:grpSp>
+      <p:grpSp>
+        <p:nvGrpSpPr>
+          <p:cNvPr id="44" name="Group 43"/>
+          <p:cNvGrpSpPr/>
+          <p:nvPr/>
+        </p:nvGrpSpPr>
+        <p:grpSpPr>
+          <a:xfrm>
+            <a:off x="1179871" y="3313471"/>
+            <a:ext cx="4454013" cy="2477729"/>
+            <a:chOff x="1179871" y="3313471"/>
+            <a:chExt cx="4454013" cy="2477729"/>
+          </a:xfrm>
+        </p:grpSpPr>
+        <p:sp>
+          <p:nvSpPr>
+            <p:cNvPr id="41" name="Rectangle 40"/>
+            <p:cNvSpPr/>
+            <p:nvPr/>
+          </p:nvSpPr>
+          <p:spPr>
+            <a:xfrm>
+              <a:off x="1179871" y="3313471"/>
+              <a:ext cx="4454013" cy="2477729"/>
+            </a:xfrm>
+            <a:prstGeom prst="rect">
+              <a:avLst/>
+            </a:prstGeom>
+            <a:solidFill>
+              <a:schemeClr val="accent1">
+                <a:lumMod val="20000"/>
+                <a:lumOff val="80000"/>
+              </a:schemeClr>
+            </a:solidFill>
+            <a:ln w="38100">
+              <a:noFill/>
+            </a:ln>
+          </p:spPr>
+          <p:style>
+            <a:lnRef idx="2">
+              <a:schemeClr val="accent1">
+                <a:shade val="50000"/>
+              </a:schemeClr>
+            </a:lnRef>
+            <a:fillRef idx="1">
+              <a:schemeClr val="accent1"/>
+            </a:fillRef>
+            <a:effectRef idx="0">
+              <a:schemeClr val="accent1"/>
+            </a:effectRef>
+            <a:fontRef idx="minor">
+              <a:schemeClr val="lt1"/>
+            </a:fontRef>
+          </p:style>
+          <p:txBody>
+            <a:bodyPr rtlCol="0" anchor="ctr"/>
+            <a:lstStyle/>
+            <a:p>
+              <a:pPr algn="ctr"/>
+              <a:endParaRPr lang="en-US"/>
+            </a:p>
+          </p:txBody>
+        </p:sp>
+        <p:sp>
+          <p:nvSpPr>
+            <p:cNvPr id="26" name="Rectangle 25"/>
+            <p:cNvSpPr/>
+            <p:nvPr/>
+          </p:nvSpPr>
+          <p:spPr>
+            <a:xfrm>
+              <a:off x="2241067" y="3480619"/>
+              <a:ext cx="407177" cy="403123"/>
+            </a:xfrm>
+            <a:prstGeom prst="rect">
+              <a:avLst/>
+            </a:prstGeom>
+            <a:solidFill>
+              <a:schemeClr val="accent4">
+                <a:lumMod val="75000"/>
+              </a:schemeClr>
+            </a:solidFill>
+            <a:ln w="38100">
+              <a:solidFill>
+                <a:schemeClr val="accent4">
+                  <a:lumMod val="75000"/>
+                </a:schemeClr>
+              </a:solidFill>
+            </a:ln>
+          </p:spPr>
+          <p:style>
+            <a:lnRef idx="2">
+              <a:schemeClr val="accent1">
+                <a:shade val="50000"/>
+              </a:schemeClr>
+            </a:lnRef>
+            <a:fillRef idx="1">
+              <a:schemeClr val="accent1"/>
+            </a:fillRef>
+            <a:effectRef idx="0">
+              <a:schemeClr val="accent1"/>
+            </a:effectRef>
+            <a:fontRef idx="minor">
+              <a:schemeClr val="lt1"/>
+            </a:fontRef>
+          </p:style>
+          <p:txBody>
+            <a:bodyPr rtlCol="0" anchor="ctr"/>
+            <a:lstStyle/>
+            <a:p>
+              <a:pPr algn="ctr"/>
+              <a:endParaRPr lang="en-US"/>
+            </a:p>
+          </p:txBody>
+        </p:sp>
+        <p:sp>
+          <p:nvSpPr>
+            <p:cNvPr id="27" name="Rectangle 26"/>
+            <p:cNvSpPr/>
+            <p:nvPr/>
+          </p:nvSpPr>
+          <p:spPr>
+            <a:xfrm>
+              <a:off x="4340323" y="5069961"/>
+              <a:ext cx="407177" cy="403123"/>
+            </a:xfrm>
+            <a:prstGeom prst="rect">
+              <a:avLst/>
+            </a:prstGeom>
+            <a:solidFill>
+              <a:schemeClr val="accent4">
+                <a:lumMod val="75000"/>
+              </a:schemeClr>
+            </a:solidFill>
+            <a:ln w="38100">
+              <a:solidFill>
+                <a:schemeClr val="accent4">
+                  <a:lumMod val="75000"/>
+                </a:schemeClr>
+              </a:solidFill>
+            </a:ln>
+          </p:spPr>
+          <p:style>
+            <a:lnRef idx="2">
+              <a:schemeClr val="accent1">
+                <a:shade val="50000"/>
+              </a:schemeClr>
+            </a:lnRef>
+            <a:fillRef idx="1">
+              <a:schemeClr val="accent1"/>
+            </a:fillRef>
+            <a:effectRef idx="0">
+              <a:schemeClr val="accent1"/>
+            </a:effectRef>
+            <a:fontRef idx="minor">
+              <a:schemeClr val="lt1"/>
+            </a:fontRef>
+          </p:style>
+          <p:txBody>
+            <a:bodyPr rtlCol="0" anchor="ctr"/>
+            <a:lstStyle/>
+            <a:p>
+              <a:pPr algn="ctr"/>
+              <a:endParaRPr lang="en-US"/>
+            </a:p>
+          </p:txBody>
+        </p:sp>
+        <p:sp>
+          <p:nvSpPr>
+            <p:cNvPr id="28" name="Rectangle 27"/>
+            <p:cNvSpPr/>
+            <p:nvPr/>
+          </p:nvSpPr>
+          <p:spPr>
+            <a:xfrm>
+              <a:off x="2241068" y="5079794"/>
+              <a:ext cx="407177" cy="403123"/>
+            </a:xfrm>
+            <a:prstGeom prst="rect">
+              <a:avLst/>
+            </a:prstGeom>
+            <a:solidFill>
+              <a:schemeClr val="accent4">
+                <a:lumMod val="75000"/>
+              </a:schemeClr>
+            </a:solidFill>
+            <a:ln w="38100">
+              <a:solidFill>
+                <a:schemeClr val="accent4">
+                  <a:lumMod val="75000"/>
+                </a:schemeClr>
+              </a:solidFill>
+            </a:ln>
+          </p:spPr>
+          <p:style>
+            <a:lnRef idx="2">
+              <a:schemeClr val="accent1">
+                <a:shade val="50000"/>
+              </a:schemeClr>
+            </a:lnRef>
+            <a:fillRef idx="1">
+              <a:schemeClr val="accent1"/>
+            </a:fillRef>
+            <a:effectRef idx="0">
+              <a:schemeClr val="accent1"/>
+            </a:effectRef>
+            <a:fontRef idx="minor">
+              <a:schemeClr val="lt1"/>
+            </a:fontRef>
+          </p:style>
+          <p:txBody>
+            <a:bodyPr rtlCol="0" anchor="ctr"/>
+            <a:lstStyle/>
+            <a:p>
+              <a:pPr algn="ctr"/>
+              <a:endParaRPr lang="en-US"/>
+            </a:p>
+          </p:txBody>
+        </p:sp>
+        <p:cxnSp>
+          <p:nvCxnSpPr>
+            <p:cNvPr id="30" name="Straight Connector 29"/>
+            <p:cNvCxnSpPr>
+              <a:stCxn id="26" idx="2"/>
+              <a:endCxn id="28" idx="0"/>
+            </p:cNvCxnSpPr>
+            <p:nvPr/>
+          </p:nvCxnSpPr>
+          <p:spPr>
+            <a:xfrm>
+              <a:off x="2444656" y="3883742"/>
+              <a:ext cx="1" cy="1196052"/>
+            </a:xfrm>
+            <a:prstGeom prst="line">
+              <a:avLst/>
+            </a:prstGeom>
+            <a:ln w="38100">
+              <a:solidFill>
+                <a:schemeClr val="tx1"/>
+              </a:solidFill>
+            </a:ln>
+          </p:spPr>
+          <p:style>
+            <a:lnRef idx="1">
+              <a:schemeClr val="accent1"/>
+            </a:lnRef>
+            <a:fillRef idx="0">
+              <a:schemeClr val="accent1"/>
+            </a:fillRef>
+            <a:effectRef idx="0">
+              <a:schemeClr val="accent1"/>
+            </a:effectRef>
+            <a:fontRef idx="minor">
+              <a:schemeClr val="tx1"/>
+            </a:fontRef>
+          </p:style>
+        </p:cxnSp>
+        <p:cxnSp>
+          <p:nvCxnSpPr>
+            <p:cNvPr id="31" name="Straight Connector 30"/>
+            <p:cNvCxnSpPr/>
+            <p:nvPr/>
+          </p:nvCxnSpPr>
+          <p:spPr>
+            <a:xfrm>
+              <a:off x="2648245" y="3883742"/>
+              <a:ext cx="1692079" cy="1196051"/>
+            </a:xfrm>
+            <a:prstGeom prst="line">
+              <a:avLst/>
+            </a:prstGeom>
+            <a:ln w="38100">
+              <a:solidFill>
+                <a:schemeClr val="tx1"/>
+              </a:solidFill>
+            </a:ln>
+          </p:spPr>
+          <p:style>
+            <a:lnRef idx="1">
+              <a:schemeClr val="accent1"/>
+            </a:lnRef>
+            <a:fillRef idx="0">
+              <a:schemeClr val="accent1"/>
+            </a:fillRef>
+            <a:effectRef idx="0">
+              <a:schemeClr val="accent1"/>
+            </a:effectRef>
+            <a:fontRef idx="minor">
+              <a:schemeClr val="tx1"/>
+            </a:fontRef>
+          </p:style>
+        </p:cxnSp>
+        <p:cxnSp>
+          <p:nvCxnSpPr>
+            <p:cNvPr id="34" name="Straight Connector 33"/>
+            <p:cNvCxnSpPr>
+              <a:stCxn id="28" idx="3"/>
+              <a:endCxn id="27" idx="1"/>
+            </p:cNvCxnSpPr>
+            <p:nvPr/>
+          </p:nvCxnSpPr>
+          <p:spPr>
+            <a:xfrm flipV="1">
+              <a:off x="2648245" y="5271523"/>
+              <a:ext cx="1692078" cy="9833"/>
+            </a:xfrm>
+            <a:prstGeom prst="line">
+              <a:avLst/>
+            </a:prstGeom>
+            <a:ln w="38100">
+              <a:solidFill>
+                <a:schemeClr val="tx1"/>
+              </a:solidFill>
+            </a:ln>
+          </p:spPr>
+          <p:style>
+            <a:lnRef idx="1">
+              <a:schemeClr val="accent1"/>
+            </a:lnRef>
+            <a:fillRef idx="0">
+              <a:schemeClr val="accent1"/>
+            </a:fillRef>
+            <a:effectRef idx="0">
+              <a:schemeClr val="accent1"/>
+            </a:effectRef>
+            <a:fontRef idx="minor">
+              <a:schemeClr val="tx1"/>
+            </a:fontRef>
+          </p:style>
+        </p:cxnSp>
+        <mc:AlternateContent xmlns:mc="http://schemas.openxmlformats.org/markup-compatibility/2006">
+          <mc:Choice xmlns:a14="http://schemas.microsoft.com/office/drawing/2010/main" Requires="a14">
+            <p:sp>
+              <p:nvSpPr>
+                <p:cNvPr id="38" name="TextBox 37"/>
+                <p:cNvSpPr txBox="1"/>
+                <p:nvPr/>
+              </p:nvSpPr>
+              <p:spPr>
+                <a:xfrm>
+                  <a:off x="2239166" y="5093306"/>
+                  <a:ext cx="408445" cy="307777"/>
+                </a:xfrm>
+                <a:prstGeom prst="rect">
+                  <a:avLst/>
+                </a:prstGeom>
+                <a:noFill/>
+              </p:spPr>
+              <p:txBody>
+                <a:bodyPr wrap="none" lIns="0" tIns="0" rIns="0" bIns="0" rtlCol="0">
+                  <a:spAutoFit/>
+                </a:bodyPr>
+                <a:lstStyle/>
+                <a:p>
+                  <a14:m>
+                    <m:oMathPara xmlns:m="http://schemas.openxmlformats.org/officeDocument/2006/math">
+                      <m:oMathParaPr>
+                        <m:jc m:val="centerGroup"/>
+                      </m:oMathParaPr>
+                      <m:oMath xmlns:m="http://schemas.openxmlformats.org/officeDocument/2006/math">
+                        <m:sSub>
+                          <m:sSubPr>
+                            <m:ctrlPr>
+                              <a:rPr lang="en-US" sz="2000" b="0" i="1" smtClean="0">
+                                <a:latin typeface="Cambria Math" panose="02040503050406030204" pitchFamily="18" charset="0"/>
+                                <a:cs typeface="Arial" panose="020B0604020202020204" pitchFamily="34" charset="0"/>
+                              </a:rPr>
+                            </m:ctrlPr>
+                          </m:sSubPr>
+                          <m:e>
+                            <m:r>
+                              <a:rPr lang="en-US" sz="2000" b="0" i="1" smtClean="0">
+                                <a:latin typeface="Cambria Math" panose="02040503050406030204" pitchFamily="18" charset="0"/>
+                                <a:cs typeface="Arial" panose="020B0604020202020204" pitchFamily="34" charset="0"/>
+                              </a:rPr>
+                              <m:t>𝑚</m:t>
+                            </m:r>
+                          </m:e>
+                          <m:sub>
+                            <m:r>
+                              <a:rPr lang="en-US" sz="2000" b="0" i="1" smtClean="0">
+                                <a:latin typeface="Cambria Math" panose="02040503050406030204" pitchFamily="18" charset="0"/>
+                                <a:cs typeface="Arial" panose="020B0604020202020204" pitchFamily="34" charset="0"/>
+                              </a:rPr>
+                              <m:t>𝐴</m:t>
+                            </m:r>
+                          </m:sub>
+                        </m:sSub>
+                      </m:oMath>
+                    </m:oMathPara>
+                  </a14:m>
+                  <a:endParaRPr lang="en-US" sz="2000" dirty="0" smtClean="0">
+                    <a:latin typeface="Arial" panose="020B0604020202020204" pitchFamily="34" charset="0"/>
+                    <a:cs typeface="Arial" panose="020B0604020202020204" pitchFamily="34" charset="0"/>
+                  </a:endParaRPr>
+                </a:p>
+              </p:txBody>
+            </p:sp>
+          </mc:Choice>
+          <mc:Fallback>
+            <p:sp>
+              <p:nvSpPr>
+                <p:cNvPr id="38" name="TextBox 37"/>
+                <p:cNvSpPr txBox="1">
+                  <a:spLocks noRot="1" noChangeAspect="1" noMove="1" noResize="1" noEditPoints="1" noAdjustHandles="1" noChangeArrowheads="1" noChangeShapeType="1" noTextEdit="1"/>
+                </p:cNvSpPr>
+                <p:nvPr/>
+              </p:nvSpPr>
+              <p:spPr>
+                <a:xfrm>
+                  <a:off x="2239166" y="5093306"/>
+                  <a:ext cx="408445" cy="307777"/>
+                </a:xfrm>
+                <a:prstGeom prst="rect">
+                  <a:avLst/>
+                </a:prstGeom>
+                <a:blipFill>
+                  <a:blip r:embed="rId37"/>
+                  <a:stretch>
+                    <a:fillRect l="-5970" r="-5970" b="-20000"/>
+                  </a:stretch>
+                </a:blipFill>
+              </p:spPr>
+              <p:txBody>
+                <a:bodyPr/>
+                <a:lstStyle/>
+                <a:p>
+                  <a:r>
+                    <a:rPr lang="en-US">
+                      <a:noFill/>
+                    </a:rPr>
+                    <a:t> </a:t>
+                  </a:r>
+                </a:p>
+              </p:txBody>
+            </p:sp>
+          </mc:Fallback>
+        </mc:AlternateContent>
+        <mc:AlternateContent xmlns:mc="http://schemas.openxmlformats.org/markup-compatibility/2006">
+          <mc:Choice xmlns:a14="http://schemas.microsoft.com/office/drawing/2010/main" Requires="a14">
+            <p:sp>
+              <p:nvSpPr>
+                <p:cNvPr id="39" name="TextBox 38"/>
+                <p:cNvSpPr txBox="1"/>
+                <p:nvPr/>
+              </p:nvSpPr>
+              <p:spPr>
+                <a:xfrm>
+                  <a:off x="4339689" y="5069961"/>
+                  <a:ext cx="427618" cy="307777"/>
+                </a:xfrm>
+                <a:prstGeom prst="rect">
+                  <a:avLst/>
+                </a:prstGeom>
+                <a:noFill/>
+              </p:spPr>
+              <p:txBody>
+                <a:bodyPr wrap="none" lIns="0" tIns="0" rIns="0" bIns="0" rtlCol="0">
+                  <a:spAutoFit/>
+                </a:bodyPr>
+                <a:lstStyle/>
+                <a:p>
+                  <a14:m>
+                    <m:oMathPara xmlns:m="http://schemas.openxmlformats.org/officeDocument/2006/math">
+                      <m:oMathParaPr>
+                        <m:jc m:val="centerGroup"/>
+                      </m:oMathParaPr>
+                      <m:oMath xmlns:m="http://schemas.openxmlformats.org/officeDocument/2006/math">
+                        <m:sSub>
+                          <m:sSubPr>
+                            <m:ctrlPr>
+                              <a:rPr lang="en-US" sz="2000" b="0" i="1" smtClean="0">
+                                <a:latin typeface="Cambria Math" panose="02040503050406030204" pitchFamily="18" charset="0"/>
+                                <a:cs typeface="Arial" panose="020B0604020202020204" pitchFamily="34" charset="0"/>
+                              </a:rPr>
+                            </m:ctrlPr>
+                          </m:sSubPr>
+                          <m:e>
+                            <m:r>
+                              <a:rPr lang="en-US" sz="2000" b="0" i="1" smtClean="0">
+                                <a:latin typeface="Cambria Math" panose="02040503050406030204" pitchFamily="18" charset="0"/>
+                                <a:cs typeface="Arial" panose="020B0604020202020204" pitchFamily="34" charset="0"/>
+                              </a:rPr>
+                              <m:t>𝑚</m:t>
+                            </m:r>
+                          </m:e>
+                          <m:sub>
+                            <m:r>
+                              <a:rPr lang="en-US" sz="2000" b="0" i="1" smtClean="0">
+                                <a:latin typeface="Cambria Math" panose="02040503050406030204" pitchFamily="18" charset="0"/>
+                                <a:cs typeface="Arial" panose="020B0604020202020204" pitchFamily="34" charset="0"/>
+                              </a:rPr>
+                              <m:t>𝐵</m:t>
+                            </m:r>
+                          </m:sub>
+                        </m:sSub>
+                      </m:oMath>
+                    </m:oMathPara>
+                  </a14:m>
+                  <a:endParaRPr lang="en-US" sz="2000" dirty="0" smtClean="0">
+                    <a:latin typeface="Arial" panose="020B0604020202020204" pitchFamily="34" charset="0"/>
+                    <a:cs typeface="Arial" panose="020B0604020202020204" pitchFamily="34" charset="0"/>
+                  </a:endParaRPr>
+                </a:p>
+              </p:txBody>
+            </p:sp>
+          </mc:Choice>
+          <mc:Fallback>
+            <p:sp>
+              <p:nvSpPr>
+                <p:cNvPr id="39" name="TextBox 38"/>
+                <p:cNvSpPr txBox="1">
+                  <a:spLocks noRot="1" noChangeAspect="1" noMove="1" noResize="1" noEditPoints="1" noAdjustHandles="1" noChangeArrowheads="1" noChangeShapeType="1" noTextEdit="1"/>
+                </p:cNvSpPr>
+                <p:nvPr/>
+              </p:nvSpPr>
+              <p:spPr>
+                <a:xfrm>
+                  <a:off x="4339689" y="5069961"/>
+                  <a:ext cx="427618" cy="307777"/>
+                </a:xfrm>
+                <a:prstGeom prst="rect">
+                  <a:avLst/>
+                </a:prstGeom>
+                <a:blipFill>
+                  <a:blip r:embed="rId38"/>
+                  <a:stretch>
+                    <a:fillRect l="-7143" r="-2857" b="-20000"/>
+                  </a:stretch>
+                </a:blipFill>
+              </p:spPr>
+              <p:txBody>
+                <a:bodyPr/>
+                <a:lstStyle/>
+                <a:p>
+                  <a:r>
+                    <a:rPr lang="en-US">
+                      <a:noFill/>
+                    </a:rPr>
+                    <a:t> </a:t>
+                  </a:r>
+                </a:p>
+              </p:txBody>
+            </p:sp>
+          </mc:Fallback>
+        </mc:AlternateContent>
+        <mc:AlternateContent xmlns:mc="http://schemas.openxmlformats.org/markup-compatibility/2006">
+          <mc:Choice xmlns:a14="http://schemas.microsoft.com/office/drawing/2010/main" Requires="a14">
+            <p:sp>
+              <p:nvSpPr>
+                <p:cNvPr id="40" name="TextBox 39"/>
+                <p:cNvSpPr txBox="1"/>
+                <p:nvPr/>
+              </p:nvSpPr>
+              <p:spPr>
+                <a:xfrm>
+                  <a:off x="2257365" y="3506070"/>
+                  <a:ext cx="427618" cy="307777"/>
+                </a:xfrm>
+                <a:prstGeom prst="rect">
+                  <a:avLst/>
+                </a:prstGeom>
+                <a:noFill/>
+              </p:spPr>
+              <p:txBody>
+                <a:bodyPr wrap="none" lIns="0" tIns="0" rIns="0" bIns="0" rtlCol="0">
+                  <a:spAutoFit/>
+                </a:bodyPr>
+                <a:lstStyle/>
+                <a:p>
+                  <a14:m>
+                    <m:oMathPara xmlns:m="http://schemas.openxmlformats.org/officeDocument/2006/math">
+                      <m:oMathParaPr>
+                        <m:jc m:val="centerGroup"/>
+                      </m:oMathParaPr>
+                      <m:oMath xmlns:m="http://schemas.openxmlformats.org/officeDocument/2006/math">
+                        <m:sSub>
+                          <m:sSubPr>
+                            <m:ctrlPr>
+                              <a:rPr lang="en-US" sz="2000" b="0" i="1" smtClean="0">
+                                <a:latin typeface="Cambria Math" panose="02040503050406030204" pitchFamily="18" charset="0"/>
+                                <a:cs typeface="Arial" panose="020B0604020202020204" pitchFamily="34" charset="0"/>
+                              </a:rPr>
+                            </m:ctrlPr>
+                          </m:sSubPr>
+                          <m:e>
+                            <m:r>
+                              <a:rPr lang="en-US" sz="2000" b="0" i="1" smtClean="0">
+                                <a:latin typeface="Cambria Math" panose="02040503050406030204" pitchFamily="18" charset="0"/>
+                                <a:cs typeface="Arial" panose="020B0604020202020204" pitchFamily="34" charset="0"/>
+                              </a:rPr>
+                              <m:t>𝑚</m:t>
+                            </m:r>
+                          </m:e>
+                          <m:sub>
+                            <m:r>
+                              <a:rPr lang="en-US" sz="2000" b="0" i="1" smtClean="0">
+                                <a:latin typeface="Cambria Math" panose="02040503050406030204" pitchFamily="18" charset="0"/>
+                                <a:cs typeface="Arial" panose="020B0604020202020204" pitchFamily="34" charset="0"/>
+                              </a:rPr>
+                              <m:t>𝐶</m:t>
+                            </m:r>
+                          </m:sub>
+                        </m:sSub>
+                      </m:oMath>
+                    </m:oMathPara>
+                  </a14:m>
+                  <a:endParaRPr lang="en-US" sz="2000" dirty="0" smtClean="0">
+                    <a:latin typeface="Arial" panose="020B0604020202020204" pitchFamily="34" charset="0"/>
+                    <a:cs typeface="Arial" panose="020B0604020202020204" pitchFamily="34" charset="0"/>
+                  </a:endParaRPr>
+                </a:p>
+              </p:txBody>
+            </p:sp>
+          </mc:Choice>
+          <mc:Fallback>
+            <p:sp>
+              <p:nvSpPr>
+                <p:cNvPr id="40" name="TextBox 39"/>
+                <p:cNvSpPr txBox="1">
+                  <a:spLocks noRot="1" noChangeAspect="1" noMove="1" noResize="1" noEditPoints="1" noAdjustHandles="1" noChangeArrowheads="1" noChangeShapeType="1" noTextEdit="1"/>
+                </p:cNvSpPr>
+                <p:nvPr/>
+              </p:nvSpPr>
+              <p:spPr>
+                <a:xfrm>
+                  <a:off x="2257365" y="3506070"/>
+                  <a:ext cx="427618" cy="307777"/>
+                </a:xfrm>
+                <a:prstGeom prst="rect">
+                  <a:avLst/>
+                </a:prstGeom>
+                <a:blipFill>
+                  <a:blip r:embed="rId39"/>
+                  <a:stretch>
+                    <a:fillRect l="-4286" r="-2857" b="-19608"/>
+                  </a:stretch>
+                </a:blipFill>
+              </p:spPr>
+              <p:txBody>
+                <a:bodyPr/>
+                <a:lstStyle/>
+                <a:p>
+                  <a:r>
+                    <a:rPr lang="en-US">
+                      <a:noFill/>
+                    </a:rPr>
+                    <a:t> </a:t>
+                  </a:r>
+                </a:p>
+              </p:txBody>
+            </p:sp>
+          </mc:Fallback>
+        </mc:AlternateContent>
+        <mc:AlternateContent xmlns:mc="http://schemas.openxmlformats.org/markup-compatibility/2006">
+          <mc:Choice xmlns:a14="http://schemas.microsoft.com/office/drawing/2010/main" Requires="a14">
+            <p:sp>
+              <p:nvSpPr>
+                <p:cNvPr id="42" name="TextBox 41"/>
+                <p:cNvSpPr txBox="1"/>
+                <p:nvPr/>
+              </p:nvSpPr>
+              <p:spPr>
+                <a:xfrm>
+                  <a:off x="1833738" y="4301854"/>
+                  <a:ext cx="407483" cy="307777"/>
+                </a:xfrm>
+                <a:prstGeom prst="rect">
+                  <a:avLst/>
+                </a:prstGeom>
+                <a:noFill/>
+              </p:spPr>
+              <p:txBody>
+                <a:bodyPr wrap="none" lIns="0" tIns="0" rIns="0" bIns="0" rtlCol="0">
+                  <a:spAutoFit/>
+                </a:bodyPr>
+                <a:lstStyle/>
+                <a:p>
+                  <a14:m>
+                    <m:oMathPara xmlns:m="http://schemas.openxmlformats.org/officeDocument/2006/math">
+                      <m:oMathParaPr>
+                        <m:jc m:val="centerGroup"/>
+                      </m:oMathParaPr>
+                      <m:oMath xmlns:m="http://schemas.openxmlformats.org/officeDocument/2006/math">
+                        <m:sSub>
+                          <m:sSubPr>
+                            <m:ctrlPr>
+                              <a:rPr lang="en-US" sz="2000" b="0" i="1" smtClean="0">
+                                <a:latin typeface="Cambria Math" panose="02040503050406030204" pitchFamily="18" charset="0"/>
+                                <a:cs typeface="Arial" panose="020B0604020202020204" pitchFamily="34" charset="0"/>
+                              </a:rPr>
+                            </m:ctrlPr>
+                          </m:sSubPr>
+                          <m:e>
+                            <m:r>
+                              <a:rPr lang="en-US" sz="2000" b="0" i="1" smtClean="0">
+                                <a:latin typeface="Cambria Math" panose="02040503050406030204" pitchFamily="18" charset="0"/>
+                                <a:cs typeface="Arial" panose="020B0604020202020204" pitchFamily="34" charset="0"/>
+                              </a:rPr>
+                              <m:t>𝑟</m:t>
+                            </m:r>
+                          </m:e>
+                          <m:sub>
+                            <m:r>
+                              <a:rPr lang="en-US" sz="2000" b="0" i="1" smtClean="0">
+                                <a:latin typeface="Cambria Math" panose="02040503050406030204" pitchFamily="18" charset="0"/>
+                                <a:cs typeface="Arial" panose="020B0604020202020204" pitchFamily="34" charset="0"/>
+                              </a:rPr>
+                              <m:t>𝐴𝐶</m:t>
+                            </m:r>
+                          </m:sub>
+                        </m:sSub>
+                      </m:oMath>
+                    </m:oMathPara>
+                  </a14:m>
+                  <a:endParaRPr lang="en-US" sz="2000" dirty="0" smtClean="0">
+                    <a:latin typeface="Arial" panose="020B0604020202020204" pitchFamily="34" charset="0"/>
+                    <a:cs typeface="Arial" panose="020B0604020202020204" pitchFamily="34" charset="0"/>
+                  </a:endParaRPr>
+                </a:p>
+              </p:txBody>
+            </p:sp>
+          </mc:Choice>
+          <mc:Fallback>
+            <p:sp>
+              <p:nvSpPr>
+                <p:cNvPr id="42" name="TextBox 41"/>
+                <p:cNvSpPr txBox="1">
+                  <a:spLocks noRot="1" noChangeAspect="1" noMove="1" noResize="1" noEditPoints="1" noAdjustHandles="1" noChangeArrowheads="1" noChangeShapeType="1" noTextEdit="1"/>
+                </p:cNvSpPr>
+                <p:nvPr/>
+              </p:nvSpPr>
+              <p:spPr>
+                <a:xfrm>
+                  <a:off x="1833738" y="4301854"/>
+                  <a:ext cx="407483" cy="307777"/>
+                </a:xfrm>
+                <a:prstGeom prst="rect">
+                  <a:avLst/>
+                </a:prstGeom>
+                <a:blipFill>
+                  <a:blip r:embed="rId40"/>
+                  <a:stretch>
+                    <a:fillRect l="-7463" r="-2985" b="-20000"/>
+                  </a:stretch>
+                </a:blipFill>
+              </p:spPr>
+              <p:txBody>
+                <a:bodyPr/>
+                <a:lstStyle/>
+                <a:p>
+                  <a:r>
+                    <a:rPr lang="en-US">
+                      <a:noFill/>
+                    </a:rPr>
+                    <a:t> </a:t>
+                  </a:r>
+                </a:p>
+              </p:txBody>
+            </p:sp>
+          </mc:Fallback>
+        </mc:AlternateContent>
+        <mc:AlternateContent xmlns:mc="http://schemas.openxmlformats.org/markup-compatibility/2006">
+          <mc:Choice xmlns:a14="http://schemas.microsoft.com/office/drawing/2010/main" Requires="a14">
+            <p:sp>
+              <p:nvSpPr>
+                <p:cNvPr id="43" name="TextBox 42"/>
+                <p:cNvSpPr txBox="1"/>
+                <p:nvPr/>
+              </p:nvSpPr>
+              <p:spPr>
+                <a:xfrm>
+                  <a:off x="3299423" y="5319195"/>
+                  <a:ext cx="417101" cy="307777"/>
+                </a:xfrm>
+                <a:prstGeom prst="rect">
+                  <a:avLst/>
+                </a:prstGeom>
+                <a:noFill/>
+              </p:spPr>
+              <p:txBody>
+                <a:bodyPr wrap="none" lIns="0" tIns="0" rIns="0" bIns="0" rtlCol="0">
+                  <a:spAutoFit/>
+                </a:bodyPr>
+                <a:lstStyle/>
+                <a:p>
+                  <a14:m>
+                    <m:oMathPara xmlns:m="http://schemas.openxmlformats.org/officeDocument/2006/math">
+                      <m:oMathParaPr>
+                        <m:jc m:val="centerGroup"/>
+                      </m:oMathParaPr>
+                      <m:oMath xmlns:m="http://schemas.openxmlformats.org/officeDocument/2006/math">
+                        <m:sSub>
+                          <m:sSubPr>
+                            <m:ctrlPr>
+                              <a:rPr lang="en-US" sz="2000" b="0" i="1" smtClean="0">
+                                <a:latin typeface="Cambria Math" panose="02040503050406030204" pitchFamily="18" charset="0"/>
+                                <a:cs typeface="Arial" panose="020B0604020202020204" pitchFamily="34" charset="0"/>
+                              </a:rPr>
+                            </m:ctrlPr>
+                          </m:sSubPr>
+                          <m:e>
+                            <m:r>
+                              <a:rPr lang="en-US" sz="2000" b="0" i="1" smtClean="0">
+                                <a:latin typeface="Cambria Math" panose="02040503050406030204" pitchFamily="18" charset="0"/>
+                                <a:cs typeface="Arial" panose="020B0604020202020204" pitchFamily="34" charset="0"/>
+                              </a:rPr>
+                              <m:t>𝑟</m:t>
+                            </m:r>
+                          </m:e>
+                          <m:sub>
+                            <m:r>
+                              <a:rPr lang="en-US" sz="2000" b="0" i="1" smtClean="0">
+                                <a:latin typeface="Cambria Math" panose="02040503050406030204" pitchFamily="18" charset="0"/>
+                                <a:cs typeface="Arial" panose="020B0604020202020204" pitchFamily="34" charset="0"/>
+                              </a:rPr>
+                              <m:t>𝐴𝐵</m:t>
+                            </m:r>
+                          </m:sub>
+                        </m:sSub>
+                      </m:oMath>
+                    </m:oMathPara>
+                  </a14:m>
+                  <a:endParaRPr lang="en-US" sz="2000" dirty="0" smtClean="0">
+                    <a:latin typeface="Arial" panose="020B0604020202020204" pitchFamily="34" charset="0"/>
+                    <a:cs typeface="Arial" panose="020B0604020202020204" pitchFamily="34" charset="0"/>
+                  </a:endParaRPr>
+                </a:p>
+              </p:txBody>
+            </p:sp>
+          </mc:Choice>
+          <mc:Fallback>
+            <p:sp>
+              <p:nvSpPr>
+                <p:cNvPr id="43" name="TextBox 42"/>
+                <p:cNvSpPr txBox="1">
+                  <a:spLocks noRot="1" noChangeAspect="1" noMove="1" noResize="1" noEditPoints="1" noAdjustHandles="1" noChangeArrowheads="1" noChangeShapeType="1" noTextEdit="1"/>
+                </p:cNvSpPr>
+                <p:nvPr/>
+              </p:nvSpPr>
+              <p:spPr>
+                <a:xfrm>
+                  <a:off x="3299423" y="5319195"/>
+                  <a:ext cx="417101" cy="307777"/>
+                </a:xfrm>
+                <a:prstGeom prst="rect">
+                  <a:avLst/>
+                </a:prstGeom>
+                <a:blipFill>
+                  <a:blip r:embed="rId41"/>
+                  <a:stretch>
+                    <a:fillRect l="-5797" r="-4348" b="-20000"/>
+                  </a:stretch>
+                </a:blipFill>
+              </p:spPr>
+              <p:txBody>
+                <a:bodyPr/>
+                <a:lstStyle/>
+                <a:p>
+                  <a:r>
+                    <a:rPr lang="en-US">
+                      <a:noFill/>
+                    </a:rPr>
+                    <a:t> </a:t>
+                  </a:r>
+                </a:p>
+              </p:txBody>
+            </p:sp>
+          </mc:Fallback>
+        </mc:AlternateContent>
+      </p:grpSp>
+    </p:spTree>
+    <p:extLst>
+      <p:ext uri="{BB962C8B-B14F-4D97-AF65-F5344CB8AC3E}">
+        <p14:creationId xmlns:p14="http://schemas.microsoft.com/office/powerpoint/2010/main" val="2935055830"/>
       </p:ext>
     </p:extLst>
   </p:cSld>

</xml_diff>

<commit_message>
Momentum and CM narrative done
- I still need to review it
- Many figures need improvement!
</commit_message>
<xml_diff>
--- a/tex/figures/MomentumAndCM/Figures.pptx
+++ b/tex/figures/MomentumAndCM/Figures.pptx
@@ -12,6 +12,7 @@
     <p:sldId id="275" r:id="rId6"/>
     <p:sldId id="276" r:id="rId7"/>
     <p:sldId id="277" r:id="rId8"/>
+    <p:sldId id="278" r:id="rId9"/>
   </p:sldIdLst>
   <p:sldSz cx="12192000" cy="6858000"/>
   <p:notesSz cx="6858000" cy="9144000"/>
@@ -20512,8 +20513,8 @@
             </a:fontRef>
           </p:style>
         </p:cxnSp>
-        <mc:AlternateContent xmlns:mc="http://schemas.openxmlformats.org/markup-compatibility/2006">
-          <mc:Choice xmlns:a14="http://schemas.microsoft.com/office/drawing/2010/main" Requires="a14">
+        <mc:AlternateContent xmlns:mc="http://schemas.openxmlformats.org/markup-compatibility/2006" xmlns:a14="http://schemas.microsoft.com/office/drawing/2010/main">
+          <mc:Choice Requires="a14">
             <p:sp>
               <p:nvSpPr>
                 <p:cNvPr id="20" name="TextBox 19"/>
@@ -20536,6 +20537,7 @@
                 </a:bodyPr>
                 <a:lstStyle/>
                 <a:p>
+                  <a:pPr/>
                   <a14:m>
                     <m:oMathPara xmlns:m="http://schemas.openxmlformats.org/officeDocument/2006/math">
                       <m:oMathParaPr>
@@ -20594,7 +20596,7 @@
               </p:txBody>
             </p:sp>
           </mc:Choice>
-          <mc:Fallback>
+          <mc:Fallback xmlns="">
             <p:sp>
               <p:nvSpPr>
                 <p:cNvPr id="20" name="TextBox 19"/>
@@ -20633,8 +20635,8 @@
             </p:sp>
           </mc:Fallback>
         </mc:AlternateContent>
-        <mc:AlternateContent xmlns:mc="http://schemas.openxmlformats.org/markup-compatibility/2006">
-          <mc:Choice xmlns:a14="http://schemas.microsoft.com/office/drawing/2010/main" Requires="a14">
+        <mc:AlternateContent xmlns:mc="http://schemas.openxmlformats.org/markup-compatibility/2006" xmlns:a14="http://schemas.microsoft.com/office/drawing/2010/main">
+          <mc:Choice Requires="a14">
             <p:sp>
               <p:nvSpPr>
                 <p:cNvPr id="21" name="TextBox 20"/>
@@ -20657,6 +20659,7 @@
                 </a:bodyPr>
                 <a:lstStyle/>
                 <a:p>
+                  <a:pPr/>
                   <a14:m>
                     <m:oMathPara xmlns:m="http://schemas.openxmlformats.org/officeDocument/2006/math">
                       <m:oMathParaPr>
@@ -20715,7 +20718,7 @@
               </p:txBody>
             </p:sp>
           </mc:Choice>
-          <mc:Fallback>
+          <mc:Fallback xmlns="">
             <p:sp>
               <p:nvSpPr>
                 <p:cNvPr id="21" name="TextBox 20"/>
@@ -20754,8 +20757,8 @@
             </p:sp>
           </mc:Fallback>
         </mc:AlternateContent>
-        <mc:AlternateContent xmlns:mc="http://schemas.openxmlformats.org/markup-compatibility/2006">
-          <mc:Choice xmlns:a14="http://schemas.microsoft.com/office/drawing/2010/main" Requires="a14">
+        <mc:AlternateContent xmlns:mc="http://schemas.openxmlformats.org/markup-compatibility/2006" xmlns:a14="http://schemas.microsoft.com/office/drawing/2010/main">
+          <mc:Choice Requires="a14">
             <p:sp>
               <p:nvSpPr>
                 <p:cNvPr id="22" name="TextBox 21"/>
@@ -20778,6 +20781,7 @@
                 </a:bodyPr>
                 <a:lstStyle/>
                 <a:p>
+                  <a:pPr/>
                   <a14:m>
                     <m:oMathPara xmlns:m="http://schemas.openxmlformats.org/officeDocument/2006/math">
                       <m:oMathParaPr>
@@ -20823,7 +20827,7 @@
               </p:txBody>
             </p:sp>
           </mc:Choice>
-          <mc:Fallback>
+          <mc:Fallback xmlns="">
             <p:sp>
               <p:nvSpPr>
                 <p:cNvPr id="22" name="TextBox 21"/>
@@ -20862,8 +20866,8 @@
             </p:sp>
           </mc:Fallback>
         </mc:AlternateContent>
-        <mc:AlternateContent xmlns:mc="http://schemas.openxmlformats.org/markup-compatibility/2006">
-          <mc:Choice xmlns:a14="http://schemas.microsoft.com/office/drawing/2010/main" Requires="a14">
+        <mc:AlternateContent xmlns:mc="http://schemas.openxmlformats.org/markup-compatibility/2006" xmlns:a14="http://schemas.microsoft.com/office/drawing/2010/main">
+          <mc:Choice Requires="a14">
             <p:sp>
               <p:nvSpPr>
                 <p:cNvPr id="23" name="TextBox 22"/>
@@ -20886,6 +20890,7 @@
                 </a:bodyPr>
                 <a:lstStyle/>
                 <a:p>
+                  <a:pPr/>
                   <a14:m>
                     <m:oMathPara xmlns:m="http://schemas.openxmlformats.org/officeDocument/2006/math">
                       <m:oMathParaPr>
@@ -20931,7 +20936,7 @@
               </p:txBody>
             </p:sp>
           </mc:Choice>
-          <mc:Fallback>
+          <mc:Fallback xmlns="">
             <p:sp>
               <p:nvSpPr>
                 <p:cNvPr id="23" name="TextBox 22"/>
@@ -20970,8 +20975,8 @@
             </p:sp>
           </mc:Fallback>
         </mc:AlternateContent>
-        <mc:AlternateContent xmlns:mc="http://schemas.openxmlformats.org/markup-compatibility/2006">
-          <mc:Choice xmlns:a14="http://schemas.microsoft.com/office/drawing/2010/main" Requires="a14">
+        <mc:AlternateContent xmlns:mc="http://schemas.openxmlformats.org/markup-compatibility/2006" xmlns:a14="http://schemas.microsoft.com/office/drawing/2010/main">
+          <mc:Choice Requires="a14">
             <p:sp>
               <p:nvSpPr>
                 <p:cNvPr id="24" name="TextBox 23"/>
@@ -20994,6 +20999,7 @@
                 </a:bodyPr>
                 <a:lstStyle/>
                 <a:p>
+                  <a:pPr/>
                   <a14:m>
                     <m:oMathPara xmlns:m="http://schemas.openxmlformats.org/officeDocument/2006/math">
                       <m:oMathParaPr>
@@ -21039,7 +21045,7 @@
               </p:txBody>
             </p:sp>
           </mc:Choice>
-          <mc:Fallback>
+          <mc:Fallback xmlns="">
             <p:sp>
               <p:nvSpPr>
                 <p:cNvPr id="24" name="TextBox 23"/>
@@ -21409,8 +21415,8 @@
             </a:fontRef>
           </p:style>
         </p:cxnSp>
-        <mc:AlternateContent xmlns:mc="http://schemas.openxmlformats.org/markup-compatibility/2006">
-          <mc:Choice xmlns:a14="http://schemas.microsoft.com/office/drawing/2010/main" Requires="a14">
+        <mc:AlternateContent xmlns:mc="http://schemas.openxmlformats.org/markup-compatibility/2006" xmlns:a14="http://schemas.microsoft.com/office/drawing/2010/main">
+          <mc:Choice Requires="a14">
             <p:sp>
               <p:nvSpPr>
                 <p:cNvPr id="38" name="TextBox 37"/>
@@ -21433,6 +21439,7 @@
                 </a:bodyPr>
                 <a:lstStyle/>
                 <a:p>
+                  <a:pPr/>
                   <a14:m>
                     <m:oMathPara xmlns:m="http://schemas.openxmlformats.org/officeDocument/2006/math">
                       <m:oMathParaPr>
@@ -21478,7 +21485,7 @@
               </p:txBody>
             </p:sp>
           </mc:Choice>
-          <mc:Fallback>
+          <mc:Fallback xmlns="">
             <p:sp>
               <p:nvSpPr>
                 <p:cNvPr id="38" name="TextBox 37"/>
@@ -21517,8 +21524,8 @@
             </p:sp>
           </mc:Fallback>
         </mc:AlternateContent>
-        <mc:AlternateContent xmlns:mc="http://schemas.openxmlformats.org/markup-compatibility/2006">
-          <mc:Choice xmlns:a14="http://schemas.microsoft.com/office/drawing/2010/main" Requires="a14">
+        <mc:AlternateContent xmlns:mc="http://schemas.openxmlformats.org/markup-compatibility/2006" xmlns:a14="http://schemas.microsoft.com/office/drawing/2010/main">
+          <mc:Choice Requires="a14">
             <p:sp>
               <p:nvSpPr>
                 <p:cNvPr id="39" name="TextBox 38"/>
@@ -21541,6 +21548,7 @@
                 </a:bodyPr>
                 <a:lstStyle/>
                 <a:p>
+                  <a:pPr/>
                   <a14:m>
                     <m:oMathPara xmlns:m="http://schemas.openxmlformats.org/officeDocument/2006/math">
                       <m:oMathParaPr>
@@ -21586,7 +21594,7 @@
               </p:txBody>
             </p:sp>
           </mc:Choice>
-          <mc:Fallback>
+          <mc:Fallback xmlns="">
             <p:sp>
               <p:nvSpPr>
                 <p:cNvPr id="39" name="TextBox 38"/>
@@ -21625,8 +21633,8 @@
             </p:sp>
           </mc:Fallback>
         </mc:AlternateContent>
-        <mc:AlternateContent xmlns:mc="http://schemas.openxmlformats.org/markup-compatibility/2006">
-          <mc:Choice xmlns:a14="http://schemas.microsoft.com/office/drawing/2010/main" Requires="a14">
+        <mc:AlternateContent xmlns:mc="http://schemas.openxmlformats.org/markup-compatibility/2006" xmlns:a14="http://schemas.microsoft.com/office/drawing/2010/main">
+          <mc:Choice Requires="a14">
             <p:sp>
               <p:nvSpPr>
                 <p:cNvPr id="40" name="TextBox 39"/>
@@ -21649,6 +21657,7 @@
                 </a:bodyPr>
                 <a:lstStyle/>
                 <a:p>
+                  <a:pPr/>
                   <a14:m>
                     <m:oMathPara xmlns:m="http://schemas.openxmlformats.org/officeDocument/2006/math">
                       <m:oMathParaPr>
@@ -21694,7 +21703,7 @@
               </p:txBody>
             </p:sp>
           </mc:Choice>
-          <mc:Fallback>
+          <mc:Fallback xmlns="">
             <p:sp>
               <p:nvSpPr>
                 <p:cNvPr id="40" name="TextBox 39"/>
@@ -21733,8 +21742,8 @@
             </p:sp>
           </mc:Fallback>
         </mc:AlternateContent>
-        <mc:AlternateContent xmlns:mc="http://schemas.openxmlformats.org/markup-compatibility/2006">
-          <mc:Choice xmlns:a14="http://schemas.microsoft.com/office/drawing/2010/main" Requires="a14">
+        <mc:AlternateContent xmlns:mc="http://schemas.openxmlformats.org/markup-compatibility/2006" xmlns:a14="http://schemas.microsoft.com/office/drawing/2010/main">
+          <mc:Choice Requires="a14">
             <p:sp>
               <p:nvSpPr>
                 <p:cNvPr id="42" name="TextBox 41"/>
@@ -21757,6 +21766,7 @@
                 </a:bodyPr>
                 <a:lstStyle/>
                 <a:p>
+                  <a:pPr/>
                   <a14:m>
                     <m:oMathPara xmlns:m="http://schemas.openxmlformats.org/officeDocument/2006/math">
                       <m:oMathParaPr>
@@ -21802,7 +21812,7 @@
               </p:txBody>
             </p:sp>
           </mc:Choice>
-          <mc:Fallback>
+          <mc:Fallback xmlns="">
             <p:sp>
               <p:nvSpPr>
                 <p:cNvPr id="42" name="TextBox 41"/>
@@ -21841,8 +21851,8 @@
             </p:sp>
           </mc:Fallback>
         </mc:AlternateContent>
-        <mc:AlternateContent xmlns:mc="http://schemas.openxmlformats.org/markup-compatibility/2006">
-          <mc:Choice xmlns:a14="http://schemas.microsoft.com/office/drawing/2010/main" Requires="a14">
+        <mc:AlternateContent xmlns:mc="http://schemas.openxmlformats.org/markup-compatibility/2006" xmlns:a14="http://schemas.microsoft.com/office/drawing/2010/main">
+          <mc:Choice Requires="a14">
             <p:sp>
               <p:nvSpPr>
                 <p:cNvPr id="43" name="TextBox 42"/>
@@ -21865,6 +21875,7 @@
                 </a:bodyPr>
                 <a:lstStyle/>
                 <a:p>
+                  <a:pPr/>
                   <a14:m>
                     <m:oMathPara xmlns:m="http://schemas.openxmlformats.org/officeDocument/2006/math">
                       <m:oMathParaPr>
@@ -21910,7 +21921,7 @@
               </p:txBody>
             </p:sp>
           </mc:Choice>
-          <mc:Fallback>
+          <mc:Fallback xmlns="">
             <p:sp>
               <p:nvSpPr>
                 <p:cNvPr id="43" name="TextBox 42"/>
@@ -21950,10 +21961,3205 @@
           </mc:Fallback>
         </mc:AlternateContent>
       </p:grpSp>
+      <p:grpSp>
+        <p:nvGrpSpPr>
+          <p:cNvPr id="91" name="Group 90"/>
+          <p:cNvGrpSpPr/>
+          <p:nvPr/>
+        </p:nvGrpSpPr>
+        <p:grpSpPr>
+          <a:xfrm>
+            <a:off x="7195931" y="2382194"/>
+            <a:ext cx="4031829" cy="1403143"/>
+            <a:chOff x="7195931" y="2382194"/>
+            <a:chExt cx="4031829" cy="1403143"/>
+          </a:xfrm>
+        </p:grpSpPr>
+        <p:grpSp>
+          <p:nvGrpSpPr>
+            <p:cNvPr id="84" name="Group 83"/>
+            <p:cNvGrpSpPr/>
+            <p:nvPr/>
+          </p:nvGrpSpPr>
+          <p:grpSpPr>
+            <a:xfrm>
+              <a:off x="7195931" y="2382194"/>
+              <a:ext cx="4031829" cy="1403143"/>
+              <a:chOff x="7195931" y="2382194"/>
+              <a:chExt cx="4031829" cy="1403143"/>
+            </a:xfrm>
+          </p:grpSpPr>
+          <p:grpSp>
+            <p:nvGrpSpPr>
+              <p:cNvPr id="32" name="Group 31"/>
+              <p:cNvGrpSpPr/>
+              <p:nvPr/>
+            </p:nvGrpSpPr>
+            <p:grpSpPr>
+              <a:xfrm>
+                <a:off x="7195931" y="3226803"/>
+                <a:ext cx="4031829" cy="558534"/>
+                <a:chOff x="919312" y="3331012"/>
+                <a:chExt cx="4031829" cy="558534"/>
+              </a:xfrm>
+            </p:grpSpPr>
+            <p:cxnSp>
+              <p:nvCxnSpPr>
+                <p:cNvPr id="33" name="Straight Arrow Connector 32"/>
+                <p:cNvCxnSpPr/>
+                <p:nvPr/>
+              </p:nvCxnSpPr>
+              <p:spPr>
+                <a:xfrm flipV="1">
+                  <a:off x="1025912" y="3438955"/>
+                  <a:ext cx="3925229" cy="1"/>
+                </a:xfrm>
+                <a:prstGeom prst="straightConnector1">
+                  <a:avLst/>
+                </a:prstGeom>
+                <a:ln w="38100">
+                  <a:solidFill>
+                    <a:schemeClr val="tx1"/>
+                  </a:solidFill>
+                  <a:tailEnd type="triangle"/>
+                </a:ln>
+              </p:spPr>
+              <p:style>
+                <a:lnRef idx="1">
+                  <a:schemeClr val="accent1"/>
+                </a:lnRef>
+                <a:fillRef idx="0">
+                  <a:schemeClr val="accent1"/>
+                </a:fillRef>
+                <a:effectRef idx="0">
+                  <a:schemeClr val="accent1"/>
+                </a:effectRef>
+                <a:fontRef idx="minor">
+                  <a:schemeClr val="tx1"/>
+                </a:fontRef>
+              </p:style>
+            </p:cxnSp>
+            <mc:AlternateContent xmlns:mc="http://schemas.openxmlformats.org/markup-compatibility/2006" xmlns:a14="http://schemas.microsoft.com/office/drawing/2010/main">
+              <mc:Choice Requires="a14">
+                <p:sp>
+                  <p:nvSpPr>
+                    <p:cNvPr id="35" name="Rectangle 34"/>
+                    <p:cNvSpPr/>
+                    <p:nvPr/>
+                  </p:nvSpPr>
+                  <p:spPr>
+                    <a:xfrm>
+                      <a:off x="4404738" y="3438955"/>
+                      <a:ext cx="367985" cy="369332"/>
+                    </a:xfrm>
+                    <a:prstGeom prst="rect">
+                      <a:avLst/>
+                    </a:prstGeom>
+                  </p:spPr>
+                  <p:txBody>
+                    <a:bodyPr wrap="square">
+                      <a:spAutoFit/>
+                    </a:bodyPr>
+                    <a:lstStyle/>
+                    <a:p>
+                      <a:pPr/>
+                      <a14:m>
+                        <m:oMathPara xmlns:m="http://schemas.openxmlformats.org/officeDocument/2006/math">
+                          <m:oMathParaPr>
+                            <m:jc m:val="centerGroup"/>
+                          </m:oMathParaPr>
+                          <m:oMath xmlns:m="http://schemas.openxmlformats.org/officeDocument/2006/math">
+                            <m:r>
+                              <a:rPr lang="en-US" i="1">
+                                <a:latin typeface="Cambria Math" panose="02040503050406030204" pitchFamily="18" charset="0"/>
+                                <a:cs typeface="Arial" panose="020B0604020202020204" pitchFamily="34" charset="0"/>
+                              </a:rPr>
+                              <m:t>𝑥</m:t>
+                            </m:r>
+                          </m:oMath>
+                        </m:oMathPara>
+                      </a14:m>
+                      <a:endParaRPr lang="en-CA" dirty="0"/>
+                    </a:p>
+                  </p:txBody>
+                </p:sp>
+              </mc:Choice>
+              <mc:Fallback xmlns="">
+                <p:sp>
+                  <p:nvSpPr>
+                    <p:cNvPr id="28" name="Rectangle 27"/>
+                    <p:cNvSpPr>
+                      <a:spLocks noRot="1" noChangeAspect="1" noMove="1" noResize="1" noEditPoints="1" noAdjustHandles="1" noChangeArrowheads="1" noChangeShapeType="1" noTextEdit="1"/>
+                    </p:cNvSpPr>
+                    <p:nvPr/>
+                  </p:nvSpPr>
+                  <p:spPr>
+                    <a:xfrm>
+                      <a:off x="4404738" y="3438955"/>
+                      <a:ext cx="367985" cy="369332"/>
+                    </a:xfrm>
+                    <a:prstGeom prst="rect">
+                      <a:avLst/>
+                    </a:prstGeom>
+                    <a:blipFill>
+                      <a:blip r:embed="rId42"/>
+                      <a:stretch>
+                        <a:fillRect/>
+                      </a:stretch>
+                    </a:blipFill>
+                  </p:spPr>
+                  <p:txBody>
+                    <a:bodyPr/>
+                    <a:lstStyle/>
+                    <a:p>
+                      <a:r>
+                        <a:rPr lang="en-US">
+                          <a:noFill/>
+                        </a:rPr>
+                        <a:t> </a:t>
+                      </a:r>
+                    </a:p>
+                  </p:txBody>
+                </p:sp>
+              </mc:Fallback>
+            </mc:AlternateContent>
+            <mc:AlternateContent xmlns:mc="http://schemas.openxmlformats.org/markup-compatibility/2006" xmlns:a14="http://schemas.microsoft.com/office/drawing/2010/main">
+              <mc:Choice Requires="a14">
+                <p:sp>
+                  <p:nvSpPr>
+                    <p:cNvPr id="36" name="TextBox 35"/>
+                    <p:cNvSpPr txBox="1"/>
+                    <p:nvPr/>
+                  </p:nvSpPr>
+                  <p:spPr>
+                    <a:xfrm>
+                      <a:off x="919312" y="3581769"/>
+                      <a:ext cx="213200" cy="307777"/>
+                    </a:xfrm>
+                    <a:prstGeom prst="rect">
+                      <a:avLst/>
+                    </a:prstGeom>
+                    <a:noFill/>
+                  </p:spPr>
+                  <p:txBody>
+                    <a:bodyPr wrap="none" lIns="0" tIns="0" rIns="0" bIns="0" rtlCol="0">
+                      <a:spAutoFit/>
+                    </a:bodyPr>
+                    <a:lstStyle/>
+                    <a:p>
+                      <a:pPr/>
+                      <a14:m>
+                        <m:oMathPara xmlns:m="http://schemas.openxmlformats.org/officeDocument/2006/math">
+                          <m:oMathParaPr>
+                            <m:jc m:val="centerGroup"/>
+                          </m:oMathParaPr>
+                          <m:oMath xmlns:m="http://schemas.openxmlformats.org/officeDocument/2006/math">
+                            <m:r>
+                              <a:rPr lang="en-US" sz="2000" b="0" i="1" smtClean="0">
+                                <a:latin typeface="Cambria Math" panose="02040503050406030204" pitchFamily="18" charset="0"/>
+                                <a:cs typeface="Arial" panose="020B0604020202020204" pitchFamily="34" charset="0"/>
+                              </a:rPr>
+                              <m:t>0</m:t>
+                            </m:r>
+                          </m:oMath>
+                        </m:oMathPara>
+                      </a14:m>
+                      <a:endParaRPr lang="en-US" sz="2000" dirty="0" smtClean="0">
+                        <a:latin typeface="Arial" panose="020B0604020202020204" pitchFamily="34" charset="0"/>
+                        <a:cs typeface="Arial" panose="020B0604020202020204" pitchFamily="34" charset="0"/>
+                      </a:endParaRPr>
+                    </a:p>
+                  </p:txBody>
+                </p:sp>
+              </mc:Choice>
+              <mc:Fallback xmlns="">
+                <p:sp>
+                  <p:nvSpPr>
+                    <p:cNvPr id="29" name="TextBox 28"/>
+                    <p:cNvSpPr txBox="1">
+                      <a:spLocks noRot="1" noChangeAspect="1" noMove="1" noResize="1" noEditPoints="1" noAdjustHandles="1" noChangeArrowheads="1" noChangeShapeType="1" noTextEdit="1"/>
+                    </p:cNvSpPr>
+                    <p:nvPr/>
+                  </p:nvSpPr>
+                  <p:spPr>
+                    <a:xfrm>
+                      <a:off x="919312" y="3581769"/>
+                      <a:ext cx="213200" cy="307777"/>
+                    </a:xfrm>
+                    <a:prstGeom prst="rect">
+                      <a:avLst/>
+                    </a:prstGeom>
+                    <a:blipFill>
+                      <a:blip r:embed="rId43"/>
+                      <a:stretch>
+                        <a:fillRect l="-25714" r="-22857" b="-10000"/>
+                      </a:stretch>
+                    </a:blipFill>
+                  </p:spPr>
+                  <p:txBody>
+                    <a:bodyPr/>
+                    <a:lstStyle/>
+                    <a:p>
+                      <a:r>
+                        <a:rPr lang="en-US">
+                          <a:noFill/>
+                        </a:rPr>
+                        <a:t> </a:t>
+                      </a:r>
+                    </a:p>
+                  </p:txBody>
+                </p:sp>
+              </mc:Fallback>
+            </mc:AlternateContent>
+            <p:cxnSp>
+              <p:nvCxnSpPr>
+                <p:cNvPr id="37" name="Straight Connector 36"/>
+                <p:cNvCxnSpPr/>
+                <p:nvPr/>
+              </p:nvCxnSpPr>
+              <p:spPr>
+                <a:xfrm flipV="1">
+                  <a:off x="1099058" y="3331012"/>
+                  <a:ext cx="0" cy="239606"/>
+                </a:xfrm>
+                <a:prstGeom prst="line">
+                  <a:avLst/>
+                </a:prstGeom>
+                <a:ln w="38100">
+                  <a:solidFill>
+                    <a:schemeClr val="tx1"/>
+                  </a:solidFill>
+                </a:ln>
+              </p:spPr>
+              <p:style>
+                <a:lnRef idx="1">
+                  <a:schemeClr val="accent1"/>
+                </a:lnRef>
+                <a:fillRef idx="0">
+                  <a:schemeClr val="accent1"/>
+                </a:fillRef>
+                <a:effectRef idx="0">
+                  <a:schemeClr val="accent1"/>
+                </a:effectRef>
+                <a:fontRef idx="minor">
+                  <a:schemeClr val="tx1"/>
+                </a:fontRef>
+              </p:style>
+            </p:cxnSp>
+          </p:grpSp>
+          <p:cxnSp>
+            <p:nvCxnSpPr>
+              <p:cNvPr id="4" name="Straight Arrow Connector 3"/>
+              <p:cNvCxnSpPr/>
+              <p:nvPr/>
+            </p:nvCxnSpPr>
+            <p:spPr>
+              <a:xfrm>
+                <a:off x="7339942" y="2735157"/>
+                <a:ext cx="3360915" cy="0"/>
+              </a:xfrm>
+              <a:prstGeom prst="straightConnector1">
+                <a:avLst/>
+              </a:prstGeom>
+              <a:ln w="38100">
+                <a:solidFill>
+                  <a:schemeClr val="tx1"/>
+                </a:solidFill>
+                <a:headEnd type="triangle"/>
+                <a:tailEnd type="triangle"/>
+              </a:ln>
+            </p:spPr>
+            <p:style>
+              <a:lnRef idx="1">
+                <a:schemeClr val="accent1"/>
+              </a:lnRef>
+              <a:fillRef idx="0">
+                <a:schemeClr val="accent1"/>
+              </a:fillRef>
+              <a:effectRef idx="0">
+                <a:schemeClr val="accent1"/>
+              </a:effectRef>
+              <a:fontRef idx="minor">
+                <a:schemeClr val="tx1"/>
+              </a:fontRef>
+            </p:style>
+          </p:cxnSp>
+          <mc:AlternateContent xmlns:mc="http://schemas.openxmlformats.org/markup-compatibility/2006">
+            <mc:Choice xmlns:a14="http://schemas.microsoft.com/office/drawing/2010/main" Requires="a14">
+              <p:sp>
+                <p:nvSpPr>
+                  <p:cNvPr id="5" name="TextBox 4"/>
+                  <p:cNvSpPr txBox="1"/>
+                  <p:nvPr/>
+                </p:nvSpPr>
+                <p:spPr>
+                  <a:xfrm>
+                    <a:off x="8980256" y="2382194"/>
+                    <a:ext cx="212045" cy="307777"/>
+                  </a:xfrm>
+                  <a:prstGeom prst="rect">
+                    <a:avLst/>
+                  </a:prstGeom>
+                  <a:noFill/>
+                </p:spPr>
+                <p:txBody>
+                  <a:bodyPr wrap="none" lIns="0" tIns="0" rIns="0" bIns="0" rtlCol="0">
+                    <a:spAutoFit/>
+                  </a:bodyPr>
+                  <a:lstStyle/>
+                  <a:p>
+                    <a14:m>
+                      <m:oMathPara xmlns:m="http://schemas.openxmlformats.org/officeDocument/2006/math">
+                        <m:oMathParaPr>
+                          <m:jc m:val="centerGroup"/>
+                        </m:oMathParaPr>
+                        <m:oMath xmlns:m="http://schemas.openxmlformats.org/officeDocument/2006/math">
+                          <m:r>
+                            <a:rPr lang="en-US" sz="2000" b="0" i="1" smtClean="0">
+                              <a:latin typeface="Cambria Math" panose="02040503050406030204" pitchFamily="18" charset="0"/>
+                              <a:cs typeface="Arial" panose="020B0604020202020204" pitchFamily="34" charset="0"/>
+                            </a:rPr>
+                            <m:t>𝐿</m:t>
+                          </m:r>
+                        </m:oMath>
+                      </m:oMathPara>
+                    </a14:m>
+                    <a:endParaRPr lang="en-US" sz="2000" dirty="0" smtClean="0">
+                      <a:latin typeface="Arial" panose="020B0604020202020204" pitchFamily="34" charset="0"/>
+                      <a:cs typeface="Arial" panose="020B0604020202020204" pitchFamily="34" charset="0"/>
+                    </a:endParaRPr>
+                  </a:p>
+                </p:txBody>
+              </p:sp>
+            </mc:Choice>
+            <mc:Fallback>
+              <p:sp>
+                <p:nvSpPr>
+                  <p:cNvPr id="5" name="TextBox 4"/>
+                  <p:cNvSpPr txBox="1">
+                    <a:spLocks noRot="1" noChangeAspect="1" noMove="1" noResize="1" noEditPoints="1" noAdjustHandles="1" noChangeArrowheads="1" noChangeShapeType="1" noTextEdit="1"/>
+                  </p:cNvSpPr>
+                  <p:nvPr/>
+                </p:nvSpPr>
+                <p:spPr>
+                  <a:xfrm>
+                    <a:off x="8980256" y="2382194"/>
+                    <a:ext cx="212045" cy="307777"/>
+                  </a:xfrm>
+                  <a:prstGeom prst="rect">
+                    <a:avLst/>
+                  </a:prstGeom>
+                  <a:blipFill>
+                    <a:blip r:embed="rId44"/>
+                    <a:stretch>
+                      <a:fillRect l="-22857" r="-22857" b="-10000"/>
+                    </a:stretch>
+                  </a:blipFill>
+                </p:spPr>
+                <p:txBody>
+                  <a:bodyPr/>
+                  <a:lstStyle/>
+                  <a:p>
+                    <a:r>
+                      <a:rPr lang="en-US">
+                        <a:noFill/>
+                      </a:rPr>
+                      <a:t> </a:t>
+                    </a:r>
+                  </a:p>
+                </p:txBody>
+              </p:sp>
+            </mc:Fallback>
+          </mc:AlternateContent>
+          <mc:AlternateContent xmlns:mc="http://schemas.openxmlformats.org/markup-compatibility/2006">
+            <mc:Choice xmlns:a14="http://schemas.microsoft.com/office/drawing/2010/main" Requires="a14">
+              <p:sp>
+                <p:nvSpPr>
+                  <p:cNvPr id="14" name="TextBox 13"/>
+                  <p:cNvSpPr txBox="1"/>
+                  <p:nvPr/>
+                </p:nvSpPr>
+                <p:spPr>
+                  <a:xfrm>
+                    <a:off x="10932936" y="2761905"/>
+                    <a:ext cx="294824" cy="307777"/>
+                  </a:xfrm>
+                  <a:prstGeom prst="rect">
+                    <a:avLst/>
+                  </a:prstGeom>
+                  <a:noFill/>
+                </p:spPr>
+                <p:txBody>
+                  <a:bodyPr wrap="none" lIns="0" tIns="0" rIns="0" bIns="0" rtlCol="0">
+                    <a:spAutoFit/>
+                  </a:bodyPr>
+                  <a:lstStyle/>
+                  <a:p>
+                    <a14:m>
+                      <m:oMathPara xmlns:m="http://schemas.openxmlformats.org/officeDocument/2006/math">
+                        <m:oMathParaPr>
+                          <m:jc m:val="centerGroup"/>
+                        </m:oMathParaPr>
+                        <m:oMath xmlns:m="http://schemas.openxmlformats.org/officeDocument/2006/math">
+                          <m:r>
+                            <a:rPr lang="en-US" sz="2000" b="0" i="1" smtClean="0">
+                              <a:latin typeface="Cambria Math" panose="02040503050406030204" pitchFamily="18" charset="0"/>
+                              <a:cs typeface="Arial" panose="020B0604020202020204" pitchFamily="34" charset="0"/>
+                            </a:rPr>
+                            <m:t>𝑀</m:t>
+                          </m:r>
+                        </m:oMath>
+                      </m:oMathPara>
+                    </a14:m>
+                    <a:endParaRPr lang="en-US" sz="2000" dirty="0" smtClean="0">
+                      <a:latin typeface="Arial" panose="020B0604020202020204" pitchFamily="34" charset="0"/>
+                      <a:cs typeface="Arial" panose="020B0604020202020204" pitchFamily="34" charset="0"/>
+                    </a:endParaRPr>
+                  </a:p>
+                </p:txBody>
+              </p:sp>
+            </mc:Choice>
+            <mc:Fallback>
+              <p:sp>
+                <p:nvSpPr>
+                  <p:cNvPr id="14" name="TextBox 13"/>
+                  <p:cNvSpPr txBox="1">
+                    <a:spLocks noRot="1" noChangeAspect="1" noMove="1" noResize="1" noEditPoints="1" noAdjustHandles="1" noChangeArrowheads="1" noChangeShapeType="1" noTextEdit="1"/>
+                  </p:cNvSpPr>
+                  <p:nvPr/>
+                </p:nvSpPr>
+                <p:spPr>
+                  <a:xfrm>
+                    <a:off x="10932936" y="2761905"/>
+                    <a:ext cx="294824" cy="307777"/>
+                  </a:xfrm>
+                  <a:prstGeom prst="rect">
+                    <a:avLst/>
+                  </a:prstGeom>
+                  <a:blipFill>
+                    <a:blip r:embed="rId45"/>
+                    <a:stretch>
+                      <a:fillRect l="-16327" r="-16327" b="-9804"/>
+                    </a:stretch>
+                  </a:blipFill>
+                </p:spPr>
+                <p:txBody>
+                  <a:bodyPr/>
+                  <a:lstStyle/>
+                  <a:p>
+                    <a:r>
+                      <a:rPr lang="en-US">
+                        <a:noFill/>
+                      </a:rPr>
+                      <a:t> </a:t>
+                    </a:r>
+                  </a:p>
+                </p:txBody>
+              </p:sp>
+            </mc:Fallback>
+          </mc:AlternateContent>
+          <p:grpSp>
+            <p:nvGrpSpPr>
+              <p:cNvPr id="19" name="Group 18"/>
+              <p:cNvGrpSpPr/>
+              <p:nvPr/>
+            </p:nvGrpSpPr>
+            <p:grpSpPr>
+              <a:xfrm>
+                <a:off x="7369608" y="2869341"/>
+                <a:ext cx="3366984" cy="180365"/>
+                <a:chOff x="7658423" y="1678015"/>
+                <a:chExt cx="3366984" cy="180365"/>
+              </a:xfrm>
+            </p:grpSpPr>
+            <p:sp>
+              <p:nvSpPr>
+                <p:cNvPr id="60" name="Rectangle 59"/>
+                <p:cNvSpPr/>
+                <p:nvPr/>
+              </p:nvSpPr>
+              <p:spPr>
+                <a:xfrm>
+                  <a:off x="7658423" y="1678015"/>
+                  <a:ext cx="140291" cy="180364"/>
+                </a:xfrm>
+                <a:prstGeom prst="rect">
+                  <a:avLst/>
+                </a:prstGeom>
+                <a:noFill/>
+                <a:ln w="38100">
+                  <a:solidFill>
+                    <a:schemeClr val="tx1"/>
+                  </a:solidFill>
+                </a:ln>
+              </p:spPr>
+              <p:style>
+                <a:lnRef idx="2">
+                  <a:schemeClr val="accent1">
+                    <a:shade val="50000"/>
+                  </a:schemeClr>
+                </a:lnRef>
+                <a:fillRef idx="1">
+                  <a:schemeClr val="accent1"/>
+                </a:fillRef>
+                <a:effectRef idx="0">
+                  <a:schemeClr val="accent1"/>
+                </a:effectRef>
+                <a:fontRef idx="minor">
+                  <a:schemeClr val="lt1"/>
+                </a:fontRef>
+              </p:style>
+              <p:txBody>
+                <a:bodyPr rtlCol="0" anchor="ctr"/>
+                <a:lstStyle/>
+                <a:p>
+                  <a:pPr algn="ctr"/>
+                  <a:endParaRPr lang="en-US"/>
+                </a:p>
+              </p:txBody>
+            </p:sp>
+            <p:sp>
+              <p:nvSpPr>
+                <p:cNvPr id="61" name="Rectangle 60"/>
+                <p:cNvSpPr/>
+                <p:nvPr/>
+              </p:nvSpPr>
+              <p:spPr>
+                <a:xfrm>
+                  <a:off x="7798714" y="1678015"/>
+                  <a:ext cx="140291" cy="180364"/>
+                </a:xfrm>
+                <a:prstGeom prst="rect">
+                  <a:avLst/>
+                </a:prstGeom>
+                <a:noFill/>
+                <a:ln w="38100">
+                  <a:solidFill>
+                    <a:schemeClr val="tx1"/>
+                  </a:solidFill>
+                </a:ln>
+              </p:spPr>
+              <p:style>
+                <a:lnRef idx="2">
+                  <a:schemeClr val="accent1">
+                    <a:shade val="50000"/>
+                  </a:schemeClr>
+                </a:lnRef>
+                <a:fillRef idx="1">
+                  <a:schemeClr val="accent1"/>
+                </a:fillRef>
+                <a:effectRef idx="0">
+                  <a:schemeClr val="accent1"/>
+                </a:effectRef>
+                <a:fontRef idx="minor">
+                  <a:schemeClr val="lt1"/>
+                </a:fontRef>
+              </p:style>
+              <p:txBody>
+                <a:bodyPr rtlCol="0" anchor="ctr"/>
+                <a:lstStyle/>
+                <a:p>
+                  <a:pPr algn="ctr"/>
+                  <a:endParaRPr lang="en-US"/>
+                </a:p>
+              </p:txBody>
+            </p:sp>
+            <p:sp>
+              <p:nvSpPr>
+                <p:cNvPr id="62" name="Rectangle 61"/>
+                <p:cNvSpPr/>
+                <p:nvPr/>
+              </p:nvSpPr>
+              <p:spPr>
+                <a:xfrm>
+                  <a:off x="7939005" y="1678015"/>
+                  <a:ext cx="140291" cy="180364"/>
+                </a:xfrm>
+                <a:prstGeom prst="rect">
+                  <a:avLst/>
+                </a:prstGeom>
+                <a:noFill/>
+                <a:ln w="38100">
+                  <a:solidFill>
+                    <a:schemeClr val="tx1"/>
+                  </a:solidFill>
+                </a:ln>
+              </p:spPr>
+              <p:style>
+                <a:lnRef idx="2">
+                  <a:schemeClr val="accent1">
+                    <a:shade val="50000"/>
+                  </a:schemeClr>
+                </a:lnRef>
+                <a:fillRef idx="1">
+                  <a:schemeClr val="accent1"/>
+                </a:fillRef>
+                <a:effectRef idx="0">
+                  <a:schemeClr val="accent1"/>
+                </a:effectRef>
+                <a:fontRef idx="minor">
+                  <a:schemeClr val="lt1"/>
+                </a:fontRef>
+              </p:style>
+              <p:txBody>
+                <a:bodyPr rtlCol="0" anchor="ctr"/>
+                <a:lstStyle/>
+                <a:p>
+                  <a:pPr algn="ctr"/>
+                  <a:endParaRPr lang="en-US"/>
+                </a:p>
+              </p:txBody>
+            </p:sp>
+            <p:sp>
+              <p:nvSpPr>
+                <p:cNvPr id="63" name="Rectangle 62"/>
+                <p:cNvSpPr/>
+                <p:nvPr/>
+              </p:nvSpPr>
+              <p:spPr>
+                <a:xfrm>
+                  <a:off x="8079296" y="1678015"/>
+                  <a:ext cx="140291" cy="180364"/>
+                </a:xfrm>
+                <a:prstGeom prst="rect">
+                  <a:avLst/>
+                </a:prstGeom>
+                <a:noFill/>
+                <a:ln w="38100">
+                  <a:solidFill>
+                    <a:schemeClr val="tx1"/>
+                  </a:solidFill>
+                </a:ln>
+              </p:spPr>
+              <p:style>
+                <a:lnRef idx="2">
+                  <a:schemeClr val="accent1">
+                    <a:shade val="50000"/>
+                  </a:schemeClr>
+                </a:lnRef>
+                <a:fillRef idx="1">
+                  <a:schemeClr val="accent1"/>
+                </a:fillRef>
+                <a:effectRef idx="0">
+                  <a:schemeClr val="accent1"/>
+                </a:effectRef>
+                <a:fontRef idx="minor">
+                  <a:schemeClr val="lt1"/>
+                </a:fontRef>
+              </p:style>
+              <p:txBody>
+                <a:bodyPr rtlCol="0" anchor="ctr"/>
+                <a:lstStyle/>
+                <a:p>
+                  <a:pPr algn="ctr"/>
+                  <a:endParaRPr lang="en-US"/>
+                </a:p>
+              </p:txBody>
+            </p:sp>
+            <p:sp>
+              <p:nvSpPr>
+                <p:cNvPr id="64" name="Rectangle 63"/>
+                <p:cNvSpPr/>
+                <p:nvPr/>
+              </p:nvSpPr>
+              <p:spPr>
+                <a:xfrm>
+                  <a:off x="8219587" y="1678015"/>
+                  <a:ext cx="140291" cy="180364"/>
+                </a:xfrm>
+                <a:prstGeom prst="rect">
+                  <a:avLst/>
+                </a:prstGeom>
+                <a:noFill/>
+                <a:ln w="38100">
+                  <a:solidFill>
+                    <a:schemeClr val="tx1"/>
+                  </a:solidFill>
+                </a:ln>
+              </p:spPr>
+              <p:style>
+                <a:lnRef idx="2">
+                  <a:schemeClr val="accent1">
+                    <a:shade val="50000"/>
+                  </a:schemeClr>
+                </a:lnRef>
+                <a:fillRef idx="1">
+                  <a:schemeClr val="accent1"/>
+                </a:fillRef>
+                <a:effectRef idx="0">
+                  <a:schemeClr val="accent1"/>
+                </a:effectRef>
+                <a:fontRef idx="minor">
+                  <a:schemeClr val="lt1"/>
+                </a:fontRef>
+              </p:style>
+              <p:txBody>
+                <a:bodyPr rtlCol="0" anchor="ctr"/>
+                <a:lstStyle/>
+                <a:p>
+                  <a:pPr algn="ctr"/>
+                  <a:endParaRPr lang="en-US"/>
+                </a:p>
+              </p:txBody>
+            </p:sp>
+            <p:sp>
+              <p:nvSpPr>
+                <p:cNvPr id="65" name="Rectangle 64"/>
+                <p:cNvSpPr/>
+                <p:nvPr/>
+              </p:nvSpPr>
+              <p:spPr>
+                <a:xfrm>
+                  <a:off x="8359878" y="1678015"/>
+                  <a:ext cx="140291" cy="180364"/>
+                </a:xfrm>
+                <a:prstGeom prst="rect">
+                  <a:avLst/>
+                </a:prstGeom>
+                <a:noFill/>
+                <a:ln w="38100">
+                  <a:solidFill>
+                    <a:schemeClr val="tx1"/>
+                  </a:solidFill>
+                </a:ln>
+              </p:spPr>
+              <p:style>
+                <a:lnRef idx="2">
+                  <a:schemeClr val="accent1">
+                    <a:shade val="50000"/>
+                  </a:schemeClr>
+                </a:lnRef>
+                <a:fillRef idx="1">
+                  <a:schemeClr val="accent1"/>
+                </a:fillRef>
+                <a:effectRef idx="0">
+                  <a:schemeClr val="accent1"/>
+                </a:effectRef>
+                <a:fontRef idx="minor">
+                  <a:schemeClr val="lt1"/>
+                </a:fontRef>
+              </p:style>
+              <p:txBody>
+                <a:bodyPr rtlCol="0" anchor="ctr"/>
+                <a:lstStyle/>
+                <a:p>
+                  <a:pPr algn="ctr"/>
+                  <a:endParaRPr lang="en-US"/>
+                </a:p>
+              </p:txBody>
+            </p:sp>
+            <p:sp>
+              <p:nvSpPr>
+                <p:cNvPr id="66" name="Rectangle 65"/>
+                <p:cNvSpPr/>
+                <p:nvPr/>
+              </p:nvSpPr>
+              <p:spPr>
+                <a:xfrm>
+                  <a:off x="8500169" y="1678015"/>
+                  <a:ext cx="140291" cy="180364"/>
+                </a:xfrm>
+                <a:prstGeom prst="rect">
+                  <a:avLst/>
+                </a:prstGeom>
+                <a:noFill/>
+                <a:ln w="38100">
+                  <a:solidFill>
+                    <a:schemeClr val="tx1"/>
+                  </a:solidFill>
+                </a:ln>
+              </p:spPr>
+              <p:style>
+                <a:lnRef idx="2">
+                  <a:schemeClr val="accent1">
+                    <a:shade val="50000"/>
+                  </a:schemeClr>
+                </a:lnRef>
+                <a:fillRef idx="1">
+                  <a:schemeClr val="accent1"/>
+                </a:fillRef>
+                <a:effectRef idx="0">
+                  <a:schemeClr val="accent1"/>
+                </a:effectRef>
+                <a:fontRef idx="minor">
+                  <a:schemeClr val="lt1"/>
+                </a:fontRef>
+              </p:style>
+              <p:txBody>
+                <a:bodyPr rtlCol="0" anchor="ctr"/>
+                <a:lstStyle/>
+                <a:p>
+                  <a:pPr algn="ctr"/>
+                  <a:endParaRPr lang="en-US"/>
+                </a:p>
+              </p:txBody>
+            </p:sp>
+            <p:sp>
+              <p:nvSpPr>
+                <p:cNvPr id="67" name="Rectangle 66"/>
+                <p:cNvSpPr/>
+                <p:nvPr/>
+              </p:nvSpPr>
+              <p:spPr>
+                <a:xfrm>
+                  <a:off x="8640460" y="1678015"/>
+                  <a:ext cx="140291" cy="180364"/>
+                </a:xfrm>
+                <a:prstGeom prst="rect">
+                  <a:avLst/>
+                </a:prstGeom>
+                <a:noFill/>
+                <a:ln w="38100">
+                  <a:solidFill>
+                    <a:schemeClr val="tx1"/>
+                  </a:solidFill>
+                </a:ln>
+              </p:spPr>
+              <p:style>
+                <a:lnRef idx="2">
+                  <a:schemeClr val="accent1">
+                    <a:shade val="50000"/>
+                  </a:schemeClr>
+                </a:lnRef>
+                <a:fillRef idx="1">
+                  <a:schemeClr val="accent1"/>
+                </a:fillRef>
+                <a:effectRef idx="0">
+                  <a:schemeClr val="accent1"/>
+                </a:effectRef>
+                <a:fontRef idx="minor">
+                  <a:schemeClr val="lt1"/>
+                </a:fontRef>
+              </p:style>
+              <p:txBody>
+                <a:bodyPr rtlCol="0" anchor="ctr"/>
+                <a:lstStyle/>
+                <a:p>
+                  <a:pPr algn="ctr"/>
+                  <a:endParaRPr lang="en-US"/>
+                </a:p>
+              </p:txBody>
+            </p:sp>
+            <p:sp>
+              <p:nvSpPr>
+                <p:cNvPr id="68" name="Rectangle 67"/>
+                <p:cNvSpPr/>
+                <p:nvPr/>
+              </p:nvSpPr>
+              <p:spPr>
+                <a:xfrm>
+                  <a:off x="8780751" y="1678016"/>
+                  <a:ext cx="140291" cy="180364"/>
+                </a:xfrm>
+                <a:prstGeom prst="rect">
+                  <a:avLst/>
+                </a:prstGeom>
+                <a:noFill/>
+                <a:ln w="38100">
+                  <a:solidFill>
+                    <a:schemeClr val="tx1"/>
+                  </a:solidFill>
+                </a:ln>
+              </p:spPr>
+              <p:style>
+                <a:lnRef idx="2">
+                  <a:schemeClr val="accent1">
+                    <a:shade val="50000"/>
+                  </a:schemeClr>
+                </a:lnRef>
+                <a:fillRef idx="1">
+                  <a:schemeClr val="accent1"/>
+                </a:fillRef>
+                <a:effectRef idx="0">
+                  <a:schemeClr val="accent1"/>
+                </a:effectRef>
+                <a:fontRef idx="minor">
+                  <a:schemeClr val="lt1"/>
+                </a:fontRef>
+              </p:style>
+              <p:txBody>
+                <a:bodyPr rtlCol="0" anchor="ctr"/>
+                <a:lstStyle/>
+                <a:p>
+                  <a:pPr algn="ctr"/>
+                  <a:endParaRPr lang="en-US"/>
+                </a:p>
+              </p:txBody>
+            </p:sp>
+            <p:sp>
+              <p:nvSpPr>
+                <p:cNvPr id="69" name="Rectangle 68"/>
+                <p:cNvSpPr/>
+                <p:nvPr/>
+              </p:nvSpPr>
+              <p:spPr>
+                <a:xfrm>
+                  <a:off x="8921042" y="1678016"/>
+                  <a:ext cx="140291" cy="180364"/>
+                </a:xfrm>
+                <a:prstGeom prst="rect">
+                  <a:avLst/>
+                </a:prstGeom>
+                <a:noFill/>
+                <a:ln w="38100">
+                  <a:solidFill>
+                    <a:schemeClr val="tx1"/>
+                  </a:solidFill>
+                </a:ln>
+              </p:spPr>
+              <p:style>
+                <a:lnRef idx="2">
+                  <a:schemeClr val="accent1">
+                    <a:shade val="50000"/>
+                  </a:schemeClr>
+                </a:lnRef>
+                <a:fillRef idx="1">
+                  <a:schemeClr val="accent1"/>
+                </a:fillRef>
+                <a:effectRef idx="0">
+                  <a:schemeClr val="accent1"/>
+                </a:effectRef>
+                <a:fontRef idx="minor">
+                  <a:schemeClr val="lt1"/>
+                </a:fontRef>
+              </p:style>
+              <p:txBody>
+                <a:bodyPr rtlCol="0" anchor="ctr"/>
+                <a:lstStyle/>
+                <a:p>
+                  <a:pPr algn="ctr"/>
+                  <a:endParaRPr lang="en-US"/>
+                </a:p>
+              </p:txBody>
+            </p:sp>
+            <p:sp>
+              <p:nvSpPr>
+                <p:cNvPr id="70" name="Rectangle 69"/>
+                <p:cNvSpPr/>
+                <p:nvPr/>
+              </p:nvSpPr>
+              <p:spPr>
+                <a:xfrm>
+                  <a:off x="9061333" y="1678016"/>
+                  <a:ext cx="140291" cy="180364"/>
+                </a:xfrm>
+                <a:prstGeom prst="rect">
+                  <a:avLst/>
+                </a:prstGeom>
+                <a:noFill/>
+                <a:ln w="38100">
+                  <a:solidFill>
+                    <a:schemeClr val="tx1"/>
+                  </a:solidFill>
+                </a:ln>
+              </p:spPr>
+              <p:style>
+                <a:lnRef idx="2">
+                  <a:schemeClr val="accent1">
+                    <a:shade val="50000"/>
+                  </a:schemeClr>
+                </a:lnRef>
+                <a:fillRef idx="1">
+                  <a:schemeClr val="accent1"/>
+                </a:fillRef>
+                <a:effectRef idx="0">
+                  <a:schemeClr val="accent1"/>
+                </a:effectRef>
+                <a:fontRef idx="minor">
+                  <a:schemeClr val="lt1"/>
+                </a:fontRef>
+              </p:style>
+              <p:txBody>
+                <a:bodyPr rtlCol="0" anchor="ctr"/>
+                <a:lstStyle/>
+                <a:p>
+                  <a:pPr algn="ctr"/>
+                  <a:endParaRPr lang="en-US"/>
+                </a:p>
+              </p:txBody>
+            </p:sp>
+            <p:sp>
+              <p:nvSpPr>
+                <p:cNvPr id="71" name="Rectangle 70"/>
+                <p:cNvSpPr/>
+                <p:nvPr/>
+              </p:nvSpPr>
+              <p:spPr>
+                <a:xfrm>
+                  <a:off x="9201624" y="1678016"/>
+                  <a:ext cx="140291" cy="180364"/>
+                </a:xfrm>
+                <a:prstGeom prst="rect">
+                  <a:avLst/>
+                </a:prstGeom>
+                <a:noFill/>
+                <a:ln w="38100">
+                  <a:solidFill>
+                    <a:schemeClr val="tx1"/>
+                  </a:solidFill>
+                </a:ln>
+              </p:spPr>
+              <p:style>
+                <a:lnRef idx="2">
+                  <a:schemeClr val="accent1">
+                    <a:shade val="50000"/>
+                  </a:schemeClr>
+                </a:lnRef>
+                <a:fillRef idx="1">
+                  <a:schemeClr val="accent1"/>
+                </a:fillRef>
+                <a:effectRef idx="0">
+                  <a:schemeClr val="accent1"/>
+                </a:effectRef>
+                <a:fontRef idx="minor">
+                  <a:schemeClr val="lt1"/>
+                </a:fontRef>
+              </p:style>
+              <p:txBody>
+                <a:bodyPr rtlCol="0" anchor="ctr"/>
+                <a:lstStyle/>
+                <a:p>
+                  <a:pPr algn="ctr"/>
+                  <a:endParaRPr lang="en-US"/>
+                </a:p>
+              </p:txBody>
+            </p:sp>
+            <p:sp>
+              <p:nvSpPr>
+                <p:cNvPr id="72" name="Rectangle 71"/>
+                <p:cNvSpPr/>
+                <p:nvPr/>
+              </p:nvSpPr>
+              <p:spPr>
+                <a:xfrm>
+                  <a:off x="9341915" y="1678016"/>
+                  <a:ext cx="140291" cy="180364"/>
+                </a:xfrm>
+                <a:prstGeom prst="rect">
+                  <a:avLst/>
+                </a:prstGeom>
+                <a:noFill/>
+                <a:ln w="38100">
+                  <a:solidFill>
+                    <a:schemeClr val="tx1"/>
+                  </a:solidFill>
+                </a:ln>
+              </p:spPr>
+              <p:style>
+                <a:lnRef idx="2">
+                  <a:schemeClr val="accent1">
+                    <a:shade val="50000"/>
+                  </a:schemeClr>
+                </a:lnRef>
+                <a:fillRef idx="1">
+                  <a:schemeClr val="accent1"/>
+                </a:fillRef>
+                <a:effectRef idx="0">
+                  <a:schemeClr val="accent1"/>
+                </a:effectRef>
+                <a:fontRef idx="minor">
+                  <a:schemeClr val="lt1"/>
+                </a:fontRef>
+              </p:style>
+              <p:txBody>
+                <a:bodyPr rtlCol="0" anchor="ctr"/>
+                <a:lstStyle/>
+                <a:p>
+                  <a:pPr algn="ctr"/>
+                  <a:endParaRPr lang="en-US"/>
+                </a:p>
+              </p:txBody>
+            </p:sp>
+            <p:sp>
+              <p:nvSpPr>
+                <p:cNvPr id="73" name="Rectangle 72"/>
+                <p:cNvSpPr/>
+                <p:nvPr/>
+              </p:nvSpPr>
+              <p:spPr>
+                <a:xfrm>
+                  <a:off x="9482206" y="1678016"/>
+                  <a:ext cx="140291" cy="180364"/>
+                </a:xfrm>
+                <a:prstGeom prst="rect">
+                  <a:avLst/>
+                </a:prstGeom>
+                <a:solidFill>
+                  <a:schemeClr val="bg2">
+                    <a:lumMod val="50000"/>
+                  </a:schemeClr>
+                </a:solidFill>
+                <a:ln w="38100">
+                  <a:solidFill>
+                    <a:schemeClr val="tx1"/>
+                  </a:solidFill>
+                </a:ln>
+              </p:spPr>
+              <p:style>
+                <a:lnRef idx="2">
+                  <a:schemeClr val="accent1">
+                    <a:shade val="50000"/>
+                  </a:schemeClr>
+                </a:lnRef>
+                <a:fillRef idx="1">
+                  <a:schemeClr val="accent1"/>
+                </a:fillRef>
+                <a:effectRef idx="0">
+                  <a:schemeClr val="accent1"/>
+                </a:effectRef>
+                <a:fontRef idx="minor">
+                  <a:schemeClr val="lt1"/>
+                </a:fontRef>
+              </p:style>
+              <p:txBody>
+                <a:bodyPr rtlCol="0" anchor="ctr"/>
+                <a:lstStyle/>
+                <a:p>
+                  <a:pPr algn="ctr"/>
+                  <a:endParaRPr lang="en-US"/>
+                </a:p>
+              </p:txBody>
+            </p:sp>
+            <p:sp>
+              <p:nvSpPr>
+                <p:cNvPr id="74" name="Rectangle 73"/>
+                <p:cNvSpPr/>
+                <p:nvPr/>
+              </p:nvSpPr>
+              <p:spPr>
+                <a:xfrm>
+                  <a:off x="9622497" y="1678016"/>
+                  <a:ext cx="140291" cy="180364"/>
+                </a:xfrm>
+                <a:prstGeom prst="rect">
+                  <a:avLst/>
+                </a:prstGeom>
+                <a:noFill/>
+                <a:ln w="38100">
+                  <a:solidFill>
+                    <a:schemeClr val="tx1"/>
+                  </a:solidFill>
+                </a:ln>
+              </p:spPr>
+              <p:style>
+                <a:lnRef idx="2">
+                  <a:schemeClr val="accent1">
+                    <a:shade val="50000"/>
+                  </a:schemeClr>
+                </a:lnRef>
+                <a:fillRef idx="1">
+                  <a:schemeClr val="accent1"/>
+                </a:fillRef>
+                <a:effectRef idx="0">
+                  <a:schemeClr val="accent1"/>
+                </a:effectRef>
+                <a:fontRef idx="minor">
+                  <a:schemeClr val="lt1"/>
+                </a:fontRef>
+              </p:style>
+              <p:txBody>
+                <a:bodyPr rtlCol="0" anchor="ctr"/>
+                <a:lstStyle/>
+                <a:p>
+                  <a:pPr algn="ctr"/>
+                  <a:endParaRPr lang="en-US"/>
+                </a:p>
+              </p:txBody>
+            </p:sp>
+            <p:sp>
+              <p:nvSpPr>
+                <p:cNvPr id="75" name="Rectangle 74"/>
+                <p:cNvSpPr/>
+                <p:nvPr/>
+              </p:nvSpPr>
+              <p:spPr>
+                <a:xfrm>
+                  <a:off x="9762788" y="1678016"/>
+                  <a:ext cx="140291" cy="180364"/>
+                </a:xfrm>
+                <a:prstGeom prst="rect">
+                  <a:avLst/>
+                </a:prstGeom>
+                <a:noFill/>
+                <a:ln w="38100">
+                  <a:solidFill>
+                    <a:schemeClr val="tx1"/>
+                  </a:solidFill>
+                </a:ln>
+              </p:spPr>
+              <p:style>
+                <a:lnRef idx="2">
+                  <a:schemeClr val="accent1">
+                    <a:shade val="50000"/>
+                  </a:schemeClr>
+                </a:lnRef>
+                <a:fillRef idx="1">
+                  <a:schemeClr val="accent1"/>
+                </a:fillRef>
+                <a:effectRef idx="0">
+                  <a:schemeClr val="accent1"/>
+                </a:effectRef>
+                <a:fontRef idx="minor">
+                  <a:schemeClr val="lt1"/>
+                </a:fontRef>
+              </p:style>
+              <p:txBody>
+                <a:bodyPr rtlCol="0" anchor="ctr"/>
+                <a:lstStyle/>
+                <a:p>
+                  <a:pPr algn="ctr"/>
+                  <a:endParaRPr lang="en-US"/>
+                </a:p>
+              </p:txBody>
+            </p:sp>
+            <p:sp>
+              <p:nvSpPr>
+                <p:cNvPr id="76" name="Rectangle 75"/>
+                <p:cNvSpPr/>
+                <p:nvPr/>
+              </p:nvSpPr>
+              <p:spPr>
+                <a:xfrm>
+                  <a:off x="9903079" y="1678015"/>
+                  <a:ext cx="140291" cy="180364"/>
+                </a:xfrm>
+                <a:prstGeom prst="rect">
+                  <a:avLst/>
+                </a:prstGeom>
+                <a:noFill/>
+                <a:ln w="38100">
+                  <a:solidFill>
+                    <a:schemeClr val="tx1"/>
+                  </a:solidFill>
+                </a:ln>
+              </p:spPr>
+              <p:style>
+                <a:lnRef idx="2">
+                  <a:schemeClr val="accent1">
+                    <a:shade val="50000"/>
+                  </a:schemeClr>
+                </a:lnRef>
+                <a:fillRef idx="1">
+                  <a:schemeClr val="accent1"/>
+                </a:fillRef>
+                <a:effectRef idx="0">
+                  <a:schemeClr val="accent1"/>
+                </a:effectRef>
+                <a:fontRef idx="minor">
+                  <a:schemeClr val="lt1"/>
+                </a:fontRef>
+              </p:style>
+              <p:txBody>
+                <a:bodyPr rtlCol="0" anchor="ctr"/>
+                <a:lstStyle/>
+                <a:p>
+                  <a:pPr algn="ctr"/>
+                  <a:endParaRPr lang="en-US"/>
+                </a:p>
+              </p:txBody>
+            </p:sp>
+            <p:sp>
+              <p:nvSpPr>
+                <p:cNvPr id="77" name="Rectangle 76"/>
+                <p:cNvSpPr/>
+                <p:nvPr/>
+              </p:nvSpPr>
+              <p:spPr>
+                <a:xfrm>
+                  <a:off x="10043370" y="1678015"/>
+                  <a:ext cx="140291" cy="180364"/>
+                </a:xfrm>
+                <a:prstGeom prst="rect">
+                  <a:avLst/>
+                </a:prstGeom>
+                <a:noFill/>
+                <a:ln w="38100">
+                  <a:solidFill>
+                    <a:schemeClr val="tx1"/>
+                  </a:solidFill>
+                </a:ln>
+              </p:spPr>
+              <p:style>
+                <a:lnRef idx="2">
+                  <a:schemeClr val="accent1">
+                    <a:shade val="50000"/>
+                  </a:schemeClr>
+                </a:lnRef>
+                <a:fillRef idx="1">
+                  <a:schemeClr val="accent1"/>
+                </a:fillRef>
+                <a:effectRef idx="0">
+                  <a:schemeClr val="accent1"/>
+                </a:effectRef>
+                <a:fontRef idx="minor">
+                  <a:schemeClr val="lt1"/>
+                </a:fontRef>
+              </p:style>
+              <p:txBody>
+                <a:bodyPr rtlCol="0" anchor="ctr"/>
+                <a:lstStyle/>
+                <a:p>
+                  <a:pPr algn="ctr"/>
+                  <a:endParaRPr lang="en-US"/>
+                </a:p>
+              </p:txBody>
+            </p:sp>
+            <p:sp>
+              <p:nvSpPr>
+                <p:cNvPr id="78" name="Rectangle 77"/>
+                <p:cNvSpPr/>
+                <p:nvPr/>
+              </p:nvSpPr>
+              <p:spPr>
+                <a:xfrm>
+                  <a:off x="10183661" y="1678015"/>
+                  <a:ext cx="140291" cy="180364"/>
+                </a:xfrm>
+                <a:prstGeom prst="rect">
+                  <a:avLst/>
+                </a:prstGeom>
+                <a:noFill/>
+                <a:ln w="38100">
+                  <a:solidFill>
+                    <a:schemeClr val="tx1"/>
+                  </a:solidFill>
+                </a:ln>
+              </p:spPr>
+              <p:style>
+                <a:lnRef idx="2">
+                  <a:schemeClr val="accent1">
+                    <a:shade val="50000"/>
+                  </a:schemeClr>
+                </a:lnRef>
+                <a:fillRef idx="1">
+                  <a:schemeClr val="accent1"/>
+                </a:fillRef>
+                <a:effectRef idx="0">
+                  <a:schemeClr val="accent1"/>
+                </a:effectRef>
+                <a:fontRef idx="minor">
+                  <a:schemeClr val="lt1"/>
+                </a:fontRef>
+              </p:style>
+              <p:txBody>
+                <a:bodyPr rtlCol="0" anchor="ctr"/>
+                <a:lstStyle/>
+                <a:p>
+                  <a:pPr algn="ctr"/>
+                  <a:endParaRPr lang="en-US"/>
+                </a:p>
+              </p:txBody>
+            </p:sp>
+            <p:sp>
+              <p:nvSpPr>
+                <p:cNvPr id="79" name="Rectangle 78"/>
+                <p:cNvSpPr/>
+                <p:nvPr/>
+              </p:nvSpPr>
+              <p:spPr>
+                <a:xfrm>
+                  <a:off x="10323952" y="1678015"/>
+                  <a:ext cx="140291" cy="180364"/>
+                </a:xfrm>
+                <a:prstGeom prst="rect">
+                  <a:avLst/>
+                </a:prstGeom>
+                <a:noFill/>
+                <a:ln w="38100">
+                  <a:solidFill>
+                    <a:schemeClr val="tx1"/>
+                  </a:solidFill>
+                </a:ln>
+              </p:spPr>
+              <p:style>
+                <a:lnRef idx="2">
+                  <a:schemeClr val="accent1">
+                    <a:shade val="50000"/>
+                  </a:schemeClr>
+                </a:lnRef>
+                <a:fillRef idx="1">
+                  <a:schemeClr val="accent1"/>
+                </a:fillRef>
+                <a:effectRef idx="0">
+                  <a:schemeClr val="accent1"/>
+                </a:effectRef>
+                <a:fontRef idx="minor">
+                  <a:schemeClr val="lt1"/>
+                </a:fontRef>
+              </p:style>
+              <p:txBody>
+                <a:bodyPr rtlCol="0" anchor="ctr"/>
+                <a:lstStyle/>
+                <a:p>
+                  <a:pPr algn="ctr"/>
+                  <a:endParaRPr lang="en-US"/>
+                </a:p>
+              </p:txBody>
+            </p:sp>
+            <p:sp>
+              <p:nvSpPr>
+                <p:cNvPr id="80" name="Rectangle 79"/>
+                <p:cNvSpPr/>
+                <p:nvPr/>
+              </p:nvSpPr>
+              <p:spPr>
+                <a:xfrm>
+                  <a:off x="10464243" y="1678015"/>
+                  <a:ext cx="140291" cy="180364"/>
+                </a:xfrm>
+                <a:prstGeom prst="rect">
+                  <a:avLst/>
+                </a:prstGeom>
+                <a:noFill/>
+                <a:ln w="38100">
+                  <a:solidFill>
+                    <a:schemeClr val="tx1"/>
+                  </a:solidFill>
+                </a:ln>
+              </p:spPr>
+              <p:style>
+                <a:lnRef idx="2">
+                  <a:schemeClr val="accent1">
+                    <a:shade val="50000"/>
+                  </a:schemeClr>
+                </a:lnRef>
+                <a:fillRef idx="1">
+                  <a:schemeClr val="accent1"/>
+                </a:fillRef>
+                <a:effectRef idx="0">
+                  <a:schemeClr val="accent1"/>
+                </a:effectRef>
+                <a:fontRef idx="minor">
+                  <a:schemeClr val="lt1"/>
+                </a:fontRef>
+              </p:style>
+              <p:txBody>
+                <a:bodyPr rtlCol="0" anchor="ctr"/>
+                <a:lstStyle/>
+                <a:p>
+                  <a:pPr algn="ctr"/>
+                  <a:endParaRPr lang="en-US"/>
+                </a:p>
+              </p:txBody>
+            </p:sp>
+            <p:sp>
+              <p:nvSpPr>
+                <p:cNvPr id="81" name="Rectangle 80"/>
+                <p:cNvSpPr/>
+                <p:nvPr/>
+              </p:nvSpPr>
+              <p:spPr>
+                <a:xfrm>
+                  <a:off x="10604534" y="1678015"/>
+                  <a:ext cx="140291" cy="180364"/>
+                </a:xfrm>
+                <a:prstGeom prst="rect">
+                  <a:avLst/>
+                </a:prstGeom>
+                <a:noFill/>
+                <a:ln w="38100">
+                  <a:solidFill>
+                    <a:schemeClr val="tx1"/>
+                  </a:solidFill>
+                </a:ln>
+              </p:spPr>
+              <p:style>
+                <a:lnRef idx="2">
+                  <a:schemeClr val="accent1">
+                    <a:shade val="50000"/>
+                  </a:schemeClr>
+                </a:lnRef>
+                <a:fillRef idx="1">
+                  <a:schemeClr val="accent1"/>
+                </a:fillRef>
+                <a:effectRef idx="0">
+                  <a:schemeClr val="accent1"/>
+                </a:effectRef>
+                <a:fontRef idx="minor">
+                  <a:schemeClr val="lt1"/>
+                </a:fontRef>
+              </p:style>
+              <p:txBody>
+                <a:bodyPr rtlCol="0" anchor="ctr"/>
+                <a:lstStyle/>
+                <a:p>
+                  <a:pPr algn="ctr"/>
+                  <a:endParaRPr lang="en-US"/>
+                </a:p>
+              </p:txBody>
+            </p:sp>
+            <p:sp>
+              <p:nvSpPr>
+                <p:cNvPr id="82" name="Rectangle 81"/>
+                <p:cNvSpPr/>
+                <p:nvPr/>
+              </p:nvSpPr>
+              <p:spPr>
+                <a:xfrm>
+                  <a:off x="10744825" y="1678015"/>
+                  <a:ext cx="140291" cy="180364"/>
+                </a:xfrm>
+                <a:prstGeom prst="rect">
+                  <a:avLst/>
+                </a:prstGeom>
+                <a:noFill/>
+                <a:ln w="38100">
+                  <a:solidFill>
+                    <a:schemeClr val="tx1"/>
+                  </a:solidFill>
+                </a:ln>
+              </p:spPr>
+              <p:style>
+                <a:lnRef idx="2">
+                  <a:schemeClr val="accent1">
+                    <a:shade val="50000"/>
+                  </a:schemeClr>
+                </a:lnRef>
+                <a:fillRef idx="1">
+                  <a:schemeClr val="accent1"/>
+                </a:fillRef>
+                <a:effectRef idx="0">
+                  <a:schemeClr val="accent1"/>
+                </a:effectRef>
+                <a:fontRef idx="minor">
+                  <a:schemeClr val="lt1"/>
+                </a:fontRef>
+              </p:style>
+              <p:txBody>
+                <a:bodyPr rtlCol="0" anchor="ctr"/>
+                <a:lstStyle/>
+                <a:p>
+                  <a:pPr algn="ctr"/>
+                  <a:endParaRPr lang="en-US"/>
+                </a:p>
+              </p:txBody>
+            </p:sp>
+            <p:sp>
+              <p:nvSpPr>
+                <p:cNvPr id="83" name="Rectangle 82"/>
+                <p:cNvSpPr/>
+                <p:nvPr/>
+              </p:nvSpPr>
+              <p:spPr>
+                <a:xfrm>
+                  <a:off x="10885116" y="1678015"/>
+                  <a:ext cx="140291" cy="180364"/>
+                </a:xfrm>
+                <a:prstGeom prst="rect">
+                  <a:avLst/>
+                </a:prstGeom>
+                <a:noFill/>
+                <a:ln w="38100">
+                  <a:solidFill>
+                    <a:schemeClr val="tx1"/>
+                  </a:solidFill>
+                </a:ln>
+              </p:spPr>
+              <p:style>
+                <a:lnRef idx="2">
+                  <a:schemeClr val="accent1">
+                    <a:shade val="50000"/>
+                  </a:schemeClr>
+                </a:lnRef>
+                <a:fillRef idx="1">
+                  <a:schemeClr val="accent1"/>
+                </a:fillRef>
+                <a:effectRef idx="0">
+                  <a:schemeClr val="accent1"/>
+                </a:effectRef>
+                <a:fontRef idx="minor">
+                  <a:schemeClr val="lt1"/>
+                </a:fontRef>
+              </p:style>
+              <p:txBody>
+                <a:bodyPr rtlCol="0" anchor="ctr"/>
+                <a:lstStyle/>
+                <a:p>
+                  <a:pPr algn="ctr"/>
+                  <a:endParaRPr lang="en-US"/>
+                </a:p>
+              </p:txBody>
+            </p:sp>
+          </p:grpSp>
+        </p:grpSp>
+        <mc:AlternateContent xmlns:mc="http://schemas.openxmlformats.org/markup-compatibility/2006">
+          <mc:Choice xmlns:a14="http://schemas.microsoft.com/office/drawing/2010/main" Requires="a14">
+            <p:sp>
+              <p:nvSpPr>
+                <p:cNvPr id="85" name="TextBox 84"/>
+                <p:cNvSpPr txBox="1"/>
+                <p:nvPr/>
+              </p:nvSpPr>
+              <p:spPr>
+                <a:xfrm>
+                  <a:off x="9130165" y="3030001"/>
+                  <a:ext cx="441980" cy="307777"/>
+                </a:xfrm>
+                <a:prstGeom prst="rect">
+                  <a:avLst/>
+                </a:prstGeom>
+                <a:noFill/>
+              </p:spPr>
+              <p:txBody>
+                <a:bodyPr wrap="none" lIns="0" tIns="0" rIns="0" bIns="0" rtlCol="0">
+                  <a:spAutoFit/>
+                </a:bodyPr>
+                <a:lstStyle/>
+                <a:p>
+                  <a14:m>
+                    <m:oMathPara xmlns:m="http://schemas.openxmlformats.org/officeDocument/2006/math">
+                      <m:oMathParaPr>
+                        <m:jc m:val="centerGroup"/>
+                      </m:oMathParaPr>
+                      <m:oMath xmlns:m="http://schemas.openxmlformats.org/officeDocument/2006/math">
+                        <m:r>
+                          <m:rPr>
+                            <m:sty m:val="p"/>
+                          </m:rPr>
+                          <a:rPr lang="en-US" sz="2000" b="0" i="0" smtClean="0">
+                            <a:latin typeface="Cambria Math" panose="02040503050406030204" pitchFamily="18" charset="0"/>
+                            <a:cs typeface="Arial" panose="020B0604020202020204" pitchFamily="34" charset="0"/>
+                          </a:rPr>
+                          <m:t>Δ</m:t>
+                        </m:r>
+                        <m:r>
+                          <a:rPr lang="en-US" sz="2000" b="0" i="1" smtClean="0">
+                            <a:latin typeface="Cambria Math" panose="02040503050406030204" pitchFamily="18" charset="0"/>
+                            <a:cs typeface="Arial" panose="020B0604020202020204" pitchFamily="34" charset="0"/>
+                          </a:rPr>
+                          <m:t>𝑚</m:t>
+                        </m:r>
+                      </m:oMath>
+                    </m:oMathPara>
+                  </a14:m>
+                  <a:endParaRPr lang="en-US" sz="2000" dirty="0" smtClean="0">
+                    <a:latin typeface="Arial" panose="020B0604020202020204" pitchFamily="34" charset="0"/>
+                    <a:cs typeface="Arial" panose="020B0604020202020204" pitchFamily="34" charset="0"/>
+                  </a:endParaRPr>
+                </a:p>
+              </p:txBody>
+            </p:sp>
+          </mc:Choice>
+          <mc:Fallback>
+            <p:sp>
+              <p:nvSpPr>
+                <p:cNvPr id="85" name="TextBox 84"/>
+                <p:cNvSpPr txBox="1">
+                  <a:spLocks noRot="1" noChangeAspect="1" noMove="1" noResize="1" noEditPoints="1" noAdjustHandles="1" noChangeArrowheads="1" noChangeShapeType="1" noTextEdit="1"/>
+                </p:cNvSpPr>
+                <p:nvPr/>
+              </p:nvSpPr>
+              <p:spPr>
+                <a:xfrm>
+                  <a:off x="9130165" y="3030001"/>
+                  <a:ext cx="441980" cy="307777"/>
+                </a:xfrm>
+                <a:prstGeom prst="rect">
+                  <a:avLst/>
+                </a:prstGeom>
+                <a:blipFill>
+                  <a:blip r:embed="rId46"/>
+                  <a:stretch>
+                    <a:fillRect l="-12500" r="-5556" b="-9804"/>
+                  </a:stretch>
+                </a:blipFill>
+              </p:spPr>
+              <p:txBody>
+                <a:bodyPr/>
+                <a:lstStyle/>
+                <a:p>
+                  <a:r>
+                    <a:rPr lang="en-US">
+                      <a:noFill/>
+                    </a:rPr>
+                    <a:t> </a:t>
+                  </a:r>
+                </a:p>
+              </p:txBody>
+            </p:sp>
+          </mc:Fallback>
+        </mc:AlternateContent>
+        <mc:AlternateContent xmlns:mc="http://schemas.openxmlformats.org/markup-compatibility/2006">
+          <mc:Choice xmlns:a14="http://schemas.microsoft.com/office/drawing/2010/main" Requires="a14">
+            <p:sp>
+              <p:nvSpPr>
+                <p:cNvPr id="86" name="TextBox 85"/>
+                <p:cNvSpPr txBox="1"/>
+                <p:nvPr/>
+              </p:nvSpPr>
+              <p:spPr>
+                <a:xfrm>
+                  <a:off x="9130165" y="3445922"/>
+                  <a:ext cx="366832" cy="307777"/>
+                </a:xfrm>
+                <a:prstGeom prst="rect">
+                  <a:avLst/>
+                </a:prstGeom>
+                <a:noFill/>
+              </p:spPr>
+              <p:txBody>
+                <a:bodyPr wrap="none" lIns="0" tIns="0" rIns="0" bIns="0" rtlCol="0">
+                  <a:spAutoFit/>
+                </a:bodyPr>
+                <a:lstStyle/>
+                <a:p>
+                  <a14:m>
+                    <m:oMathPara xmlns:m="http://schemas.openxmlformats.org/officeDocument/2006/math">
+                      <m:oMathParaPr>
+                        <m:jc m:val="centerGroup"/>
+                      </m:oMathParaPr>
+                      <m:oMath xmlns:m="http://schemas.openxmlformats.org/officeDocument/2006/math">
+                        <m:r>
+                          <m:rPr>
+                            <m:sty m:val="p"/>
+                          </m:rPr>
+                          <a:rPr lang="en-US" sz="2000" b="0" i="0" smtClean="0">
+                            <a:latin typeface="Cambria Math" panose="02040503050406030204" pitchFamily="18" charset="0"/>
+                            <a:cs typeface="Arial" panose="020B0604020202020204" pitchFamily="34" charset="0"/>
+                          </a:rPr>
+                          <m:t>Δ</m:t>
+                        </m:r>
+                        <m:r>
+                          <a:rPr lang="en-US" sz="2000" b="0" i="1" smtClean="0">
+                            <a:latin typeface="Cambria Math" panose="02040503050406030204" pitchFamily="18" charset="0"/>
+                            <a:cs typeface="Arial" panose="020B0604020202020204" pitchFamily="34" charset="0"/>
+                          </a:rPr>
+                          <m:t>𝑥</m:t>
+                        </m:r>
+                      </m:oMath>
+                    </m:oMathPara>
+                  </a14:m>
+                  <a:endParaRPr lang="en-US" sz="2000" dirty="0" smtClean="0">
+                    <a:latin typeface="Arial" panose="020B0604020202020204" pitchFamily="34" charset="0"/>
+                    <a:cs typeface="Arial" panose="020B0604020202020204" pitchFamily="34" charset="0"/>
+                  </a:endParaRPr>
+                </a:p>
+              </p:txBody>
+            </p:sp>
+          </mc:Choice>
+          <mc:Fallback>
+            <p:sp>
+              <p:nvSpPr>
+                <p:cNvPr id="86" name="TextBox 85"/>
+                <p:cNvSpPr txBox="1">
+                  <a:spLocks noRot="1" noChangeAspect="1" noMove="1" noResize="1" noEditPoints="1" noAdjustHandles="1" noChangeArrowheads="1" noChangeShapeType="1" noTextEdit="1"/>
+                </p:cNvSpPr>
+                <p:nvPr/>
+              </p:nvSpPr>
+              <p:spPr>
+                <a:xfrm>
+                  <a:off x="9130165" y="3445922"/>
+                  <a:ext cx="366832" cy="307777"/>
+                </a:xfrm>
+                <a:prstGeom prst="rect">
+                  <a:avLst/>
+                </a:prstGeom>
+                <a:blipFill>
+                  <a:blip r:embed="rId47"/>
+                  <a:stretch>
+                    <a:fillRect l="-15000" r="-5000" b="-9804"/>
+                  </a:stretch>
+                </a:blipFill>
+              </p:spPr>
+              <p:txBody>
+                <a:bodyPr/>
+                <a:lstStyle/>
+                <a:p>
+                  <a:r>
+                    <a:rPr lang="en-US">
+                      <a:noFill/>
+                    </a:rPr>
+                    <a:t> </a:t>
+                  </a:r>
+                </a:p>
+              </p:txBody>
+            </p:sp>
+          </mc:Fallback>
+        </mc:AlternateContent>
+        <p:cxnSp>
+          <p:nvCxnSpPr>
+            <p:cNvPr id="88" name="Straight Arrow Connector 87"/>
+            <p:cNvCxnSpPr/>
+            <p:nvPr/>
+          </p:nvCxnSpPr>
+          <p:spPr>
+            <a:xfrm>
+              <a:off x="9165168" y="3433158"/>
+              <a:ext cx="196736" cy="0"/>
+            </a:xfrm>
+            <a:prstGeom prst="straightConnector1">
+              <a:avLst/>
+            </a:prstGeom>
+            <a:ln w="28575">
+              <a:solidFill>
+                <a:schemeClr val="tx1"/>
+              </a:solidFill>
+              <a:headEnd type="triangle" w="sm" len="sm"/>
+              <a:tailEnd type="triangle" w="sm" len="sm"/>
+            </a:ln>
+          </p:spPr>
+          <p:style>
+            <a:lnRef idx="1">
+              <a:schemeClr val="accent1"/>
+            </a:lnRef>
+            <a:fillRef idx="0">
+              <a:schemeClr val="accent1"/>
+            </a:fillRef>
+            <a:effectRef idx="0">
+              <a:schemeClr val="accent1"/>
+            </a:effectRef>
+            <a:fontRef idx="minor">
+              <a:schemeClr val="tx1"/>
+            </a:fontRef>
+          </p:style>
+        </p:cxnSp>
+      </p:grpSp>
     </p:spTree>
     <p:extLst>
       <p:ext uri="{BB962C8B-B14F-4D97-AF65-F5344CB8AC3E}">
         <p14:creationId xmlns:p14="http://schemas.microsoft.com/office/powerpoint/2010/main" val="2935055830"/>
+      </p:ext>
+    </p:extLst>
+  </p:cSld>
+  <p:clrMapOvr>
+    <a:masterClrMapping/>
+  </p:clrMapOvr>
+</p:sld>
+</file>
+
+<file path=ppt/slides/slide8.xml><?xml version="1.0" encoding="utf-8"?>
+<p:sld xmlns:a="http://schemas.openxmlformats.org/drawingml/2006/main" xmlns:r="http://schemas.openxmlformats.org/officeDocument/2006/relationships" xmlns:p="http://schemas.openxmlformats.org/presentationml/2006/main">
+  <p:cSld>
+    <p:spTree>
+      <p:nvGrpSpPr>
+        <p:cNvPr id="1" name=""/>
+        <p:cNvGrpSpPr/>
+        <p:nvPr/>
+      </p:nvGrpSpPr>
+      <p:grpSpPr>
+        <a:xfrm>
+          <a:off x="0" y="0"/>
+          <a:ext cx="0" cy="0"/>
+          <a:chOff x="0" y="0"/>
+          <a:chExt cx="0" cy="0"/>
+        </a:xfrm>
+      </p:grpSpPr>
+      <p:grpSp>
+        <p:nvGrpSpPr>
+          <p:cNvPr id="65" name="Group 64"/>
+          <p:cNvGrpSpPr/>
+          <p:nvPr/>
+        </p:nvGrpSpPr>
+        <p:grpSpPr>
+          <a:xfrm>
+            <a:off x="1042219" y="668594"/>
+            <a:ext cx="4925961" cy="2913322"/>
+            <a:chOff x="953729" y="599768"/>
+            <a:chExt cx="4925961" cy="2913322"/>
+          </a:xfrm>
+        </p:grpSpPr>
+        <p:grpSp>
+          <p:nvGrpSpPr>
+            <p:cNvPr id="57" name="Group 56"/>
+            <p:cNvGrpSpPr/>
+            <p:nvPr/>
+          </p:nvGrpSpPr>
+          <p:grpSpPr>
+            <a:xfrm>
+              <a:off x="953729" y="599768"/>
+              <a:ext cx="4925961" cy="2913322"/>
+              <a:chOff x="2418735" y="835742"/>
+              <a:chExt cx="4925961" cy="2913322"/>
+            </a:xfrm>
+          </p:grpSpPr>
+          <p:grpSp>
+            <p:nvGrpSpPr>
+              <p:cNvPr id="51" name="Group 50"/>
+              <p:cNvGrpSpPr/>
+              <p:nvPr/>
+            </p:nvGrpSpPr>
+            <p:grpSpPr>
+              <a:xfrm>
+                <a:off x="2418735" y="835742"/>
+                <a:ext cx="4925961" cy="2913322"/>
+                <a:chOff x="2418735" y="835742"/>
+                <a:chExt cx="4925961" cy="2913322"/>
+              </a:xfrm>
+            </p:grpSpPr>
+            <p:cxnSp>
+              <p:nvCxnSpPr>
+                <p:cNvPr id="44" name="Straight Arrow Connector 43"/>
+                <p:cNvCxnSpPr>
+                  <a:stCxn id="33" idx="1"/>
+                </p:cNvCxnSpPr>
+                <p:nvPr/>
+              </p:nvCxnSpPr>
+              <p:spPr>
+                <a:xfrm flipV="1">
+                  <a:off x="4267200" y="2138516"/>
+                  <a:ext cx="2047126" cy="1302774"/>
+                </a:xfrm>
+                <a:prstGeom prst="straightConnector1">
+                  <a:avLst/>
+                </a:prstGeom>
+                <a:ln w="38100">
+                  <a:solidFill>
+                    <a:schemeClr val="tx1"/>
+                  </a:solidFill>
+                  <a:prstDash val="dash"/>
+                  <a:tailEnd type="triangle"/>
+                </a:ln>
+              </p:spPr>
+              <p:style>
+                <a:lnRef idx="1">
+                  <a:schemeClr val="accent1"/>
+                </a:lnRef>
+                <a:fillRef idx="0">
+                  <a:schemeClr val="accent1"/>
+                </a:fillRef>
+                <a:effectRef idx="0">
+                  <a:schemeClr val="accent1"/>
+                </a:effectRef>
+                <a:fontRef idx="minor">
+                  <a:schemeClr val="tx1"/>
+                </a:fontRef>
+              </p:style>
+            </p:cxnSp>
+            <p:sp>
+              <p:nvSpPr>
+                <p:cNvPr id="33" name="Freeform 32"/>
+                <p:cNvSpPr/>
+                <p:nvPr/>
+              </p:nvSpPr>
+              <p:spPr>
+                <a:xfrm>
+                  <a:off x="2418735" y="2507226"/>
+                  <a:ext cx="3687097" cy="934068"/>
+                </a:xfrm>
+                <a:custGeom>
+                  <a:avLst/>
+                  <a:gdLst>
+                    <a:gd name="connsiteX0" fmla="*/ 0 w 3687097"/>
+                    <a:gd name="connsiteY0" fmla="*/ 9832 h 934068"/>
+                    <a:gd name="connsiteX1" fmla="*/ 1848465 w 3687097"/>
+                    <a:gd name="connsiteY1" fmla="*/ 934064 h 934068"/>
+                    <a:gd name="connsiteX2" fmla="*/ 3687097 w 3687097"/>
+                    <a:gd name="connsiteY2" fmla="*/ 0 h 934068"/>
+                  </a:gdLst>
+                  <a:ahLst/>
+                  <a:cxnLst>
+                    <a:cxn ang="0">
+                      <a:pos x="connsiteX0" y="connsiteY0"/>
+                    </a:cxn>
+                    <a:cxn ang="0">
+                      <a:pos x="connsiteX1" y="connsiteY1"/>
+                    </a:cxn>
+                    <a:cxn ang="0">
+                      <a:pos x="connsiteX2" y="connsiteY2"/>
+                    </a:cxn>
+                  </a:cxnLst>
+                  <a:rect l="l" t="t" r="r" b="b"/>
+                  <a:pathLst>
+                    <a:path w="3687097" h="934068">
+                      <a:moveTo>
+                        <a:pt x="0" y="9832"/>
+                      </a:moveTo>
+                      <a:cubicBezTo>
+                        <a:pt x="616974" y="472767"/>
+                        <a:pt x="1233949" y="935703"/>
+                        <a:pt x="1848465" y="934064"/>
+                      </a:cubicBezTo>
+                      <a:cubicBezTo>
+                        <a:pt x="2462981" y="932425"/>
+                        <a:pt x="3075039" y="466212"/>
+                        <a:pt x="3687097" y="0"/>
+                      </a:cubicBezTo>
+                    </a:path>
+                  </a:pathLst>
+                </a:custGeom>
+                <a:noFill/>
+                <a:ln w="38100">
+                  <a:solidFill>
+                    <a:schemeClr val="tx1"/>
+                  </a:solidFill>
+                </a:ln>
+              </p:spPr>
+              <p:style>
+                <a:lnRef idx="2">
+                  <a:schemeClr val="accent1">
+                    <a:shade val="50000"/>
+                  </a:schemeClr>
+                </a:lnRef>
+                <a:fillRef idx="1">
+                  <a:schemeClr val="accent1"/>
+                </a:fillRef>
+                <a:effectRef idx="0">
+                  <a:schemeClr val="accent1"/>
+                </a:effectRef>
+                <a:fontRef idx="minor">
+                  <a:schemeClr val="lt1"/>
+                </a:fontRef>
+              </p:style>
+              <p:txBody>
+                <a:bodyPr rtlCol="0" anchor="ctr"/>
+                <a:lstStyle/>
+                <a:p>
+                  <a:pPr algn="ctr"/>
+                  <a:endParaRPr lang="en-US"/>
+                </a:p>
+              </p:txBody>
+            </p:sp>
+            <p:sp>
+              <p:nvSpPr>
+                <p:cNvPr id="34" name="Oval 33"/>
+                <p:cNvSpPr/>
+                <p:nvPr/>
+              </p:nvSpPr>
+              <p:spPr>
+                <a:xfrm>
+                  <a:off x="2418735" y="2359742"/>
+                  <a:ext cx="3687097" cy="294968"/>
+                </a:xfrm>
+                <a:prstGeom prst="ellipse">
+                  <a:avLst/>
+                </a:prstGeom>
+                <a:solidFill>
+                  <a:schemeClr val="bg1">
+                    <a:lumMod val="85000"/>
+                  </a:schemeClr>
+                </a:solidFill>
+                <a:ln w="38100">
+                  <a:solidFill>
+                    <a:schemeClr val="tx1"/>
+                  </a:solidFill>
+                </a:ln>
+              </p:spPr>
+              <p:style>
+                <a:lnRef idx="2">
+                  <a:schemeClr val="accent1">
+                    <a:shade val="50000"/>
+                  </a:schemeClr>
+                </a:lnRef>
+                <a:fillRef idx="1">
+                  <a:schemeClr val="accent1"/>
+                </a:fillRef>
+                <a:effectRef idx="0">
+                  <a:schemeClr val="accent1"/>
+                </a:effectRef>
+                <a:fontRef idx="minor">
+                  <a:schemeClr val="lt1"/>
+                </a:fontRef>
+              </p:style>
+              <p:txBody>
+                <a:bodyPr rtlCol="0" anchor="ctr"/>
+                <a:lstStyle/>
+                <a:p>
+                  <a:pPr algn="ctr"/>
+                  <a:endParaRPr lang="en-US"/>
+                </a:p>
+              </p:txBody>
+            </p:sp>
+            <p:sp>
+              <p:nvSpPr>
+                <p:cNvPr id="35" name="Oval 34"/>
+                <p:cNvSpPr/>
+                <p:nvPr/>
+              </p:nvSpPr>
+              <p:spPr>
+                <a:xfrm>
+                  <a:off x="3023419" y="2831690"/>
+                  <a:ext cx="2492478" cy="196645"/>
+                </a:xfrm>
+                <a:prstGeom prst="ellipse">
+                  <a:avLst/>
+                </a:prstGeom>
+                <a:solidFill>
+                  <a:schemeClr val="bg2">
+                    <a:lumMod val="50000"/>
+                  </a:schemeClr>
+                </a:solidFill>
+                <a:ln w="76200">
+                  <a:solidFill>
+                    <a:schemeClr val="tx1"/>
+                  </a:solidFill>
+                </a:ln>
+              </p:spPr>
+              <p:style>
+                <a:lnRef idx="2">
+                  <a:schemeClr val="accent1">
+                    <a:shade val="50000"/>
+                  </a:schemeClr>
+                </a:lnRef>
+                <a:fillRef idx="1">
+                  <a:schemeClr val="accent1"/>
+                </a:fillRef>
+                <a:effectRef idx="0">
+                  <a:schemeClr val="accent1"/>
+                </a:effectRef>
+                <a:fontRef idx="minor">
+                  <a:schemeClr val="lt1"/>
+                </a:fontRef>
+              </p:style>
+              <p:txBody>
+                <a:bodyPr rtlCol="0" anchor="ctr"/>
+                <a:lstStyle/>
+                <a:p>
+                  <a:pPr algn="ctr"/>
+                  <a:endParaRPr lang="en-US"/>
+                </a:p>
+              </p:txBody>
+            </p:sp>
+            <p:cxnSp>
+              <p:nvCxnSpPr>
+                <p:cNvPr id="37" name="Straight Arrow Connector 36"/>
+                <p:cNvCxnSpPr>
+                  <a:stCxn id="33" idx="1"/>
+                </p:cNvCxnSpPr>
+                <p:nvPr/>
+              </p:nvCxnSpPr>
+              <p:spPr>
+                <a:xfrm flipH="1" flipV="1">
+                  <a:off x="4262283" y="835742"/>
+                  <a:ext cx="4917" cy="2605548"/>
+                </a:xfrm>
+                <a:prstGeom prst="straightConnector1">
+                  <a:avLst/>
+                </a:prstGeom>
+                <a:ln w="38100">
+                  <a:solidFill>
+                    <a:schemeClr val="tx1"/>
+                  </a:solidFill>
+                  <a:tailEnd type="triangle"/>
+                </a:ln>
+              </p:spPr>
+              <p:style>
+                <a:lnRef idx="1">
+                  <a:schemeClr val="accent1"/>
+                </a:lnRef>
+                <a:fillRef idx="0">
+                  <a:schemeClr val="accent1"/>
+                </a:fillRef>
+                <a:effectRef idx="0">
+                  <a:schemeClr val="accent1"/>
+                </a:effectRef>
+                <a:fontRef idx="minor">
+                  <a:schemeClr val="tx1"/>
+                </a:fontRef>
+              </p:style>
+            </p:cxnSp>
+            <p:cxnSp>
+              <p:nvCxnSpPr>
+                <p:cNvPr id="38" name="Straight Arrow Connector 37"/>
+                <p:cNvCxnSpPr>
+                  <a:stCxn id="33" idx="1"/>
+                </p:cNvCxnSpPr>
+                <p:nvPr/>
+              </p:nvCxnSpPr>
+              <p:spPr>
+                <a:xfrm>
+                  <a:off x="4267200" y="3441290"/>
+                  <a:ext cx="3077496" cy="0"/>
+                </a:xfrm>
+                <a:prstGeom prst="straightConnector1">
+                  <a:avLst/>
+                </a:prstGeom>
+                <a:ln w="38100">
+                  <a:solidFill>
+                    <a:schemeClr val="tx1"/>
+                  </a:solidFill>
+                  <a:tailEnd type="triangle"/>
+                </a:ln>
+              </p:spPr>
+              <p:style>
+                <a:lnRef idx="1">
+                  <a:schemeClr val="accent1"/>
+                </a:lnRef>
+                <a:fillRef idx="0">
+                  <a:schemeClr val="accent1"/>
+                </a:fillRef>
+                <a:effectRef idx="0">
+                  <a:schemeClr val="accent1"/>
+                </a:effectRef>
+                <a:fontRef idx="minor">
+                  <a:schemeClr val="tx1"/>
+                </a:fontRef>
+              </p:style>
+            </p:cxnSp>
+            <mc:AlternateContent xmlns:mc="http://schemas.openxmlformats.org/markup-compatibility/2006">
+              <mc:Choice xmlns:a14="http://schemas.microsoft.com/office/drawing/2010/main" Requires="a14">
+                <p:sp>
+                  <p:nvSpPr>
+                    <p:cNvPr id="42" name="TextBox 41"/>
+                    <p:cNvSpPr txBox="1"/>
+                    <p:nvPr/>
+                  </p:nvSpPr>
+                  <p:spPr>
+                    <a:xfrm>
+                      <a:off x="6917875" y="3441287"/>
+                      <a:ext cx="214546" cy="307777"/>
+                    </a:xfrm>
+                    <a:prstGeom prst="rect">
+                      <a:avLst/>
+                    </a:prstGeom>
+                    <a:noFill/>
+                  </p:spPr>
+                  <p:txBody>
+                    <a:bodyPr wrap="none" lIns="0" tIns="0" rIns="0" bIns="0" rtlCol="0">
+                      <a:spAutoFit/>
+                    </a:bodyPr>
+                    <a:lstStyle/>
+                    <a:p>
+                      <a14:m>
+                        <m:oMathPara xmlns:m="http://schemas.openxmlformats.org/officeDocument/2006/math">
+                          <m:oMathParaPr>
+                            <m:jc m:val="centerGroup"/>
+                          </m:oMathParaPr>
+                          <m:oMath xmlns:m="http://schemas.openxmlformats.org/officeDocument/2006/math">
+                            <m:r>
+                              <a:rPr lang="en-US" sz="2000" b="0" i="1" smtClean="0">
+                                <a:latin typeface="Cambria Math" panose="02040503050406030204" pitchFamily="18" charset="0"/>
+                                <a:cs typeface="Arial" panose="020B0604020202020204" pitchFamily="34" charset="0"/>
+                              </a:rPr>
+                              <m:t>𝑥</m:t>
+                            </m:r>
+                          </m:oMath>
+                        </m:oMathPara>
+                      </a14:m>
+                      <a:endParaRPr lang="en-US" sz="2000" dirty="0" smtClean="0">
+                        <a:latin typeface="Arial" panose="020B0604020202020204" pitchFamily="34" charset="0"/>
+                        <a:cs typeface="Arial" panose="020B0604020202020204" pitchFamily="34" charset="0"/>
+                      </a:endParaRPr>
+                    </a:p>
+                  </p:txBody>
+                </p:sp>
+              </mc:Choice>
+              <mc:Fallback>
+                <p:sp>
+                  <p:nvSpPr>
+                    <p:cNvPr id="42" name="TextBox 41"/>
+                    <p:cNvSpPr txBox="1">
+                      <a:spLocks noRot="1" noChangeAspect="1" noMove="1" noResize="1" noEditPoints="1" noAdjustHandles="1" noChangeArrowheads="1" noChangeShapeType="1" noTextEdit="1"/>
+                    </p:cNvSpPr>
+                    <p:nvPr/>
+                  </p:nvSpPr>
+                  <p:spPr>
+                    <a:xfrm>
+                      <a:off x="6917875" y="3441287"/>
+                      <a:ext cx="214546" cy="307777"/>
+                    </a:xfrm>
+                    <a:prstGeom prst="rect">
+                      <a:avLst/>
+                    </a:prstGeom>
+                    <a:blipFill>
+                      <a:blip r:embed="rId2"/>
+                      <a:stretch>
+                        <a:fillRect l="-11429" r="-11429" b="-1961"/>
+                      </a:stretch>
+                    </a:blipFill>
+                  </p:spPr>
+                  <p:txBody>
+                    <a:bodyPr/>
+                    <a:lstStyle/>
+                    <a:p>
+                      <a:r>
+                        <a:rPr lang="en-US">
+                          <a:noFill/>
+                        </a:rPr>
+                        <a:t> </a:t>
+                      </a:r>
+                    </a:p>
+                  </p:txBody>
+                </p:sp>
+              </mc:Fallback>
+            </mc:AlternateContent>
+            <mc:AlternateContent xmlns:mc="http://schemas.openxmlformats.org/markup-compatibility/2006">
+              <mc:Choice xmlns:a14="http://schemas.microsoft.com/office/drawing/2010/main" Requires="a14">
+                <p:sp>
+                  <p:nvSpPr>
+                    <p:cNvPr id="43" name="TextBox 42"/>
+                    <p:cNvSpPr txBox="1"/>
+                    <p:nvPr/>
+                  </p:nvSpPr>
+                  <p:spPr>
+                    <a:xfrm>
+                      <a:off x="3989185" y="851975"/>
+                      <a:ext cx="198324" cy="307777"/>
+                    </a:xfrm>
+                    <a:prstGeom prst="rect">
+                      <a:avLst/>
+                    </a:prstGeom>
+                    <a:noFill/>
+                  </p:spPr>
+                  <p:txBody>
+                    <a:bodyPr wrap="none" lIns="0" tIns="0" rIns="0" bIns="0" rtlCol="0">
+                      <a:spAutoFit/>
+                    </a:bodyPr>
+                    <a:lstStyle/>
+                    <a:p>
+                      <a14:m>
+                        <m:oMathPara xmlns:m="http://schemas.openxmlformats.org/officeDocument/2006/math">
+                          <m:oMathParaPr>
+                            <m:jc m:val="centerGroup"/>
+                          </m:oMathParaPr>
+                          <m:oMath xmlns:m="http://schemas.openxmlformats.org/officeDocument/2006/math">
+                            <m:r>
+                              <a:rPr lang="en-US" sz="2000" b="0" i="1" smtClean="0">
+                                <a:latin typeface="Cambria Math" panose="02040503050406030204" pitchFamily="18" charset="0"/>
+                                <a:cs typeface="Arial" panose="020B0604020202020204" pitchFamily="34" charset="0"/>
+                              </a:rPr>
+                              <m:t>𝑧</m:t>
+                            </m:r>
+                          </m:oMath>
+                        </m:oMathPara>
+                      </a14:m>
+                      <a:endParaRPr lang="en-US" sz="2000" dirty="0" smtClean="0">
+                        <a:latin typeface="Arial" panose="020B0604020202020204" pitchFamily="34" charset="0"/>
+                        <a:cs typeface="Arial" panose="020B0604020202020204" pitchFamily="34" charset="0"/>
+                      </a:endParaRPr>
+                    </a:p>
+                  </p:txBody>
+                </p:sp>
+              </mc:Choice>
+              <mc:Fallback>
+                <p:sp>
+                  <p:nvSpPr>
+                    <p:cNvPr id="43" name="TextBox 42"/>
+                    <p:cNvSpPr txBox="1">
+                      <a:spLocks noRot="1" noChangeAspect="1" noMove="1" noResize="1" noEditPoints="1" noAdjustHandles="1" noChangeArrowheads="1" noChangeShapeType="1" noTextEdit="1"/>
+                    </p:cNvSpPr>
+                    <p:nvPr/>
+                  </p:nvSpPr>
+                  <p:spPr>
+                    <a:xfrm>
+                      <a:off x="3989185" y="851975"/>
+                      <a:ext cx="198324" cy="307777"/>
+                    </a:xfrm>
+                    <a:prstGeom prst="rect">
+                      <a:avLst/>
+                    </a:prstGeom>
+                    <a:blipFill>
+                      <a:blip r:embed="rId3"/>
+                      <a:stretch>
+                        <a:fillRect l="-15625" r="-12500" b="-1961"/>
+                      </a:stretch>
+                    </a:blipFill>
+                  </p:spPr>
+                  <p:txBody>
+                    <a:bodyPr/>
+                    <a:lstStyle/>
+                    <a:p>
+                      <a:r>
+                        <a:rPr lang="en-US">
+                          <a:noFill/>
+                        </a:rPr>
+                        <a:t> </a:t>
+                      </a:r>
+                    </a:p>
+                  </p:txBody>
+                </p:sp>
+              </mc:Fallback>
+            </mc:AlternateContent>
+            <mc:AlternateContent xmlns:mc="http://schemas.openxmlformats.org/markup-compatibility/2006">
+              <mc:Choice xmlns:a14="http://schemas.microsoft.com/office/drawing/2010/main" Requires="a14">
+                <p:sp>
+                  <p:nvSpPr>
+                    <p:cNvPr id="50" name="TextBox 49"/>
+                    <p:cNvSpPr txBox="1"/>
+                    <p:nvPr/>
+                  </p:nvSpPr>
+                  <p:spPr>
+                    <a:xfrm>
+                      <a:off x="6022757" y="1824335"/>
+                      <a:ext cx="214546" cy="307777"/>
+                    </a:xfrm>
+                    <a:prstGeom prst="rect">
+                      <a:avLst/>
+                    </a:prstGeom>
+                    <a:noFill/>
+                  </p:spPr>
+                  <p:txBody>
+                    <a:bodyPr wrap="square" lIns="0" tIns="0" rIns="0" bIns="0" rtlCol="0">
+                      <a:spAutoFit/>
+                    </a:bodyPr>
+                    <a:lstStyle/>
+                    <a:p>
+                      <a14:m>
+                        <m:oMathPara xmlns:m="http://schemas.openxmlformats.org/officeDocument/2006/math">
+                          <m:oMathParaPr>
+                            <m:jc m:val="centerGroup"/>
+                          </m:oMathParaPr>
+                          <m:oMath xmlns:m="http://schemas.openxmlformats.org/officeDocument/2006/math">
+                            <m:r>
+                              <a:rPr lang="en-US" sz="2000" b="0" i="1" smtClean="0">
+                                <a:latin typeface="Cambria Math" panose="02040503050406030204" pitchFamily="18" charset="0"/>
+                                <a:cs typeface="Arial" panose="020B0604020202020204" pitchFamily="34" charset="0"/>
+                              </a:rPr>
+                              <m:t>𝑦</m:t>
+                            </m:r>
+                          </m:oMath>
+                        </m:oMathPara>
+                      </a14:m>
+                      <a:endParaRPr lang="en-US" sz="2000" dirty="0" smtClean="0">
+                        <a:latin typeface="Arial" panose="020B0604020202020204" pitchFamily="34" charset="0"/>
+                        <a:cs typeface="Arial" panose="020B0604020202020204" pitchFamily="34" charset="0"/>
+                      </a:endParaRPr>
+                    </a:p>
+                  </p:txBody>
+                </p:sp>
+              </mc:Choice>
+              <mc:Fallback>
+                <p:sp>
+                  <p:nvSpPr>
+                    <p:cNvPr id="50" name="TextBox 49"/>
+                    <p:cNvSpPr txBox="1">
+                      <a:spLocks noRot="1" noChangeAspect="1" noMove="1" noResize="1" noEditPoints="1" noAdjustHandles="1" noChangeArrowheads="1" noChangeShapeType="1" noTextEdit="1"/>
+                    </p:cNvSpPr>
+                    <p:nvPr/>
+                  </p:nvSpPr>
+                  <p:spPr>
+                    <a:xfrm>
+                      <a:off x="6022757" y="1824335"/>
+                      <a:ext cx="214546" cy="307777"/>
+                    </a:xfrm>
+                    <a:prstGeom prst="rect">
+                      <a:avLst/>
+                    </a:prstGeom>
+                    <a:blipFill>
+                      <a:blip r:embed="rId4"/>
+                      <a:stretch>
+                        <a:fillRect l="-25714" r="-28571" b="-30000"/>
+                      </a:stretch>
+                    </a:blipFill>
+                  </p:spPr>
+                  <p:txBody>
+                    <a:bodyPr/>
+                    <a:lstStyle/>
+                    <a:p>
+                      <a:r>
+                        <a:rPr lang="en-US">
+                          <a:noFill/>
+                        </a:rPr>
+                        <a:t> </a:t>
+                      </a:r>
+                    </a:p>
+                  </p:txBody>
+                </p:sp>
+              </mc:Fallback>
+            </mc:AlternateContent>
+          </p:grpSp>
+          <p:cxnSp>
+            <p:nvCxnSpPr>
+              <p:cNvPr id="52" name="Straight Arrow Connector 51"/>
+              <p:cNvCxnSpPr/>
+              <p:nvPr/>
+            </p:nvCxnSpPr>
+            <p:spPr>
+              <a:xfrm flipV="1">
+                <a:off x="5722962" y="2863093"/>
+                <a:ext cx="0" cy="165242"/>
+              </a:xfrm>
+              <a:prstGeom prst="straightConnector1">
+                <a:avLst/>
+              </a:prstGeom>
+              <a:ln w="28575">
+                <a:solidFill>
+                  <a:schemeClr val="tx1"/>
+                </a:solidFill>
+                <a:headEnd type="triangle" w="sm" len="sm"/>
+                <a:tailEnd type="triangle" w="sm" len="sm"/>
+              </a:ln>
+            </p:spPr>
+            <p:style>
+              <a:lnRef idx="1">
+                <a:schemeClr val="accent1"/>
+              </a:lnRef>
+              <a:fillRef idx="0">
+                <a:schemeClr val="accent1"/>
+              </a:fillRef>
+              <a:effectRef idx="0">
+                <a:schemeClr val="accent1"/>
+              </a:effectRef>
+              <a:fontRef idx="minor">
+                <a:schemeClr val="tx1"/>
+              </a:fontRef>
+            </p:style>
+          </p:cxnSp>
+          <mc:AlternateContent xmlns:mc="http://schemas.openxmlformats.org/markup-compatibility/2006">
+            <mc:Choice xmlns:a14="http://schemas.microsoft.com/office/drawing/2010/main" Requires="a14">
+              <p:sp>
+                <p:nvSpPr>
+                  <p:cNvPr id="55" name="TextBox 54"/>
+                  <p:cNvSpPr txBox="1"/>
+                  <p:nvPr/>
+                </p:nvSpPr>
+                <p:spPr>
+                  <a:xfrm>
+                    <a:off x="5829997" y="2759888"/>
+                    <a:ext cx="347403" cy="307777"/>
+                  </a:xfrm>
+                  <a:prstGeom prst="rect">
+                    <a:avLst/>
+                  </a:prstGeom>
+                  <a:noFill/>
+                </p:spPr>
+                <p:txBody>
+                  <a:bodyPr wrap="none" lIns="0" tIns="0" rIns="0" bIns="0" rtlCol="0">
+                    <a:spAutoFit/>
+                  </a:bodyPr>
+                  <a:lstStyle/>
+                  <a:p>
+                    <a14:m>
+                      <m:oMathPara xmlns:m="http://schemas.openxmlformats.org/officeDocument/2006/math">
+                        <m:oMathParaPr>
+                          <m:jc m:val="centerGroup"/>
+                        </m:oMathParaPr>
+                        <m:oMath xmlns:m="http://schemas.openxmlformats.org/officeDocument/2006/math">
+                          <m:r>
+                            <a:rPr lang="en-US" sz="2000" b="0" i="1" smtClean="0">
+                              <a:latin typeface="Cambria Math" panose="02040503050406030204" pitchFamily="18" charset="0"/>
+                              <a:cs typeface="Arial" panose="020B0604020202020204" pitchFamily="34" charset="0"/>
+                            </a:rPr>
+                            <m:t>𝑑𝑧</m:t>
+                          </m:r>
+                        </m:oMath>
+                      </m:oMathPara>
+                    </a14:m>
+                    <a:endParaRPr lang="en-US" sz="2000" dirty="0" smtClean="0">
+                      <a:latin typeface="Arial" panose="020B0604020202020204" pitchFamily="34" charset="0"/>
+                      <a:cs typeface="Arial" panose="020B0604020202020204" pitchFamily="34" charset="0"/>
+                    </a:endParaRPr>
+                  </a:p>
+                </p:txBody>
+              </p:sp>
+            </mc:Choice>
+            <mc:Fallback>
+              <p:sp>
+                <p:nvSpPr>
+                  <p:cNvPr id="55" name="TextBox 54"/>
+                  <p:cNvSpPr txBox="1">
+                    <a:spLocks noRot="1" noChangeAspect="1" noMove="1" noResize="1" noEditPoints="1" noAdjustHandles="1" noChangeArrowheads="1" noChangeShapeType="1" noTextEdit="1"/>
+                  </p:cNvSpPr>
+                  <p:nvPr/>
+                </p:nvSpPr>
+                <p:spPr>
+                  <a:xfrm>
+                    <a:off x="5829997" y="2759888"/>
+                    <a:ext cx="347403" cy="307777"/>
+                  </a:xfrm>
+                  <a:prstGeom prst="rect">
+                    <a:avLst/>
+                  </a:prstGeom>
+                  <a:blipFill>
+                    <a:blip r:embed="rId5"/>
+                    <a:stretch>
+                      <a:fillRect l="-15789" r="-14035" b="-9804"/>
+                    </a:stretch>
+                  </a:blipFill>
+                </p:spPr>
+                <p:txBody>
+                  <a:bodyPr/>
+                  <a:lstStyle/>
+                  <a:p>
+                    <a:r>
+                      <a:rPr lang="en-US">
+                        <a:noFill/>
+                      </a:rPr>
+                      <a:t> </a:t>
+                    </a:r>
+                  </a:p>
+                </p:txBody>
+              </p:sp>
+            </mc:Fallback>
+          </mc:AlternateContent>
+          <mc:AlternateContent xmlns:mc="http://schemas.openxmlformats.org/markup-compatibility/2006">
+            <mc:Choice xmlns:a14="http://schemas.microsoft.com/office/drawing/2010/main" Requires="a14">
+              <p:sp>
+                <p:nvSpPr>
+                  <p:cNvPr id="56" name="TextBox 55"/>
+                  <p:cNvSpPr txBox="1"/>
+                  <p:nvPr/>
+                </p:nvSpPr>
+                <p:spPr>
+                  <a:xfrm>
+                    <a:off x="2439561" y="2759888"/>
+                    <a:ext cx="438774" cy="307777"/>
+                  </a:xfrm>
+                  <a:prstGeom prst="rect">
+                    <a:avLst/>
+                  </a:prstGeom>
+                  <a:noFill/>
+                </p:spPr>
+                <p:txBody>
+                  <a:bodyPr wrap="none" lIns="0" tIns="0" rIns="0" bIns="0" rtlCol="0">
+                    <a:spAutoFit/>
+                  </a:bodyPr>
+                  <a:lstStyle/>
+                  <a:p>
+                    <a14:m>
+                      <m:oMathPara xmlns:m="http://schemas.openxmlformats.org/officeDocument/2006/math">
+                        <m:oMathParaPr>
+                          <m:jc m:val="centerGroup"/>
+                        </m:oMathParaPr>
+                        <m:oMath xmlns:m="http://schemas.openxmlformats.org/officeDocument/2006/math">
+                          <m:r>
+                            <a:rPr lang="en-US" sz="2000" b="0" i="1" smtClean="0">
+                              <a:latin typeface="Cambria Math" panose="02040503050406030204" pitchFamily="18" charset="0"/>
+                              <a:cs typeface="Arial" panose="020B0604020202020204" pitchFamily="34" charset="0"/>
+                            </a:rPr>
+                            <m:t>𝑑𝑚</m:t>
+                          </m:r>
+                        </m:oMath>
+                      </m:oMathPara>
+                    </a14:m>
+                    <a:endParaRPr lang="en-US" sz="2000" dirty="0" smtClean="0">
+                      <a:latin typeface="Arial" panose="020B0604020202020204" pitchFamily="34" charset="0"/>
+                      <a:cs typeface="Arial" panose="020B0604020202020204" pitchFamily="34" charset="0"/>
+                    </a:endParaRPr>
+                  </a:p>
+                </p:txBody>
+              </p:sp>
+            </mc:Choice>
+            <mc:Fallback>
+              <p:sp>
+                <p:nvSpPr>
+                  <p:cNvPr id="56" name="TextBox 55"/>
+                  <p:cNvSpPr txBox="1">
+                    <a:spLocks noRot="1" noChangeAspect="1" noMove="1" noResize="1" noEditPoints="1" noAdjustHandles="1" noChangeArrowheads="1" noChangeShapeType="1" noTextEdit="1"/>
+                  </p:cNvSpPr>
+                  <p:nvPr/>
+                </p:nvSpPr>
+                <p:spPr>
+                  <a:xfrm>
+                    <a:off x="2439561" y="2759888"/>
+                    <a:ext cx="438774" cy="307777"/>
+                  </a:xfrm>
+                  <a:prstGeom prst="rect">
+                    <a:avLst/>
+                  </a:prstGeom>
+                  <a:blipFill>
+                    <a:blip r:embed="rId6"/>
+                    <a:stretch>
+                      <a:fillRect l="-12500" r="-11111" b="-9804"/>
+                    </a:stretch>
+                  </a:blipFill>
+                </p:spPr>
+                <p:txBody>
+                  <a:bodyPr/>
+                  <a:lstStyle/>
+                  <a:p>
+                    <a:r>
+                      <a:rPr lang="en-US">
+                        <a:noFill/>
+                      </a:rPr>
+                      <a:t> </a:t>
+                    </a:r>
+                  </a:p>
+                </p:txBody>
+              </p:sp>
+            </mc:Fallback>
+          </mc:AlternateContent>
+        </p:grpSp>
+        <p:grpSp>
+          <p:nvGrpSpPr>
+            <p:cNvPr id="64" name="Group 63"/>
+            <p:cNvGrpSpPr/>
+            <p:nvPr/>
+          </p:nvGrpSpPr>
+          <p:grpSpPr>
+            <a:xfrm>
+              <a:off x="2797277" y="1724073"/>
+              <a:ext cx="2637327" cy="1481240"/>
+              <a:chOff x="2797277" y="1724073"/>
+              <a:chExt cx="2637327" cy="1481240"/>
+            </a:xfrm>
+          </p:grpSpPr>
+          <p:cxnSp>
+            <p:nvCxnSpPr>
+              <p:cNvPr id="59" name="Straight Arrow Connector 58"/>
+              <p:cNvCxnSpPr>
+                <a:endCxn id="34" idx="6"/>
+              </p:cNvCxnSpPr>
+              <p:nvPr/>
+            </p:nvCxnSpPr>
+            <p:spPr>
+              <a:xfrm>
+                <a:off x="2797277" y="2271252"/>
+                <a:ext cx="1843549" cy="0"/>
+              </a:xfrm>
+              <a:prstGeom prst="straightConnector1">
+                <a:avLst/>
+              </a:prstGeom>
+              <a:ln w="38100">
+                <a:solidFill>
+                  <a:schemeClr val="tx1"/>
+                </a:solidFill>
+                <a:headEnd type="triangle"/>
+                <a:tailEnd type="triangle"/>
+              </a:ln>
+            </p:spPr>
+            <p:style>
+              <a:lnRef idx="1">
+                <a:schemeClr val="accent1"/>
+              </a:lnRef>
+              <a:fillRef idx="0">
+                <a:schemeClr val="accent1"/>
+              </a:fillRef>
+              <a:effectRef idx="0">
+                <a:schemeClr val="accent1"/>
+              </a:effectRef>
+              <a:fontRef idx="minor">
+                <a:schemeClr val="tx1"/>
+              </a:fontRef>
+            </p:style>
+          </p:cxnSp>
+          <mc:AlternateContent xmlns:mc="http://schemas.openxmlformats.org/markup-compatibility/2006">
+            <mc:Choice xmlns:a14="http://schemas.microsoft.com/office/drawing/2010/main" Requires="a14">
+              <p:sp>
+                <p:nvSpPr>
+                  <p:cNvPr id="60" name="TextBox 59"/>
+                  <p:cNvSpPr txBox="1"/>
+                  <p:nvPr/>
+                </p:nvSpPr>
+                <p:spPr>
+                  <a:xfrm>
+                    <a:off x="3525850" y="1724073"/>
+                    <a:ext cx="241540" cy="307777"/>
+                  </a:xfrm>
+                  <a:prstGeom prst="rect">
+                    <a:avLst/>
+                  </a:prstGeom>
+                  <a:noFill/>
+                </p:spPr>
+                <p:txBody>
+                  <a:bodyPr wrap="none" lIns="0" tIns="0" rIns="0" bIns="0" rtlCol="0">
+                    <a:spAutoFit/>
+                  </a:bodyPr>
+                  <a:lstStyle/>
+                  <a:p>
+                    <a14:m>
+                      <m:oMathPara xmlns:m="http://schemas.openxmlformats.org/officeDocument/2006/math">
+                        <m:oMathParaPr>
+                          <m:jc m:val="centerGroup"/>
+                        </m:oMathParaPr>
+                        <m:oMath xmlns:m="http://schemas.openxmlformats.org/officeDocument/2006/math">
+                          <m:r>
+                            <a:rPr lang="en-US" sz="2000" b="0" i="1" smtClean="0">
+                              <a:latin typeface="Cambria Math" panose="02040503050406030204" pitchFamily="18" charset="0"/>
+                              <a:cs typeface="Arial" panose="020B0604020202020204" pitchFamily="34" charset="0"/>
+                            </a:rPr>
+                            <m:t>𝑅</m:t>
+                          </m:r>
+                        </m:oMath>
+                      </m:oMathPara>
+                    </a14:m>
+                    <a:endParaRPr lang="en-US" sz="2000" dirty="0" smtClean="0">
+                      <a:latin typeface="Arial" panose="020B0604020202020204" pitchFamily="34" charset="0"/>
+                      <a:cs typeface="Arial" panose="020B0604020202020204" pitchFamily="34" charset="0"/>
+                    </a:endParaRPr>
+                  </a:p>
+                </p:txBody>
+              </p:sp>
+            </mc:Choice>
+            <mc:Fallback>
+              <p:sp>
+                <p:nvSpPr>
+                  <p:cNvPr id="60" name="TextBox 59"/>
+                  <p:cNvSpPr txBox="1">
+                    <a:spLocks noRot="1" noChangeAspect="1" noMove="1" noResize="1" noEditPoints="1" noAdjustHandles="1" noChangeArrowheads="1" noChangeShapeType="1" noTextEdit="1"/>
+                  </p:cNvSpPr>
+                  <p:nvPr/>
+                </p:nvSpPr>
+                <p:spPr>
+                  <a:xfrm>
+                    <a:off x="3525850" y="1724073"/>
+                    <a:ext cx="241540" cy="307777"/>
+                  </a:xfrm>
+                  <a:prstGeom prst="rect">
+                    <a:avLst/>
+                  </a:prstGeom>
+                  <a:blipFill>
+                    <a:blip r:embed="rId7"/>
+                    <a:stretch>
+                      <a:fillRect l="-22500" r="-17500" b="-9804"/>
+                    </a:stretch>
+                  </a:blipFill>
+                </p:spPr>
+                <p:txBody>
+                  <a:bodyPr/>
+                  <a:lstStyle/>
+                  <a:p>
+                    <a:r>
+                      <a:rPr lang="en-US">
+                        <a:noFill/>
+                      </a:rPr>
+                      <a:t> </a:t>
+                    </a:r>
+                  </a:p>
+                </p:txBody>
+              </p:sp>
+            </mc:Fallback>
+          </mc:AlternateContent>
+          <p:cxnSp>
+            <p:nvCxnSpPr>
+              <p:cNvPr id="62" name="Straight Arrow Connector 61"/>
+              <p:cNvCxnSpPr/>
+              <p:nvPr/>
+            </p:nvCxnSpPr>
+            <p:spPr>
+              <a:xfrm>
+                <a:off x="5152103" y="2271252"/>
+                <a:ext cx="0" cy="934061"/>
+              </a:xfrm>
+              <a:prstGeom prst="straightConnector1">
+                <a:avLst/>
+              </a:prstGeom>
+              <a:ln w="38100">
+                <a:solidFill>
+                  <a:schemeClr val="tx1"/>
+                </a:solidFill>
+                <a:headEnd type="triangle"/>
+                <a:tailEnd type="triangle"/>
+              </a:ln>
+            </p:spPr>
+            <p:style>
+              <a:lnRef idx="1">
+                <a:schemeClr val="accent1"/>
+              </a:lnRef>
+              <a:fillRef idx="0">
+                <a:schemeClr val="accent1"/>
+              </a:fillRef>
+              <a:effectRef idx="0">
+                <a:schemeClr val="accent1"/>
+              </a:effectRef>
+              <a:fontRef idx="minor">
+                <a:schemeClr val="tx1"/>
+              </a:fontRef>
+            </p:style>
+          </p:cxnSp>
+          <mc:AlternateContent xmlns:mc="http://schemas.openxmlformats.org/markup-compatibility/2006">
+            <mc:Choice xmlns:a14="http://schemas.microsoft.com/office/drawing/2010/main" Requires="a14">
+              <p:sp>
+                <p:nvSpPr>
+                  <p:cNvPr id="63" name="TextBox 62"/>
+                  <p:cNvSpPr txBox="1"/>
+                  <p:nvPr/>
+                </p:nvSpPr>
+                <p:spPr>
+                  <a:xfrm>
+                    <a:off x="5217044" y="2584393"/>
+                    <a:ext cx="217560" cy="307777"/>
+                  </a:xfrm>
+                  <a:prstGeom prst="rect">
+                    <a:avLst/>
+                  </a:prstGeom>
+                  <a:noFill/>
+                </p:spPr>
+                <p:txBody>
+                  <a:bodyPr wrap="none" lIns="0" tIns="0" rIns="0" bIns="0" rtlCol="0">
+                    <a:spAutoFit/>
+                  </a:bodyPr>
+                  <a:lstStyle/>
+                  <a:p>
+                    <a14:m>
+                      <m:oMathPara xmlns:m="http://schemas.openxmlformats.org/officeDocument/2006/math">
+                        <m:oMathParaPr>
+                          <m:jc m:val="centerGroup"/>
+                        </m:oMathParaPr>
+                        <m:oMath xmlns:m="http://schemas.openxmlformats.org/officeDocument/2006/math">
+                          <m:r>
+                            <a:rPr lang="en-US" sz="2000" b="0" i="1" smtClean="0">
+                              <a:latin typeface="Cambria Math" panose="02040503050406030204" pitchFamily="18" charset="0"/>
+                              <a:cs typeface="Arial" panose="020B0604020202020204" pitchFamily="34" charset="0"/>
+                            </a:rPr>
+                            <m:t>h</m:t>
+                          </m:r>
+                        </m:oMath>
+                      </m:oMathPara>
+                    </a14:m>
+                    <a:endParaRPr lang="en-US" sz="2000" dirty="0" smtClean="0">
+                      <a:latin typeface="Arial" panose="020B0604020202020204" pitchFamily="34" charset="0"/>
+                      <a:cs typeface="Arial" panose="020B0604020202020204" pitchFamily="34" charset="0"/>
+                    </a:endParaRPr>
+                  </a:p>
+                </p:txBody>
+              </p:sp>
+            </mc:Choice>
+            <mc:Fallback>
+              <p:sp>
+                <p:nvSpPr>
+                  <p:cNvPr id="63" name="TextBox 62"/>
+                  <p:cNvSpPr txBox="1">
+                    <a:spLocks noRot="1" noChangeAspect="1" noMove="1" noResize="1" noEditPoints="1" noAdjustHandles="1" noChangeArrowheads="1" noChangeShapeType="1" noTextEdit="1"/>
+                  </p:cNvSpPr>
+                  <p:nvPr/>
+                </p:nvSpPr>
+                <p:spPr>
+                  <a:xfrm>
+                    <a:off x="5217044" y="2584393"/>
+                    <a:ext cx="217560" cy="307777"/>
+                  </a:xfrm>
+                  <a:prstGeom prst="rect">
+                    <a:avLst/>
+                  </a:prstGeom>
+                  <a:blipFill>
+                    <a:blip r:embed="rId8"/>
+                    <a:stretch>
+                      <a:fillRect l="-25000" r="-22222" b="-9804"/>
+                    </a:stretch>
+                  </a:blipFill>
+                </p:spPr>
+                <p:txBody>
+                  <a:bodyPr/>
+                  <a:lstStyle/>
+                  <a:p>
+                    <a:r>
+                      <a:rPr lang="en-US">
+                        <a:noFill/>
+                      </a:rPr>
+                      <a:t> </a:t>
+                    </a:r>
+                  </a:p>
+                </p:txBody>
+              </p:sp>
+            </mc:Fallback>
+          </mc:AlternateContent>
+        </p:grpSp>
+      </p:grpSp>
+      <mc:AlternateContent xmlns:mc="http://schemas.openxmlformats.org/markup-compatibility/2006">
+        <mc:Choice xmlns:a14="http://schemas.microsoft.com/office/drawing/2010/main" Requires="a14">
+          <p:sp>
+            <p:nvSpPr>
+              <p:cNvPr id="69" name="TextBox 68"/>
+              <p:cNvSpPr txBox="1"/>
+              <p:nvPr/>
+            </p:nvSpPr>
+            <p:spPr>
+              <a:xfrm>
+                <a:off x="3601990" y="3297233"/>
+                <a:ext cx="537391" cy="307777"/>
+              </a:xfrm>
+              <a:prstGeom prst="rect">
+                <a:avLst/>
+              </a:prstGeom>
+              <a:noFill/>
+            </p:spPr>
+            <p:txBody>
+              <a:bodyPr wrap="none" lIns="0" tIns="0" rIns="0" bIns="0" rtlCol="0">
+                <a:spAutoFit/>
+              </a:bodyPr>
+              <a:lstStyle/>
+              <a:p>
+                <a14:m>
+                  <m:oMathPara xmlns:m="http://schemas.openxmlformats.org/officeDocument/2006/math">
+                    <m:oMathParaPr>
+                      <m:jc m:val="centerGroup"/>
+                    </m:oMathParaPr>
+                    <m:oMath xmlns:m="http://schemas.openxmlformats.org/officeDocument/2006/math">
+                      <m:r>
+                        <a:rPr lang="en-US" sz="2000" b="0" i="1" smtClean="0">
+                          <a:latin typeface="Cambria Math" panose="02040503050406030204" pitchFamily="18" charset="0"/>
+                          <a:cs typeface="Arial" panose="020B0604020202020204" pitchFamily="34" charset="0"/>
+                        </a:rPr>
+                        <m:t>𝑟</m:t>
+                      </m:r>
+                      <m:r>
+                        <a:rPr lang="en-US" sz="2000" b="0" i="1" smtClean="0">
+                          <a:latin typeface="Cambria Math" panose="02040503050406030204" pitchFamily="18" charset="0"/>
+                          <a:cs typeface="Arial" panose="020B0604020202020204" pitchFamily="34" charset="0"/>
+                        </a:rPr>
+                        <m:t>(</m:t>
+                      </m:r>
+                      <m:r>
+                        <a:rPr lang="en-US" sz="2000" b="0" i="1" smtClean="0">
+                          <a:latin typeface="Cambria Math" panose="02040503050406030204" pitchFamily="18" charset="0"/>
+                          <a:cs typeface="Arial" panose="020B0604020202020204" pitchFamily="34" charset="0"/>
+                        </a:rPr>
+                        <m:t>𝑧</m:t>
+                      </m:r>
+                      <m:r>
+                        <a:rPr lang="en-US" sz="2000" b="0" i="1" smtClean="0">
+                          <a:latin typeface="Cambria Math" panose="02040503050406030204" pitchFamily="18" charset="0"/>
+                          <a:cs typeface="Arial" panose="020B0604020202020204" pitchFamily="34" charset="0"/>
+                        </a:rPr>
+                        <m:t>)</m:t>
+                      </m:r>
+                    </m:oMath>
+                  </m:oMathPara>
+                </a14:m>
+                <a:endParaRPr lang="en-US" sz="2000" dirty="0" smtClean="0">
+                  <a:latin typeface="Arial" panose="020B0604020202020204" pitchFamily="34" charset="0"/>
+                  <a:cs typeface="Arial" panose="020B0604020202020204" pitchFamily="34" charset="0"/>
+                </a:endParaRPr>
+              </a:p>
+            </p:txBody>
+          </p:sp>
+        </mc:Choice>
+        <mc:Fallback>
+          <p:sp>
+            <p:nvSpPr>
+              <p:cNvPr id="69" name="TextBox 68"/>
+              <p:cNvSpPr txBox="1">
+                <a:spLocks noRot="1" noChangeAspect="1" noMove="1" noResize="1" noEditPoints="1" noAdjustHandles="1" noChangeArrowheads="1" noChangeShapeType="1" noTextEdit="1"/>
+              </p:cNvSpPr>
+              <p:nvPr/>
+            </p:nvSpPr>
+            <p:spPr>
+              <a:xfrm>
+                <a:off x="3601990" y="3297233"/>
+                <a:ext cx="537391" cy="307777"/>
+              </a:xfrm>
+              <a:prstGeom prst="rect">
+                <a:avLst/>
+              </a:prstGeom>
+              <a:blipFill>
+                <a:blip r:embed="rId9"/>
+                <a:stretch>
+                  <a:fillRect l="-5682" r="-15909" b="-40000"/>
+                </a:stretch>
+              </a:blipFill>
+            </p:spPr>
+            <p:txBody>
+              <a:bodyPr/>
+              <a:lstStyle/>
+              <a:p>
+                <a:r>
+                  <a:rPr lang="en-US">
+                    <a:noFill/>
+                  </a:rPr>
+                  <a:t> </a:t>
+                </a:r>
+              </a:p>
+            </p:txBody>
+          </p:sp>
+        </mc:Fallback>
+      </mc:AlternateContent>
+      <mc:AlternateContent xmlns:mc="http://schemas.openxmlformats.org/markup-compatibility/2006">
+        <mc:Choice xmlns:a14="http://schemas.microsoft.com/office/drawing/2010/main" Requires="a14">
+          <p:sp>
+            <p:nvSpPr>
+              <p:cNvPr id="70" name="TextBox 69"/>
+              <p:cNvSpPr txBox="1"/>
+              <p:nvPr/>
+            </p:nvSpPr>
+            <p:spPr>
+              <a:xfrm>
+                <a:off x="2635589" y="3267741"/>
+                <a:ext cx="213200" cy="307777"/>
+              </a:xfrm>
+              <a:prstGeom prst="rect">
+                <a:avLst/>
+              </a:prstGeom>
+              <a:noFill/>
+            </p:spPr>
+            <p:txBody>
+              <a:bodyPr wrap="none" lIns="0" tIns="0" rIns="0" bIns="0" rtlCol="0">
+                <a:spAutoFit/>
+              </a:bodyPr>
+              <a:lstStyle/>
+              <a:p>
+                <a14:m>
+                  <m:oMathPara xmlns:m="http://schemas.openxmlformats.org/officeDocument/2006/math">
+                    <m:oMathParaPr>
+                      <m:jc m:val="centerGroup"/>
+                    </m:oMathParaPr>
+                    <m:oMath xmlns:m="http://schemas.openxmlformats.org/officeDocument/2006/math">
+                      <m:r>
+                        <a:rPr lang="en-US" sz="2000" b="0" i="1" smtClean="0">
+                          <a:latin typeface="Cambria Math" panose="02040503050406030204" pitchFamily="18" charset="0"/>
+                          <a:cs typeface="Arial" panose="020B0604020202020204" pitchFamily="34" charset="0"/>
+                        </a:rPr>
+                        <m:t>0</m:t>
+                      </m:r>
+                    </m:oMath>
+                  </m:oMathPara>
+                </a14:m>
+                <a:endParaRPr lang="en-US" sz="2000" dirty="0" smtClean="0">
+                  <a:latin typeface="Arial" panose="020B0604020202020204" pitchFamily="34" charset="0"/>
+                  <a:cs typeface="Arial" panose="020B0604020202020204" pitchFamily="34" charset="0"/>
+                </a:endParaRPr>
+              </a:p>
+            </p:txBody>
+          </p:sp>
+        </mc:Choice>
+        <mc:Fallback>
+          <p:sp>
+            <p:nvSpPr>
+              <p:cNvPr id="70" name="TextBox 69"/>
+              <p:cNvSpPr txBox="1">
+                <a:spLocks noRot="1" noChangeAspect="1" noMove="1" noResize="1" noEditPoints="1" noAdjustHandles="1" noChangeArrowheads="1" noChangeShapeType="1" noTextEdit="1"/>
+              </p:cNvSpPr>
+              <p:nvPr/>
+            </p:nvSpPr>
+            <p:spPr>
+              <a:xfrm>
+                <a:off x="2635589" y="3267741"/>
+                <a:ext cx="213200" cy="307777"/>
+              </a:xfrm>
+              <a:prstGeom prst="rect">
+                <a:avLst/>
+              </a:prstGeom>
+              <a:blipFill>
+                <a:blip r:embed="rId10"/>
+                <a:stretch>
+                  <a:fillRect l="-22857" r="-25714" b="-9804"/>
+                </a:stretch>
+              </a:blipFill>
+            </p:spPr>
+            <p:txBody>
+              <a:bodyPr/>
+              <a:lstStyle/>
+              <a:p>
+                <a:r>
+                  <a:rPr lang="en-US">
+                    <a:noFill/>
+                  </a:rPr>
+                  <a:t> </a:t>
+                </a:r>
+              </a:p>
+            </p:txBody>
+          </p:sp>
+        </mc:Fallback>
+      </mc:AlternateContent>
+      <p:cxnSp>
+        <p:nvCxnSpPr>
+          <p:cNvPr id="71" name="Straight Connector 70"/>
+          <p:cNvCxnSpPr/>
+          <p:nvPr/>
+        </p:nvCxnSpPr>
+        <p:spPr>
+          <a:xfrm>
+            <a:off x="4156562" y="2780052"/>
+            <a:ext cx="1883" cy="494087"/>
+          </a:xfrm>
+          <a:prstGeom prst="line">
+            <a:avLst/>
+          </a:prstGeom>
+          <a:ln w="19050">
+            <a:solidFill>
+              <a:schemeClr val="tx1"/>
+            </a:solidFill>
+            <a:prstDash val="sysDot"/>
+          </a:ln>
+        </p:spPr>
+        <p:style>
+          <a:lnRef idx="1">
+            <a:schemeClr val="accent1"/>
+          </a:lnRef>
+          <a:fillRef idx="0">
+            <a:schemeClr val="accent1"/>
+          </a:fillRef>
+          <a:effectRef idx="0">
+            <a:schemeClr val="accent1"/>
+          </a:effectRef>
+          <a:fontRef idx="minor">
+            <a:schemeClr val="tx1"/>
+          </a:fontRef>
+        </p:style>
+      </p:cxnSp>
+    </p:spTree>
+    <p:extLst>
+      <p:ext uri="{BB962C8B-B14F-4D97-AF65-F5344CB8AC3E}">
+        <p14:creationId xmlns:p14="http://schemas.microsoft.com/office/powerpoint/2010/main" val="2074167699"/>
       </p:ext>
     </p:extLst>
   </p:cSld>

</xml_diff>

<commit_message>
Momentum and CM done
</commit_message>
<xml_diff>
--- a/tex/figures/MomentumAndCM/Figures.pptx
+++ b/tex/figures/MomentumAndCM/Figures.pptx
@@ -250,7 +250,7 @@
           <a:p>
             <a:fld id="{F7249F8D-641B-4CAF-BAE5-10524742F6F1}" type="datetimeFigureOut">
               <a:rPr lang="en-CA" smtClean="0"/>
-              <a:t>2018-06-29</a:t>
+              <a:t>2018-07-03</a:t>
             </a:fld>
             <a:endParaRPr lang="en-CA"/>
           </a:p>
@@ -420,7 +420,7 @@
           <a:p>
             <a:fld id="{F7249F8D-641B-4CAF-BAE5-10524742F6F1}" type="datetimeFigureOut">
               <a:rPr lang="en-CA" smtClean="0"/>
-              <a:t>2018-06-29</a:t>
+              <a:t>2018-07-03</a:t>
             </a:fld>
             <a:endParaRPr lang="en-CA"/>
           </a:p>
@@ -600,7 +600,7 @@
           <a:p>
             <a:fld id="{F7249F8D-641B-4CAF-BAE5-10524742F6F1}" type="datetimeFigureOut">
               <a:rPr lang="en-CA" smtClean="0"/>
-              <a:t>2018-06-29</a:t>
+              <a:t>2018-07-03</a:t>
             </a:fld>
             <a:endParaRPr lang="en-CA"/>
           </a:p>
@@ -770,7 +770,7 @@
           <a:p>
             <a:fld id="{F7249F8D-641B-4CAF-BAE5-10524742F6F1}" type="datetimeFigureOut">
               <a:rPr lang="en-CA" smtClean="0"/>
-              <a:t>2018-06-29</a:t>
+              <a:t>2018-07-03</a:t>
             </a:fld>
             <a:endParaRPr lang="en-CA"/>
           </a:p>
@@ -1016,7 +1016,7 @@
           <a:p>
             <a:fld id="{F7249F8D-641B-4CAF-BAE5-10524742F6F1}" type="datetimeFigureOut">
               <a:rPr lang="en-CA" smtClean="0"/>
-              <a:t>2018-06-29</a:t>
+              <a:t>2018-07-03</a:t>
             </a:fld>
             <a:endParaRPr lang="en-CA"/>
           </a:p>
@@ -1248,7 +1248,7 @@
           <a:p>
             <a:fld id="{F7249F8D-641B-4CAF-BAE5-10524742F6F1}" type="datetimeFigureOut">
               <a:rPr lang="en-CA" smtClean="0"/>
-              <a:t>2018-06-29</a:t>
+              <a:t>2018-07-03</a:t>
             </a:fld>
             <a:endParaRPr lang="en-CA"/>
           </a:p>
@@ -1615,7 +1615,7 @@
           <a:p>
             <a:fld id="{F7249F8D-641B-4CAF-BAE5-10524742F6F1}" type="datetimeFigureOut">
               <a:rPr lang="en-CA" smtClean="0"/>
-              <a:t>2018-06-29</a:t>
+              <a:t>2018-07-03</a:t>
             </a:fld>
             <a:endParaRPr lang="en-CA"/>
           </a:p>
@@ -1733,7 +1733,7 @@
           <a:p>
             <a:fld id="{F7249F8D-641B-4CAF-BAE5-10524742F6F1}" type="datetimeFigureOut">
               <a:rPr lang="en-CA" smtClean="0"/>
-              <a:t>2018-06-29</a:t>
+              <a:t>2018-07-03</a:t>
             </a:fld>
             <a:endParaRPr lang="en-CA"/>
           </a:p>
@@ -1828,7 +1828,7 @@
           <a:p>
             <a:fld id="{F7249F8D-641B-4CAF-BAE5-10524742F6F1}" type="datetimeFigureOut">
               <a:rPr lang="en-CA" smtClean="0"/>
-              <a:t>2018-06-29</a:t>
+              <a:t>2018-07-03</a:t>
             </a:fld>
             <a:endParaRPr lang="en-CA"/>
           </a:p>
@@ -2105,7 +2105,7 @@
           <a:p>
             <a:fld id="{F7249F8D-641B-4CAF-BAE5-10524742F6F1}" type="datetimeFigureOut">
               <a:rPr lang="en-CA" smtClean="0"/>
-              <a:t>2018-06-29</a:t>
+              <a:t>2018-07-03</a:t>
             </a:fld>
             <a:endParaRPr lang="en-CA"/>
           </a:p>
@@ -2358,7 +2358,7 @@
           <a:p>
             <a:fld id="{F7249F8D-641B-4CAF-BAE5-10524742F6F1}" type="datetimeFigureOut">
               <a:rPr lang="en-CA" smtClean="0"/>
-              <a:t>2018-06-29</a:t>
+              <a:t>2018-07-03</a:t>
             </a:fld>
             <a:endParaRPr lang="en-CA"/>
           </a:p>
@@ -2571,7 +2571,7 @@
           <a:p>
             <a:fld id="{F7249F8D-641B-4CAF-BAE5-10524742F6F1}" type="datetimeFigureOut">
               <a:rPr lang="en-CA" smtClean="0"/>
-              <a:t>2018-06-29</a:t>
+              <a:t>2018-07-03</a:t>
             </a:fld>
             <a:endParaRPr lang="en-CA"/>
           </a:p>
@@ -22284,8 +22284,8 @@
               </a:fontRef>
             </p:style>
           </p:cxnSp>
-          <mc:AlternateContent xmlns:mc="http://schemas.openxmlformats.org/markup-compatibility/2006">
-            <mc:Choice xmlns:a14="http://schemas.microsoft.com/office/drawing/2010/main" Requires="a14">
+          <mc:AlternateContent xmlns:mc="http://schemas.openxmlformats.org/markup-compatibility/2006" xmlns:a14="http://schemas.microsoft.com/office/drawing/2010/main">
+            <mc:Choice Requires="a14">
               <p:sp>
                 <p:nvSpPr>
                   <p:cNvPr id="5" name="TextBox 4"/>
@@ -22308,6 +22308,7 @@
                   </a:bodyPr>
                   <a:lstStyle/>
                   <a:p>
+                    <a:pPr/>
                     <a14:m>
                       <m:oMathPara xmlns:m="http://schemas.openxmlformats.org/officeDocument/2006/math">
                         <m:oMathParaPr>
@@ -22332,7 +22333,7 @@
                 </p:txBody>
               </p:sp>
             </mc:Choice>
-            <mc:Fallback>
+            <mc:Fallback xmlns="">
               <p:sp>
                 <p:nvSpPr>
                   <p:cNvPr id="5" name="TextBox 4"/>
@@ -22371,8 +22372,8 @@
               </p:sp>
             </mc:Fallback>
           </mc:AlternateContent>
-          <mc:AlternateContent xmlns:mc="http://schemas.openxmlformats.org/markup-compatibility/2006">
-            <mc:Choice xmlns:a14="http://schemas.microsoft.com/office/drawing/2010/main" Requires="a14">
+          <mc:AlternateContent xmlns:mc="http://schemas.openxmlformats.org/markup-compatibility/2006" xmlns:a14="http://schemas.microsoft.com/office/drawing/2010/main">
+            <mc:Choice Requires="a14">
               <p:sp>
                 <p:nvSpPr>
                   <p:cNvPr id="14" name="TextBox 13"/>
@@ -22395,6 +22396,7 @@
                   </a:bodyPr>
                   <a:lstStyle/>
                   <a:p>
+                    <a:pPr/>
                     <a14:m>
                       <m:oMathPara xmlns:m="http://schemas.openxmlformats.org/officeDocument/2006/math">
                         <m:oMathParaPr>
@@ -22419,7 +22421,7 @@
                 </p:txBody>
               </p:sp>
             </mc:Choice>
-            <mc:Fallback>
+            <mc:Fallback xmlns="">
               <p:sp>
                 <p:nvSpPr>
                   <p:cNvPr id="14" name="TextBox 13"/>
@@ -23582,8 +23584,8 @@
             </p:sp>
           </p:grpSp>
         </p:grpSp>
-        <mc:AlternateContent xmlns:mc="http://schemas.openxmlformats.org/markup-compatibility/2006">
-          <mc:Choice xmlns:a14="http://schemas.microsoft.com/office/drawing/2010/main" Requires="a14">
+        <mc:AlternateContent xmlns:mc="http://schemas.openxmlformats.org/markup-compatibility/2006" xmlns:a14="http://schemas.microsoft.com/office/drawing/2010/main">
+          <mc:Choice Requires="a14">
             <p:sp>
               <p:nvSpPr>
                 <p:cNvPr id="85" name="TextBox 84"/>
@@ -23606,6 +23608,7 @@
                 </a:bodyPr>
                 <a:lstStyle/>
                 <a:p>
+                  <a:pPr/>
                   <a14:m>
                     <m:oMathPara xmlns:m="http://schemas.openxmlformats.org/officeDocument/2006/math">
                       <m:oMathParaPr>
@@ -23640,7 +23643,7 @@
               </p:txBody>
             </p:sp>
           </mc:Choice>
-          <mc:Fallback>
+          <mc:Fallback xmlns="">
             <p:sp>
               <p:nvSpPr>
                 <p:cNvPr id="85" name="TextBox 84"/>
@@ -23679,8 +23682,8 @@
             </p:sp>
           </mc:Fallback>
         </mc:AlternateContent>
-        <mc:AlternateContent xmlns:mc="http://schemas.openxmlformats.org/markup-compatibility/2006">
-          <mc:Choice xmlns:a14="http://schemas.microsoft.com/office/drawing/2010/main" Requires="a14">
+        <mc:AlternateContent xmlns:mc="http://schemas.openxmlformats.org/markup-compatibility/2006" xmlns:a14="http://schemas.microsoft.com/office/drawing/2010/main">
+          <mc:Choice Requires="a14">
             <p:sp>
               <p:nvSpPr>
                 <p:cNvPr id="86" name="TextBox 85"/>
@@ -23703,6 +23706,7 @@
                 </a:bodyPr>
                 <a:lstStyle/>
                 <a:p>
+                  <a:pPr/>
                   <a14:m>
                     <m:oMathPara xmlns:m="http://schemas.openxmlformats.org/officeDocument/2006/math">
                       <m:oMathParaPr>
@@ -23737,7 +23741,7 @@
               </p:txBody>
             </p:sp>
           </mc:Choice>
-          <mc:Fallback>
+          <mc:Fallback xmlns="">
             <p:sp>
               <p:nvSpPr>
                 <p:cNvPr id="86" name="TextBox 85"/>
@@ -24185,8 +24189,8 @@
                 </a:fontRef>
               </p:style>
             </p:cxnSp>
-            <mc:AlternateContent xmlns:mc="http://schemas.openxmlformats.org/markup-compatibility/2006">
-              <mc:Choice xmlns:a14="http://schemas.microsoft.com/office/drawing/2010/main" Requires="a14">
+            <mc:AlternateContent xmlns:mc="http://schemas.openxmlformats.org/markup-compatibility/2006" xmlns:a14="http://schemas.microsoft.com/office/drawing/2010/main">
+              <mc:Choice Requires="a14">
                 <p:sp>
                   <p:nvSpPr>
                     <p:cNvPr id="42" name="TextBox 41"/>
@@ -24209,6 +24213,7 @@
                     </a:bodyPr>
                     <a:lstStyle/>
                     <a:p>
+                      <a:pPr/>
                       <a14:m>
                         <m:oMathPara xmlns:m="http://schemas.openxmlformats.org/officeDocument/2006/math">
                           <m:oMathParaPr>
@@ -24233,7 +24238,7 @@
                   </p:txBody>
                 </p:sp>
               </mc:Choice>
-              <mc:Fallback>
+              <mc:Fallback xmlns="">
                 <p:sp>
                   <p:nvSpPr>
                     <p:cNvPr id="42" name="TextBox 41"/>
@@ -24272,8 +24277,8 @@
                 </p:sp>
               </mc:Fallback>
             </mc:AlternateContent>
-            <mc:AlternateContent xmlns:mc="http://schemas.openxmlformats.org/markup-compatibility/2006">
-              <mc:Choice xmlns:a14="http://schemas.microsoft.com/office/drawing/2010/main" Requires="a14">
+            <mc:AlternateContent xmlns:mc="http://schemas.openxmlformats.org/markup-compatibility/2006" xmlns:a14="http://schemas.microsoft.com/office/drawing/2010/main">
+              <mc:Choice Requires="a14">
                 <p:sp>
                   <p:nvSpPr>
                     <p:cNvPr id="43" name="TextBox 42"/>
@@ -24296,6 +24301,7 @@
                     </a:bodyPr>
                     <a:lstStyle/>
                     <a:p>
+                      <a:pPr/>
                       <a14:m>
                         <m:oMathPara xmlns:m="http://schemas.openxmlformats.org/officeDocument/2006/math">
                           <m:oMathParaPr>
@@ -24320,7 +24326,7 @@
                   </p:txBody>
                 </p:sp>
               </mc:Choice>
-              <mc:Fallback>
+              <mc:Fallback xmlns="">
                 <p:sp>
                   <p:nvSpPr>
                     <p:cNvPr id="43" name="TextBox 42"/>
@@ -24359,8 +24365,8 @@
                 </p:sp>
               </mc:Fallback>
             </mc:AlternateContent>
-            <mc:AlternateContent xmlns:mc="http://schemas.openxmlformats.org/markup-compatibility/2006">
-              <mc:Choice xmlns:a14="http://schemas.microsoft.com/office/drawing/2010/main" Requires="a14">
+            <mc:AlternateContent xmlns:mc="http://schemas.openxmlformats.org/markup-compatibility/2006" xmlns:a14="http://schemas.microsoft.com/office/drawing/2010/main">
+              <mc:Choice Requires="a14">
                 <p:sp>
                   <p:nvSpPr>
                     <p:cNvPr id="50" name="TextBox 49"/>
@@ -24383,6 +24389,7 @@
                     </a:bodyPr>
                     <a:lstStyle/>
                     <a:p>
+                      <a:pPr/>
                       <a14:m>
                         <m:oMathPara xmlns:m="http://schemas.openxmlformats.org/officeDocument/2006/math">
                           <m:oMathParaPr>
@@ -24407,7 +24414,7 @@
                   </p:txBody>
                 </p:sp>
               </mc:Choice>
-              <mc:Fallback>
+              <mc:Fallback xmlns="">
                 <p:sp>
                   <p:nvSpPr>
                     <p:cNvPr id="50" name="TextBox 49"/>
@@ -24484,8 +24491,8 @@
               </a:fontRef>
             </p:style>
           </p:cxnSp>
-          <mc:AlternateContent xmlns:mc="http://schemas.openxmlformats.org/markup-compatibility/2006">
-            <mc:Choice xmlns:a14="http://schemas.microsoft.com/office/drawing/2010/main" Requires="a14">
+          <mc:AlternateContent xmlns:mc="http://schemas.openxmlformats.org/markup-compatibility/2006" xmlns:a14="http://schemas.microsoft.com/office/drawing/2010/main">
+            <mc:Choice Requires="a14">
               <p:sp>
                 <p:nvSpPr>
                   <p:cNvPr id="55" name="TextBox 54"/>
@@ -24508,6 +24515,7 @@
                   </a:bodyPr>
                   <a:lstStyle/>
                   <a:p>
+                    <a:pPr/>
                     <a14:m>
                       <m:oMathPara xmlns:m="http://schemas.openxmlformats.org/officeDocument/2006/math">
                         <m:oMathParaPr>
@@ -24532,7 +24540,7 @@
                 </p:txBody>
               </p:sp>
             </mc:Choice>
-            <mc:Fallback>
+            <mc:Fallback xmlns="">
               <p:sp>
                 <p:nvSpPr>
                   <p:cNvPr id="55" name="TextBox 54"/>
@@ -24571,8 +24579,8 @@
               </p:sp>
             </mc:Fallback>
           </mc:AlternateContent>
-          <mc:AlternateContent xmlns:mc="http://schemas.openxmlformats.org/markup-compatibility/2006">
-            <mc:Choice xmlns:a14="http://schemas.microsoft.com/office/drawing/2010/main" Requires="a14">
+          <mc:AlternateContent xmlns:mc="http://schemas.openxmlformats.org/markup-compatibility/2006" xmlns:a14="http://schemas.microsoft.com/office/drawing/2010/main">
+            <mc:Choice Requires="a14">
               <p:sp>
                 <p:nvSpPr>
                   <p:cNvPr id="56" name="TextBox 55"/>
@@ -24595,6 +24603,7 @@
                   </a:bodyPr>
                   <a:lstStyle/>
                   <a:p>
+                    <a:pPr/>
                     <a14:m>
                       <m:oMathPara xmlns:m="http://schemas.openxmlformats.org/officeDocument/2006/math">
                         <m:oMathParaPr>
@@ -24619,7 +24628,7 @@
                 </p:txBody>
               </p:sp>
             </mc:Choice>
-            <mc:Fallback>
+            <mc:Fallback xmlns="">
               <p:sp>
                 <p:nvSpPr>
                   <p:cNvPr id="56" name="TextBox 55"/>
@@ -24667,138 +24676,12 @@
           </p:nvGrpSpPr>
           <p:grpSpPr>
             <a:xfrm>
-              <a:off x="2797277" y="1724073"/>
-              <a:ext cx="2637327" cy="1481240"/>
-              <a:chOff x="2797277" y="1724073"/>
-              <a:chExt cx="2637327" cy="1481240"/>
+              <a:off x="5152103" y="2271252"/>
+              <a:ext cx="282501" cy="934061"/>
+              <a:chOff x="5152103" y="2271252"/>
+              <a:chExt cx="282501" cy="934061"/>
             </a:xfrm>
           </p:grpSpPr>
-          <p:cxnSp>
-            <p:nvCxnSpPr>
-              <p:cNvPr id="59" name="Straight Arrow Connector 58"/>
-              <p:cNvCxnSpPr>
-                <a:endCxn id="34" idx="6"/>
-              </p:cNvCxnSpPr>
-              <p:nvPr/>
-            </p:nvCxnSpPr>
-            <p:spPr>
-              <a:xfrm>
-                <a:off x="2797277" y="2271252"/>
-                <a:ext cx="1843549" cy="0"/>
-              </a:xfrm>
-              <a:prstGeom prst="straightConnector1">
-                <a:avLst/>
-              </a:prstGeom>
-              <a:ln w="38100">
-                <a:solidFill>
-                  <a:schemeClr val="tx1"/>
-                </a:solidFill>
-                <a:headEnd type="triangle"/>
-                <a:tailEnd type="triangle"/>
-              </a:ln>
-            </p:spPr>
-            <p:style>
-              <a:lnRef idx="1">
-                <a:schemeClr val="accent1"/>
-              </a:lnRef>
-              <a:fillRef idx="0">
-                <a:schemeClr val="accent1"/>
-              </a:fillRef>
-              <a:effectRef idx="0">
-                <a:schemeClr val="accent1"/>
-              </a:effectRef>
-              <a:fontRef idx="minor">
-                <a:schemeClr val="tx1"/>
-              </a:fontRef>
-            </p:style>
-          </p:cxnSp>
-          <mc:AlternateContent xmlns:mc="http://schemas.openxmlformats.org/markup-compatibility/2006">
-            <mc:Choice xmlns:a14="http://schemas.microsoft.com/office/drawing/2010/main" Requires="a14">
-              <p:sp>
-                <p:nvSpPr>
-                  <p:cNvPr id="60" name="TextBox 59"/>
-                  <p:cNvSpPr txBox="1"/>
-                  <p:nvPr/>
-                </p:nvSpPr>
-                <p:spPr>
-                  <a:xfrm>
-                    <a:off x="3525850" y="1724073"/>
-                    <a:ext cx="241540" cy="307777"/>
-                  </a:xfrm>
-                  <a:prstGeom prst="rect">
-                    <a:avLst/>
-                  </a:prstGeom>
-                  <a:noFill/>
-                </p:spPr>
-                <p:txBody>
-                  <a:bodyPr wrap="none" lIns="0" tIns="0" rIns="0" bIns="0" rtlCol="0">
-                    <a:spAutoFit/>
-                  </a:bodyPr>
-                  <a:lstStyle/>
-                  <a:p>
-                    <a14:m>
-                      <m:oMathPara xmlns:m="http://schemas.openxmlformats.org/officeDocument/2006/math">
-                        <m:oMathParaPr>
-                          <m:jc m:val="centerGroup"/>
-                        </m:oMathParaPr>
-                        <m:oMath xmlns:m="http://schemas.openxmlformats.org/officeDocument/2006/math">
-                          <m:r>
-                            <a:rPr lang="en-US" sz="2000" b="0" i="1" smtClean="0">
-                              <a:latin typeface="Cambria Math" panose="02040503050406030204" pitchFamily="18" charset="0"/>
-                              <a:cs typeface="Arial" panose="020B0604020202020204" pitchFamily="34" charset="0"/>
-                            </a:rPr>
-                            <m:t>𝑅</m:t>
-                          </m:r>
-                        </m:oMath>
-                      </m:oMathPara>
-                    </a14:m>
-                    <a:endParaRPr lang="en-US" sz="2000" dirty="0" smtClean="0">
-                      <a:latin typeface="Arial" panose="020B0604020202020204" pitchFamily="34" charset="0"/>
-                      <a:cs typeface="Arial" panose="020B0604020202020204" pitchFamily="34" charset="0"/>
-                    </a:endParaRPr>
-                  </a:p>
-                </p:txBody>
-              </p:sp>
-            </mc:Choice>
-            <mc:Fallback>
-              <p:sp>
-                <p:nvSpPr>
-                  <p:cNvPr id="60" name="TextBox 59"/>
-                  <p:cNvSpPr txBox="1">
-                    <a:spLocks noRot="1" noChangeAspect="1" noMove="1" noResize="1" noEditPoints="1" noAdjustHandles="1" noChangeArrowheads="1" noChangeShapeType="1" noTextEdit="1"/>
-                  </p:cNvSpPr>
-                  <p:nvPr/>
-                </p:nvSpPr>
-                <p:spPr>
-                  <a:xfrm>
-                    <a:off x="3525850" y="1724073"/>
-                    <a:ext cx="241540" cy="307777"/>
-                  </a:xfrm>
-                  <a:prstGeom prst="rect">
-                    <a:avLst/>
-                  </a:prstGeom>
-                  <a:blipFill>
-                    <a:blip r:embed="rId7"/>
-                    <a:stretch>
-                      <a:fillRect l="-22500" r="-17500" b="-9804"/>
-                    </a:stretch>
-                  </a:blipFill>
-                </p:spPr>
-                <p:txBody>
-                  <a:bodyPr/>
-                  <a:lstStyle/>
-                  <a:p>
-                    <a:r>
-                      <a:rPr lang="en-US">
-                        <a:noFill/>
-                      </a:rPr>
-                      <a:t> </a:t>
-                    </a:r>
-                  </a:p>
-                </p:txBody>
-              </p:sp>
-            </mc:Fallback>
-          </mc:AlternateContent>
           <p:cxnSp>
             <p:nvCxnSpPr>
               <p:cNvPr id="62" name="Straight Arrow Connector 61"/>
@@ -24836,8 +24719,8 @@
               </a:fontRef>
             </p:style>
           </p:cxnSp>
-          <mc:AlternateContent xmlns:mc="http://schemas.openxmlformats.org/markup-compatibility/2006">
-            <mc:Choice xmlns:a14="http://schemas.microsoft.com/office/drawing/2010/main" Requires="a14">
+          <mc:AlternateContent xmlns:mc="http://schemas.openxmlformats.org/markup-compatibility/2006" xmlns:a14="http://schemas.microsoft.com/office/drawing/2010/main">
+            <mc:Choice Requires="a14">
               <p:sp>
                 <p:nvSpPr>
                   <p:cNvPr id="63" name="TextBox 62"/>
@@ -24860,6 +24743,7 @@
                   </a:bodyPr>
                   <a:lstStyle/>
                   <a:p>
+                    <a:pPr/>
                     <a14:m>
                       <m:oMathPara xmlns:m="http://schemas.openxmlformats.org/officeDocument/2006/math">
                         <m:oMathParaPr>
@@ -24884,7 +24768,7 @@
                 </p:txBody>
               </p:sp>
             </mc:Choice>
-            <mc:Fallback>
+            <mc:Fallback xmlns="">
               <p:sp>
                 <p:nvSpPr>
                   <p:cNvPr id="63" name="TextBox 62"/>
@@ -24925,8 +24809,8 @@
           </mc:AlternateContent>
         </p:grpSp>
       </p:grpSp>
-      <mc:AlternateContent xmlns:mc="http://schemas.openxmlformats.org/markup-compatibility/2006">
-        <mc:Choice xmlns:a14="http://schemas.microsoft.com/office/drawing/2010/main" Requires="a14">
+      <mc:AlternateContent xmlns:mc="http://schemas.openxmlformats.org/markup-compatibility/2006" xmlns:a14="http://schemas.microsoft.com/office/drawing/2010/main">
+        <mc:Choice Requires="a14">
           <p:sp>
             <p:nvSpPr>
               <p:cNvPr id="69" name="TextBox 68"/>
@@ -24949,6 +24833,7 @@
               </a:bodyPr>
               <a:lstStyle/>
               <a:p>
+                <a:pPr/>
                 <a14:m>
                   <m:oMathPara xmlns:m="http://schemas.openxmlformats.org/officeDocument/2006/math">
                     <m:oMathParaPr>
@@ -24994,7 +24879,7 @@
             </p:txBody>
           </p:sp>
         </mc:Choice>
-        <mc:Fallback>
+        <mc:Fallback xmlns="">
           <p:sp>
             <p:nvSpPr>
               <p:cNvPr id="69" name="TextBox 68"/>
@@ -25033,8 +24918,8 @@
           </p:sp>
         </mc:Fallback>
       </mc:AlternateContent>
-      <mc:AlternateContent xmlns:mc="http://schemas.openxmlformats.org/markup-compatibility/2006">
-        <mc:Choice xmlns:a14="http://schemas.microsoft.com/office/drawing/2010/main" Requires="a14">
+      <mc:AlternateContent xmlns:mc="http://schemas.openxmlformats.org/markup-compatibility/2006" xmlns:a14="http://schemas.microsoft.com/office/drawing/2010/main">
+        <mc:Choice Requires="a14">
           <p:sp>
             <p:nvSpPr>
               <p:cNvPr id="70" name="TextBox 69"/>
@@ -25057,6 +24942,7 @@
               </a:bodyPr>
               <a:lstStyle/>
               <a:p>
+                <a:pPr/>
                 <a14:m>
                   <m:oMathPara xmlns:m="http://schemas.openxmlformats.org/officeDocument/2006/math">
                     <m:oMathParaPr>
@@ -25081,7 +24967,7 @@
             </p:txBody>
           </p:sp>
         </mc:Choice>
-        <mc:Fallback>
+        <mc:Fallback xmlns="">
           <p:sp>
             <p:nvSpPr>
               <p:cNvPr id="70" name="TextBox 69"/>

</xml_diff>

<commit_message>
Changed skaters figure momemtum and CM
</commit_message>
<xml_diff>
--- a/tex/figures/MomentumAndCM/Figures.pptx
+++ b/tex/figures/MomentumAndCM/Figures.pptx
@@ -5215,7 +5215,7 @@
                             <m:sSubPr>
                               <m:ctrlPr>
                                 <a:rPr lang="en-US" sz="2000" b="0" i="1" smtClean="0">
-                                  <a:latin typeface="Cambria Math" panose="02040503050406030204" pitchFamily="18" charset="0"/>
+                                  <a:latin typeface="Cambria Math" charset="0"/>
                                   <a:cs typeface="Arial" panose="020B0604020202020204" pitchFamily="34" charset="0"/>
                                 </a:rPr>
                               </m:ctrlPr>
@@ -5226,7 +5226,7 @@
                                   <m:chr m:val="⃗"/>
                                   <m:ctrlPr>
                                     <a:rPr lang="en-US" sz="2000" b="0" i="1" smtClean="0">
-                                      <a:latin typeface="Cambria Math" panose="02040503050406030204" pitchFamily="18" charset="0"/>
+                                      <a:latin typeface="Cambria Math" charset="0"/>
                                       <a:cs typeface="Arial" panose="020B0604020202020204" pitchFamily="34" charset="0"/>
                                     </a:rPr>
                                   </m:ctrlPr>
@@ -5337,7 +5337,7 @@
                             <m:sSubPr>
                               <m:ctrlPr>
                                 <a:rPr lang="en-US" sz="2000" b="0" i="1" smtClean="0">
-                                  <a:latin typeface="Cambria Math" panose="02040503050406030204" pitchFamily="18" charset="0"/>
+                                  <a:latin typeface="Cambria Math" charset="0"/>
                                   <a:cs typeface="Arial" panose="020B0604020202020204" pitchFamily="34" charset="0"/>
                                 </a:rPr>
                               </m:ctrlPr>
@@ -5348,7 +5348,7 @@
                                   <m:chr m:val="⃗"/>
                                   <m:ctrlPr>
                                     <a:rPr lang="en-US" sz="2000" b="0" i="1" smtClean="0">
-                                      <a:latin typeface="Cambria Math" panose="02040503050406030204" pitchFamily="18" charset="0"/>
+                                      <a:latin typeface="Cambria Math" charset="0"/>
                                       <a:cs typeface="Arial" panose="020B0604020202020204" pitchFamily="34" charset="0"/>
                                     </a:rPr>
                                   </m:ctrlPr>
@@ -6229,7 +6229,7 @@
                             <m:sSubPr>
                               <m:ctrlPr>
                                 <a:rPr lang="en-US" sz="2000" b="0" i="1" smtClean="0">
-                                  <a:latin typeface="Cambria Math" panose="02040503050406030204" pitchFamily="18" charset="0"/>
+                                  <a:latin typeface="Cambria Math" charset="0"/>
                                   <a:cs typeface="Arial" panose="020B0604020202020204" pitchFamily="34" charset="0"/>
                                 </a:rPr>
                               </m:ctrlPr>
@@ -6240,7 +6240,7 @@
                                   <m:chr m:val="⃗"/>
                                   <m:ctrlPr>
                                     <a:rPr lang="en-US" sz="2000" b="0" i="1" smtClean="0">
-                                      <a:latin typeface="Cambria Math" panose="02040503050406030204" pitchFamily="18" charset="0"/>
+                                      <a:latin typeface="Cambria Math" charset="0"/>
                                       <a:cs typeface="Arial" panose="020B0604020202020204" pitchFamily="34" charset="0"/>
                                     </a:rPr>
                                   </m:ctrlPr>
@@ -6351,7 +6351,7 @@
                             <m:sSubPr>
                               <m:ctrlPr>
                                 <a:rPr lang="en-US" sz="2000" b="0" i="1" smtClean="0">
-                                  <a:latin typeface="Cambria Math" panose="02040503050406030204" pitchFamily="18" charset="0"/>
+                                  <a:latin typeface="Cambria Math" charset="0"/>
                                   <a:cs typeface="Arial" panose="020B0604020202020204" pitchFamily="34" charset="0"/>
                                 </a:rPr>
                               </m:ctrlPr>
@@ -6362,7 +6362,7 @@
                                   <m:chr m:val="⃗"/>
                                   <m:ctrlPr>
                                     <a:rPr lang="en-US" sz="2000" b="0" i="1" smtClean="0">
-                                      <a:latin typeface="Cambria Math" panose="02040503050406030204" pitchFamily="18" charset="0"/>
+                                      <a:latin typeface="Cambria Math" charset="0"/>
                                       <a:cs typeface="Arial" panose="020B0604020202020204" pitchFamily="34" charset="0"/>
                                     </a:rPr>
                                   </m:ctrlPr>
@@ -7553,7 +7553,7 @@
                             <m:sSubPr>
                               <m:ctrlPr>
                                 <a:rPr lang="en-US" sz="2000" b="0" i="1" smtClean="0">
-                                  <a:latin typeface="Cambria Math" panose="02040503050406030204" pitchFamily="18" charset="0"/>
+                                  <a:latin typeface="Cambria Math" charset="0"/>
                                   <a:cs typeface="Arial" panose="020B0604020202020204" pitchFamily="34" charset="0"/>
                                 </a:rPr>
                               </m:ctrlPr>
@@ -7564,7 +7564,7 @@
                                   <m:chr m:val="⃗"/>
                                   <m:ctrlPr>
                                     <a:rPr lang="en-US" sz="2000" b="0" i="1" smtClean="0">
-                                      <a:latin typeface="Cambria Math" panose="02040503050406030204" pitchFamily="18" charset="0"/>
+                                      <a:latin typeface="Cambria Math" charset="0"/>
                                       <a:cs typeface="Arial" panose="020B0604020202020204" pitchFamily="34" charset="0"/>
                                     </a:rPr>
                                   </m:ctrlPr>
@@ -7675,7 +7675,7 @@
                             <m:sSubPr>
                               <m:ctrlPr>
                                 <a:rPr lang="en-US" sz="2000" b="0" i="1" smtClean="0">
-                                  <a:latin typeface="Cambria Math" panose="02040503050406030204" pitchFamily="18" charset="0"/>
+                                  <a:latin typeface="Cambria Math" charset="0"/>
                                   <a:cs typeface="Arial" panose="020B0604020202020204" pitchFamily="34" charset="0"/>
                                 </a:rPr>
                               </m:ctrlPr>
@@ -7686,7 +7686,7 @@
                                   <m:chr m:val="⃗"/>
                                   <m:ctrlPr>
                                     <a:rPr lang="en-US" sz="2000" b="0" i="1" smtClean="0">
-                                      <a:latin typeface="Cambria Math" panose="02040503050406030204" pitchFamily="18" charset="0"/>
+                                      <a:latin typeface="Cambria Math" charset="0"/>
                                       <a:cs typeface="Arial" panose="020B0604020202020204" pitchFamily="34" charset="0"/>
                                     </a:rPr>
                                   </m:ctrlPr>
@@ -7804,7 +7804,7 @@
                             <m:sSubPr>
                               <m:ctrlPr>
                                 <a:rPr lang="en-US" sz="2000" b="0" i="1" smtClean="0">
-                                  <a:latin typeface="Cambria Math" panose="02040503050406030204" pitchFamily="18" charset="0"/>
+                                  <a:latin typeface="Cambria Math" charset="0"/>
                                   <a:cs typeface="Arial" panose="020B0604020202020204" pitchFamily="34" charset="0"/>
                                 </a:rPr>
                               </m:ctrlPr>
@@ -7815,7 +7815,7 @@
                                   <m:chr m:val="⃗"/>
                                   <m:ctrlPr>
                                     <a:rPr lang="en-US" sz="2000" b="0" i="1" smtClean="0">
-                                      <a:latin typeface="Cambria Math" panose="02040503050406030204" pitchFamily="18" charset="0"/>
+                                      <a:latin typeface="Cambria Math" charset="0"/>
                                       <a:cs typeface="Arial" panose="020B0604020202020204" pitchFamily="34" charset="0"/>
                                     </a:rPr>
                                   </m:ctrlPr>
@@ -7933,7 +7933,7 @@
                             <m:sSubPr>
                               <m:ctrlPr>
                                 <a:rPr lang="en-US" sz="2000" b="0" i="1" smtClean="0">
-                                  <a:latin typeface="Cambria Math" panose="02040503050406030204" pitchFamily="18" charset="0"/>
+                                  <a:latin typeface="Cambria Math" charset="0"/>
                                   <a:cs typeface="Arial" panose="020B0604020202020204" pitchFamily="34" charset="0"/>
                                 </a:rPr>
                               </m:ctrlPr>
@@ -8042,7 +8042,7 @@
                             <m:sSubPr>
                               <m:ctrlPr>
                                 <a:rPr lang="en-US" sz="2000" b="0" i="1" smtClean="0">
-                                  <a:latin typeface="Cambria Math" panose="02040503050406030204" pitchFamily="18" charset="0"/>
+                                  <a:latin typeface="Cambria Math" charset="0"/>
                                   <a:cs typeface="Arial" panose="020B0604020202020204" pitchFamily="34" charset="0"/>
                                 </a:rPr>
                               </m:ctrlPr>
@@ -8495,343 +8495,6 @@
             </p:txBody>
           </p:sp>
         </p:grpSp>
-      </p:grpSp>
-      <p:grpSp>
-        <p:nvGrpSpPr>
-          <p:cNvPr id="10" name="Group 9"/>
-          <p:cNvGrpSpPr/>
-          <p:nvPr/>
-        </p:nvGrpSpPr>
-        <p:grpSpPr>
-          <a:xfrm>
-            <a:off x="193950" y="2388718"/>
-            <a:ext cx="3353274" cy="3531323"/>
-            <a:chOff x="193950" y="2388718"/>
-            <a:chExt cx="3353274" cy="3531323"/>
-          </a:xfrm>
-        </p:grpSpPr>
-        <p:sp>
-          <p:nvSpPr>
-            <p:cNvPr id="58" name="Rectangle 57"/>
-            <p:cNvSpPr/>
-            <p:nvPr/>
-          </p:nvSpPr>
-          <p:spPr>
-            <a:xfrm>
-              <a:off x="193950" y="5815054"/>
-              <a:ext cx="3353274" cy="61423"/>
-            </a:xfrm>
-            <a:prstGeom prst="rect">
-              <a:avLst/>
-            </a:prstGeom>
-            <a:noFill/>
-            <a:ln w="38100">
-              <a:solidFill>
-                <a:schemeClr val="tx1"/>
-              </a:solidFill>
-            </a:ln>
-          </p:spPr>
-          <p:style>
-            <a:lnRef idx="2">
-              <a:schemeClr val="accent1">
-                <a:shade val="50000"/>
-              </a:schemeClr>
-            </a:lnRef>
-            <a:fillRef idx="1">
-              <a:schemeClr val="accent1"/>
-            </a:fillRef>
-            <a:effectRef idx="0">
-              <a:schemeClr val="accent1"/>
-            </a:effectRef>
-            <a:fontRef idx="minor">
-              <a:schemeClr val="lt1"/>
-            </a:fontRef>
-          </p:style>
-          <p:txBody>
-            <a:bodyPr rtlCol="0" anchor="ctr"/>
-            <a:lstStyle/>
-            <a:p>
-              <a:pPr algn="ctr"/>
-              <a:endParaRPr lang="en-US"/>
-            </a:p>
-          </p:txBody>
-        </p:sp>
-        <mc:AlternateContent xmlns:mc="http://schemas.openxmlformats.org/markup-compatibility/2006" xmlns:a14="http://schemas.microsoft.com/office/drawing/2010/main">
-          <mc:Choice Requires="a14">
-            <p:sp>
-              <p:nvSpPr>
-                <p:cNvPr id="75" name="TextBox 74"/>
-                <p:cNvSpPr txBox="1"/>
-                <p:nvPr/>
-              </p:nvSpPr>
-              <p:spPr>
-                <a:xfrm>
-                  <a:off x="668912" y="3520639"/>
-                  <a:ext cx="391196" cy="307777"/>
-                </a:xfrm>
-                <a:prstGeom prst="rect">
-                  <a:avLst/>
-                </a:prstGeom>
-                <a:noFill/>
-              </p:spPr>
-              <p:txBody>
-                <a:bodyPr wrap="none" lIns="0" tIns="0" rIns="0" bIns="0" rtlCol="0">
-                  <a:spAutoFit/>
-                </a:bodyPr>
-                <a:lstStyle/>
-                <a:p>
-                  <a:pPr/>
-                  <a14:m>
-                    <m:oMathPara xmlns:m="http://schemas.openxmlformats.org/officeDocument/2006/math">
-                      <m:oMathParaPr>
-                        <m:jc m:val="centerGroup"/>
-                      </m:oMathParaPr>
-                      <m:oMath xmlns:m="http://schemas.openxmlformats.org/officeDocument/2006/math">
-                        <m:sSub>
-                          <m:sSubPr>
-                            <m:ctrlPr>
-                              <a:rPr lang="en-US" sz="2000" b="0" i="1" smtClean="0">
-                                <a:latin typeface="Cambria Math" panose="02040503050406030204" pitchFamily="18" charset="0"/>
-                                <a:cs typeface="Arial" panose="020B0604020202020204" pitchFamily="34" charset="0"/>
-                              </a:rPr>
-                            </m:ctrlPr>
-                          </m:sSubPr>
-                          <m:e>
-                            <m:r>
-                              <a:rPr lang="en-US" sz="2000" b="0" i="1" smtClean="0">
-                                <a:latin typeface="Cambria Math" panose="02040503050406030204" pitchFamily="18" charset="0"/>
-                                <a:cs typeface="Arial" panose="020B0604020202020204" pitchFamily="34" charset="0"/>
-                              </a:rPr>
-                              <m:t>𝑚</m:t>
-                            </m:r>
-                          </m:e>
-                          <m:sub>
-                            <m:r>
-                              <a:rPr lang="en-US" sz="2000" b="0" i="1" smtClean="0">
-                                <a:latin typeface="Cambria Math" panose="02040503050406030204" pitchFamily="18" charset="0"/>
-                                <a:cs typeface="Arial" panose="020B0604020202020204" pitchFamily="34" charset="0"/>
-                              </a:rPr>
-                              <m:t>𝑠</m:t>
-                            </m:r>
-                          </m:sub>
-                        </m:sSub>
-                      </m:oMath>
-                    </m:oMathPara>
-                  </a14:m>
-                  <a:endParaRPr lang="en-US" sz="2000" dirty="0">
-                    <a:latin typeface="Arial" panose="020B0604020202020204" pitchFamily="34" charset="0"/>
-                    <a:cs typeface="Arial" panose="020B0604020202020204" pitchFamily="34" charset="0"/>
-                  </a:endParaRPr>
-                </a:p>
-              </p:txBody>
-            </p:sp>
-          </mc:Choice>
-          <mc:Fallback xmlns="">
-            <p:sp>
-              <p:nvSpPr>
-                <p:cNvPr id="75" name="TextBox 74"/>
-                <p:cNvSpPr txBox="1">
-                  <a:spLocks noRot="1" noChangeAspect="1" noMove="1" noResize="1" noEditPoints="1" noAdjustHandles="1" noChangeArrowheads="1" noChangeShapeType="1" noTextEdit="1"/>
-                </p:cNvSpPr>
-                <p:nvPr/>
-              </p:nvSpPr>
-              <p:spPr>
-                <a:xfrm>
-                  <a:off x="668912" y="3520639"/>
-                  <a:ext cx="391196" cy="307777"/>
-                </a:xfrm>
-                <a:prstGeom prst="rect">
-                  <a:avLst/>
-                </a:prstGeom>
-                <a:blipFill rotWithShape="0">
-                  <a:blip r:embed="rId49"/>
-                  <a:stretch>
-                    <a:fillRect l="-7813" b="-18000"/>
-                  </a:stretch>
-                </a:blipFill>
-              </p:spPr>
-              <p:txBody>
-                <a:bodyPr/>
-                <a:lstStyle/>
-                <a:p>
-                  <a:r>
-                    <a:rPr lang="en-US">
-                      <a:noFill/>
-                    </a:rPr>
-                    <a:t> </a:t>
-                  </a:r>
-                </a:p>
-              </p:txBody>
-            </p:sp>
-          </mc:Fallback>
-        </mc:AlternateContent>
-        <mc:AlternateContent xmlns:mc="http://schemas.openxmlformats.org/markup-compatibility/2006" xmlns:a14="http://schemas.microsoft.com/office/drawing/2010/main">
-          <mc:Choice Requires="a14">
-            <p:sp>
-              <p:nvSpPr>
-                <p:cNvPr id="76" name="TextBox 75"/>
-                <p:cNvSpPr txBox="1"/>
-                <p:nvPr/>
-              </p:nvSpPr>
-              <p:spPr>
-                <a:xfrm>
-                  <a:off x="2538934" y="3505968"/>
-                  <a:ext cx="397673" cy="332399"/>
-                </a:xfrm>
-                <a:prstGeom prst="rect">
-                  <a:avLst/>
-                </a:prstGeom>
-                <a:noFill/>
-              </p:spPr>
-              <p:txBody>
-                <a:bodyPr wrap="none" lIns="0" tIns="0" rIns="0" bIns="0" rtlCol="0">
-                  <a:spAutoFit/>
-                </a:bodyPr>
-                <a:lstStyle/>
-                <a:p>
-                  <a:pPr/>
-                  <a14:m>
-                    <m:oMathPara xmlns:m="http://schemas.openxmlformats.org/officeDocument/2006/math">
-                      <m:oMathParaPr>
-                        <m:jc m:val="centerGroup"/>
-                      </m:oMathParaPr>
-                      <m:oMath xmlns:m="http://schemas.openxmlformats.org/officeDocument/2006/math">
-                        <m:sSub>
-                          <m:sSubPr>
-                            <m:ctrlPr>
-                              <a:rPr lang="en-US" sz="2000" b="0" i="1" smtClean="0">
-                                <a:latin typeface="Cambria Math" panose="02040503050406030204" pitchFamily="18" charset="0"/>
-                                <a:cs typeface="Arial" panose="020B0604020202020204" pitchFamily="34" charset="0"/>
-                              </a:rPr>
-                            </m:ctrlPr>
-                          </m:sSubPr>
-                          <m:e>
-                            <m:r>
-                              <a:rPr lang="en-US" sz="2000" b="0" i="1" smtClean="0">
-                                <a:latin typeface="Cambria Math" panose="02040503050406030204" pitchFamily="18" charset="0"/>
-                                <a:cs typeface="Arial" panose="020B0604020202020204" pitchFamily="34" charset="0"/>
-                              </a:rPr>
-                              <m:t>𝑚</m:t>
-                            </m:r>
-                          </m:e>
-                          <m:sub>
-                            <m:r>
-                              <a:rPr lang="en-US" sz="2000" b="0" i="1" smtClean="0">
-                                <a:latin typeface="Cambria Math" panose="02040503050406030204" pitchFamily="18" charset="0"/>
-                                <a:cs typeface="Arial" panose="020B0604020202020204" pitchFamily="34" charset="0"/>
-                              </a:rPr>
-                              <m:t>𝑓</m:t>
-                            </m:r>
-                          </m:sub>
-                        </m:sSub>
-                      </m:oMath>
-                    </m:oMathPara>
-                  </a14:m>
-                  <a:endParaRPr lang="en-US" sz="2000" dirty="0">
-                    <a:latin typeface="Arial" panose="020B0604020202020204" pitchFamily="34" charset="0"/>
-                    <a:cs typeface="Arial" panose="020B0604020202020204" pitchFamily="34" charset="0"/>
-                  </a:endParaRPr>
-                </a:p>
-              </p:txBody>
-            </p:sp>
-          </mc:Choice>
-          <mc:Fallback xmlns="">
-            <p:sp>
-              <p:nvSpPr>
-                <p:cNvPr id="76" name="TextBox 75"/>
-                <p:cNvSpPr txBox="1">
-                  <a:spLocks noRot="1" noChangeAspect="1" noMove="1" noResize="1" noEditPoints="1" noAdjustHandles="1" noChangeArrowheads="1" noChangeShapeType="1" noTextEdit="1"/>
-                </p:cNvSpPr>
-                <p:nvPr/>
-              </p:nvSpPr>
-              <p:spPr>
-                <a:xfrm>
-                  <a:off x="2538934" y="3505968"/>
-                  <a:ext cx="397673" cy="332399"/>
-                </a:xfrm>
-                <a:prstGeom prst="rect">
-                  <a:avLst/>
-                </a:prstGeom>
-                <a:blipFill rotWithShape="0">
-                  <a:blip r:embed="rId50"/>
-                  <a:stretch>
-                    <a:fillRect l="-6061" r="-9091" b="-25455"/>
-                  </a:stretch>
-                </a:blipFill>
-              </p:spPr>
-              <p:txBody>
-                <a:bodyPr/>
-                <a:lstStyle/>
-                <a:p>
-                  <a:r>
-                    <a:rPr lang="en-US">
-                      <a:noFill/>
-                    </a:rPr>
-                    <a:t> </a:t>
-                  </a:r>
-                </a:p>
-              </p:txBody>
-            </p:sp>
-          </mc:Fallback>
-        </mc:AlternateContent>
-        <p:pic>
-          <p:nvPicPr>
-            <p:cNvPr id="3" name="Picture 2"/>
-            <p:cNvPicPr>
-              <a:picLocks noChangeAspect="1"/>
-            </p:cNvPicPr>
-            <p:nvPr/>
-          </p:nvPicPr>
-          <p:blipFill rotWithShape="1">
-            <a:blip r:embed="rId51" cstate="print">
-              <a:extLst>
-                <a:ext uri="{28A0092B-C50C-407E-A947-70E740481C1C}">
-                  <a14:useLocalDpi xmlns:a14="http://schemas.microsoft.com/office/drawing/2010/main" val="0"/>
-                </a:ext>
-              </a:extLst>
-            </a:blip>
-            <a:srcRect l="21326" t="10534" r="65744" b="45710"/>
-            <a:stretch/>
-          </p:blipFill>
-          <p:spPr>
-            <a:xfrm flipH="1">
-              <a:off x="1652828" y="2388718"/>
-              <a:ext cx="1043561" cy="3531323"/>
-            </a:xfrm>
-            <a:prstGeom prst="rect">
-              <a:avLst/>
-            </a:prstGeom>
-          </p:spPr>
-        </p:pic>
-        <p:pic>
-          <p:nvPicPr>
-            <p:cNvPr id="95" name="Picture 94"/>
-            <p:cNvPicPr>
-              <a:picLocks noChangeAspect="1"/>
-            </p:cNvPicPr>
-            <p:nvPr/>
-          </p:nvPicPr>
-          <p:blipFill rotWithShape="1">
-            <a:blip r:embed="rId52" cstate="print">
-              <a:extLst>
-                <a:ext uri="{28A0092B-C50C-407E-A947-70E740481C1C}">
-                  <a14:useLocalDpi xmlns:a14="http://schemas.microsoft.com/office/drawing/2010/main" val="0"/>
-                </a:ext>
-              </a:extLst>
-            </a:blip>
-            <a:srcRect l="38020" r="41286"/>
-            <a:stretch/>
-          </p:blipFill>
-          <p:spPr>
-            <a:xfrm flipH="1">
-              <a:off x="926743" y="2534810"/>
-              <a:ext cx="1201012" cy="3291634"/>
-            </a:xfrm>
-            <a:prstGeom prst="rect">
-              <a:avLst/>
-            </a:prstGeom>
-          </p:spPr>
-        </p:pic>
       </p:grpSp>
       <p:grpSp>
         <p:nvGrpSpPr>
@@ -9911,7 +9574,7 @@
                               <m:chr m:val="⃗"/>
                               <m:ctrlPr>
                                 <a:rPr lang="en-US" sz="2000" b="0" i="1" smtClean="0">
-                                  <a:latin typeface="Cambria Math" panose="02040503050406030204" pitchFamily="18" charset="0"/>
+                                  <a:latin typeface="Cambria Math" charset="0"/>
                                   <a:cs typeface="Arial" panose="020B0604020202020204" pitchFamily="34" charset="0"/>
                                 </a:rPr>
                               </m:ctrlPr>
@@ -9986,7 +9649,7 @@
             <p:nvPr/>
           </p:nvPicPr>
           <p:blipFill rotWithShape="1">
-            <a:blip r:embed="rId53" cstate="print">
+            <a:blip r:embed="rId49" cstate="print">
               <a:extLst>
                 <a:ext uri="{28A0092B-C50C-407E-A947-70E740481C1C}">
                   <a14:useLocalDpi xmlns:a14="http://schemas.microsoft.com/office/drawing/2010/main" val="0"/>
@@ -10029,7 +9692,7 @@
               <p:nvPr/>
             </p:nvPicPr>
             <p:blipFill rotWithShape="1">
-              <a:blip r:embed="rId54" cstate="print">
+              <a:blip r:embed="rId50" cstate="print">
                 <a:alphaModFix/>
                 <a:extLst>
                   <a:ext uri="{28A0092B-C50C-407E-A947-70E740481C1C}">
@@ -10059,7 +9722,7 @@
               <p:nvPr/>
             </p:nvPicPr>
             <p:blipFill rotWithShape="1">
-              <a:blip r:embed="rId55" cstate="print">
+              <a:blip r:embed="rId51" cstate="print">
                 <a:extLst>
                   <a:ext uri="{28A0092B-C50C-407E-A947-70E740481C1C}">
                     <a14:useLocalDpi xmlns:a14="http://schemas.microsoft.com/office/drawing/2010/main" val="0"/>
@@ -10088,7 +9751,7 @@
               <p:nvPr/>
             </p:nvPicPr>
             <p:blipFill rotWithShape="1">
-              <a:blip r:embed="rId56" cstate="print">
+              <a:blip r:embed="rId52" cstate="print">
                 <a:extLst>
                   <a:ext uri="{28A0092B-C50C-407E-A947-70E740481C1C}">
                     <a14:useLocalDpi xmlns:a14="http://schemas.microsoft.com/office/drawing/2010/main" val="0"/>
@@ -10117,7 +9780,7 @@
               <p:nvPr/>
             </p:nvPicPr>
             <p:blipFill rotWithShape="1">
-              <a:blip r:embed="rId54" cstate="print">
+              <a:blip r:embed="rId50" cstate="print">
                 <a:extLst>
                   <a:ext uri="{28A0092B-C50C-407E-A947-70E740481C1C}">
                     <a14:useLocalDpi xmlns:a14="http://schemas.microsoft.com/office/drawing/2010/main" val="0"/>
@@ -10146,7 +9809,7 @@
               <p:nvPr/>
             </p:nvPicPr>
             <p:blipFill rotWithShape="1">
-              <a:blip r:embed="rId55" cstate="print">
+              <a:blip r:embed="rId51" cstate="print">
                 <a:extLst>
                   <a:ext uri="{28A0092B-C50C-407E-A947-70E740481C1C}">
                     <a14:useLocalDpi xmlns:a14="http://schemas.microsoft.com/office/drawing/2010/main" val="0"/>
@@ -10175,7 +9838,7 @@
               <p:nvPr/>
             </p:nvPicPr>
             <p:blipFill rotWithShape="1">
-              <a:blip r:embed="rId56" cstate="print">
+              <a:blip r:embed="rId52" cstate="print">
                 <a:extLst>
                   <a:ext uri="{28A0092B-C50C-407E-A947-70E740481C1C}">
                     <a14:useLocalDpi xmlns:a14="http://schemas.microsoft.com/office/drawing/2010/main" val="0"/>
@@ -10196,6 +9859,358 @@
             </p:spPr>
           </p:pic>
         </p:grpSp>
+      </p:grpSp>
+      <p:grpSp>
+        <p:nvGrpSpPr>
+          <p:cNvPr id="4" name="Group 3"/>
+          <p:cNvGrpSpPr/>
+          <p:nvPr/>
+        </p:nvGrpSpPr>
+        <p:grpSpPr>
+          <a:xfrm>
+            <a:off x="571777" y="2400246"/>
+            <a:ext cx="3353274" cy="3571252"/>
+            <a:chOff x="193950" y="2388718"/>
+            <a:chExt cx="3353274" cy="3571252"/>
+          </a:xfrm>
+        </p:grpSpPr>
+        <p:grpSp>
+          <p:nvGrpSpPr>
+            <p:cNvPr id="10" name="Group 9"/>
+            <p:cNvGrpSpPr/>
+            <p:nvPr/>
+          </p:nvGrpSpPr>
+          <p:grpSpPr>
+            <a:xfrm>
+              <a:off x="193950" y="2388718"/>
+              <a:ext cx="3353274" cy="3531323"/>
+              <a:chOff x="193950" y="2388718"/>
+              <a:chExt cx="3353274" cy="3531323"/>
+            </a:xfrm>
+          </p:grpSpPr>
+          <p:sp>
+            <p:nvSpPr>
+              <p:cNvPr id="58" name="Rectangle 57"/>
+              <p:cNvSpPr/>
+              <p:nvPr/>
+            </p:nvSpPr>
+            <p:spPr>
+              <a:xfrm>
+                <a:off x="193950" y="5815054"/>
+                <a:ext cx="3353274" cy="61423"/>
+              </a:xfrm>
+              <a:prstGeom prst="rect">
+                <a:avLst/>
+              </a:prstGeom>
+              <a:noFill/>
+              <a:ln w="38100">
+                <a:solidFill>
+                  <a:schemeClr val="tx1"/>
+                </a:solidFill>
+              </a:ln>
+            </p:spPr>
+            <p:style>
+              <a:lnRef idx="2">
+                <a:schemeClr val="accent1">
+                  <a:shade val="50000"/>
+                </a:schemeClr>
+              </a:lnRef>
+              <a:fillRef idx="1">
+                <a:schemeClr val="accent1"/>
+              </a:fillRef>
+              <a:effectRef idx="0">
+                <a:schemeClr val="accent1"/>
+              </a:effectRef>
+              <a:fontRef idx="minor">
+                <a:schemeClr val="lt1"/>
+              </a:fontRef>
+            </p:style>
+            <p:txBody>
+              <a:bodyPr rtlCol="0" anchor="ctr"/>
+              <a:lstStyle/>
+              <a:p>
+                <a:pPr algn="ctr"/>
+                <a:endParaRPr lang="en-US"/>
+              </a:p>
+            </p:txBody>
+          </p:sp>
+          <mc:AlternateContent xmlns:mc="http://schemas.openxmlformats.org/markup-compatibility/2006" xmlns:a14="http://schemas.microsoft.com/office/drawing/2010/main">
+            <mc:Choice Requires="a14">
+              <p:sp>
+                <p:nvSpPr>
+                  <p:cNvPr id="75" name="TextBox 74"/>
+                  <p:cNvSpPr txBox="1"/>
+                  <p:nvPr/>
+                </p:nvSpPr>
+                <p:spPr>
+                  <a:xfrm>
+                    <a:off x="668912" y="3520639"/>
+                    <a:ext cx="391196" cy="307777"/>
+                  </a:xfrm>
+                  <a:prstGeom prst="rect">
+                    <a:avLst/>
+                  </a:prstGeom>
+                  <a:noFill/>
+                </p:spPr>
+                <p:txBody>
+                  <a:bodyPr wrap="none" lIns="0" tIns="0" rIns="0" bIns="0" rtlCol="0">
+                    <a:spAutoFit/>
+                  </a:bodyPr>
+                  <a:lstStyle/>
+                  <a:p>
+                    <a:pPr/>
+                    <a14:m>
+                      <m:oMathPara xmlns:m="http://schemas.openxmlformats.org/officeDocument/2006/math">
+                        <m:oMathParaPr>
+                          <m:jc m:val="centerGroup"/>
+                        </m:oMathParaPr>
+                        <m:oMath xmlns:m="http://schemas.openxmlformats.org/officeDocument/2006/math">
+                          <m:sSub>
+                            <m:sSubPr>
+                              <m:ctrlPr>
+                                <a:rPr lang="en-US" sz="2000" b="0" i="1" smtClean="0">
+                                  <a:latin typeface="Cambria Math" charset="0"/>
+                                  <a:cs typeface="Arial" panose="020B0604020202020204" pitchFamily="34" charset="0"/>
+                                </a:rPr>
+                              </m:ctrlPr>
+                            </m:sSubPr>
+                            <m:e>
+                              <m:r>
+                                <a:rPr lang="en-US" sz="2000" b="0" i="1" smtClean="0">
+                                  <a:latin typeface="Cambria Math" panose="02040503050406030204" pitchFamily="18" charset="0"/>
+                                  <a:cs typeface="Arial" panose="020B0604020202020204" pitchFamily="34" charset="0"/>
+                                </a:rPr>
+                                <m:t>𝑚</m:t>
+                              </m:r>
+                            </m:e>
+                            <m:sub>
+                              <m:r>
+                                <a:rPr lang="en-US" sz="2000" b="0" i="1" smtClean="0">
+                                  <a:latin typeface="Cambria Math" panose="02040503050406030204" pitchFamily="18" charset="0"/>
+                                  <a:cs typeface="Arial" panose="020B0604020202020204" pitchFamily="34" charset="0"/>
+                                </a:rPr>
+                                <m:t>𝑠</m:t>
+                              </m:r>
+                            </m:sub>
+                          </m:sSub>
+                        </m:oMath>
+                      </m:oMathPara>
+                    </a14:m>
+                    <a:endParaRPr lang="en-US" sz="2000" dirty="0">
+                      <a:latin typeface="Arial" panose="020B0604020202020204" pitchFamily="34" charset="0"/>
+                      <a:cs typeface="Arial" panose="020B0604020202020204" pitchFamily="34" charset="0"/>
+                    </a:endParaRPr>
+                  </a:p>
+                </p:txBody>
+              </p:sp>
+            </mc:Choice>
+            <mc:Fallback xmlns="">
+              <p:sp>
+                <p:nvSpPr>
+                  <p:cNvPr id="75" name="TextBox 74"/>
+                  <p:cNvSpPr txBox="1">
+                    <a:spLocks noRot="1" noChangeAspect="1" noMove="1" noResize="1" noEditPoints="1" noAdjustHandles="1" noChangeArrowheads="1" noChangeShapeType="1" noTextEdit="1"/>
+                  </p:cNvSpPr>
+                  <p:nvPr/>
+                </p:nvSpPr>
+                <p:spPr>
+                  <a:xfrm>
+                    <a:off x="668912" y="3520639"/>
+                    <a:ext cx="391196" cy="307777"/>
+                  </a:xfrm>
+                  <a:prstGeom prst="rect">
+                    <a:avLst/>
+                  </a:prstGeom>
+                  <a:blipFill rotWithShape="0">
+                    <a:blip r:embed="rId53"/>
+                    <a:stretch>
+                      <a:fillRect l="-7813" b="-18000"/>
+                    </a:stretch>
+                  </a:blipFill>
+                </p:spPr>
+                <p:txBody>
+                  <a:bodyPr/>
+                  <a:lstStyle/>
+                  <a:p>
+                    <a:r>
+                      <a:rPr lang="en-US">
+                        <a:noFill/>
+                      </a:rPr>
+                      <a:t> </a:t>
+                    </a:r>
+                  </a:p>
+                </p:txBody>
+              </p:sp>
+            </mc:Fallback>
+          </mc:AlternateContent>
+          <mc:AlternateContent xmlns:mc="http://schemas.openxmlformats.org/markup-compatibility/2006" xmlns:a14="http://schemas.microsoft.com/office/drawing/2010/main">
+            <mc:Choice Requires="a14">
+              <p:sp>
+                <p:nvSpPr>
+                  <p:cNvPr id="76" name="TextBox 75"/>
+                  <p:cNvSpPr txBox="1"/>
+                  <p:nvPr/>
+                </p:nvSpPr>
+                <p:spPr>
+                  <a:xfrm>
+                    <a:off x="2538934" y="3505968"/>
+                    <a:ext cx="397673" cy="332399"/>
+                  </a:xfrm>
+                  <a:prstGeom prst="rect">
+                    <a:avLst/>
+                  </a:prstGeom>
+                  <a:noFill/>
+                </p:spPr>
+                <p:txBody>
+                  <a:bodyPr wrap="none" lIns="0" tIns="0" rIns="0" bIns="0" rtlCol="0">
+                    <a:spAutoFit/>
+                  </a:bodyPr>
+                  <a:lstStyle/>
+                  <a:p>
+                    <a:pPr/>
+                    <a14:m>
+                      <m:oMathPara xmlns:m="http://schemas.openxmlformats.org/officeDocument/2006/math">
+                        <m:oMathParaPr>
+                          <m:jc m:val="centerGroup"/>
+                        </m:oMathParaPr>
+                        <m:oMath xmlns:m="http://schemas.openxmlformats.org/officeDocument/2006/math">
+                          <m:sSub>
+                            <m:sSubPr>
+                              <m:ctrlPr>
+                                <a:rPr lang="en-US" sz="2000" b="0" i="1" smtClean="0">
+                                  <a:latin typeface="Cambria Math" charset="0"/>
+                                  <a:cs typeface="Arial" panose="020B0604020202020204" pitchFamily="34" charset="0"/>
+                                </a:rPr>
+                              </m:ctrlPr>
+                            </m:sSubPr>
+                            <m:e>
+                              <m:r>
+                                <a:rPr lang="en-US" sz="2000" b="0" i="1" smtClean="0">
+                                  <a:latin typeface="Cambria Math" panose="02040503050406030204" pitchFamily="18" charset="0"/>
+                                  <a:cs typeface="Arial" panose="020B0604020202020204" pitchFamily="34" charset="0"/>
+                                </a:rPr>
+                                <m:t>𝑚</m:t>
+                              </m:r>
+                            </m:e>
+                            <m:sub>
+                              <m:r>
+                                <a:rPr lang="en-US" sz="2000" b="0" i="1" smtClean="0">
+                                  <a:latin typeface="Cambria Math" panose="02040503050406030204" pitchFamily="18" charset="0"/>
+                                  <a:cs typeface="Arial" panose="020B0604020202020204" pitchFamily="34" charset="0"/>
+                                </a:rPr>
+                                <m:t>𝑓</m:t>
+                              </m:r>
+                            </m:sub>
+                          </m:sSub>
+                        </m:oMath>
+                      </m:oMathPara>
+                    </a14:m>
+                    <a:endParaRPr lang="en-US" sz="2000" dirty="0">
+                      <a:latin typeface="Arial" panose="020B0604020202020204" pitchFamily="34" charset="0"/>
+                      <a:cs typeface="Arial" panose="020B0604020202020204" pitchFamily="34" charset="0"/>
+                    </a:endParaRPr>
+                  </a:p>
+                </p:txBody>
+              </p:sp>
+            </mc:Choice>
+            <mc:Fallback xmlns="">
+              <p:sp>
+                <p:nvSpPr>
+                  <p:cNvPr id="76" name="TextBox 75"/>
+                  <p:cNvSpPr txBox="1">
+                    <a:spLocks noRot="1" noChangeAspect="1" noMove="1" noResize="1" noEditPoints="1" noAdjustHandles="1" noChangeArrowheads="1" noChangeShapeType="1" noTextEdit="1"/>
+                  </p:cNvSpPr>
+                  <p:nvPr/>
+                </p:nvSpPr>
+                <p:spPr>
+                  <a:xfrm>
+                    <a:off x="2538934" y="3505968"/>
+                    <a:ext cx="397673" cy="332399"/>
+                  </a:xfrm>
+                  <a:prstGeom prst="rect">
+                    <a:avLst/>
+                  </a:prstGeom>
+                  <a:blipFill rotWithShape="0">
+                    <a:blip r:embed="rId54"/>
+                    <a:stretch>
+                      <a:fillRect l="-6061" r="-9091" b="-25455"/>
+                    </a:stretch>
+                  </a:blipFill>
+                </p:spPr>
+                <p:txBody>
+                  <a:bodyPr/>
+                  <a:lstStyle/>
+                  <a:p>
+                    <a:r>
+                      <a:rPr lang="en-US">
+                        <a:noFill/>
+                      </a:rPr>
+                      <a:t> </a:t>
+                    </a:r>
+                  </a:p>
+                </p:txBody>
+              </p:sp>
+            </mc:Fallback>
+          </mc:AlternateContent>
+          <p:pic>
+            <p:nvPicPr>
+              <p:cNvPr id="3" name="Picture 2"/>
+              <p:cNvPicPr>
+                <a:picLocks noChangeAspect="1"/>
+              </p:cNvPicPr>
+              <p:nvPr/>
+            </p:nvPicPr>
+            <p:blipFill rotWithShape="1">
+              <a:blip r:embed="rId55" cstate="print">
+                <a:extLst>
+                  <a:ext uri="{28A0092B-C50C-407E-A947-70E740481C1C}">
+                    <a14:useLocalDpi xmlns:a14="http://schemas.microsoft.com/office/drawing/2010/main" val="0"/>
+                  </a:ext>
+                </a:extLst>
+              </a:blip>
+              <a:srcRect l="21326" t="10534" r="65744" b="45710"/>
+              <a:stretch/>
+            </p:blipFill>
+            <p:spPr>
+              <a:xfrm flipH="1">
+                <a:off x="1652828" y="2388718"/>
+                <a:ext cx="1043561" cy="3531323"/>
+              </a:xfrm>
+              <a:prstGeom prst="rect">
+                <a:avLst/>
+              </a:prstGeom>
+            </p:spPr>
+          </p:pic>
+        </p:grpSp>
+        <p:pic>
+          <p:nvPicPr>
+            <p:cNvPr id="2" name="Picture 1"/>
+            <p:cNvPicPr>
+              <a:picLocks noChangeAspect="1"/>
+            </p:cNvPicPr>
+            <p:nvPr/>
+          </p:nvPicPr>
+          <p:blipFill rotWithShape="1">
+            <a:blip r:embed="rId56">
+              <a:extLst>
+                <a:ext uri="{28A0092B-C50C-407E-A947-70E740481C1C}">
+                  <a14:useLocalDpi xmlns:a14="http://schemas.microsoft.com/office/drawing/2010/main" val="0"/>
+                </a:ext>
+              </a:extLst>
+            </a:blip>
+            <a:srcRect l="57706" b="28212"/>
+            <a:stretch/>
+          </p:blipFill>
+          <p:spPr>
+            <a:xfrm flipH="1">
+              <a:off x="623773" y="2531539"/>
+              <a:ext cx="1560823" cy="3428431"/>
+            </a:xfrm>
+            <a:prstGeom prst="rect">
+              <a:avLst/>
+            </a:prstGeom>
+          </p:spPr>
+        </p:pic>
       </p:grpSp>
     </p:spTree>
     <p:extLst>
@@ -10545,7 +10560,7 @@
                               <m:chr m:val="⃗"/>
                               <m:ctrlPr>
                                 <a:rPr lang="en-US" sz="2000" b="0" i="1" smtClean="0">
-                                  <a:latin typeface="Cambria Math" panose="02040503050406030204" pitchFamily="18" charset="0"/>
+                                  <a:latin typeface="Cambria Math" charset="0"/>
                                   <a:cs typeface="Arial" panose="020B0604020202020204" pitchFamily="34" charset="0"/>
                                 </a:rPr>
                               </m:ctrlPr>
@@ -12421,7 +12436,7 @@
                                 <m:sSubPr>
                                   <m:ctrlPr>
                                     <a:rPr lang="en-US" sz="2000" b="0" i="1" smtClean="0">
-                                      <a:latin typeface="Cambria Math" panose="02040503050406030204" pitchFamily="18" charset="0"/>
+                                      <a:latin typeface="Cambria Math" charset="0"/>
                                       <a:cs typeface="Arial" panose="020B0604020202020204" pitchFamily="34" charset="0"/>
                                     </a:rPr>
                                   </m:ctrlPr>
@@ -12432,7 +12447,7 @@
                                       <m:chr m:val="⃗"/>
                                       <m:ctrlPr>
                                         <a:rPr lang="en-US" sz="2000" b="0" i="1" smtClean="0">
-                                          <a:latin typeface="Cambria Math" panose="02040503050406030204" pitchFamily="18" charset="0"/>
+                                          <a:latin typeface="Cambria Math" charset="0"/>
                                           <a:cs typeface="Arial" panose="020B0604020202020204" pitchFamily="34" charset="0"/>
                                         </a:rPr>
                                       </m:ctrlPr>
@@ -12543,7 +12558,7 @@
                                 <m:sSubPr>
                                   <m:ctrlPr>
                                     <a:rPr lang="en-US" sz="2000" b="0" i="1" smtClean="0">
-                                      <a:latin typeface="Cambria Math" panose="02040503050406030204" pitchFamily="18" charset="0"/>
+                                      <a:latin typeface="Cambria Math" charset="0"/>
                                       <a:cs typeface="Arial" panose="020B0604020202020204" pitchFamily="34" charset="0"/>
                                     </a:rPr>
                                   </m:ctrlPr>
@@ -12554,7 +12569,7 @@
                                       <m:chr m:val="⃗"/>
                                       <m:ctrlPr>
                                         <a:rPr lang="en-US" sz="2000" b="0" i="1" smtClean="0">
-                                          <a:latin typeface="Cambria Math" panose="02040503050406030204" pitchFamily="18" charset="0"/>
+                                          <a:latin typeface="Cambria Math" charset="0"/>
                                           <a:cs typeface="Arial" panose="020B0604020202020204" pitchFamily="34" charset="0"/>
                                         </a:rPr>
                                       </m:ctrlPr>
@@ -12672,7 +12687,7 @@
                                 <m:sSubPr>
                                   <m:ctrlPr>
                                     <a:rPr lang="en-US" sz="2000" b="0" i="1" smtClean="0">
-                                      <a:latin typeface="Cambria Math" panose="02040503050406030204" pitchFamily="18" charset="0"/>
+                                      <a:latin typeface="Cambria Math" charset="0"/>
                                       <a:cs typeface="Arial" panose="020B0604020202020204" pitchFamily="34" charset="0"/>
                                     </a:rPr>
                                   </m:ctrlPr>
@@ -12683,7 +12698,7 @@
                                       <m:chr m:val="⃗"/>
                                       <m:ctrlPr>
                                         <a:rPr lang="en-US" sz="2000" b="0" i="1" smtClean="0">
-                                          <a:latin typeface="Cambria Math" panose="02040503050406030204" pitchFamily="18" charset="0"/>
+                                          <a:latin typeface="Cambria Math" charset="0"/>
                                           <a:cs typeface="Arial" panose="020B0604020202020204" pitchFamily="34" charset="0"/>
                                         </a:rPr>
                                       </m:ctrlPr>
@@ -12801,7 +12816,7 @@
                                 <m:sSubPr>
                                   <m:ctrlPr>
                                     <a:rPr lang="en-US" sz="2000" b="0" i="1" smtClean="0">
-                                      <a:latin typeface="Cambria Math" panose="02040503050406030204" pitchFamily="18" charset="0"/>
+                                      <a:latin typeface="Cambria Math" charset="0"/>
                                       <a:cs typeface="Arial" panose="020B0604020202020204" pitchFamily="34" charset="0"/>
                                     </a:rPr>
                                   </m:ctrlPr>
@@ -12910,7 +12925,7 @@
                                 <m:sSubPr>
                                   <m:ctrlPr>
                                     <a:rPr lang="en-US" sz="2000" b="0" i="1" smtClean="0">
-                                      <a:latin typeface="Cambria Math" panose="02040503050406030204" pitchFamily="18" charset="0"/>
+                                      <a:latin typeface="Cambria Math" charset="0"/>
                                       <a:cs typeface="Arial" panose="020B0604020202020204" pitchFamily="34" charset="0"/>
                                     </a:rPr>
                                   </m:ctrlPr>
@@ -13583,7 +13598,7 @@
                           <m:sSubPr>
                             <m:ctrlPr>
                               <a:rPr lang="en-US" sz="2000" b="0" i="1" smtClean="0">
-                                <a:latin typeface="Cambria Math" panose="02040503050406030204" pitchFamily="18" charset="0"/>
+                                <a:latin typeface="Cambria Math" charset="0"/>
                                 <a:cs typeface="Arial" panose="020B0604020202020204" pitchFamily="34" charset="0"/>
                               </a:rPr>
                             </m:ctrlPr>
@@ -13594,7 +13609,7 @@
                                 <m:chr m:val="⃗"/>
                                 <m:ctrlPr>
                                   <a:rPr lang="en-US" sz="2000" b="0" i="1" smtClean="0">
-                                    <a:latin typeface="Cambria Math" panose="02040503050406030204" pitchFamily="18" charset="0"/>
+                                    <a:latin typeface="Cambria Math" charset="0"/>
                                     <a:cs typeface="Arial" panose="020B0604020202020204" pitchFamily="34" charset="0"/>
                                   </a:rPr>
                                 </m:ctrlPr>
@@ -13712,7 +13727,7 @@
                           <m:sSubPr>
                             <m:ctrlPr>
                               <a:rPr lang="en-US" sz="2000" b="0" i="1" smtClean="0">
-                                <a:latin typeface="Cambria Math" panose="02040503050406030204" pitchFamily="18" charset="0"/>
+                                <a:latin typeface="Cambria Math" charset="0"/>
                                 <a:cs typeface="Arial" panose="020B0604020202020204" pitchFamily="34" charset="0"/>
                               </a:rPr>
                             </m:ctrlPr>
@@ -13723,7 +13738,7 @@
                                 <m:chr m:val="⃗"/>
                                 <m:ctrlPr>
                                   <a:rPr lang="en-US" sz="2000" b="0" i="1" smtClean="0">
-                                    <a:latin typeface="Cambria Math" panose="02040503050406030204" pitchFamily="18" charset="0"/>
+                                    <a:latin typeface="Cambria Math" charset="0"/>
                                     <a:cs typeface="Arial" panose="020B0604020202020204" pitchFamily="34" charset="0"/>
                                   </a:rPr>
                                 </m:ctrlPr>
@@ -13949,7 +13964,7 @@
                           <m:sSubPr>
                             <m:ctrlPr>
                               <a:rPr lang="en-US" sz="2000" b="0" i="1" smtClean="0">
-                                <a:latin typeface="Cambria Math" panose="02040503050406030204" pitchFamily="18" charset="0"/>
+                                <a:latin typeface="Cambria Math" charset="0"/>
                                 <a:cs typeface="Arial" panose="020B0604020202020204" pitchFamily="34" charset="0"/>
                               </a:rPr>
                             </m:ctrlPr>
@@ -13960,7 +13975,7 @@
                                 <m:chr m:val="⃗"/>
                                 <m:ctrlPr>
                                   <a:rPr lang="en-US" sz="2000" b="0" i="1" smtClean="0">
-                                    <a:latin typeface="Cambria Math" panose="02040503050406030204" pitchFamily="18" charset="0"/>
+                                    <a:latin typeface="Cambria Math" charset="0"/>
                                     <a:cs typeface="Arial" panose="020B0604020202020204" pitchFamily="34" charset="0"/>
                                   </a:rPr>
                                 </m:ctrlPr>
@@ -14286,7 +14301,7 @@
                           <m:sSubPr>
                             <m:ctrlPr>
                               <a:rPr lang="en-US" sz="2000" b="0" i="1" smtClean="0">
-                                <a:latin typeface="Cambria Math" panose="02040503050406030204" pitchFamily="18" charset="0"/>
+                                <a:latin typeface="Cambria Math" charset="0"/>
                                 <a:cs typeface="Arial" panose="020B0604020202020204" pitchFamily="34" charset="0"/>
                               </a:rPr>
                             </m:ctrlPr>
@@ -14297,7 +14312,7 @@
                                 <m:chr m:val="⃗"/>
                                 <m:ctrlPr>
                                   <a:rPr lang="en-US" sz="2000" b="0" i="1" smtClean="0">
-                                    <a:latin typeface="Cambria Math" panose="02040503050406030204" pitchFamily="18" charset="0"/>
+                                    <a:latin typeface="Cambria Math" charset="0"/>
                                     <a:cs typeface="Arial" panose="020B0604020202020204" pitchFamily="34" charset="0"/>
                                   </a:rPr>
                                 </m:ctrlPr>
@@ -14408,7 +14423,7 @@
                           <m:sSubPr>
                             <m:ctrlPr>
                               <a:rPr lang="en-US" sz="2000" b="0" i="1" smtClean="0">
-                                <a:latin typeface="Cambria Math" panose="02040503050406030204" pitchFamily="18" charset="0"/>
+                                <a:latin typeface="Cambria Math" charset="0"/>
                                 <a:cs typeface="Arial" panose="020B0604020202020204" pitchFamily="34" charset="0"/>
                               </a:rPr>
                             </m:ctrlPr>
@@ -14517,7 +14532,7 @@
                           <m:sSubPr>
                             <m:ctrlPr>
                               <a:rPr lang="en-US" sz="2000" b="0" i="1" smtClean="0">
-                                <a:latin typeface="Cambria Math" panose="02040503050406030204" pitchFamily="18" charset="0"/>
+                                <a:latin typeface="Cambria Math" charset="0"/>
                                 <a:cs typeface="Arial" panose="020B0604020202020204" pitchFamily="34" charset="0"/>
                               </a:rPr>
                             </m:ctrlPr>
@@ -14626,7 +14641,7 @@
                           <m:sSubPr>
                             <m:ctrlPr>
                               <a:rPr lang="en-US" sz="2000" b="0" i="1" smtClean="0">
-                                <a:latin typeface="Cambria Math" panose="02040503050406030204" pitchFamily="18" charset="0"/>
+                                <a:latin typeface="Cambria Math" charset="0"/>
                                 <a:cs typeface="Arial" panose="020B0604020202020204" pitchFamily="34" charset="0"/>
                               </a:rPr>
                             </m:ctrlPr>
@@ -14637,7 +14652,7 @@
                                 <m:chr m:val="⃗"/>
                                 <m:ctrlPr>
                                   <a:rPr lang="en-US" sz="2000" b="0" i="1" smtClean="0">
-                                    <a:latin typeface="Cambria Math" panose="02040503050406030204" pitchFamily="18" charset="0"/>
+                                    <a:latin typeface="Cambria Math" charset="0"/>
                                     <a:cs typeface="Arial" panose="020B0604020202020204" pitchFamily="34" charset="0"/>
                                   </a:rPr>
                                 </m:ctrlPr>
@@ -15027,7 +15042,7 @@
                                 <m:sSubPr>
                                   <m:ctrlPr>
                                     <a:rPr lang="en-US" sz="2000" b="0" i="1" smtClean="0">
-                                      <a:latin typeface="Cambria Math" panose="02040503050406030204" pitchFamily="18" charset="0"/>
+                                      <a:latin typeface="Cambria Math" charset="0"/>
                                       <a:cs typeface="Arial" panose="020B0604020202020204" pitchFamily="34" charset="0"/>
                                     </a:rPr>
                                   </m:ctrlPr>
@@ -15038,7 +15053,7 @@
                                       <m:chr m:val="⃗"/>
                                       <m:ctrlPr>
                                         <a:rPr lang="en-US" sz="2000" b="0" i="1" smtClean="0">
-                                          <a:latin typeface="Cambria Math" panose="02040503050406030204" pitchFamily="18" charset="0"/>
+                                          <a:latin typeface="Cambria Math" charset="0"/>
                                           <a:cs typeface="Arial" panose="020B0604020202020204" pitchFamily="34" charset="0"/>
                                         </a:rPr>
                                       </m:ctrlPr>
@@ -15969,7 +15984,7 @@
                                   <m:sSubPr>
                                     <m:ctrlPr>
                                       <a:rPr lang="en-US" sz="2000" b="0" i="1" smtClean="0">
-                                        <a:latin typeface="Cambria Math" panose="02040503050406030204" pitchFamily="18" charset="0"/>
+                                        <a:latin typeface="Cambria Math" charset="0"/>
                                         <a:cs typeface="Arial" panose="020B0604020202020204" pitchFamily="34" charset="0"/>
                                       </a:rPr>
                                     </m:ctrlPr>
@@ -15979,7 +15994,7 @@
                                       <m:fPr>
                                         <m:ctrlPr>
                                           <a:rPr lang="en-US" sz="2000" b="0" i="1" smtClean="0">
-                                            <a:latin typeface="Cambria Math" panose="02040503050406030204" pitchFamily="18" charset="0"/>
+                                            <a:latin typeface="Cambria Math" charset="0"/>
                                             <a:cs typeface="Arial" panose="020B0604020202020204" pitchFamily="34" charset="0"/>
                                           </a:rPr>
                                         </m:ctrlPr>
@@ -16008,7 +16023,7 @@
                                         <m:chr m:val="⃗"/>
                                         <m:ctrlPr>
                                           <a:rPr lang="en-US" sz="2000" b="0" i="1" smtClean="0">
-                                            <a:latin typeface="Cambria Math" panose="02040503050406030204" pitchFamily="18" charset="0"/>
+                                            <a:latin typeface="Cambria Math" charset="0"/>
                                             <a:cs typeface="Arial" panose="020B0604020202020204" pitchFamily="34" charset="0"/>
                                           </a:rPr>
                                         </m:ctrlPr>
@@ -16683,7 +16698,7 @@
                           <m:sSubPr>
                             <m:ctrlPr>
                               <a:rPr lang="en-US" sz="2000" b="0" i="1" smtClean="0">
-                                <a:latin typeface="Cambria Math" panose="02040503050406030204" pitchFamily="18" charset="0"/>
+                                <a:latin typeface="Cambria Math" charset="0"/>
                                 <a:cs typeface="Arial" panose="020B0604020202020204" pitchFamily="34" charset="0"/>
                               </a:rPr>
                             </m:ctrlPr>
@@ -16700,7 +16715,7 @@
                               <m:fPr>
                                 <m:ctrlPr>
                                   <a:rPr lang="en-US" sz="2000" b="0" i="1" smtClean="0">
-                                    <a:latin typeface="Cambria Math" panose="02040503050406030204" pitchFamily="18" charset="0"/>
+                                    <a:latin typeface="Cambria Math" charset="0"/>
                                     <a:cs typeface="Arial" panose="020B0604020202020204" pitchFamily="34" charset="0"/>
                                   </a:rPr>
                                 </m:ctrlPr>
@@ -16729,7 +16744,7 @@
                                 <m:chr m:val="⃗"/>
                                 <m:ctrlPr>
                                   <a:rPr lang="en-US" sz="2000" b="0" i="1" smtClean="0">
-                                    <a:latin typeface="Cambria Math" panose="02040503050406030204" pitchFamily="18" charset="0"/>
+                                    <a:latin typeface="Cambria Math" charset="0"/>
                                     <a:cs typeface="Arial" panose="020B0604020202020204" pitchFamily="34" charset="0"/>
                                   </a:rPr>
                                 </m:ctrlPr>
@@ -18888,7 +18903,7 @@
                             <m:sSubPr>
                               <m:ctrlPr>
                                 <a:rPr lang="en-US" sz="2000" b="0" i="1" smtClean="0">
-                                  <a:latin typeface="Cambria Math" panose="02040503050406030204" pitchFamily="18" charset="0"/>
+                                  <a:latin typeface="Cambria Math" charset="0"/>
                                   <a:cs typeface="Arial" panose="020B0604020202020204" pitchFamily="34" charset="0"/>
                                 </a:rPr>
                               </m:ctrlPr>
@@ -18899,7 +18914,7 @@
                                   <m:chr m:val="⃗"/>
                                   <m:ctrlPr>
                                     <a:rPr lang="en-US" sz="2000" b="0" i="1" smtClean="0">
-                                      <a:latin typeface="Cambria Math" panose="02040503050406030204" pitchFamily="18" charset="0"/>
+                                      <a:latin typeface="Cambria Math" charset="0"/>
                                       <a:cs typeface="Arial" panose="020B0604020202020204" pitchFamily="34" charset="0"/>
                                     </a:rPr>
                                   </m:ctrlPr>
@@ -19010,7 +19025,7 @@
                             <m:sSubPr>
                               <m:ctrlPr>
                                 <a:rPr lang="en-US" sz="2000" b="0" i="1" smtClean="0">
-                                  <a:latin typeface="Cambria Math" panose="02040503050406030204" pitchFamily="18" charset="0"/>
+                                  <a:latin typeface="Cambria Math" charset="0"/>
                                   <a:cs typeface="Arial" panose="020B0604020202020204" pitchFamily="34" charset="0"/>
                                 </a:rPr>
                               </m:ctrlPr>
@@ -19021,7 +19036,7 @@
                                   <m:chr m:val="⃗"/>
                                   <m:ctrlPr>
                                     <a:rPr lang="en-US" sz="2000" b="0" i="1" smtClean="0">
-                                      <a:latin typeface="Cambria Math" panose="02040503050406030204" pitchFamily="18" charset="0"/>
+                                      <a:latin typeface="Cambria Math" charset="0"/>
                                       <a:cs typeface="Arial" panose="020B0604020202020204" pitchFamily="34" charset="0"/>
                                     </a:rPr>
                                   </m:ctrlPr>
@@ -19132,7 +19147,7 @@
                             <m:sSubPr>
                               <m:ctrlPr>
                                 <a:rPr lang="en-US" sz="2000" b="0" i="1" smtClean="0">
-                                  <a:latin typeface="Cambria Math" panose="02040503050406030204" pitchFamily="18" charset="0"/>
+                                  <a:latin typeface="Cambria Math" charset="0"/>
                                   <a:cs typeface="Arial" panose="020B0604020202020204" pitchFamily="34" charset="0"/>
                                 </a:rPr>
                               </m:ctrlPr>
@@ -19241,7 +19256,7 @@
                             <m:sSubPr>
                               <m:ctrlPr>
                                 <a:rPr lang="en-US" sz="2000" b="0" i="1" smtClean="0">
-                                  <a:latin typeface="Cambria Math" panose="02040503050406030204" pitchFamily="18" charset="0"/>
+                                  <a:latin typeface="Cambria Math" charset="0"/>
                                   <a:cs typeface="Arial" panose="020B0604020202020204" pitchFamily="34" charset="0"/>
                                 </a:rPr>
                               </m:ctrlPr>
@@ -19350,7 +19365,7 @@
                             <m:sSubPr>
                               <m:ctrlPr>
                                 <a:rPr lang="en-US" sz="2000" b="0" i="1" smtClean="0">
-                                  <a:latin typeface="Cambria Math" panose="02040503050406030204" pitchFamily="18" charset="0"/>
+                                  <a:latin typeface="Cambria Math" charset="0"/>
                                   <a:cs typeface="Arial" panose="020B0604020202020204" pitchFamily="34" charset="0"/>
                                 </a:rPr>
                               </m:ctrlPr>
@@ -21500,7 +21515,7 @@
                             <m:sSubPr>
                               <m:ctrlPr>
                                 <a:rPr lang="en-US" sz="2000" b="0" i="1" smtClean="0">
-                                  <a:latin typeface="Cambria Math" panose="02040503050406030204" pitchFamily="18" charset="0"/>
+                                  <a:latin typeface="Cambria Math" charset="0"/>
                                   <a:cs typeface="Arial" panose="020B0604020202020204" pitchFamily="34" charset="0"/>
                                 </a:rPr>
                               </m:ctrlPr>
@@ -21609,7 +21624,7 @@
                             <m:sSubPr>
                               <m:ctrlPr>
                                 <a:rPr lang="en-US" sz="2000" b="0" i="1" smtClean="0">
-                                  <a:latin typeface="Cambria Math" panose="02040503050406030204" pitchFamily="18" charset="0"/>
+                                  <a:latin typeface="Cambria Math" charset="0"/>
                                   <a:cs typeface="Arial" panose="020B0604020202020204" pitchFamily="34" charset="0"/>
                                 </a:rPr>
                               </m:ctrlPr>
@@ -21809,7 +21824,7 @@
                           <m:sSubPr>
                             <m:ctrlPr>
                               <a:rPr lang="en-US" sz="2000" b="0" i="1" smtClean="0">
-                                <a:latin typeface="Cambria Math" panose="02040503050406030204" pitchFamily="18" charset="0"/>
+                                <a:latin typeface="Cambria Math" charset="0"/>
                                 <a:cs typeface="Arial" panose="020B0604020202020204" pitchFamily="34" charset="0"/>
                               </a:rPr>
                             </m:ctrlPr>
@@ -21918,7 +21933,7 @@
                           <m:sSubPr>
                             <m:ctrlPr>
                               <a:rPr lang="en-US" sz="2000" b="0" i="1" smtClean="0">
-                                <a:latin typeface="Cambria Math" panose="02040503050406030204" pitchFamily="18" charset="0"/>
+                                <a:latin typeface="Cambria Math" charset="0"/>
                                 <a:cs typeface="Arial" panose="020B0604020202020204" pitchFamily="34" charset="0"/>
                               </a:rPr>
                             </m:ctrlPr>
@@ -22027,7 +22042,7 @@
                           <m:sSubPr>
                             <m:ctrlPr>
                               <a:rPr lang="en-US" sz="2000" b="0" i="1" smtClean="0">
-                                <a:latin typeface="Cambria Math" panose="02040503050406030204" pitchFamily="18" charset="0"/>
+                                <a:latin typeface="Cambria Math" charset="0"/>
                                 <a:cs typeface="Arial" panose="020B0604020202020204" pitchFamily="34" charset="0"/>
                               </a:rPr>
                             </m:ctrlPr>
@@ -23505,7 +23520,7 @@
           <p:cNvPr id="26" name="Group 25">
             <a:extLst>
               <a:ext uri="{FF2B5EF4-FFF2-40B4-BE49-F238E27FC236}">
-                <a16:creationId xmlns:a16="http://schemas.microsoft.com/office/drawing/2014/main" id="{F22328EA-3706-F141-9861-742E2E5D763F}"/>
+                <a16:creationId xmlns:a16="http://schemas.microsoft.com/office/drawing/2014/main" xmlns="" id="{F22328EA-3706-F141-9861-742E2E5D763F}"/>
               </a:ext>
             </a:extLst>
           </p:cNvPr>
@@ -23525,7 +23540,7 @@
             <p:cNvPr id="4" name="Group 3">
               <a:extLst>
                 <a:ext uri="{FF2B5EF4-FFF2-40B4-BE49-F238E27FC236}">
-                  <a16:creationId xmlns:a16="http://schemas.microsoft.com/office/drawing/2014/main" id="{A8AD7B89-E35B-4347-A6D4-7559033B3495}"/>
+                  <a16:creationId xmlns:a16="http://schemas.microsoft.com/office/drawing/2014/main" xmlns="" id="{A8AD7B89-E35B-4347-A6D4-7559033B3495}"/>
                 </a:ext>
               </a:extLst>
             </p:cNvPr>
@@ -23545,7 +23560,7 @@
               <p:cNvPr id="5" name="Group 4">
                 <a:extLst>
                   <a:ext uri="{FF2B5EF4-FFF2-40B4-BE49-F238E27FC236}">
-                    <a16:creationId xmlns:a16="http://schemas.microsoft.com/office/drawing/2014/main" id="{38569929-4C40-CF46-915B-578A05249BEE}"/>
+                    <a16:creationId xmlns:a16="http://schemas.microsoft.com/office/drawing/2014/main" xmlns="" id="{38569929-4C40-CF46-915B-578A05249BEE}"/>
                   </a:ext>
                 </a:extLst>
               </p:cNvPr>
@@ -23565,7 +23580,7 @@
                 <p:cNvPr id="7" name="Straight Arrow Connector 6">
                   <a:extLst>
                     <a:ext uri="{FF2B5EF4-FFF2-40B4-BE49-F238E27FC236}">
-                      <a16:creationId xmlns:a16="http://schemas.microsoft.com/office/drawing/2014/main" id="{1B47B7ED-9F45-6D4B-9C68-0E449589D95B}"/>
+                      <a16:creationId xmlns:a16="http://schemas.microsoft.com/office/drawing/2014/main" xmlns="" id="{1B47B7ED-9F45-6D4B-9C68-0E449589D95B}"/>
                     </a:ext>
                   </a:extLst>
                 </p:cNvPr>
@@ -23607,7 +23622,7 @@
                 <p:cNvPr id="8" name="Straight Arrow Connector 7">
                   <a:extLst>
                     <a:ext uri="{FF2B5EF4-FFF2-40B4-BE49-F238E27FC236}">
-                      <a16:creationId xmlns:a16="http://schemas.microsoft.com/office/drawing/2014/main" id="{786EBDAB-B3DC-9344-919F-9ACE9AF7F6BF}"/>
+                      <a16:creationId xmlns:a16="http://schemas.microsoft.com/office/drawing/2014/main" xmlns="" id="{786EBDAB-B3DC-9344-919F-9ACE9AF7F6BF}"/>
                     </a:ext>
                   </a:extLst>
                 </p:cNvPr>
@@ -23651,7 +23666,7 @@
                     <p:cNvPr id="9" name="Rectangle 8">
                       <a:extLst>
                         <a:ext uri="{FF2B5EF4-FFF2-40B4-BE49-F238E27FC236}">
-                          <a16:creationId xmlns:a16="http://schemas.microsoft.com/office/drawing/2014/main" id="{C6DE9E4E-DAFB-B647-A3AC-A75661AF6AF8}"/>
+                          <a16:creationId xmlns:a16="http://schemas.microsoft.com/office/drawing/2014/main" xmlns="" id="{C6DE9E4E-DAFB-B647-A3AC-A75661AF6AF8}"/>
                         </a:ext>
                       </a:extLst>
                     </p:cNvPr>
@@ -23741,7 +23756,7 @@
                     <p:cNvPr id="10" name="Rectangle 9">
                       <a:extLst>
                         <a:ext uri="{FF2B5EF4-FFF2-40B4-BE49-F238E27FC236}">
-                          <a16:creationId xmlns:a16="http://schemas.microsoft.com/office/drawing/2014/main" id="{65C8D917-24FE-E449-BABF-C8D3E4EE5D1D}"/>
+                          <a16:creationId xmlns:a16="http://schemas.microsoft.com/office/drawing/2014/main" xmlns="" id="{65C8D917-24FE-E449-BABF-C8D3E4EE5D1D}"/>
                         </a:ext>
                       </a:extLst>
                     </p:cNvPr>
@@ -23830,7 +23845,7 @@
                     <p:cNvPr id="11" name="Rectangle 10">
                       <a:extLst>
                         <a:ext uri="{FF2B5EF4-FFF2-40B4-BE49-F238E27FC236}">
-                          <a16:creationId xmlns:a16="http://schemas.microsoft.com/office/drawing/2014/main" id="{32272D14-379A-A248-B7A3-328309BFD041}"/>
+                          <a16:creationId xmlns:a16="http://schemas.microsoft.com/office/drawing/2014/main" xmlns="" id="{32272D14-379A-A248-B7A3-328309BFD041}"/>
                         </a:ext>
                       </a:extLst>
                     </p:cNvPr>
@@ -23924,7 +23939,7 @@
               <p:cNvPr id="6" name="Rectangle 5">
                 <a:extLst>
                   <a:ext uri="{FF2B5EF4-FFF2-40B4-BE49-F238E27FC236}">
-                    <a16:creationId xmlns:a16="http://schemas.microsoft.com/office/drawing/2014/main" id="{2899AA6D-6DE3-1C4F-92DF-4DE73921E608}"/>
+                    <a16:creationId xmlns:a16="http://schemas.microsoft.com/office/drawing/2014/main" xmlns="" id="{2899AA6D-6DE3-1C4F-92DF-4DE73921E608}"/>
                   </a:ext>
                 </a:extLst>
               </p:cNvPr>
@@ -23956,7 +23971,7 @@
             <p:cNvPr id="12" name="Straight Arrow Connector 11">
               <a:extLst>
                 <a:ext uri="{FF2B5EF4-FFF2-40B4-BE49-F238E27FC236}">
-                  <a16:creationId xmlns:a16="http://schemas.microsoft.com/office/drawing/2014/main" id="{3DE76F5D-A213-8049-AB03-774538F0F791}"/>
+                  <a16:creationId xmlns:a16="http://schemas.microsoft.com/office/drawing/2014/main" xmlns="" id="{3DE76F5D-A213-8049-AB03-774538F0F791}"/>
                 </a:ext>
               </a:extLst>
             </p:cNvPr>
@@ -24000,7 +24015,7 @@
             <p:cNvPr id="14" name="Arc 13">
               <a:extLst>
                 <a:ext uri="{FF2B5EF4-FFF2-40B4-BE49-F238E27FC236}">
-                  <a16:creationId xmlns:a16="http://schemas.microsoft.com/office/drawing/2014/main" id="{56FFDDB0-0F57-D546-A487-CA0DAC9D84D0}"/>
+                  <a16:creationId xmlns:a16="http://schemas.microsoft.com/office/drawing/2014/main" xmlns="" id="{56FFDDB0-0F57-D546-A487-CA0DAC9D84D0}"/>
                 </a:ext>
               </a:extLst>
             </p:cNvPr>
@@ -24052,7 +24067,7 @@
             <p:cNvPr id="15" name="Arc 14">
               <a:extLst>
                 <a:ext uri="{FF2B5EF4-FFF2-40B4-BE49-F238E27FC236}">
-                  <a16:creationId xmlns:a16="http://schemas.microsoft.com/office/drawing/2014/main" id="{17CA5993-F1A6-B542-A7C8-2852E052B971}"/>
+                  <a16:creationId xmlns:a16="http://schemas.microsoft.com/office/drawing/2014/main" xmlns="" id="{17CA5993-F1A6-B542-A7C8-2852E052B971}"/>
                 </a:ext>
               </a:extLst>
             </p:cNvPr>
@@ -24107,7 +24122,7 @@
             <p:cNvPr id="19" name="Arc 18">
               <a:extLst>
                 <a:ext uri="{FF2B5EF4-FFF2-40B4-BE49-F238E27FC236}">
-                  <a16:creationId xmlns:a16="http://schemas.microsoft.com/office/drawing/2014/main" id="{65553801-37DE-754C-A759-D7A8C97F7C9D}"/>
+                  <a16:creationId xmlns:a16="http://schemas.microsoft.com/office/drawing/2014/main" xmlns="" id="{65553801-37DE-754C-A759-D7A8C97F7C9D}"/>
                 </a:ext>
               </a:extLst>
             </p:cNvPr>
@@ -24162,7 +24177,7 @@
             <p:cNvPr id="21" name="Straight Arrow Connector 20">
               <a:extLst>
                 <a:ext uri="{FF2B5EF4-FFF2-40B4-BE49-F238E27FC236}">
-                  <a16:creationId xmlns:a16="http://schemas.microsoft.com/office/drawing/2014/main" id="{4CC93CF9-279B-7F4F-A7F7-082DFA0B5FA7}"/>
+                  <a16:creationId xmlns:a16="http://schemas.microsoft.com/office/drawing/2014/main" xmlns="" id="{4CC93CF9-279B-7F4F-A7F7-082DFA0B5FA7}"/>
                 </a:ext>
               </a:extLst>
             </p:cNvPr>
@@ -24222,7 +24237,7 @@
             <p:cNvPr id="16" name="Group 15">
               <a:extLst>
                 <a:ext uri="{FF2B5EF4-FFF2-40B4-BE49-F238E27FC236}">
-                  <a16:creationId xmlns:a16="http://schemas.microsoft.com/office/drawing/2014/main" id="{F22328EA-3706-F141-9861-742E2E5D763F}"/>
+                  <a16:creationId xmlns:a16="http://schemas.microsoft.com/office/drawing/2014/main" xmlns="" id="{F22328EA-3706-F141-9861-742E2E5D763F}"/>
                 </a:ext>
               </a:extLst>
             </p:cNvPr>
@@ -24242,7 +24257,7 @@
               <p:cNvPr id="17" name="Group 16">
                 <a:extLst>
                   <a:ext uri="{FF2B5EF4-FFF2-40B4-BE49-F238E27FC236}">
-                    <a16:creationId xmlns:a16="http://schemas.microsoft.com/office/drawing/2014/main" id="{A8AD7B89-E35B-4347-A6D4-7559033B3495}"/>
+                    <a16:creationId xmlns:a16="http://schemas.microsoft.com/office/drawing/2014/main" xmlns="" id="{A8AD7B89-E35B-4347-A6D4-7559033B3495}"/>
                   </a:ext>
                 </a:extLst>
               </p:cNvPr>
@@ -24262,7 +24277,7 @@
                 <p:cNvPr id="25" name="Group 24">
                   <a:extLst>
                     <a:ext uri="{FF2B5EF4-FFF2-40B4-BE49-F238E27FC236}">
-                      <a16:creationId xmlns:a16="http://schemas.microsoft.com/office/drawing/2014/main" id="{38569929-4C40-CF46-915B-578A05249BEE}"/>
+                      <a16:creationId xmlns:a16="http://schemas.microsoft.com/office/drawing/2014/main" xmlns="" id="{38569929-4C40-CF46-915B-578A05249BEE}"/>
                     </a:ext>
                   </a:extLst>
                 </p:cNvPr>
@@ -24282,7 +24297,7 @@
                   <p:cNvPr id="28" name="Straight Arrow Connector 27">
                     <a:extLst>
                       <a:ext uri="{FF2B5EF4-FFF2-40B4-BE49-F238E27FC236}">
-                        <a16:creationId xmlns:a16="http://schemas.microsoft.com/office/drawing/2014/main" id="{1B47B7ED-9F45-6D4B-9C68-0E449589D95B}"/>
+                        <a16:creationId xmlns:a16="http://schemas.microsoft.com/office/drawing/2014/main" xmlns="" id="{1B47B7ED-9F45-6D4B-9C68-0E449589D95B}"/>
                       </a:ext>
                     </a:extLst>
                   </p:cNvPr>
@@ -24324,7 +24339,7 @@
                   <p:cNvPr id="29" name="Straight Arrow Connector 28">
                     <a:extLst>
                       <a:ext uri="{FF2B5EF4-FFF2-40B4-BE49-F238E27FC236}">
-                        <a16:creationId xmlns:a16="http://schemas.microsoft.com/office/drawing/2014/main" id="{786EBDAB-B3DC-9344-919F-9ACE9AF7F6BF}"/>
+                        <a16:creationId xmlns:a16="http://schemas.microsoft.com/office/drawing/2014/main" xmlns="" id="{786EBDAB-B3DC-9344-919F-9ACE9AF7F6BF}"/>
                       </a:ext>
                     </a:extLst>
                   </p:cNvPr>
@@ -24368,7 +24383,7 @@
                       <p:cNvPr id="30" name="Rectangle 29">
                         <a:extLst>
                           <a:ext uri="{FF2B5EF4-FFF2-40B4-BE49-F238E27FC236}">
-                            <a16:creationId xmlns:a16="http://schemas.microsoft.com/office/drawing/2014/main" id="{C6DE9E4E-DAFB-B647-A3AC-A75661AF6AF8}"/>
+                            <a16:creationId xmlns:a16="http://schemas.microsoft.com/office/drawing/2014/main" xmlns="" id="{C6DE9E4E-DAFB-B647-A3AC-A75661AF6AF8}"/>
                           </a:ext>
                         </a:extLst>
                       </p:cNvPr>
@@ -24458,7 +24473,7 @@
                       <p:cNvPr id="31" name="Rectangle 30">
                         <a:extLst>
                           <a:ext uri="{FF2B5EF4-FFF2-40B4-BE49-F238E27FC236}">
-                            <a16:creationId xmlns:a16="http://schemas.microsoft.com/office/drawing/2014/main" id="{65C8D917-24FE-E449-BABF-C8D3E4EE5D1D}"/>
+                            <a16:creationId xmlns:a16="http://schemas.microsoft.com/office/drawing/2014/main" xmlns="" id="{65C8D917-24FE-E449-BABF-C8D3E4EE5D1D}"/>
                           </a:ext>
                         </a:extLst>
                       </p:cNvPr>
@@ -24547,7 +24562,7 @@
                       <p:cNvPr id="32" name="Rectangle 31">
                         <a:extLst>
                           <a:ext uri="{FF2B5EF4-FFF2-40B4-BE49-F238E27FC236}">
-                            <a16:creationId xmlns:a16="http://schemas.microsoft.com/office/drawing/2014/main" id="{32272D14-379A-A248-B7A3-328309BFD041}"/>
+                            <a16:creationId xmlns:a16="http://schemas.microsoft.com/office/drawing/2014/main" xmlns="" id="{32272D14-379A-A248-B7A3-328309BFD041}"/>
                           </a:ext>
                         </a:extLst>
                       </p:cNvPr>
@@ -24641,7 +24656,7 @@
                 <p:cNvPr id="27" name="Rectangle 26">
                   <a:extLst>
                     <a:ext uri="{FF2B5EF4-FFF2-40B4-BE49-F238E27FC236}">
-                      <a16:creationId xmlns:a16="http://schemas.microsoft.com/office/drawing/2014/main" id="{2899AA6D-6DE3-1C4F-92DF-4DE73921E608}"/>
+                      <a16:creationId xmlns:a16="http://schemas.microsoft.com/office/drawing/2014/main" xmlns="" id="{2899AA6D-6DE3-1C4F-92DF-4DE73921E608}"/>
                     </a:ext>
                   </a:extLst>
                 </p:cNvPr>
@@ -24673,7 +24688,7 @@
               <p:cNvPr id="20" name="Arc 19">
                 <a:extLst>
                   <a:ext uri="{FF2B5EF4-FFF2-40B4-BE49-F238E27FC236}">
-                    <a16:creationId xmlns:a16="http://schemas.microsoft.com/office/drawing/2014/main" id="{56FFDDB0-0F57-D546-A487-CA0DAC9D84D0}"/>
+                    <a16:creationId xmlns:a16="http://schemas.microsoft.com/office/drawing/2014/main" xmlns="" id="{56FFDDB0-0F57-D546-A487-CA0DAC9D84D0}"/>
                   </a:ext>
                 </a:extLst>
               </p:cNvPr>
@@ -24727,7 +24742,7 @@
               <p:cNvPr id="24" name="Straight Arrow Connector 23">
                 <a:extLst>
                   <a:ext uri="{FF2B5EF4-FFF2-40B4-BE49-F238E27FC236}">
-                    <a16:creationId xmlns:a16="http://schemas.microsoft.com/office/drawing/2014/main" id="{4CC93CF9-279B-7F4F-A7F7-082DFA0B5FA7}"/>
+                    <a16:creationId xmlns:a16="http://schemas.microsoft.com/office/drawing/2014/main" xmlns="" id="{4CC93CF9-279B-7F4F-A7F7-082DFA0B5FA7}"/>
                   </a:ext>
                 </a:extLst>
               </p:cNvPr>
@@ -24773,7 +24788,7 @@
             <p:cNvPr id="33" name="Arc 32">
               <a:extLst>
                 <a:ext uri="{FF2B5EF4-FFF2-40B4-BE49-F238E27FC236}">
-                  <a16:creationId xmlns:a16="http://schemas.microsoft.com/office/drawing/2014/main" id="{56FFDDB0-0F57-D546-A487-CA0DAC9D84D0}"/>
+                  <a16:creationId xmlns:a16="http://schemas.microsoft.com/office/drawing/2014/main" xmlns="" id="{56FFDDB0-0F57-D546-A487-CA0DAC9D84D0}"/>
                 </a:ext>
               </a:extLst>
             </p:cNvPr>
@@ -24857,8 +24872,8 @@
             </a:fontRef>
           </p:style>
         </p:cxnSp>
-        <mc:AlternateContent xmlns:mc="http://schemas.openxmlformats.org/markup-compatibility/2006">
-          <mc:Choice xmlns:a14="http://schemas.microsoft.com/office/drawing/2010/main" Requires="a14">
+        <mc:AlternateContent xmlns:mc="http://schemas.openxmlformats.org/markup-compatibility/2006" xmlns:a14="http://schemas.microsoft.com/office/drawing/2010/main">
+          <mc:Choice Requires="a14">
             <p:sp>
               <p:nvSpPr>
                 <p:cNvPr id="35" name="TextBox 34"/>
@@ -24881,6 +24896,7 @@
                 </a:bodyPr>
                 <a:lstStyle/>
                 <a:p>
+                  <a:pPr/>
                   <a14:m>
                     <m:oMathPara xmlns:m="http://schemas.openxmlformats.org/officeDocument/2006/math">
                       <m:oMathParaPr>
@@ -24905,7 +24921,7 @@
               </p:txBody>
             </p:sp>
           </mc:Choice>
-          <mc:Fallback>
+          <mc:Fallback xmlns="">
             <p:sp>
               <p:nvSpPr>
                 <p:cNvPr id="35" name="TextBox 34"/>
@@ -24944,8 +24960,8 @@
             </p:sp>
           </mc:Fallback>
         </mc:AlternateContent>
-        <mc:AlternateContent xmlns:mc="http://schemas.openxmlformats.org/markup-compatibility/2006">
-          <mc:Choice xmlns:a14="http://schemas.microsoft.com/office/drawing/2010/main" Requires="a14">
+        <mc:AlternateContent xmlns:mc="http://schemas.openxmlformats.org/markup-compatibility/2006" xmlns:a14="http://schemas.microsoft.com/office/drawing/2010/main">
+          <mc:Choice Requires="a14">
             <p:sp>
               <p:nvSpPr>
                 <p:cNvPr id="36" name="TextBox 35"/>
@@ -24968,6 +24984,7 @@
                 </a:bodyPr>
                 <a:lstStyle/>
                 <a:p>
+                  <a:pPr/>
                   <a14:m>
                     <m:oMathPara xmlns:m="http://schemas.openxmlformats.org/officeDocument/2006/math">
                       <m:oMathParaPr>
@@ -24992,7 +25009,7 @@
               </p:txBody>
             </p:sp>
           </mc:Choice>
-          <mc:Fallback>
+          <mc:Fallback xmlns="">
             <p:sp>
               <p:nvSpPr>
                 <p:cNvPr id="36" name="TextBox 35"/>

</xml_diff>